<commit_message>
updates to figures and bug fixes of script
</commit_message>
<xml_diff>
--- a/docs/Maie_v5_Figure.pptx
+++ b/docs/Maie_v5_Figure.pptx
@@ -2,15 +2,15 @@
 <file path=ppt/presentation.xml><?xml version="1.0" encoding="utf-8"?>
 <p:presentation xmlns:a="http://schemas.openxmlformats.org/drawingml/2006/main" xmlns:r="http://schemas.openxmlformats.org/officeDocument/2006/relationships" xmlns:p="http://schemas.openxmlformats.org/presentationml/2006/main" saveSubsetFonts="1" autoCompressPictures="0">
   <p:sldMasterIdLst>
-    <p:sldMasterId id="2147483660" r:id="rId1"/>
+    <p:sldMasterId id="2147483684" r:id="rId1"/>
   </p:sldMasterIdLst>
   <p:notesMasterIdLst>
     <p:notesMasterId r:id="rId3"/>
   </p:notesMasterIdLst>
   <p:sldIdLst>
-    <p:sldId id="266" r:id="rId2"/>
+    <p:sldId id="267" r:id="rId2"/>
   </p:sldIdLst>
-  <p:sldSz cx="13811250" cy="6858000"/>
+  <p:sldSz cx="6858000" cy="9907588"/>
   <p:notesSz cx="6858000" cy="9144000"/>
   <p:defaultTextStyle>
     <a:defPPr>
@@ -107,6 +107,11 @@
       </a:defRPr>
     </a:lvl9pPr>
   </p:defaultTextStyle>
+  <p:extLst>
+    <p:ext uri="{EFAFB233-063F-42B5-8137-9DF3F51BA10A}">
+      <p15:sldGuideLst xmlns:p15="http://schemas.microsoft.com/office/powerpoint/2012/main"/>
+    </p:ext>
+  </p:extLst>
 </p:presentation>
 </file>
 
@@ -200,7 +205,7 @@
           <a:p>
             <a:fld id="{69BCE753-FEAF-2346-94B7-4FCB79DBED48}" type="datetimeFigureOut">
               <a:rPr lang="en-US" smtClean="0"/>
-              <a:t>2/10/23</a:t>
+              <a:t>1/25/24</a:t>
             </a:fld>
             <a:endParaRPr lang="en-US"/>
           </a:p>
@@ -218,8 +223,8 @@
         </p:nvSpPr>
         <p:spPr>
           <a:xfrm>
-            <a:off x="322263" y="1143000"/>
-            <a:ext cx="6213475" cy="3086100"/>
+            <a:off x="2360613" y="1143000"/>
+            <a:ext cx="2136775" cy="3086100"/>
           </a:xfrm>
           <a:prstGeom prst="rect">
             <a:avLst/>
@@ -468,95 +473,6 @@
 </p:notesMaster>
 </file>
 
-<file path=ppt/notesSlides/notesSlide1.xml><?xml version="1.0" encoding="utf-8"?>
-<p:notes xmlns:a="http://schemas.openxmlformats.org/drawingml/2006/main" xmlns:r="http://schemas.openxmlformats.org/officeDocument/2006/relationships" xmlns:p="http://schemas.openxmlformats.org/presentationml/2006/main">
-  <p:cSld>
-    <p:spTree>
-      <p:nvGrpSpPr>
-        <p:cNvPr id="1" name=""/>
-        <p:cNvGrpSpPr/>
-        <p:nvPr/>
-      </p:nvGrpSpPr>
-      <p:grpSpPr>
-        <a:xfrm>
-          <a:off x="0" y="0"/>
-          <a:ext cx="0" cy="0"/>
-          <a:chOff x="0" y="0"/>
-          <a:chExt cx="0" cy="0"/>
-        </a:xfrm>
-      </p:grpSpPr>
-      <p:sp>
-        <p:nvSpPr>
-          <p:cNvPr id="2" name="Slide Image Placeholder 1"/>
-          <p:cNvSpPr>
-            <a:spLocks noGrp="1" noRot="1" noChangeAspect="1"/>
-          </p:cNvSpPr>
-          <p:nvPr>
-            <p:ph type="sldImg"/>
-          </p:nvPr>
-        </p:nvSpPr>
-        <p:spPr>
-          <a:xfrm>
-            <a:off x="322263" y="1143000"/>
-            <a:ext cx="6213475" cy="3086100"/>
-          </a:xfrm>
-        </p:spPr>
-      </p:sp>
-      <p:sp>
-        <p:nvSpPr>
-          <p:cNvPr id="3" name="Notes Placeholder 2"/>
-          <p:cNvSpPr>
-            <a:spLocks noGrp="1"/>
-          </p:cNvSpPr>
-          <p:nvPr>
-            <p:ph type="body" idx="1"/>
-          </p:nvPr>
-        </p:nvSpPr>
-        <p:spPr/>
-        <p:txBody>
-          <a:bodyPr/>
-          <a:lstStyle/>
-          <a:p>
-            <a:endParaRPr lang="en-US" dirty="0"/>
-          </a:p>
-        </p:txBody>
-      </p:sp>
-      <p:sp>
-        <p:nvSpPr>
-          <p:cNvPr id="4" name="Slide Number Placeholder 3"/>
-          <p:cNvSpPr>
-            <a:spLocks noGrp="1"/>
-          </p:cNvSpPr>
-          <p:nvPr>
-            <p:ph type="sldNum" sz="quarter" idx="5"/>
-          </p:nvPr>
-        </p:nvSpPr>
-        <p:spPr/>
-        <p:txBody>
-          <a:bodyPr/>
-          <a:lstStyle/>
-          <a:p>
-            <a:fld id="{8C8FBACB-5A33-E442-9383-B29CA25E1B4F}" type="slidenum">
-              <a:rPr lang="en-US" smtClean="0"/>
-              <a:t>1</a:t>
-            </a:fld>
-            <a:endParaRPr lang="en-US"/>
-          </a:p>
-        </p:txBody>
-      </p:sp>
-    </p:spTree>
-    <p:extLst>
-      <p:ext uri="{BB962C8B-B14F-4D97-AF65-F5344CB8AC3E}">
-        <p14:creationId xmlns:p14="http://schemas.microsoft.com/office/powerpoint/2010/main" val="3517286051"/>
-      </p:ext>
-    </p:extLst>
-  </p:cSld>
-  <p:clrMapOvr>
-    <a:masterClrMapping/>
-  </p:clrMapOvr>
-</p:notes>
-</file>
-
 <file path=ppt/slideLayouts/slideLayout1.xml><?xml version="1.0" encoding="utf-8"?>
 <p:sldLayout xmlns:a="http://schemas.openxmlformats.org/drawingml/2006/main" xmlns:r="http://schemas.openxmlformats.org/officeDocument/2006/relationships" xmlns:p="http://schemas.openxmlformats.org/presentationml/2006/main" type="title" preserve="1">
   <p:cSld name="Title Slide">
@@ -586,15 +502,15 @@
         </p:nvSpPr>
         <p:spPr>
           <a:xfrm>
-            <a:off x="1726406" y="1122363"/>
-            <a:ext cx="10358438" cy="2387600"/>
+            <a:off x="514350" y="1621451"/>
+            <a:ext cx="5829300" cy="3449308"/>
           </a:xfrm>
         </p:spPr>
         <p:txBody>
           <a:bodyPr anchor="b"/>
           <a:lstStyle>
             <a:lvl1pPr algn="ctr">
-              <a:defRPr sz="6000"/>
+              <a:defRPr sz="4500"/>
             </a:lvl1pPr>
           </a:lstStyle>
           <a:p>
@@ -618,8 +534,8 @@
         </p:nvSpPr>
         <p:spPr>
           <a:xfrm>
-            <a:off x="1726406" y="3602038"/>
-            <a:ext cx="10358438" cy="1655762"/>
+            <a:off x="857250" y="5203778"/>
+            <a:ext cx="5143500" cy="2392040"/>
           </a:xfrm>
         </p:spPr>
         <p:txBody>
@@ -627,39 +543,39 @@
           <a:lstStyle>
             <a:lvl1pPr marL="0" indent="0" algn="ctr">
               <a:buNone/>
-              <a:defRPr sz="2400"/>
+              <a:defRPr sz="1800"/>
             </a:lvl1pPr>
-            <a:lvl2pPr marL="457200" indent="0" algn="ctr">
-              <a:buNone/>
-              <a:defRPr sz="2000"/>
+            <a:lvl2pPr marL="342900" indent="0" algn="ctr">
+              <a:buNone/>
+              <a:defRPr sz="1500"/>
             </a:lvl2pPr>
-            <a:lvl3pPr marL="914400" indent="0" algn="ctr">
-              <a:buNone/>
-              <a:defRPr sz="1800"/>
+            <a:lvl3pPr marL="685800" indent="0" algn="ctr">
+              <a:buNone/>
+              <a:defRPr sz="1350"/>
             </a:lvl3pPr>
-            <a:lvl4pPr marL="1371600" indent="0" algn="ctr">
-              <a:buNone/>
-              <a:defRPr sz="1600"/>
+            <a:lvl4pPr marL="1028700" indent="0" algn="ctr">
+              <a:buNone/>
+              <a:defRPr sz="1200"/>
             </a:lvl4pPr>
-            <a:lvl5pPr marL="1828800" indent="0" algn="ctr">
-              <a:buNone/>
-              <a:defRPr sz="1600"/>
+            <a:lvl5pPr marL="1371600" indent="0" algn="ctr">
+              <a:buNone/>
+              <a:defRPr sz="1200"/>
             </a:lvl5pPr>
-            <a:lvl6pPr marL="2286000" indent="0" algn="ctr">
-              <a:buNone/>
-              <a:defRPr sz="1600"/>
+            <a:lvl6pPr marL="1714500" indent="0" algn="ctr">
+              <a:buNone/>
+              <a:defRPr sz="1200"/>
             </a:lvl6pPr>
-            <a:lvl7pPr marL="2743200" indent="0" algn="ctr">
-              <a:buNone/>
-              <a:defRPr sz="1600"/>
+            <a:lvl7pPr marL="2057400" indent="0" algn="ctr">
+              <a:buNone/>
+              <a:defRPr sz="1200"/>
             </a:lvl7pPr>
-            <a:lvl8pPr marL="3200400" indent="0" algn="ctr">
-              <a:buNone/>
-              <a:defRPr sz="1600"/>
+            <a:lvl8pPr marL="2400300" indent="0" algn="ctr">
+              <a:buNone/>
+              <a:defRPr sz="1200"/>
             </a:lvl8pPr>
-            <a:lvl9pPr marL="3657600" indent="0" algn="ctr">
-              <a:buNone/>
-              <a:defRPr sz="1600"/>
+            <a:lvl9pPr marL="2743200" indent="0" algn="ctr">
+              <a:buNone/>
+              <a:defRPr sz="1200"/>
             </a:lvl9pPr>
           </a:lstStyle>
           <a:p>
@@ -688,7 +604,7 @@
           <a:p>
             <a:fld id="{17D8D008-64F1-FB47-AAE7-E5AAE46159A6}" type="datetimeFigureOut">
               <a:rPr lang="en-US" smtClean="0"/>
-              <a:t>2/10/23</a:t>
+              <a:t>1/25/24</a:t>
             </a:fld>
             <a:endParaRPr lang="en-US"/>
           </a:p>
@@ -739,7 +655,7 @@
     </p:spTree>
     <p:extLst>
       <p:ext uri="{BB962C8B-B14F-4D97-AF65-F5344CB8AC3E}">
-        <p14:creationId xmlns:p14="http://schemas.microsoft.com/office/powerpoint/2010/main" val="1714070767"/>
+        <p14:creationId xmlns:p14="http://schemas.microsoft.com/office/powerpoint/2010/main" val="1593257809"/>
       </p:ext>
     </p:extLst>
   </p:cSld>
@@ -858,7 +774,7 @@
           <a:p>
             <a:fld id="{17D8D008-64F1-FB47-AAE7-E5AAE46159A6}" type="datetimeFigureOut">
               <a:rPr lang="en-US" smtClean="0"/>
-              <a:t>2/10/23</a:t>
+              <a:t>1/25/24</a:t>
             </a:fld>
             <a:endParaRPr lang="en-US"/>
           </a:p>
@@ -909,7 +825,7 @@
     </p:spTree>
     <p:extLst>
       <p:ext uri="{BB962C8B-B14F-4D97-AF65-F5344CB8AC3E}">
-        <p14:creationId xmlns:p14="http://schemas.microsoft.com/office/powerpoint/2010/main" val="962118207"/>
+        <p14:creationId xmlns:p14="http://schemas.microsoft.com/office/powerpoint/2010/main" val="3846080605"/>
       </p:ext>
     </p:extLst>
   </p:cSld>
@@ -948,8 +864,8 @@
         </p:nvSpPr>
         <p:spPr>
           <a:xfrm>
-            <a:off x="9883676" y="365125"/>
-            <a:ext cx="2978051" cy="5811838"/>
+            <a:off x="4907757" y="527487"/>
+            <a:ext cx="1478756" cy="8396223"/>
           </a:xfrm>
         </p:spPr>
         <p:txBody>
@@ -976,8 +892,8 @@
         </p:nvSpPr>
         <p:spPr>
           <a:xfrm>
-            <a:off x="949523" y="365125"/>
-            <a:ext cx="8761512" cy="5811838"/>
+            <a:off x="471488" y="527487"/>
+            <a:ext cx="4350544" cy="8396223"/>
           </a:xfrm>
         </p:spPr>
         <p:txBody>
@@ -1038,7 +954,7 @@
           <a:p>
             <a:fld id="{17D8D008-64F1-FB47-AAE7-E5AAE46159A6}" type="datetimeFigureOut">
               <a:rPr lang="en-US" smtClean="0"/>
-              <a:t>2/10/23</a:t>
+              <a:t>1/25/24</a:t>
             </a:fld>
             <a:endParaRPr lang="en-US"/>
           </a:p>
@@ -1089,7 +1005,7 @@
     </p:spTree>
     <p:extLst>
       <p:ext uri="{BB962C8B-B14F-4D97-AF65-F5344CB8AC3E}">
-        <p14:creationId xmlns:p14="http://schemas.microsoft.com/office/powerpoint/2010/main" val="974467460"/>
+        <p14:creationId xmlns:p14="http://schemas.microsoft.com/office/powerpoint/2010/main" val="1452798836"/>
       </p:ext>
     </p:extLst>
   </p:cSld>
@@ -1208,7 +1124,7 @@
           <a:p>
             <a:fld id="{17D8D008-64F1-FB47-AAE7-E5AAE46159A6}" type="datetimeFigureOut">
               <a:rPr lang="en-US" smtClean="0"/>
-              <a:t>2/10/23</a:t>
+              <a:t>1/25/24</a:t>
             </a:fld>
             <a:endParaRPr lang="en-US"/>
           </a:p>
@@ -1259,7 +1175,7 @@
     </p:spTree>
     <p:extLst>
       <p:ext uri="{BB962C8B-B14F-4D97-AF65-F5344CB8AC3E}">
-        <p14:creationId xmlns:p14="http://schemas.microsoft.com/office/powerpoint/2010/main" val="2129904093"/>
+        <p14:creationId xmlns:p14="http://schemas.microsoft.com/office/powerpoint/2010/main" val="4183887807"/>
       </p:ext>
     </p:extLst>
   </p:cSld>
@@ -1298,15 +1214,15 @@
         </p:nvSpPr>
         <p:spPr>
           <a:xfrm>
-            <a:off x="942330" y="1709739"/>
-            <a:ext cx="11912203" cy="2852737"/>
+            <a:off x="467916" y="2470019"/>
+            <a:ext cx="5915025" cy="4121281"/>
           </a:xfrm>
         </p:spPr>
         <p:txBody>
           <a:bodyPr anchor="b"/>
           <a:lstStyle>
             <a:lvl1pPr>
-              <a:defRPr sz="6000"/>
+              <a:defRPr sz="4500"/>
             </a:lvl1pPr>
           </a:lstStyle>
           <a:p>
@@ -1330,8 +1246,8 @@
         </p:nvSpPr>
         <p:spPr>
           <a:xfrm>
-            <a:off x="942330" y="4589464"/>
-            <a:ext cx="11912203" cy="1500187"/>
+            <a:off x="467916" y="6630289"/>
+            <a:ext cx="5915025" cy="2167284"/>
           </a:xfrm>
         </p:spPr>
         <p:txBody>
@@ -1339,17 +1255,15 @@
           <a:lstStyle>
             <a:lvl1pPr marL="0" indent="0">
               <a:buNone/>
-              <a:defRPr sz="2400">
+              <a:defRPr sz="1800">
                 <a:solidFill>
-                  <a:schemeClr val="tx1">
-                    <a:tint val="75000"/>
-                  </a:schemeClr>
+                  <a:schemeClr val="tx1"/>
                 </a:solidFill>
               </a:defRPr>
             </a:lvl1pPr>
-            <a:lvl2pPr marL="457200" indent="0">
-              <a:buNone/>
-              <a:defRPr sz="2000">
+            <a:lvl2pPr marL="342900" indent="0">
+              <a:buNone/>
+              <a:defRPr sz="1500">
                 <a:solidFill>
                   <a:schemeClr val="tx1">
                     <a:tint val="75000"/>
@@ -1357,9 +1271,9 @@
                 </a:solidFill>
               </a:defRPr>
             </a:lvl2pPr>
-            <a:lvl3pPr marL="914400" indent="0">
-              <a:buNone/>
-              <a:defRPr sz="1800">
+            <a:lvl3pPr marL="685800" indent="0">
+              <a:buNone/>
+              <a:defRPr sz="1350">
                 <a:solidFill>
                   <a:schemeClr val="tx1">
                     <a:tint val="75000"/>
@@ -1367,9 +1281,9 @@
                 </a:solidFill>
               </a:defRPr>
             </a:lvl3pPr>
-            <a:lvl4pPr marL="1371600" indent="0">
-              <a:buNone/>
-              <a:defRPr sz="1600">
+            <a:lvl4pPr marL="1028700" indent="0">
+              <a:buNone/>
+              <a:defRPr sz="1200">
                 <a:solidFill>
                   <a:schemeClr val="tx1">
                     <a:tint val="75000"/>
@@ -1377,9 +1291,9 @@
                 </a:solidFill>
               </a:defRPr>
             </a:lvl4pPr>
-            <a:lvl5pPr marL="1828800" indent="0">
-              <a:buNone/>
-              <a:defRPr sz="1600">
+            <a:lvl5pPr marL="1371600" indent="0">
+              <a:buNone/>
+              <a:defRPr sz="1200">
                 <a:solidFill>
                   <a:schemeClr val="tx1">
                     <a:tint val="75000"/>
@@ -1387,9 +1301,9 @@
                 </a:solidFill>
               </a:defRPr>
             </a:lvl5pPr>
-            <a:lvl6pPr marL="2286000" indent="0">
-              <a:buNone/>
-              <a:defRPr sz="1600">
+            <a:lvl6pPr marL="1714500" indent="0">
+              <a:buNone/>
+              <a:defRPr sz="1200">
                 <a:solidFill>
                   <a:schemeClr val="tx1">
                     <a:tint val="75000"/>
@@ -1397,9 +1311,9 @@
                 </a:solidFill>
               </a:defRPr>
             </a:lvl6pPr>
-            <a:lvl7pPr marL="2743200" indent="0">
-              <a:buNone/>
-              <a:defRPr sz="1600">
+            <a:lvl7pPr marL="2057400" indent="0">
+              <a:buNone/>
+              <a:defRPr sz="1200">
                 <a:solidFill>
                   <a:schemeClr val="tx1">
                     <a:tint val="75000"/>
@@ -1407,9 +1321,9 @@
                 </a:solidFill>
               </a:defRPr>
             </a:lvl7pPr>
-            <a:lvl8pPr marL="3200400" indent="0">
-              <a:buNone/>
-              <a:defRPr sz="1600">
+            <a:lvl8pPr marL="2400300" indent="0">
+              <a:buNone/>
+              <a:defRPr sz="1200">
                 <a:solidFill>
                   <a:schemeClr val="tx1">
                     <a:tint val="75000"/>
@@ -1417,9 +1331,9 @@
                 </a:solidFill>
               </a:defRPr>
             </a:lvl8pPr>
-            <a:lvl9pPr marL="3657600" indent="0">
-              <a:buNone/>
-              <a:defRPr sz="1600">
+            <a:lvl9pPr marL="2743200" indent="0">
+              <a:buNone/>
+              <a:defRPr sz="1200">
                 <a:solidFill>
                   <a:schemeClr val="tx1">
                     <a:tint val="75000"/>
@@ -1454,7 +1368,7 @@
           <a:p>
             <a:fld id="{17D8D008-64F1-FB47-AAE7-E5AAE46159A6}" type="datetimeFigureOut">
               <a:rPr lang="en-US" smtClean="0"/>
-              <a:t>2/10/23</a:t>
+              <a:t>1/25/24</a:t>
             </a:fld>
             <a:endParaRPr lang="en-US"/>
           </a:p>
@@ -1505,7 +1419,7 @@
     </p:spTree>
     <p:extLst>
       <p:ext uri="{BB962C8B-B14F-4D97-AF65-F5344CB8AC3E}">
-        <p14:creationId xmlns:p14="http://schemas.microsoft.com/office/powerpoint/2010/main" val="875684441"/>
+        <p14:creationId xmlns:p14="http://schemas.microsoft.com/office/powerpoint/2010/main" val="3044481768"/>
       </p:ext>
     </p:extLst>
   </p:cSld>
@@ -1567,8 +1481,8 @@
         </p:nvSpPr>
         <p:spPr>
           <a:xfrm>
-            <a:off x="949524" y="1825625"/>
-            <a:ext cx="5869781" cy="4351338"/>
+            <a:off x="471488" y="2637436"/>
+            <a:ext cx="2914650" cy="6286274"/>
           </a:xfrm>
         </p:spPr>
         <p:txBody>
@@ -1624,8 +1538,8 @@
         </p:nvSpPr>
         <p:spPr>
           <a:xfrm>
-            <a:off x="6991945" y="1825625"/>
-            <a:ext cx="5869781" cy="4351338"/>
+            <a:off x="3471863" y="2637436"/>
+            <a:ext cx="2914650" cy="6286274"/>
           </a:xfrm>
         </p:spPr>
         <p:txBody>
@@ -1686,7 +1600,7 @@
           <a:p>
             <a:fld id="{17D8D008-64F1-FB47-AAE7-E5AAE46159A6}" type="datetimeFigureOut">
               <a:rPr lang="en-US" smtClean="0"/>
-              <a:t>2/10/23</a:t>
+              <a:t>1/25/24</a:t>
             </a:fld>
             <a:endParaRPr lang="en-US"/>
           </a:p>
@@ -1737,7 +1651,7 @@
     </p:spTree>
     <p:extLst>
       <p:ext uri="{BB962C8B-B14F-4D97-AF65-F5344CB8AC3E}">
-        <p14:creationId xmlns:p14="http://schemas.microsoft.com/office/powerpoint/2010/main" val="1209630944"/>
+        <p14:creationId xmlns:p14="http://schemas.microsoft.com/office/powerpoint/2010/main" val="1880045307"/>
       </p:ext>
     </p:extLst>
   </p:cSld>
@@ -1776,8 +1690,8 @@
         </p:nvSpPr>
         <p:spPr>
           <a:xfrm>
-            <a:off x="951322" y="365126"/>
-            <a:ext cx="11912203" cy="1325563"/>
+            <a:off x="472381" y="527490"/>
+            <a:ext cx="5915025" cy="1915009"/>
           </a:xfrm>
         </p:spPr>
         <p:txBody>
@@ -1804,8 +1718,8 @@
         </p:nvSpPr>
         <p:spPr>
           <a:xfrm>
-            <a:off x="951323" y="1681163"/>
-            <a:ext cx="5842806" cy="823912"/>
+            <a:off x="472381" y="2428736"/>
+            <a:ext cx="2901255" cy="1190286"/>
           </a:xfrm>
         </p:spPr>
         <p:txBody>
@@ -1813,39 +1727,39 @@
           <a:lstStyle>
             <a:lvl1pPr marL="0" indent="0">
               <a:buNone/>
-              <a:defRPr sz="2400" b="1"/>
+              <a:defRPr sz="1800" b="1"/>
             </a:lvl1pPr>
-            <a:lvl2pPr marL="457200" indent="0">
-              <a:buNone/>
-              <a:defRPr sz="2000" b="1"/>
+            <a:lvl2pPr marL="342900" indent="0">
+              <a:buNone/>
+              <a:defRPr sz="1500" b="1"/>
             </a:lvl2pPr>
-            <a:lvl3pPr marL="914400" indent="0">
-              <a:buNone/>
-              <a:defRPr sz="1800" b="1"/>
+            <a:lvl3pPr marL="685800" indent="0">
+              <a:buNone/>
+              <a:defRPr sz="1350" b="1"/>
             </a:lvl3pPr>
-            <a:lvl4pPr marL="1371600" indent="0">
-              <a:buNone/>
-              <a:defRPr sz="1600" b="1"/>
+            <a:lvl4pPr marL="1028700" indent="0">
+              <a:buNone/>
+              <a:defRPr sz="1200" b="1"/>
             </a:lvl4pPr>
-            <a:lvl5pPr marL="1828800" indent="0">
-              <a:buNone/>
-              <a:defRPr sz="1600" b="1"/>
+            <a:lvl5pPr marL="1371600" indent="0">
+              <a:buNone/>
+              <a:defRPr sz="1200" b="1"/>
             </a:lvl5pPr>
-            <a:lvl6pPr marL="2286000" indent="0">
-              <a:buNone/>
-              <a:defRPr sz="1600" b="1"/>
+            <a:lvl6pPr marL="1714500" indent="0">
+              <a:buNone/>
+              <a:defRPr sz="1200" b="1"/>
             </a:lvl6pPr>
-            <a:lvl7pPr marL="2743200" indent="0">
-              <a:buNone/>
-              <a:defRPr sz="1600" b="1"/>
+            <a:lvl7pPr marL="2057400" indent="0">
+              <a:buNone/>
+              <a:defRPr sz="1200" b="1"/>
             </a:lvl7pPr>
-            <a:lvl8pPr marL="3200400" indent="0">
-              <a:buNone/>
-              <a:defRPr sz="1600" b="1"/>
+            <a:lvl8pPr marL="2400300" indent="0">
+              <a:buNone/>
+              <a:defRPr sz="1200" b="1"/>
             </a:lvl8pPr>
-            <a:lvl9pPr marL="3657600" indent="0">
-              <a:buNone/>
-              <a:defRPr sz="1600" b="1"/>
+            <a:lvl9pPr marL="2743200" indent="0">
+              <a:buNone/>
+              <a:defRPr sz="1200" b="1"/>
             </a:lvl9pPr>
           </a:lstStyle>
           <a:p>
@@ -1869,8 +1783,8 @@
         </p:nvSpPr>
         <p:spPr>
           <a:xfrm>
-            <a:off x="951323" y="2505075"/>
-            <a:ext cx="5842806" cy="3684588"/>
+            <a:off x="472381" y="3619022"/>
+            <a:ext cx="2901255" cy="5323036"/>
           </a:xfrm>
         </p:spPr>
         <p:txBody>
@@ -1926,8 +1840,8 @@
         </p:nvSpPr>
         <p:spPr>
           <a:xfrm>
-            <a:off x="6991945" y="1681163"/>
-            <a:ext cx="5871580" cy="823912"/>
+            <a:off x="3471863" y="2428736"/>
+            <a:ext cx="2915543" cy="1190286"/>
           </a:xfrm>
         </p:spPr>
         <p:txBody>
@@ -1935,39 +1849,39 @@
           <a:lstStyle>
             <a:lvl1pPr marL="0" indent="0">
               <a:buNone/>
-              <a:defRPr sz="2400" b="1"/>
+              <a:defRPr sz="1800" b="1"/>
             </a:lvl1pPr>
-            <a:lvl2pPr marL="457200" indent="0">
-              <a:buNone/>
-              <a:defRPr sz="2000" b="1"/>
+            <a:lvl2pPr marL="342900" indent="0">
+              <a:buNone/>
+              <a:defRPr sz="1500" b="1"/>
             </a:lvl2pPr>
-            <a:lvl3pPr marL="914400" indent="0">
-              <a:buNone/>
-              <a:defRPr sz="1800" b="1"/>
+            <a:lvl3pPr marL="685800" indent="0">
+              <a:buNone/>
+              <a:defRPr sz="1350" b="1"/>
             </a:lvl3pPr>
-            <a:lvl4pPr marL="1371600" indent="0">
-              <a:buNone/>
-              <a:defRPr sz="1600" b="1"/>
+            <a:lvl4pPr marL="1028700" indent="0">
+              <a:buNone/>
+              <a:defRPr sz="1200" b="1"/>
             </a:lvl4pPr>
-            <a:lvl5pPr marL="1828800" indent="0">
-              <a:buNone/>
-              <a:defRPr sz="1600" b="1"/>
+            <a:lvl5pPr marL="1371600" indent="0">
+              <a:buNone/>
+              <a:defRPr sz="1200" b="1"/>
             </a:lvl5pPr>
-            <a:lvl6pPr marL="2286000" indent="0">
-              <a:buNone/>
-              <a:defRPr sz="1600" b="1"/>
+            <a:lvl6pPr marL="1714500" indent="0">
+              <a:buNone/>
+              <a:defRPr sz="1200" b="1"/>
             </a:lvl6pPr>
-            <a:lvl7pPr marL="2743200" indent="0">
-              <a:buNone/>
-              <a:defRPr sz="1600" b="1"/>
+            <a:lvl7pPr marL="2057400" indent="0">
+              <a:buNone/>
+              <a:defRPr sz="1200" b="1"/>
             </a:lvl7pPr>
-            <a:lvl8pPr marL="3200400" indent="0">
-              <a:buNone/>
-              <a:defRPr sz="1600" b="1"/>
+            <a:lvl8pPr marL="2400300" indent="0">
+              <a:buNone/>
+              <a:defRPr sz="1200" b="1"/>
             </a:lvl8pPr>
-            <a:lvl9pPr marL="3657600" indent="0">
-              <a:buNone/>
-              <a:defRPr sz="1600" b="1"/>
+            <a:lvl9pPr marL="2743200" indent="0">
+              <a:buNone/>
+              <a:defRPr sz="1200" b="1"/>
             </a:lvl9pPr>
           </a:lstStyle>
           <a:p>
@@ -1991,8 +1905,8 @@
         </p:nvSpPr>
         <p:spPr>
           <a:xfrm>
-            <a:off x="6991945" y="2505075"/>
-            <a:ext cx="5871580" cy="3684588"/>
+            <a:off x="3471863" y="3619022"/>
+            <a:ext cx="2915543" cy="5323036"/>
           </a:xfrm>
         </p:spPr>
         <p:txBody>
@@ -2053,7 +1967,7 @@
           <a:p>
             <a:fld id="{17D8D008-64F1-FB47-AAE7-E5AAE46159A6}" type="datetimeFigureOut">
               <a:rPr lang="en-US" smtClean="0"/>
-              <a:t>2/10/23</a:t>
+              <a:t>1/25/24</a:t>
             </a:fld>
             <a:endParaRPr lang="en-US"/>
           </a:p>
@@ -2104,7 +2018,7 @@
     </p:spTree>
     <p:extLst>
       <p:ext uri="{BB962C8B-B14F-4D97-AF65-F5344CB8AC3E}">
-        <p14:creationId xmlns:p14="http://schemas.microsoft.com/office/powerpoint/2010/main" val="979487251"/>
+        <p14:creationId xmlns:p14="http://schemas.microsoft.com/office/powerpoint/2010/main" val="1426632524"/>
       </p:ext>
     </p:extLst>
   </p:cSld>
@@ -2171,7 +2085,7 @@
           <a:p>
             <a:fld id="{17D8D008-64F1-FB47-AAE7-E5AAE46159A6}" type="datetimeFigureOut">
               <a:rPr lang="en-US" smtClean="0"/>
-              <a:t>2/10/23</a:t>
+              <a:t>1/25/24</a:t>
             </a:fld>
             <a:endParaRPr lang="en-US"/>
           </a:p>
@@ -2222,7 +2136,7 @@
     </p:spTree>
     <p:extLst>
       <p:ext uri="{BB962C8B-B14F-4D97-AF65-F5344CB8AC3E}">
-        <p14:creationId xmlns:p14="http://schemas.microsoft.com/office/powerpoint/2010/main" val="1222249585"/>
+        <p14:creationId xmlns:p14="http://schemas.microsoft.com/office/powerpoint/2010/main" val="430714591"/>
       </p:ext>
     </p:extLst>
   </p:cSld>
@@ -2266,7 +2180,7 @@
           <a:p>
             <a:fld id="{17D8D008-64F1-FB47-AAE7-E5AAE46159A6}" type="datetimeFigureOut">
               <a:rPr lang="en-US" smtClean="0"/>
-              <a:t>2/10/23</a:t>
+              <a:t>1/25/24</a:t>
             </a:fld>
             <a:endParaRPr lang="en-US"/>
           </a:p>
@@ -2317,7 +2231,7 @@
     </p:spTree>
     <p:extLst>
       <p:ext uri="{BB962C8B-B14F-4D97-AF65-F5344CB8AC3E}">
-        <p14:creationId xmlns:p14="http://schemas.microsoft.com/office/powerpoint/2010/main" val="154756359"/>
+        <p14:creationId xmlns:p14="http://schemas.microsoft.com/office/powerpoint/2010/main" val="366218638"/>
       </p:ext>
     </p:extLst>
   </p:cSld>
@@ -2356,15 +2270,15 @@
         </p:nvSpPr>
         <p:spPr>
           <a:xfrm>
-            <a:off x="951323" y="457200"/>
-            <a:ext cx="4454487" cy="1600200"/>
+            <a:off x="472381" y="660506"/>
+            <a:ext cx="2211884" cy="2311771"/>
           </a:xfrm>
         </p:spPr>
         <p:txBody>
           <a:bodyPr anchor="b"/>
           <a:lstStyle>
             <a:lvl1pPr>
-              <a:defRPr sz="3200"/>
+              <a:defRPr sz="2400"/>
             </a:lvl1pPr>
           </a:lstStyle>
           <a:p>
@@ -2388,39 +2302,39 @@
         </p:nvSpPr>
         <p:spPr>
           <a:xfrm>
-            <a:off x="5871580" y="987426"/>
-            <a:ext cx="6991945" cy="4873625"/>
+            <a:off x="2915543" y="1426511"/>
+            <a:ext cx="3471863" cy="7040809"/>
           </a:xfrm>
         </p:spPr>
         <p:txBody>
           <a:bodyPr/>
           <a:lstStyle>
             <a:lvl1pPr>
-              <a:defRPr sz="3200"/>
+              <a:defRPr sz="2400"/>
             </a:lvl1pPr>
             <a:lvl2pPr>
-              <a:defRPr sz="2800"/>
+              <a:defRPr sz="2100"/>
             </a:lvl2pPr>
             <a:lvl3pPr>
-              <a:defRPr sz="2400"/>
+              <a:defRPr sz="1800"/>
             </a:lvl3pPr>
             <a:lvl4pPr>
-              <a:defRPr sz="2000"/>
+              <a:defRPr sz="1500"/>
             </a:lvl4pPr>
             <a:lvl5pPr>
-              <a:defRPr sz="2000"/>
+              <a:defRPr sz="1500"/>
             </a:lvl5pPr>
             <a:lvl6pPr>
-              <a:defRPr sz="2000"/>
+              <a:defRPr sz="1500"/>
             </a:lvl6pPr>
             <a:lvl7pPr>
-              <a:defRPr sz="2000"/>
+              <a:defRPr sz="1500"/>
             </a:lvl7pPr>
             <a:lvl8pPr>
-              <a:defRPr sz="2000"/>
+              <a:defRPr sz="1500"/>
             </a:lvl8pPr>
             <a:lvl9pPr>
-              <a:defRPr sz="2000"/>
+              <a:defRPr sz="1500"/>
             </a:lvl9pPr>
           </a:lstStyle>
           <a:p>
@@ -2473,8 +2387,8 @@
         </p:nvSpPr>
         <p:spPr>
           <a:xfrm>
-            <a:off x="951323" y="2057400"/>
-            <a:ext cx="4454487" cy="3811588"/>
+            <a:off x="472381" y="2972276"/>
+            <a:ext cx="2211884" cy="5506510"/>
           </a:xfrm>
         </p:spPr>
         <p:txBody>
@@ -2482,39 +2396,39 @@
           <a:lstStyle>
             <a:lvl1pPr marL="0" indent="0">
               <a:buNone/>
-              <a:defRPr sz="1600"/>
+              <a:defRPr sz="1200"/>
             </a:lvl1pPr>
-            <a:lvl2pPr marL="457200" indent="0">
-              <a:buNone/>
-              <a:defRPr sz="1400"/>
+            <a:lvl2pPr marL="342900" indent="0">
+              <a:buNone/>
+              <a:defRPr sz="1050"/>
             </a:lvl2pPr>
-            <a:lvl3pPr marL="914400" indent="0">
-              <a:buNone/>
-              <a:defRPr sz="1200"/>
+            <a:lvl3pPr marL="685800" indent="0">
+              <a:buNone/>
+              <a:defRPr sz="900"/>
             </a:lvl3pPr>
-            <a:lvl4pPr marL="1371600" indent="0">
-              <a:buNone/>
-              <a:defRPr sz="1000"/>
+            <a:lvl4pPr marL="1028700" indent="0">
+              <a:buNone/>
+              <a:defRPr sz="750"/>
             </a:lvl4pPr>
-            <a:lvl5pPr marL="1828800" indent="0">
-              <a:buNone/>
-              <a:defRPr sz="1000"/>
+            <a:lvl5pPr marL="1371600" indent="0">
+              <a:buNone/>
+              <a:defRPr sz="750"/>
             </a:lvl5pPr>
-            <a:lvl6pPr marL="2286000" indent="0">
-              <a:buNone/>
-              <a:defRPr sz="1000"/>
+            <a:lvl6pPr marL="1714500" indent="0">
+              <a:buNone/>
+              <a:defRPr sz="750"/>
             </a:lvl6pPr>
-            <a:lvl7pPr marL="2743200" indent="0">
-              <a:buNone/>
-              <a:defRPr sz="1000"/>
+            <a:lvl7pPr marL="2057400" indent="0">
+              <a:buNone/>
+              <a:defRPr sz="750"/>
             </a:lvl7pPr>
-            <a:lvl8pPr marL="3200400" indent="0">
-              <a:buNone/>
-              <a:defRPr sz="1000"/>
+            <a:lvl8pPr marL="2400300" indent="0">
+              <a:buNone/>
+              <a:defRPr sz="750"/>
             </a:lvl8pPr>
-            <a:lvl9pPr marL="3657600" indent="0">
-              <a:buNone/>
-              <a:defRPr sz="1000"/>
+            <a:lvl9pPr marL="2743200" indent="0">
+              <a:buNone/>
+              <a:defRPr sz="750"/>
             </a:lvl9pPr>
           </a:lstStyle>
           <a:p>
@@ -2543,7 +2457,7 @@
           <a:p>
             <a:fld id="{17D8D008-64F1-FB47-AAE7-E5AAE46159A6}" type="datetimeFigureOut">
               <a:rPr lang="en-US" smtClean="0"/>
-              <a:t>2/10/23</a:t>
+              <a:t>1/25/24</a:t>
             </a:fld>
             <a:endParaRPr lang="en-US"/>
           </a:p>
@@ -2594,7 +2508,7 @@
     </p:spTree>
     <p:extLst>
       <p:ext uri="{BB962C8B-B14F-4D97-AF65-F5344CB8AC3E}">
-        <p14:creationId xmlns:p14="http://schemas.microsoft.com/office/powerpoint/2010/main" val="4241011984"/>
+        <p14:creationId xmlns:p14="http://schemas.microsoft.com/office/powerpoint/2010/main" val="3889691724"/>
       </p:ext>
     </p:extLst>
   </p:cSld>
@@ -2633,15 +2547,15 @@
         </p:nvSpPr>
         <p:spPr>
           <a:xfrm>
-            <a:off x="951323" y="457200"/>
-            <a:ext cx="4454487" cy="1600200"/>
+            <a:off x="472381" y="660506"/>
+            <a:ext cx="2211884" cy="2311771"/>
           </a:xfrm>
         </p:spPr>
         <p:txBody>
           <a:bodyPr anchor="b"/>
           <a:lstStyle>
             <a:lvl1pPr>
-              <a:defRPr sz="3200"/>
+              <a:defRPr sz="2400"/>
             </a:lvl1pPr>
           </a:lstStyle>
           <a:p>
@@ -2665,8 +2579,8 @@
         </p:nvSpPr>
         <p:spPr>
           <a:xfrm>
-            <a:off x="5871580" y="987426"/>
-            <a:ext cx="6991945" cy="4873625"/>
+            <a:off x="2915543" y="1426511"/>
+            <a:ext cx="3471863" cy="7040809"/>
           </a:xfrm>
         </p:spPr>
         <p:txBody>
@@ -2674,39 +2588,39 @@
           <a:lstStyle>
             <a:lvl1pPr marL="0" indent="0">
               <a:buNone/>
-              <a:defRPr sz="3200"/>
+              <a:defRPr sz="2400"/>
             </a:lvl1pPr>
-            <a:lvl2pPr marL="457200" indent="0">
-              <a:buNone/>
-              <a:defRPr sz="2800"/>
+            <a:lvl2pPr marL="342900" indent="0">
+              <a:buNone/>
+              <a:defRPr sz="2100"/>
             </a:lvl2pPr>
-            <a:lvl3pPr marL="914400" indent="0">
-              <a:buNone/>
-              <a:defRPr sz="2400"/>
+            <a:lvl3pPr marL="685800" indent="0">
+              <a:buNone/>
+              <a:defRPr sz="1800"/>
             </a:lvl3pPr>
-            <a:lvl4pPr marL="1371600" indent="0">
-              <a:buNone/>
-              <a:defRPr sz="2000"/>
+            <a:lvl4pPr marL="1028700" indent="0">
+              <a:buNone/>
+              <a:defRPr sz="1500"/>
             </a:lvl4pPr>
-            <a:lvl5pPr marL="1828800" indent="0">
-              <a:buNone/>
-              <a:defRPr sz="2000"/>
+            <a:lvl5pPr marL="1371600" indent="0">
+              <a:buNone/>
+              <a:defRPr sz="1500"/>
             </a:lvl5pPr>
-            <a:lvl6pPr marL="2286000" indent="0">
-              <a:buNone/>
-              <a:defRPr sz="2000"/>
+            <a:lvl6pPr marL="1714500" indent="0">
+              <a:buNone/>
+              <a:defRPr sz="1500"/>
             </a:lvl6pPr>
-            <a:lvl7pPr marL="2743200" indent="0">
-              <a:buNone/>
-              <a:defRPr sz="2000"/>
+            <a:lvl7pPr marL="2057400" indent="0">
+              <a:buNone/>
+              <a:defRPr sz="1500"/>
             </a:lvl7pPr>
-            <a:lvl8pPr marL="3200400" indent="0">
-              <a:buNone/>
-              <a:defRPr sz="2000"/>
+            <a:lvl8pPr marL="2400300" indent="0">
+              <a:buNone/>
+              <a:defRPr sz="1500"/>
             </a:lvl8pPr>
-            <a:lvl9pPr marL="3657600" indent="0">
-              <a:buNone/>
-              <a:defRPr sz="2000"/>
+            <a:lvl9pPr marL="2743200" indent="0">
+              <a:buNone/>
+              <a:defRPr sz="1500"/>
             </a:lvl9pPr>
           </a:lstStyle>
           <a:p>
@@ -2730,8 +2644,8 @@
         </p:nvSpPr>
         <p:spPr>
           <a:xfrm>
-            <a:off x="951323" y="2057400"/>
-            <a:ext cx="4454487" cy="3811588"/>
+            <a:off x="472381" y="2972276"/>
+            <a:ext cx="2211884" cy="5506510"/>
           </a:xfrm>
         </p:spPr>
         <p:txBody>
@@ -2739,39 +2653,39 @@
           <a:lstStyle>
             <a:lvl1pPr marL="0" indent="0">
               <a:buNone/>
-              <a:defRPr sz="1600"/>
+              <a:defRPr sz="1200"/>
             </a:lvl1pPr>
-            <a:lvl2pPr marL="457200" indent="0">
-              <a:buNone/>
-              <a:defRPr sz="1400"/>
+            <a:lvl2pPr marL="342900" indent="0">
+              <a:buNone/>
+              <a:defRPr sz="1050"/>
             </a:lvl2pPr>
-            <a:lvl3pPr marL="914400" indent="0">
-              <a:buNone/>
-              <a:defRPr sz="1200"/>
+            <a:lvl3pPr marL="685800" indent="0">
+              <a:buNone/>
+              <a:defRPr sz="900"/>
             </a:lvl3pPr>
-            <a:lvl4pPr marL="1371600" indent="0">
-              <a:buNone/>
-              <a:defRPr sz="1000"/>
+            <a:lvl4pPr marL="1028700" indent="0">
+              <a:buNone/>
+              <a:defRPr sz="750"/>
             </a:lvl4pPr>
-            <a:lvl5pPr marL="1828800" indent="0">
-              <a:buNone/>
-              <a:defRPr sz="1000"/>
+            <a:lvl5pPr marL="1371600" indent="0">
+              <a:buNone/>
+              <a:defRPr sz="750"/>
             </a:lvl5pPr>
-            <a:lvl6pPr marL="2286000" indent="0">
-              <a:buNone/>
-              <a:defRPr sz="1000"/>
+            <a:lvl6pPr marL="1714500" indent="0">
+              <a:buNone/>
+              <a:defRPr sz="750"/>
             </a:lvl6pPr>
-            <a:lvl7pPr marL="2743200" indent="0">
-              <a:buNone/>
-              <a:defRPr sz="1000"/>
+            <a:lvl7pPr marL="2057400" indent="0">
+              <a:buNone/>
+              <a:defRPr sz="750"/>
             </a:lvl7pPr>
-            <a:lvl8pPr marL="3200400" indent="0">
-              <a:buNone/>
-              <a:defRPr sz="1000"/>
+            <a:lvl8pPr marL="2400300" indent="0">
+              <a:buNone/>
+              <a:defRPr sz="750"/>
             </a:lvl8pPr>
-            <a:lvl9pPr marL="3657600" indent="0">
-              <a:buNone/>
-              <a:defRPr sz="1000"/>
+            <a:lvl9pPr marL="2743200" indent="0">
+              <a:buNone/>
+              <a:defRPr sz="750"/>
             </a:lvl9pPr>
           </a:lstStyle>
           <a:p>
@@ -2800,7 +2714,7 @@
           <a:p>
             <a:fld id="{17D8D008-64F1-FB47-AAE7-E5AAE46159A6}" type="datetimeFigureOut">
               <a:rPr lang="en-US" smtClean="0"/>
-              <a:t>2/10/23</a:t>
+              <a:t>1/25/24</a:t>
             </a:fld>
             <a:endParaRPr lang="en-US"/>
           </a:p>
@@ -2851,7 +2765,7 @@
     </p:spTree>
     <p:extLst>
       <p:ext uri="{BB962C8B-B14F-4D97-AF65-F5344CB8AC3E}">
-        <p14:creationId xmlns:p14="http://schemas.microsoft.com/office/powerpoint/2010/main" val="4200215778"/>
+        <p14:creationId xmlns:p14="http://schemas.microsoft.com/office/powerpoint/2010/main" val="911366680"/>
       </p:ext>
     </p:extLst>
   </p:cSld>
@@ -2895,8 +2809,8 @@
         </p:nvSpPr>
         <p:spPr>
           <a:xfrm>
-            <a:off x="949524" y="365126"/>
-            <a:ext cx="11912203" cy="1325563"/>
+            <a:off x="471488" y="527490"/>
+            <a:ext cx="5915025" cy="1915009"/>
           </a:xfrm>
           <a:prstGeom prst="rect">
             <a:avLst/>
@@ -2928,8 +2842,8 @@
         </p:nvSpPr>
         <p:spPr>
           <a:xfrm>
-            <a:off x="949524" y="1825625"/>
-            <a:ext cx="11912203" cy="4351338"/>
+            <a:off x="471488" y="2637436"/>
+            <a:ext cx="5915025" cy="6286274"/>
           </a:xfrm>
           <a:prstGeom prst="rect">
             <a:avLst/>
@@ -2990,8 +2904,8 @@
         </p:nvSpPr>
         <p:spPr>
           <a:xfrm>
-            <a:off x="949524" y="6356351"/>
-            <a:ext cx="3107531" cy="365125"/>
+            <a:off x="471488" y="9182869"/>
+            <a:ext cx="1543050" cy="527487"/>
           </a:xfrm>
           <a:prstGeom prst="rect">
             <a:avLst/>
@@ -3001,7 +2915,7 @@
           <a:bodyPr vert="horz" lIns="91440" tIns="45720" rIns="91440" bIns="45720" rtlCol="0" anchor="ctr"/>
           <a:lstStyle>
             <a:lvl1pPr algn="l">
-              <a:defRPr sz="1200">
+              <a:defRPr sz="900">
                 <a:solidFill>
                   <a:schemeClr val="tx1">
                     <a:tint val="75000"/>
@@ -3013,7 +2927,7 @@
           <a:p>
             <a:fld id="{17D8D008-64F1-FB47-AAE7-E5AAE46159A6}" type="datetimeFigureOut">
               <a:rPr lang="en-US" smtClean="0"/>
-              <a:t>2/10/23</a:t>
+              <a:t>1/25/24</a:t>
             </a:fld>
             <a:endParaRPr lang="en-US"/>
           </a:p>
@@ -3031,8 +2945,8 @@
         </p:nvSpPr>
         <p:spPr>
           <a:xfrm>
-            <a:off x="4574977" y="6356351"/>
-            <a:ext cx="4661297" cy="365125"/>
+            <a:off x="2271713" y="9182869"/>
+            <a:ext cx="2314575" cy="527487"/>
           </a:xfrm>
           <a:prstGeom prst="rect">
             <a:avLst/>
@@ -3042,7 +2956,7 @@
           <a:bodyPr vert="horz" lIns="91440" tIns="45720" rIns="91440" bIns="45720" rtlCol="0" anchor="ctr"/>
           <a:lstStyle>
             <a:lvl1pPr algn="ctr">
-              <a:defRPr sz="1200">
+              <a:defRPr sz="900">
                 <a:solidFill>
                   <a:schemeClr val="tx1">
                     <a:tint val="75000"/>
@@ -3068,8 +2982,8 @@
         </p:nvSpPr>
         <p:spPr>
           <a:xfrm>
-            <a:off x="9754195" y="6356351"/>
-            <a:ext cx="3107531" cy="365125"/>
+            <a:off x="4843463" y="9182869"/>
+            <a:ext cx="1543050" cy="527487"/>
           </a:xfrm>
           <a:prstGeom prst="rect">
             <a:avLst/>
@@ -3079,7 +2993,7 @@
           <a:bodyPr vert="horz" lIns="91440" tIns="45720" rIns="91440" bIns="45720" rtlCol="0" anchor="ctr"/>
           <a:lstStyle>
             <a:lvl1pPr algn="r">
-              <a:defRPr sz="1200">
+              <a:defRPr sz="900">
                 <a:solidFill>
                   <a:schemeClr val="tx1">
                     <a:tint val="75000"/>
@@ -3100,27 +3014,27 @@
     </p:spTree>
     <p:extLst>
       <p:ext uri="{BB962C8B-B14F-4D97-AF65-F5344CB8AC3E}">
-        <p14:creationId xmlns:p14="http://schemas.microsoft.com/office/powerpoint/2010/main" val="1405654388"/>
+        <p14:creationId xmlns:p14="http://schemas.microsoft.com/office/powerpoint/2010/main" val="2744424012"/>
       </p:ext>
     </p:extLst>
   </p:cSld>
   <p:clrMap bg1="lt1" tx1="dk1" bg2="lt2" tx2="dk2" accent1="accent1" accent2="accent2" accent3="accent3" accent4="accent4" accent5="accent5" accent6="accent6" hlink="hlink" folHlink="folHlink"/>
   <p:sldLayoutIdLst>
-    <p:sldLayoutId id="2147483661" r:id="rId1"/>
-    <p:sldLayoutId id="2147483662" r:id="rId2"/>
-    <p:sldLayoutId id="2147483663" r:id="rId3"/>
-    <p:sldLayoutId id="2147483664" r:id="rId4"/>
-    <p:sldLayoutId id="2147483665" r:id="rId5"/>
-    <p:sldLayoutId id="2147483666" r:id="rId6"/>
-    <p:sldLayoutId id="2147483667" r:id="rId7"/>
-    <p:sldLayoutId id="2147483668" r:id="rId8"/>
-    <p:sldLayoutId id="2147483669" r:id="rId9"/>
-    <p:sldLayoutId id="2147483670" r:id="rId10"/>
-    <p:sldLayoutId id="2147483671" r:id="rId11"/>
+    <p:sldLayoutId id="2147483685" r:id="rId1"/>
+    <p:sldLayoutId id="2147483686" r:id="rId2"/>
+    <p:sldLayoutId id="2147483687" r:id="rId3"/>
+    <p:sldLayoutId id="2147483688" r:id="rId4"/>
+    <p:sldLayoutId id="2147483689" r:id="rId5"/>
+    <p:sldLayoutId id="2147483690" r:id="rId6"/>
+    <p:sldLayoutId id="2147483691" r:id="rId7"/>
+    <p:sldLayoutId id="2147483692" r:id="rId8"/>
+    <p:sldLayoutId id="2147483693" r:id="rId9"/>
+    <p:sldLayoutId id="2147483694" r:id="rId10"/>
+    <p:sldLayoutId id="2147483695" r:id="rId11"/>
   </p:sldLayoutIdLst>
   <p:txStyles>
     <p:titleStyle>
-      <a:lvl1pPr algn="l" defTabSz="914400" rtl="0" eaLnBrk="1" latinLnBrk="0" hangingPunct="1">
+      <a:lvl1pPr algn="l" defTabSz="685800" rtl="0" eaLnBrk="1" latinLnBrk="0" hangingPunct="1">
         <a:lnSpc>
           <a:spcPct val="90000"/>
         </a:lnSpc>
@@ -3128,7 +3042,7 @@
           <a:spcPct val="0"/>
         </a:spcBef>
         <a:buNone/>
-        <a:defRPr sz="4400" kern="1200">
+        <a:defRPr sz="3300" kern="1200">
           <a:solidFill>
             <a:schemeClr val="tx1"/>
           </a:solidFill>
@@ -3139,16 +3053,16 @@
       </a:lvl1pPr>
     </p:titleStyle>
     <p:bodyStyle>
-      <a:lvl1pPr marL="228600" indent="-228600" algn="l" defTabSz="914400" rtl="0" eaLnBrk="1" latinLnBrk="0" hangingPunct="1">
+      <a:lvl1pPr marL="171450" indent="-171450" algn="l" defTabSz="685800" rtl="0" eaLnBrk="1" latinLnBrk="0" hangingPunct="1">
         <a:lnSpc>
           <a:spcPct val="90000"/>
         </a:lnSpc>
         <a:spcBef>
-          <a:spcPts val="1000"/>
+          <a:spcPts val="750"/>
         </a:spcBef>
         <a:buFont typeface="Arial" panose="020B0604020202020204" pitchFamily="34" charset="0"/>
         <a:buChar char="•"/>
-        <a:defRPr sz="2800" kern="1200">
+        <a:defRPr sz="2100" kern="1200">
           <a:solidFill>
             <a:schemeClr val="tx1"/>
           </a:solidFill>
@@ -3157,48 +3071,12 @@
           <a:cs typeface="+mn-cs"/>
         </a:defRPr>
       </a:lvl1pPr>
-      <a:lvl2pPr marL="685800" indent="-228600" algn="l" defTabSz="914400" rtl="0" eaLnBrk="1" latinLnBrk="0" hangingPunct="1">
+      <a:lvl2pPr marL="514350" indent="-171450" algn="l" defTabSz="685800" rtl="0" eaLnBrk="1" latinLnBrk="0" hangingPunct="1">
         <a:lnSpc>
           <a:spcPct val="90000"/>
         </a:lnSpc>
         <a:spcBef>
-          <a:spcPts val="500"/>
-        </a:spcBef>
-        <a:buFont typeface="Arial" panose="020B0604020202020204" pitchFamily="34" charset="0"/>
-        <a:buChar char="•"/>
-        <a:defRPr sz="2400" kern="1200">
-          <a:solidFill>
-            <a:schemeClr val="tx1"/>
-          </a:solidFill>
-          <a:latin typeface="+mn-lt"/>
-          <a:ea typeface="+mn-ea"/>
-          <a:cs typeface="+mn-cs"/>
-        </a:defRPr>
-      </a:lvl2pPr>
-      <a:lvl3pPr marL="1143000" indent="-228600" algn="l" defTabSz="914400" rtl="0" eaLnBrk="1" latinLnBrk="0" hangingPunct="1">
-        <a:lnSpc>
-          <a:spcPct val="90000"/>
-        </a:lnSpc>
-        <a:spcBef>
-          <a:spcPts val="500"/>
-        </a:spcBef>
-        <a:buFont typeface="Arial" panose="020B0604020202020204" pitchFamily="34" charset="0"/>
-        <a:buChar char="•"/>
-        <a:defRPr sz="2000" kern="1200">
-          <a:solidFill>
-            <a:schemeClr val="tx1"/>
-          </a:solidFill>
-          <a:latin typeface="+mn-lt"/>
-          <a:ea typeface="+mn-ea"/>
-          <a:cs typeface="+mn-cs"/>
-        </a:defRPr>
-      </a:lvl3pPr>
-      <a:lvl4pPr marL="1600200" indent="-228600" algn="l" defTabSz="914400" rtl="0" eaLnBrk="1" latinLnBrk="0" hangingPunct="1">
-        <a:lnSpc>
-          <a:spcPct val="90000"/>
-        </a:lnSpc>
-        <a:spcBef>
-          <a:spcPts val="500"/>
+          <a:spcPts val="375"/>
         </a:spcBef>
         <a:buFont typeface="Arial" panose="020B0604020202020204" pitchFamily="34" charset="0"/>
         <a:buChar char="•"/>
@@ -3210,17 +3088,53 @@
           <a:ea typeface="+mn-ea"/>
           <a:cs typeface="+mn-cs"/>
         </a:defRPr>
-      </a:lvl4pPr>
-      <a:lvl5pPr marL="2057400" indent="-228600" algn="l" defTabSz="914400" rtl="0" eaLnBrk="1" latinLnBrk="0" hangingPunct="1">
+      </a:lvl2pPr>
+      <a:lvl3pPr marL="857250" indent="-171450" algn="l" defTabSz="685800" rtl="0" eaLnBrk="1" latinLnBrk="0" hangingPunct="1">
         <a:lnSpc>
           <a:spcPct val="90000"/>
         </a:lnSpc>
         <a:spcBef>
-          <a:spcPts val="500"/>
+          <a:spcPts val="375"/>
         </a:spcBef>
         <a:buFont typeface="Arial" panose="020B0604020202020204" pitchFamily="34" charset="0"/>
         <a:buChar char="•"/>
-        <a:defRPr sz="1800" kern="1200">
+        <a:defRPr sz="1500" kern="1200">
+          <a:solidFill>
+            <a:schemeClr val="tx1"/>
+          </a:solidFill>
+          <a:latin typeface="+mn-lt"/>
+          <a:ea typeface="+mn-ea"/>
+          <a:cs typeface="+mn-cs"/>
+        </a:defRPr>
+      </a:lvl3pPr>
+      <a:lvl4pPr marL="1200150" indent="-171450" algn="l" defTabSz="685800" rtl="0" eaLnBrk="1" latinLnBrk="0" hangingPunct="1">
+        <a:lnSpc>
+          <a:spcPct val="90000"/>
+        </a:lnSpc>
+        <a:spcBef>
+          <a:spcPts val="375"/>
+        </a:spcBef>
+        <a:buFont typeface="Arial" panose="020B0604020202020204" pitchFamily="34" charset="0"/>
+        <a:buChar char="•"/>
+        <a:defRPr sz="1350" kern="1200">
+          <a:solidFill>
+            <a:schemeClr val="tx1"/>
+          </a:solidFill>
+          <a:latin typeface="+mn-lt"/>
+          <a:ea typeface="+mn-ea"/>
+          <a:cs typeface="+mn-cs"/>
+        </a:defRPr>
+      </a:lvl4pPr>
+      <a:lvl5pPr marL="1543050" indent="-171450" algn="l" defTabSz="685800" rtl="0" eaLnBrk="1" latinLnBrk="0" hangingPunct="1">
+        <a:lnSpc>
+          <a:spcPct val="90000"/>
+        </a:lnSpc>
+        <a:spcBef>
+          <a:spcPts val="375"/>
+        </a:spcBef>
+        <a:buFont typeface="Arial" panose="020B0604020202020204" pitchFamily="34" charset="0"/>
+        <a:buChar char="•"/>
+        <a:defRPr sz="1350" kern="1200">
           <a:solidFill>
             <a:schemeClr val="tx1"/>
           </a:solidFill>
@@ -3229,16 +3143,16 @@
           <a:cs typeface="+mn-cs"/>
         </a:defRPr>
       </a:lvl5pPr>
-      <a:lvl6pPr marL="2514600" indent="-228600" algn="l" defTabSz="914400" rtl="0" eaLnBrk="1" latinLnBrk="0" hangingPunct="1">
+      <a:lvl6pPr marL="1885950" indent="-171450" algn="l" defTabSz="685800" rtl="0" eaLnBrk="1" latinLnBrk="0" hangingPunct="1">
         <a:lnSpc>
           <a:spcPct val="90000"/>
         </a:lnSpc>
         <a:spcBef>
-          <a:spcPts val="500"/>
+          <a:spcPts val="375"/>
         </a:spcBef>
         <a:buFont typeface="Arial" panose="020B0604020202020204" pitchFamily="34" charset="0"/>
         <a:buChar char="•"/>
-        <a:defRPr sz="1800" kern="1200">
+        <a:defRPr sz="1350" kern="1200">
           <a:solidFill>
             <a:schemeClr val="tx1"/>
           </a:solidFill>
@@ -3247,16 +3161,16 @@
           <a:cs typeface="+mn-cs"/>
         </a:defRPr>
       </a:lvl6pPr>
-      <a:lvl7pPr marL="2971800" indent="-228600" algn="l" defTabSz="914400" rtl="0" eaLnBrk="1" latinLnBrk="0" hangingPunct="1">
+      <a:lvl7pPr marL="2228850" indent="-171450" algn="l" defTabSz="685800" rtl="0" eaLnBrk="1" latinLnBrk="0" hangingPunct="1">
         <a:lnSpc>
           <a:spcPct val="90000"/>
         </a:lnSpc>
         <a:spcBef>
-          <a:spcPts val="500"/>
+          <a:spcPts val="375"/>
         </a:spcBef>
         <a:buFont typeface="Arial" panose="020B0604020202020204" pitchFamily="34" charset="0"/>
         <a:buChar char="•"/>
-        <a:defRPr sz="1800" kern="1200">
+        <a:defRPr sz="1350" kern="1200">
           <a:solidFill>
             <a:schemeClr val="tx1"/>
           </a:solidFill>
@@ -3265,16 +3179,16 @@
           <a:cs typeface="+mn-cs"/>
         </a:defRPr>
       </a:lvl7pPr>
-      <a:lvl8pPr marL="3429000" indent="-228600" algn="l" defTabSz="914400" rtl="0" eaLnBrk="1" latinLnBrk="0" hangingPunct="1">
+      <a:lvl8pPr marL="2571750" indent="-171450" algn="l" defTabSz="685800" rtl="0" eaLnBrk="1" latinLnBrk="0" hangingPunct="1">
         <a:lnSpc>
           <a:spcPct val="90000"/>
         </a:lnSpc>
         <a:spcBef>
-          <a:spcPts val="500"/>
+          <a:spcPts val="375"/>
         </a:spcBef>
         <a:buFont typeface="Arial" panose="020B0604020202020204" pitchFamily="34" charset="0"/>
         <a:buChar char="•"/>
-        <a:defRPr sz="1800" kern="1200">
+        <a:defRPr sz="1350" kern="1200">
           <a:solidFill>
             <a:schemeClr val="tx1"/>
           </a:solidFill>
@@ -3283,16 +3197,16 @@
           <a:cs typeface="+mn-cs"/>
         </a:defRPr>
       </a:lvl8pPr>
-      <a:lvl9pPr marL="3886200" indent="-228600" algn="l" defTabSz="914400" rtl="0" eaLnBrk="1" latinLnBrk="0" hangingPunct="1">
+      <a:lvl9pPr marL="2914650" indent="-171450" algn="l" defTabSz="685800" rtl="0" eaLnBrk="1" latinLnBrk="0" hangingPunct="1">
         <a:lnSpc>
           <a:spcPct val="90000"/>
         </a:lnSpc>
         <a:spcBef>
-          <a:spcPts val="500"/>
+          <a:spcPts val="375"/>
         </a:spcBef>
         <a:buFont typeface="Arial" panose="020B0604020202020204" pitchFamily="34" charset="0"/>
         <a:buChar char="•"/>
-        <a:defRPr sz="1800" kern="1200">
+        <a:defRPr sz="1350" kern="1200">
           <a:solidFill>
             <a:schemeClr val="tx1"/>
           </a:solidFill>
@@ -3306,8 +3220,8 @@
       <a:defPPr>
         <a:defRPr lang="en-US"/>
       </a:defPPr>
-      <a:lvl1pPr marL="0" algn="l" defTabSz="914400" rtl="0" eaLnBrk="1" latinLnBrk="0" hangingPunct="1">
-        <a:defRPr sz="1800" kern="1200">
+      <a:lvl1pPr marL="0" algn="l" defTabSz="685800" rtl="0" eaLnBrk="1" latinLnBrk="0" hangingPunct="1">
+        <a:defRPr sz="1350" kern="1200">
           <a:solidFill>
             <a:schemeClr val="tx1"/>
           </a:solidFill>
@@ -3316,8 +3230,8 @@
           <a:cs typeface="+mn-cs"/>
         </a:defRPr>
       </a:lvl1pPr>
-      <a:lvl2pPr marL="457200" algn="l" defTabSz="914400" rtl="0" eaLnBrk="1" latinLnBrk="0" hangingPunct="1">
-        <a:defRPr sz="1800" kern="1200">
+      <a:lvl2pPr marL="342900" algn="l" defTabSz="685800" rtl="0" eaLnBrk="1" latinLnBrk="0" hangingPunct="1">
+        <a:defRPr sz="1350" kern="1200">
           <a:solidFill>
             <a:schemeClr val="tx1"/>
           </a:solidFill>
@@ -3326,8 +3240,8 @@
           <a:cs typeface="+mn-cs"/>
         </a:defRPr>
       </a:lvl2pPr>
-      <a:lvl3pPr marL="914400" algn="l" defTabSz="914400" rtl="0" eaLnBrk="1" latinLnBrk="0" hangingPunct="1">
-        <a:defRPr sz="1800" kern="1200">
+      <a:lvl3pPr marL="685800" algn="l" defTabSz="685800" rtl="0" eaLnBrk="1" latinLnBrk="0" hangingPunct="1">
+        <a:defRPr sz="1350" kern="1200">
           <a:solidFill>
             <a:schemeClr val="tx1"/>
           </a:solidFill>
@@ -3336,8 +3250,8 @@
           <a:cs typeface="+mn-cs"/>
         </a:defRPr>
       </a:lvl3pPr>
-      <a:lvl4pPr marL="1371600" algn="l" defTabSz="914400" rtl="0" eaLnBrk="1" latinLnBrk="0" hangingPunct="1">
-        <a:defRPr sz="1800" kern="1200">
+      <a:lvl4pPr marL="1028700" algn="l" defTabSz="685800" rtl="0" eaLnBrk="1" latinLnBrk="0" hangingPunct="1">
+        <a:defRPr sz="1350" kern="1200">
           <a:solidFill>
             <a:schemeClr val="tx1"/>
           </a:solidFill>
@@ -3346,8 +3260,8 @@
           <a:cs typeface="+mn-cs"/>
         </a:defRPr>
       </a:lvl4pPr>
-      <a:lvl5pPr marL="1828800" algn="l" defTabSz="914400" rtl="0" eaLnBrk="1" latinLnBrk="0" hangingPunct="1">
-        <a:defRPr sz="1800" kern="1200">
+      <a:lvl5pPr marL="1371600" algn="l" defTabSz="685800" rtl="0" eaLnBrk="1" latinLnBrk="0" hangingPunct="1">
+        <a:defRPr sz="1350" kern="1200">
           <a:solidFill>
             <a:schemeClr val="tx1"/>
           </a:solidFill>
@@ -3356,8 +3270,8 @@
           <a:cs typeface="+mn-cs"/>
         </a:defRPr>
       </a:lvl5pPr>
-      <a:lvl6pPr marL="2286000" algn="l" defTabSz="914400" rtl="0" eaLnBrk="1" latinLnBrk="0" hangingPunct="1">
-        <a:defRPr sz="1800" kern="1200">
+      <a:lvl6pPr marL="1714500" algn="l" defTabSz="685800" rtl="0" eaLnBrk="1" latinLnBrk="0" hangingPunct="1">
+        <a:defRPr sz="1350" kern="1200">
           <a:solidFill>
             <a:schemeClr val="tx1"/>
           </a:solidFill>
@@ -3366,8 +3280,8 @@
           <a:cs typeface="+mn-cs"/>
         </a:defRPr>
       </a:lvl6pPr>
-      <a:lvl7pPr marL="2743200" algn="l" defTabSz="914400" rtl="0" eaLnBrk="1" latinLnBrk="0" hangingPunct="1">
-        <a:defRPr sz="1800" kern="1200">
+      <a:lvl7pPr marL="2057400" algn="l" defTabSz="685800" rtl="0" eaLnBrk="1" latinLnBrk="0" hangingPunct="1">
+        <a:defRPr sz="1350" kern="1200">
           <a:solidFill>
             <a:schemeClr val="tx1"/>
           </a:solidFill>
@@ -3376,8 +3290,8 @@
           <a:cs typeface="+mn-cs"/>
         </a:defRPr>
       </a:lvl7pPr>
-      <a:lvl8pPr marL="3200400" algn="l" defTabSz="914400" rtl="0" eaLnBrk="1" latinLnBrk="0" hangingPunct="1">
-        <a:defRPr sz="1800" kern="1200">
+      <a:lvl8pPr marL="2400300" algn="l" defTabSz="685800" rtl="0" eaLnBrk="1" latinLnBrk="0" hangingPunct="1">
+        <a:defRPr sz="1350" kern="1200">
           <a:solidFill>
             <a:schemeClr val="tx1"/>
           </a:solidFill>
@@ -3386,8 +3300,8 @@
           <a:cs typeface="+mn-cs"/>
         </a:defRPr>
       </a:lvl8pPr>
-      <a:lvl9pPr marL="3657600" algn="l" defTabSz="914400" rtl="0" eaLnBrk="1" latinLnBrk="0" hangingPunct="1">
-        <a:defRPr sz="1800" kern="1200">
+      <a:lvl9pPr marL="2743200" algn="l" defTabSz="685800" rtl="0" eaLnBrk="1" latinLnBrk="0" hangingPunct="1">
+        <a:defRPr sz="1350" kern="1200">
           <a:solidFill>
             <a:schemeClr val="tx1"/>
           </a:solidFill>
@@ -3420,10 +3334,10 @@
       </p:grpSpPr>
       <p:sp>
         <p:nvSpPr>
-          <p:cNvPr id="152" name="Rectangle 151">
+          <p:cNvPr id="28" name="Rectangle 27">
             <a:extLst>
               <a:ext uri="{FF2B5EF4-FFF2-40B4-BE49-F238E27FC236}">
-                <a16:creationId xmlns:a16="http://schemas.microsoft.com/office/drawing/2014/main" id="{0C4A87C9-EDFD-AC1A-8DCC-27FFD17EB8A6}"/>
+                <a16:creationId xmlns:a16="http://schemas.microsoft.com/office/drawing/2014/main" id="{5AB97E63-0861-21AA-97A8-B27875069948}"/>
               </a:ext>
             </a:extLst>
           </p:cNvPr>
@@ -3432,8 +3346,8 @@
         </p:nvSpPr>
         <p:spPr>
           <a:xfrm>
-            <a:off x="1157972" y="193788"/>
-            <a:ext cx="5847690" cy="714859"/>
+            <a:off x="617816" y="65971"/>
+            <a:ext cx="6153103" cy="757983"/>
           </a:xfrm>
           <a:prstGeom prst="rect">
             <a:avLst/>
@@ -3468,7 +3382,7 @@
           <a:p>
             <a:pPr algn="ctr"/>
             <a:r>
-              <a:rPr lang="en-US" sz="2337" b="1" i="1" dirty="0">
+              <a:rPr lang="en-US" sz="2000" b="1" i="1" dirty="0">
                 <a:solidFill>
                   <a:schemeClr val="tx1"/>
                 </a:solidFill>
@@ -3478,7 +3392,7 @@
               <a:t>Fusarium</a:t>
             </a:r>
             <a:r>
-              <a:rPr lang="en-US" sz="2337" b="1" dirty="0">
+              <a:rPr lang="en-US" sz="2000" b="1" dirty="0">
                 <a:solidFill>
                   <a:schemeClr val="tx1"/>
                 </a:solidFill>
@@ -3491,33 +3405,43 @@
           <a:p>
             <a:pPr algn="ctr"/>
             <a:r>
-              <a:rPr lang="en-US" sz="991" dirty="0">
+              <a:rPr lang="en-US" sz="1000" i="1" dirty="0">
                 <a:solidFill>
                   <a:schemeClr val="tx1"/>
                 </a:solidFill>
                 <a:latin typeface="Times New Roman" panose="02020603050405020304" pitchFamily="18" charset="0"/>
                 <a:cs typeface="Times New Roman" panose="02020603050405020304" pitchFamily="18" charset="0"/>
               </a:rPr>
-              <a:t>Fusarium species assemblies in FASTA format, as well as a list of assemblies and a </a:t>
-            </a:r>
-            <a:r>
-              <a:rPr lang="en-US" sz="991" i="1" dirty="0">
+              <a:t>Fusarium</a:t>
+            </a:r>
+            <a:r>
+              <a:rPr lang="en-US" sz="1000" dirty="0">
                 <a:solidFill>
                   <a:schemeClr val="tx1"/>
                 </a:solidFill>
                 <a:latin typeface="Times New Roman" panose="02020603050405020304" pitchFamily="18" charset="0"/>
                 <a:cs typeface="Times New Roman" panose="02020603050405020304" pitchFamily="18" charset="0"/>
               </a:rPr>
-              <a:t>mimp </a:t>
-            </a:r>
-            <a:r>
-              <a:rPr lang="en-US" sz="991" dirty="0">
+              <a:t> species genome assemblies in FASTA format, as well as a list of the assemblies and a </a:t>
+            </a:r>
+            <a:r>
+              <a:rPr lang="en-US" sz="1000" i="1" dirty="0">
                 <a:solidFill>
                   <a:schemeClr val="tx1"/>
                 </a:solidFill>
                 <a:latin typeface="Times New Roman" panose="02020603050405020304" pitchFamily="18" charset="0"/>
                 <a:cs typeface="Times New Roman" panose="02020603050405020304" pitchFamily="18" charset="0"/>
               </a:rPr>
+              <a:t>mimp </a:t>
+            </a:r>
+            <a:r>
+              <a:rPr lang="en-US" sz="1000" dirty="0">
+                <a:solidFill>
+                  <a:schemeClr val="tx1"/>
+                </a:solidFill>
+                <a:latin typeface="Times New Roman" panose="02020603050405020304" pitchFamily="18" charset="0"/>
+                <a:cs typeface="Times New Roman" panose="02020603050405020304" pitchFamily="18" charset="0"/>
+              </a:rPr>
               <a:t>profile HMM, are prepared as input. </a:t>
             </a:r>
           </a:p>
@@ -3525,10 +3449,10 @@
       </p:sp>
       <p:sp>
         <p:nvSpPr>
-          <p:cNvPr id="4" name="TextBox 3">
+          <p:cNvPr id="29" name="TextBox 28">
             <a:extLst>
               <a:ext uri="{FF2B5EF4-FFF2-40B4-BE49-F238E27FC236}">
-                <a16:creationId xmlns:a16="http://schemas.microsoft.com/office/drawing/2014/main" id="{BDFEC738-8424-DE81-6843-4945645EBFEC}"/>
+                <a16:creationId xmlns:a16="http://schemas.microsoft.com/office/drawing/2014/main" id="{7ACB2F06-EF52-CA7D-F30C-9FDD268FAE7D}"/>
               </a:ext>
             </a:extLst>
           </p:cNvPr>
@@ -3537,8 +3461,8 @@
         </p:nvSpPr>
         <p:spPr>
           <a:xfrm>
-            <a:off x="1154272" y="1060018"/>
-            <a:ext cx="5847379" cy="549766"/>
+            <a:off x="617815" y="961093"/>
+            <a:ext cx="6153098" cy="577081"/>
           </a:xfrm>
           <a:prstGeom prst="rect">
             <a:avLst/>
@@ -3558,14 +3482,14 @@
           <a:p>
             <a:pPr algn="ctr"/>
             <a:r>
-              <a:rPr lang="en-US" sz="991" b="1" i="1" dirty="0">
+              <a:rPr lang="en-US" sz="1050" b="1" i="1" dirty="0">
                 <a:latin typeface="Times New Roman" panose="02020603050405020304" pitchFamily="18" charset="0"/>
                 <a:cs typeface="Times New Roman" panose="02020603050405020304" pitchFamily="18" charset="0"/>
               </a:rPr>
               <a:t>Mimp </a:t>
             </a:r>
             <a:r>
-              <a:rPr lang="en-US" sz="991" b="1" dirty="0">
+              <a:rPr lang="en-US" sz="1050" b="1" dirty="0">
                 <a:latin typeface="Times New Roman" panose="02020603050405020304" pitchFamily="18" charset="0"/>
                 <a:cs typeface="Times New Roman" panose="02020603050405020304" pitchFamily="18" charset="0"/>
               </a:rPr>
@@ -3575,77 +3499,77 @@
           <a:p>
             <a:pPr algn="ctr"/>
             <a:r>
-              <a:rPr lang="en-US" sz="991" dirty="0">
+              <a:rPr lang="en-US" sz="1050" dirty="0">
                 <a:latin typeface="Times New Roman" panose="02020603050405020304" pitchFamily="18" charset="0"/>
                 <a:cs typeface="Times New Roman" panose="02020603050405020304" pitchFamily="18" charset="0"/>
               </a:rPr>
               <a:t>Each </a:t>
             </a:r>
             <a:r>
-              <a:rPr lang="en-US" sz="991" i="1" dirty="0">
+              <a:rPr lang="en-US" sz="1050" i="1" dirty="0">
                 <a:latin typeface="Times New Roman" panose="02020603050405020304" pitchFamily="18" charset="0"/>
                 <a:cs typeface="Times New Roman" panose="02020603050405020304" pitchFamily="18" charset="0"/>
               </a:rPr>
               <a:t>Fusarium</a:t>
             </a:r>
             <a:r>
-              <a:rPr lang="en-US" sz="991" dirty="0">
+              <a:rPr lang="en-US" sz="1050" dirty="0">
                 <a:latin typeface="Times New Roman" panose="02020603050405020304" pitchFamily="18" charset="0"/>
                 <a:cs typeface="Times New Roman" panose="02020603050405020304" pitchFamily="18" charset="0"/>
               </a:rPr>
               <a:t> assembly is searched for </a:t>
             </a:r>
             <a:r>
-              <a:rPr lang="en-US" sz="991" i="1" dirty="0">
+              <a:rPr lang="en-US" sz="1050" i="1" dirty="0">
                 <a:latin typeface="Times New Roman" panose="02020603050405020304" pitchFamily="18" charset="0"/>
                 <a:cs typeface="Times New Roman" panose="02020603050405020304" pitchFamily="18" charset="0"/>
               </a:rPr>
               <a:t>mimps </a:t>
             </a:r>
             <a:r>
-              <a:rPr lang="en-US" sz="991" dirty="0">
+              <a:rPr lang="en-US" sz="1050" dirty="0">
                 <a:latin typeface="Times New Roman" panose="02020603050405020304" pitchFamily="18" charset="0"/>
                 <a:cs typeface="Times New Roman" panose="02020603050405020304" pitchFamily="18" charset="0"/>
               </a:rPr>
               <a:t>using a custom python script (using </a:t>
             </a:r>
             <a:r>
-              <a:rPr lang="en-US" sz="991" i="1" dirty="0">
+              <a:rPr lang="en-US" sz="1050" i="1" dirty="0">
                 <a:latin typeface="Times New Roman" panose="02020603050405020304" pitchFamily="18" charset="0"/>
                 <a:cs typeface="Times New Roman" panose="02020603050405020304" pitchFamily="18" charset="0"/>
               </a:rPr>
               <a:t>mimp </a:t>
             </a:r>
             <a:r>
-              <a:rPr lang="en-US" sz="991" dirty="0">
+              <a:rPr lang="en-US" sz="1050" dirty="0">
                 <a:latin typeface="Times New Roman" panose="02020603050405020304" pitchFamily="18" charset="0"/>
                 <a:cs typeface="Times New Roman" panose="02020603050405020304" pitchFamily="18" charset="0"/>
               </a:rPr>
               <a:t>TIRs) and NHMMER </a:t>
             </a:r>
             <a:r>
-              <a:rPr lang="en-GB" sz="991" dirty="0">
+              <a:rPr lang="en-GB" sz="1050" dirty="0">
                 <a:latin typeface="Times New Roman" panose="02020603050405020304" pitchFamily="18" charset="0"/>
                 <a:ea typeface="Times New Roman" panose="02020603050405020304" pitchFamily="18" charset="0"/>
               </a:rPr>
               <a:t>(3.3.1) (</a:t>
             </a:r>
             <a:r>
-              <a:rPr lang="en-US" sz="991" dirty="0">
+              <a:rPr lang="en-US" sz="1050" dirty="0">
                 <a:latin typeface="Times New Roman" panose="02020603050405020304" pitchFamily="18" charset="0"/>
                 <a:cs typeface="Times New Roman" panose="02020603050405020304" pitchFamily="18" charset="0"/>
               </a:rPr>
               <a:t>using a </a:t>
             </a:r>
             <a:r>
-              <a:rPr lang="en-US" sz="991" i="1" dirty="0">
+              <a:rPr lang="en-US" sz="1050" i="1" dirty="0">
                 <a:latin typeface="Times New Roman" panose="02020603050405020304" pitchFamily="18" charset="0"/>
                 <a:cs typeface="Times New Roman" panose="02020603050405020304" pitchFamily="18" charset="0"/>
               </a:rPr>
               <a:t>mimp </a:t>
             </a:r>
             <a:r>
-              <a:rPr lang="en-US" sz="991" dirty="0">
+              <a:rPr lang="en-US" sz="1050" dirty="0">
                 <a:latin typeface="Times New Roman" panose="02020603050405020304" pitchFamily="18" charset="0"/>
                 <a:cs typeface="Times New Roman" panose="02020603050405020304" pitchFamily="18" charset="0"/>
               </a:rPr>
@@ -3656,10 +3580,10 @@
       </p:sp>
       <p:sp>
         <p:nvSpPr>
-          <p:cNvPr id="5" name="TextBox 4">
+          <p:cNvPr id="30" name="TextBox 29">
             <a:extLst>
               <a:ext uri="{FF2B5EF4-FFF2-40B4-BE49-F238E27FC236}">
-                <a16:creationId xmlns:a16="http://schemas.microsoft.com/office/drawing/2014/main" id="{FD6F4D29-CBCF-4E76-9985-03FE0B2F252C}"/>
+                <a16:creationId xmlns:a16="http://schemas.microsoft.com/office/drawing/2014/main" id="{691DA270-25BC-ECFF-7EED-18C8390263C9}"/>
               </a:ext>
             </a:extLst>
           </p:cNvPr>
@@ -3668,8 +3592,8 @@
         </p:nvSpPr>
         <p:spPr>
           <a:xfrm>
-            <a:off x="1163372" y="1798543"/>
-            <a:ext cx="5847390" cy="397288"/>
+            <a:off x="617814" y="1680837"/>
+            <a:ext cx="6153099" cy="577081"/>
           </a:xfrm>
           <a:prstGeom prst="rect">
             <a:avLst/>
@@ -3689,94 +3613,80 @@
           <a:p>
             <a:pPr algn="ctr"/>
             <a:r>
-              <a:rPr lang="en-US" sz="991" b="1" i="1" dirty="0">
+              <a:rPr lang="en-US" sz="1050" b="1" i="1" dirty="0">
                 <a:latin typeface="Times New Roman" panose="02020603050405020304" pitchFamily="18" charset="0"/>
                 <a:cs typeface="Times New Roman" panose="02020603050405020304" pitchFamily="18" charset="0"/>
               </a:rPr>
               <a:t>Mimp </a:t>
             </a:r>
             <a:r>
-              <a:rPr lang="en-US" sz="991" b="1" dirty="0">
-                <a:latin typeface="Times New Roman" panose="02020603050405020304" pitchFamily="18" charset="0"/>
-                <a:cs typeface="Times New Roman" panose="02020603050405020304" pitchFamily="18" charset="0"/>
-              </a:rPr>
-              <a:t>region Sequence identification</a:t>
+              <a:rPr lang="en-US" sz="1050" b="1" dirty="0">
+                <a:latin typeface="Times New Roman" panose="02020603050405020304" pitchFamily="18" charset="0"/>
+                <a:cs typeface="Times New Roman" panose="02020603050405020304" pitchFamily="18" charset="0"/>
+              </a:rPr>
+              <a:t>region sequence identification</a:t>
             </a:r>
           </a:p>
           <a:p>
             <a:pPr algn="ctr"/>
             <a:r>
-              <a:rPr lang="en-US" sz="991" dirty="0">
+              <a:rPr lang="en-US" sz="1050" dirty="0">
                 <a:latin typeface="Times New Roman" panose="02020603050405020304" pitchFamily="18" charset="0"/>
                 <a:cs typeface="Times New Roman" panose="02020603050405020304" pitchFamily="18" charset="0"/>
               </a:rPr>
               <a:t>Identify regions 2.5kb either side of a </a:t>
             </a:r>
             <a:r>
-              <a:rPr lang="en-US" sz="991" i="1" dirty="0">
+              <a:rPr lang="en-US" sz="1050" i="1" dirty="0">
                 <a:latin typeface="Times New Roman" panose="02020603050405020304" pitchFamily="18" charset="0"/>
                 <a:cs typeface="Times New Roman" panose="02020603050405020304" pitchFamily="18" charset="0"/>
               </a:rPr>
               <a:t>mimp </a:t>
             </a:r>
             <a:r>
-              <a:rPr lang="en-US" sz="991" dirty="0">
+              <a:rPr lang="en-US" sz="1050" dirty="0">
                 <a:latin typeface="Times New Roman" panose="02020603050405020304" pitchFamily="18" charset="0"/>
                 <a:cs typeface="Times New Roman" panose="02020603050405020304" pitchFamily="18" charset="0"/>
               </a:rPr>
               <a:t>(</a:t>
             </a:r>
             <a:r>
-              <a:rPr lang="en-US" sz="991" i="1" dirty="0">
+              <a:rPr lang="en-US" sz="1050" i="1" dirty="0">
                 <a:latin typeface="Times New Roman" panose="02020603050405020304" pitchFamily="18" charset="0"/>
                 <a:cs typeface="Times New Roman" panose="02020603050405020304" pitchFamily="18" charset="0"/>
               </a:rPr>
               <a:t>mimp</a:t>
             </a:r>
             <a:r>
-              <a:rPr lang="en-US" sz="991" dirty="0">
+              <a:rPr lang="en-US" sz="1050" dirty="0">
                 <a:latin typeface="Times New Roman" panose="02020603050405020304" pitchFamily="18" charset="0"/>
                 <a:cs typeface="Times New Roman" panose="02020603050405020304" pitchFamily="18" charset="0"/>
               </a:rPr>
               <a:t> region), generating a </a:t>
             </a:r>
             <a:r>
-              <a:rPr lang="en-US" sz="991" i="1" dirty="0">
+              <a:rPr lang="en-US" sz="1050" i="1" dirty="0">
                 <a:latin typeface="Times New Roman" panose="02020603050405020304" pitchFamily="18" charset="0"/>
                 <a:cs typeface="Times New Roman" panose="02020603050405020304" pitchFamily="18" charset="0"/>
               </a:rPr>
               <a:t>mimp </a:t>
             </a:r>
             <a:r>
-              <a:rPr lang="en-US" sz="991" dirty="0">
-                <a:latin typeface="Times New Roman" panose="02020603050405020304" pitchFamily="18" charset="0"/>
-                <a:cs typeface="Times New Roman" panose="02020603050405020304" pitchFamily="18" charset="0"/>
-              </a:rPr>
-              <a:t>region </a:t>
-            </a:r>
-            <a:r>
-              <a:rPr lang="en-US" sz="991" dirty="0" err="1">
-                <a:latin typeface="Times New Roman" panose="02020603050405020304" pitchFamily="18" charset="0"/>
-                <a:cs typeface="Times New Roman" panose="02020603050405020304" pitchFamily="18" charset="0"/>
-              </a:rPr>
-              <a:t>gff</a:t>
-            </a:r>
-            <a:r>
-              <a:rPr lang="en-US" sz="991" dirty="0">
-                <a:latin typeface="Times New Roman" panose="02020603050405020304" pitchFamily="18" charset="0"/>
-                <a:cs typeface="Times New Roman" panose="02020603050405020304" pitchFamily="18" charset="0"/>
-              </a:rPr>
-              <a:t>. </a:t>
-            </a:r>
-          </a:p>
-        </p:txBody>
-      </p:sp>
-      <p:sp>
-        <p:nvSpPr>
-          <p:cNvPr id="6" name="TextBox 5">
+              <a:rPr lang="en-US" sz="1050" dirty="0">
+                <a:latin typeface="Times New Roman" panose="02020603050405020304" pitchFamily="18" charset="0"/>
+                <a:cs typeface="Times New Roman" panose="02020603050405020304" pitchFamily="18" charset="0"/>
+              </a:rPr>
+              <a:t>region GFF file for each genome assembly. </a:t>
+            </a:r>
+          </a:p>
+        </p:txBody>
+      </p:sp>
+      <p:sp>
+        <p:nvSpPr>
+          <p:cNvPr id="31" name="TextBox 30">
             <a:extLst>
               <a:ext uri="{FF2B5EF4-FFF2-40B4-BE49-F238E27FC236}">
-                <a16:creationId xmlns:a16="http://schemas.microsoft.com/office/drawing/2014/main" id="{774BD4B8-B228-127A-4CD1-5DE0C8381C08}"/>
+                <a16:creationId xmlns:a16="http://schemas.microsoft.com/office/drawing/2014/main" id="{5540790C-75EC-AE43-DFFA-A968FC71989D}"/>
               </a:ext>
             </a:extLst>
           </p:cNvPr>
@@ -3785,8 +3695,8 @@
         </p:nvSpPr>
         <p:spPr>
           <a:xfrm>
-            <a:off x="1163275" y="2476013"/>
-            <a:ext cx="2797870" cy="854721"/>
+            <a:off x="617817" y="2438227"/>
+            <a:ext cx="3035236" cy="1061829"/>
           </a:xfrm>
           <a:prstGeom prst="rect">
             <a:avLst/>
@@ -3806,7 +3716,7 @@
           <a:p>
             <a:pPr algn="ctr"/>
             <a:r>
-              <a:rPr lang="en-US" sz="991" b="1" dirty="0">
+              <a:rPr lang="en-US" sz="1050" b="1" dirty="0">
                 <a:latin typeface="Times New Roman" panose="02020603050405020304" pitchFamily="18" charset="0"/>
                 <a:cs typeface="Times New Roman" panose="02020603050405020304" pitchFamily="18" charset="0"/>
               </a:rPr>
@@ -3816,63 +3726,35 @@
           <a:p>
             <a:pPr algn="ctr"/>
             <a:r>
-              <a:rPr lang="en-US" sz="991" dirty="0">
+              <a:rPr lang="en-US" sz="1050" dirty="0">
                 <a:latin typeface="Times New Roman" panose="02020603050405020304" pitchFamily="18" charset="0"/>
                 <a:cs typeface="Times New Roman" panose="02020603050405020304" pitchFamily="18" charset="0"/>
               </a:rPr>
               <a:t>Expand 20kb either side of the </a:t>
             </a:r>
             <a:r>
-              <a:rPr lang="en-US" sz="991" i="1" dirty="0">
+              <a:rPr lang="en-US" sz="1050" i="1" dirty="0">
                 <a:latin typeface="Times New Roman" panose="02020603050405020304" pitchFamily="18" charset="0"/>
                 <a:cs typeface="Times New Roman" panose="02020603050405020304" pitchFamily="18" charset="0"/>
               </a:rPr>
               <a:t>mimp </a:t>
             </a:r>
             <a:r>
-              <a:rPr lang="en-US" sz="991" dirty="0">
-                <a:latin typeface="Times New Roman" panose="02020603050405020304" pitchFamily="18" charset="0"/>
-                <a:cs typeface="Times New Roman" panose="02020603050405020304" pitchFamily="18" charset="0"/>
-              </a:rPr>
-              <a:t>regions to identify regions for Augustus annotation. Generate an Augustus region </a:t>
-            </a:r>
-            <a:r>
-              <a:rPr lang="en-US" sz="991" dirty="0" err="1">
-                <a:latin typeface="Times New Roman" panose="02020603050405020304" pitchFamily="18" charset="0"/>
-                <a:cs typeface="Times New Roman" panose="02020603050405020304" pitchFamily="18" charset="0"/>
-              </a:rPr>
-              <a:t>gff</a:t>
-            </a:r>
-            <a:r>
-              <a:rPr lang="en-US" sz="991" dirty="0">
-                <a:latin typeface="Times New Roman" panose="02020603050405020304" pitchFamily="18" charset="0"/>
-                <a:cs typeface="Times New Roman" panose="02020603050405020304" pitchFamily="18" charset="0"/>
-              </a:rPr>
-              <a:t>, and </a:t>
-            </a:r>
-            <a:r>
-              <a:rPr lang="en-US" sz="991" dirty="0" err="1">
-                <a:latin typeface="Times New Roman" panose="02020603050405020304" pitchFamily="18" charset="0"/>
-                <a:cs typeface="Times New Roman" panose="02020603050405020304" pitchFamily="18" charset="0"/>
-              </a:rPr>
-              <a:t>fastas</a:t>
-            </a:r>
-            <a:r>
-              <a:rPr lang="en-US" sz="991" dirty="0">
-                <a:latin typeface="Times New Roman" panose="02020603050405020304" pitchFamily="18" charset="0"/>
-                <a:cs typeface="Times New Roman" panose="02020603050405020304" pitchFamily="18" charset="0"/>
-              </a:rPr>
-              <a:t> where all non-Augustus have been hard masked.   </a:t>
-            </a:r>
-          </a:p>
-        </p:txBody>
-      </p:sp>
-      <p:sp>
-        <p:nvSpPr>
-          <p:cNvPr id="7" name="TextBox 6">
+              <a:rPr lang="en-US" sz="1050" dirty="0">
+                <a:latin typeface="Times New Roman" panose="02020603050405020304" pitchFamily="18" charset="0"/>
+                <a:cs typeface="Times New Roman" panose="02020603050405020304" pitchFamily="18" charset="0"/>
+              </a:rPr>
+              <a:t>regions to identify regions for AUGUSTUS (v3.3.3) annotation. Generate an Augustus (v3.3.3) region GFF, and FASTAs where all non-Augustus have been hard masked.   </a:t>
+            </a:r>
+          </a:p>
+        </p:txBody>
+      </p:sp>
+      <p:sp>
+        <p:nvSpPr>
+          <p:cNvPr id="32" name="TextBox 31">
             <a:extLst>
               <a:ext uri="{FF2B5EF4-FFF2-40B4-BE49-F238E27FC236}">
-                <a16:creationId xmlns:a16="http://schemas.microsoft.com/office/drawing/2014/main" id="{D922CCCA-9235-7C25-2270-3002A83A414A}"/>
+                <a16:creationId xmlns:a16="http://schemas.microsoft.com/office/drawing/2014/main" id="{6324A5E0-C5F2-41E9-B0B7-ED4197F885BA}"/>
               </a:ext>
             </a:extLst>
           </p:cNvPr>
@@ -3881,8 +3763,8 @@
         </p:nvSpPr>
         <p:spPr>
           <a:xfrm>
-            <a:off x="4168069" y="2476013"/>
-            <a:ext cx="2842693" cy="854721"/>
+            <a:off x="3750979" y="2438227"/>
+            <a:ext cx="3019934" cy="1054135"/>
           </a:xfrm>
           <a:prstGeom prst="rect">
             <a:avLst/>
@@ -3902,21 +3784,21 @@
           <a:p>
             <a:pPr algn="ctr"/>
             <a:r>
-              <a:rPr lang="en-US" sz="991" b="1" dirty="0">
+              <a:rPr lang="en-US" sz="1050" b="1" dirty="0">
                 <a:latin typeface="Times New Roman" panose="02020603050405020304" pitchFamily="18" charset="0"/>
                 <a:cs typeface="Times New Roman" panose="02020603050405020304" pitchFamily="18" charset="0"/>
               </a:rPr>
               <a:t>Mask non-</a:t>
             </a:r>
             <a:r>
-              <a:rPr lang="en-US" sz="991" b="1" i="1" dirty="0">
+              <a:rPr lang="en-US" sz="1050" b="1" i="1" dirty="0">
                 <a:latin typeface="Times New Roman" panose="02020603050405020304" pitchFamily="18" charset="0"/>
                 <a:cs typeface="Times New Roman" panose="02020603050405020304" pitchFamily="18" charset="0"/>
               </a:rPr>
               <a:t>mimp</a:t>
             </a:r>
             <a:r>
-              <a:rPr lang="en-US" sz="991" b="1" dirty="0">
+              <a:rPr lang="en-US" sz="1050" b="1" dirty="0">
                 <a:latin typeface="Times New Roman" panose="02020603050405020304" pitchFamily="18" charset="0"/>
                 <a:cs typeface="Times New Roman" panose="02020603050405020304" pitchFamily="18" charset="0"/>
               </a:rPr>
@@ -3926,77 +3808,49 @@
           <a:p>
             <a:pPr algn="ctr"/>
             <a:r>
-              <a:rPr lang="en-US" sz="991" dirty="0">
+              <a:rPr lang="en-US" sz="1050" dirty="0">
                 <a:latin typeface="Times New Roman" panose="02020603050405020304" pitchFamily="18" charset="0"/>
                 <a:cs typeface="Times New Roman" panose="02020603050405020304" pitchFamily="18" charset="0"/>
               </a:rPr>
               <a:t>Using the </a:t>
             </a:r>
             <a:r>
-              <a:rPr lang="en-US" sz="991" i="1" dirty="0">
+              <a:rPr lang="en-US" sz="1050" i="1" dirty="0">
                 <a:latin typeface="Times New Roman" panose="02020603050405020304" pitchFamily="18" charset="0"/>
                 <a:cs typeface="Times New Roman" panose="02020603050405020304" pitchFamily="18" charset="0"/>
               </a:rPr>
               <a:t>mimp </a:t>
             </a:r>
             <a:r>
-              <a:rPr lang="en-US" sz="991" dirty="0">
-                <a:latin typeface="Times New Roman" panose="02020603050405020304" pitchFamily="18" charset="0"/>
-                <a:cs typeface="Times New Roman" panose="02020603050405020304" pitchFamily="18" charset="0"/>
-              </a:rPr>
-              <a:t>region </a:t>
-            </a:r>
-            <a:r>
-              <a:rPr lang="en-US" sz="991" dirty="0" err="1">
-                <a:latin typeface="Times New Roman" panose="02020603050405020304" pitchFamily="18" charset="0"/>
-                <a:cs typeface="Times New Roman" panose="02020603050405020304" pitchFamily="18" charset="0"/>
-              </a:rPr>
-              <a:t>gff</a:t>
-            </a:r>
-            <a:r>
-              <a:rPr lang="en-US" sz="991" dirty="0">
-                <a:latin typeface="Times New Roman" panose="02020603050405020304" pitchFamily="18" charset="0"/>
-                <a:cs typeface="Times New Roman" panose="02020603050405020304" pitchFamily="18" charset="0"/>
-              </a:rPr>
-              <a:t>, create a </a:t>
-            </a:r>
-            <a:r>
-              <a:rPr lang="en-US" sz="991" i="1" dirty="0">
+              <a:rPr lang="en-US" sz="1050" dirty="0">
+                <a:latin typeface="Times New Roman" panose="02020603050405020304" pitchFamily="18" charset="0"/>
+                <a:cs typeface="Times New Roman" panose="02020603050405020304" pitchFamily="18" charset="0"/>
+              </a:rPr>
+              <a:t>region GFF, create a </a:t>
+            </a:r>
+            <a:r>
+              <a:rPr lang="en-US" sz="1050" i="1" dirty="0">
                 <a:latin typeface="Times New Roman" panose="02020603050405020304" pitchFamily="18" charset="0"/>
                 <a:cs typeface="Times New Roman" panose="02020603050405020304" pitchFamily="18" charset="0"/>
               </a:rPr>
               <a:t>mimp</a:t>
             </a:r>
             <a:r>
-              <a:rPr lang="en-US" sz="991" dirty="0">
-                <a:latin typeface="Times New Roman" panose="02020603050405020304" pitchFamily="18" charset="0"/>
-                <a:cs typeface="Times New Roman" panose="02020603050405020304" pitchFamily="18" charset="0"/>
-              </a:rPr>
-              <a:t> region </a:t>
-            </a:r>
-            <a:r>
-              <a:rPr lang="en-US" sz="991" dirty="0" err="1">
-                <a:latin typeface="Times New Roman" panose="02020603050405020304" pitchFamily="18" charset="0"/>
-                <a:cs typeface="Times New Roman" panose="02020603050405020304" pitchFamily="18" charset="0"/>
-              </a:rPr>
-              <a:t>fastas</a:t>
-            </a:r>
-            <a:r>
-              <a:rPr lang="en-US" sz="991" dirty="0">
-                <a:latin typeface="Times New Roman" panose="02020603050405020304" pitchFamily="18" charset="0"/>
-                <a:cs typeface="Times New Roman" panose="02020603050405020304" pitchFamily="18" charset="0"/>
-              </a:rPr>
-              <a:t>, where all non-</a:t>
-            </a:r>
-            <a:r>
-              <a:rPr lang="en-US" sz="991" i="1" dirty="0">
+              <a:rPr lang="en-US" sz="1050" dirty="0">
+                <a:latin typeface="Times New Roman" panose="02020603050405020304" pitchFamily="18" charset="0"/>
+                <a:cs typeface="Times New Roman" panose="02020603050405020304" pitchFamily="18" charset="0"/>
+              </a:rPr>
+              <a:t> region FASTAS, where all non-</a:t>
+            </a:r>
+            <a:r>
+              <a:rPr lang="en-US" sz="1050" i="1" dirty="0">
                 <a:latin typeface="Times New Roman" panose="02020603050405020304" pitchFamily="18" charset="0"/>
                 <a:cs typeface="Times New Roman" panose="02020603050405020304" pitchFamily="18" charset="0"/>
               </a:rPr>
               <a:t>mimp </a:t>
             </a:r>
             <a:r>
-              <a:rPr lang="en-US" sz="991" dirty="0">
+              <a:rPr lang="en-US" sz="1050" dirty="0">
                 <a:latin typeface="Times New Roman" panose="02020603050405020304" pitchFamily="18" charset="0"/>
                 <a:cs typeface="Times New Roman" panose="02020603050405020304" pitchFamily="18" charset="0"/>
               </a:rPr>
@@ -4005,19 +3859,33 @@
           </a:p>
           <a:p>
             <a:pPr algn="ctr"/>
-            <a:endParaRPr lang="en-US" sz="991" dirty="0">
+            <a:endParaRPr lang="en-US" sz="1050" dirty="0">
               <a:latin typeface="Times New Roman" panose="02020603050405020304" pitchFamily="18" charset="0"/>
               <a:cs typeface="Times New Roman" panose="02020603050405020304" pitchFamily="18" charset="0"/>
             </a:endParaRPr>
           </a:p>
-        </p:txBody>
-      </p:sp>
-      <p:sp>
-        <p:nvSpPr>
-          <p:cNvPr id="8" name="TextBox 7">
+          <a:p>
+            <a:pPr algn="ctr"/>
+            <a:r>
+              <a:rPr lang="en-US" sz="1000" dirty="0">
+                <a:latin typeface="Times New Roman" panose="02020603050405020304" pitchFamily="18" charset="0"/>
+                <a:cs typeface="Times New Roman" panose="02020603050405020304" pitchFamily="18" charset="0"/>
+              </a:rPr>
+              <a:t> </a:t>
+            </a:r>
+            <a:endParaRPr lang="en-US" sz="900" dirty="0">
+              <a:latin typeface="Times New Roman" panose="02020603050405020304" pitchFamily="18" charset="0"/>
+              <a:cs typeface="Times New Roman" panose="02020603050405020304" pitchFamily="18" charset="0"/>
+            </a:endParaRPr>
+          </a:p>
+        </p:txBody>
+      </p:sp>
+      <p:sp>
+        <p:nvSpPr>
+          <p:cNvPr id="33" name="TextBox 32">
             <a:extLst>
               <a:ext uri="{FF2B5EF4-FFF2-40B4-BE49-F238E27FC236}">
-                <a16:creationId xmlns:a16="http://schemas.microsoft.com/office/drawing/2014/main" id="{73D83FF5-DC0F-4F5B-D79F-9E0C90FE1B74}"/>
+                <a16:creationId xmlns:a16="http://schemas.microsoft.com/office/drawing/2014/main" id="{B711EA04-8776-BB1F-533B-25F5827492B4}"/>
               </a:ext>
             </a:extLst>
           </p:cNvPr>
@@ -4026,8 +3894,8 @@
         </p:nvSpPr>
         <p:spPr>
           <a:xfrm>
-            <a:off x="4168069" y="3439020"/>
-            <a:ext cx="2842694" cy="549766"/>
+            <a:off x="3750973" y="3628125"/>
+            <a:ext cx="3019934" cy="738664"/>
           </a:xfrm>
           <a:prstGeom prst="rect">
             <a:avLst/>
@@ -4047,7 +3915,7 @@
           <a:p>
             <a:pPr algn="ctr"/>
             <a:r>
-              <a:rPr lang="en-US" sz="991" b="1" dirty="0">
+              <a:rPr lang="en-US" sz="1050" b="1" dirty="0">
                 <a:latin typeface="Times New Roman" panose="02020603050405020304" pitchFamily="18" charset="0"/>
                 <a:cs typeface="Times New Roman" panose="02020603050405020304" pitchFamily="18" charset="0"/>
               </a:rPr>
@@ -4057,21 +3925,31 @@
           <a:p>
             <a:pPr algn="ctr"/>
             <a:r>
-              <a:rPr lang="en-US" sz="991" dirty="0">
-                <a:latin typeface="Times New Roman" panose="02020603050405020304" pitchFamily="18" charset="0"/>
-                <a:cs typeface="Times New Roman" panose="02020603050405020304" pitchFamily="18" charset="0"/>
-              </a:rPr>
-              <a:t>Getorf from Emboss (6.6.0.0) is used to find open reading frames (ORFs) in the 2.5kb region. </a:t>
-            </a:r>
-          </a:p>
-        </p:txBody>
-      </p:sp>
-      <p:sp>
-        <p:nvSpPr>
-          <p:cNvPr id="9" name="TextBox 8">
+              <a:rPr lang="en-US" sz="1050" dirty="0">
+                <a:latin typeface="Times New Roman" panose="02020603050405020304" pitchFamily="18" charset="0"/>
+                <a:cs typeface="Times New Roman" panose="02020603050405020304" pitchFamily="18" charset="0"/>
+              </a:rPr>
+              <a:t>Getorf from Emboss (v6.6.0.0) is used to find open reading frames (ORFs) in the 2.5kb region. </a:t>
+            </a:r>
+          </a:p>
+          <a:p>
+            <a:pPr algn="ctr"/>
+            <a:r>
+              <a:rPr lang="en-US" sz="900" dirty="0">
+                <a:latin typeface="Times New Roman" panose="02020603050405020304" pitchFamily="18" charset="0"/>
+                <a:cs typeface="Times New Roman" panose="02020603050405020304" pitchFamily="18" charset="0"/>
+              </a:rPr>
+              <a:t> </a:t>
+            </a:r>
+          </a:p>
+        </p:txBody>
+      </p:sp>
+      <p:sp>
+        <p:nvSpPr>
+          <p:cNvPr id="34" name="TextBox 33">
             <a:extLst>
               <a:ext uri="{FF2B5EF4-FFF2-40B4-BE49-F238E27FC236}">
-                <a16:creationId xmlns:a16="http://schemas.microsoft.com/office/drawing/2014/main" id="{76863FFD-4A95-4E66-357E-C00DFD584A9E}"/>
+                <a16:creationId xmlns:a16="http://schemas.microsoft.com/office/drawing/2014/main" id="{2CF06320-44C5-7F77-6DA0-DC4B361DFD27}"/>
               </a:ext>
             </a:extLst>
           </p:cNvPr>
@@ -4080,8 +3958,8 @@
         </p:nvSpPr>
         <p:spPr>
           <a:xfrm>
-            <a:off x="1172375" y="4421080"/>
-            <a:ext cx="5838388" cy="397288"/>
+            <a:off x="617816" y="4529168"/>
+            <a:ext cx="6153093" cy="415498"/>
           </a:xfrm>
           <a:prstGeom prst="rect">
             <a:avLst/>
@@ -4101,31 +3979,31 @@
           <a:p>
             <a:pPr algn="ctr"/>
             <a:r>
-              <a:rPr lang="en-US" sz="991" b="1" dirty="0">
-                <a:latin typeface="Times New Roman" panose="02020603050405020304" pitchFamily="18" charset="0"/>
-                <a:cs typeface="Times New Roman" panose="02020603050405020304" pitchFamily="18" charset="0"/>
-              </a:rPr>
-              <a:t>Signal Peptide Filtering</a:t>
+              <a:rPr lang="en-US" sz="1050" b="1" dirty="0">
+                <a:latin typeface="Times New Roman" panose="02020603050405020304" pitchFamily="18" charset="0"/>
+                <a:cs typeface="Times New Roman" panose="02020603050405020304" pitchFamily="18" charset="0"/>
+              </a:rPr>
+              <a:t>Signal peptide filtering</a:t>
             </a:r>
           </a:p>
           <a:p>
             <a:pPr algn="ctr"/>
             <a:r>
-              <a:rPr lang="en-US" sz="991" dirty="0">
-                <a:latin typeface="Times New Roman" panose="02020603050405020304" pitchFamily="18" charset="0"/>
-                <a:cs typeface="Times New Roman" panose="02020603050405020304" pitchFamily="18" charset="0"/>
-              </a:rPr>
-              <a:t>SignalP (4.1) is used search all Augustus gene models and ORFs for a signal peptide.</a:t>
-            </a:r>
-          </a:p>
-        </p:txBody>
-      </p:sp>
-      <p:sp>
-        <p:nvSpPr>
-          <p:cNvPr id="10" name="TextBox 9">
+              <a:rPr lang="en-US" sz="1050" dirty="0">
+                <a:latin typeface="Times New Roman" panose="02020603050405020304" pitchFamily="18" charset="0"/>
+                <a:cs typeface="Times New Roman" panose="02020603050405020304" pitchFamily="18" charset="0"/>
+              </a:rPr>
+              <a:t>SignalP (4.1) is used search all AUGUSTUS gene models and ORFs for a signal peptide.</a:t>
+            </a:r>
+          </a:p>
+        </p:txBody>
+      </p:sp>
+      <p:sp>
+        <p:nvSpPr>
+          <p:cNvPr id="35" name="TextBox 34">
             <a:extLst>
               <a:ext uri="{FF2B5EF4-FFF2-40B4-BE49-F238E27FC236}">
-                <a16:creationId xmlns:a16="http://schemas.microsoft.com/office/drawing/2014/main" id="{10317BC3-FAE6-9271-6B0E-F554336BB750}"/>
+                <a16:creationId xmlns:a16="http://schemas.microsoft.com/office/drawing/2014/main" id="{AE157376-0193-94C8-7444-E50B1DB6C7C4}"/>
               </a:ext>
             </a:extLst>
           </p:cNvPr>
@@ -4134,8 +4012,8 @@
         </p:nvSpPr>
         <p:spPr>
           <a:xfrm>
-            <a:off x="1152580" y="3450688"/>
-            <a:ext cx="2797881" cy="702244"/>
+            <a:off x="617817" y="3630805"/>
+            <a:ext cx="3035235" cy="738664"/>
           </a:xfrm>
           <a:prstGeom prst="rect">
             <a:avLst/>
@@ -4155,45 +4033,31 @@
           <a:p>
             <a:pPr algn="ctr"/>
             <a:r>
-              <a:rPr lang="en-US" sz="991" b="1" dirty="0">
-                <a:latin typeface="Times New Roman" panose="02020603050405020304" pitchFamily="18" charset="0"/>
-                <a:cs typeface="Times New Roman" panose="02020603050405020304" pitchFamily="18" charset="0"/>
-              </a:rPr>
-              <a:t>Augustus Gene Prediction</a:t>
+              <a:rPr lang="en-US" sz="1050" b="1" dirty="0">
+                <a:latin typeface="Times New Roman" panose="02020603050405020304" pitchFamily="18" charset="0"/>
+                <a:cs typeface="Times New Roman" panose="02020603050405020304" pitchFamily="18" charset="0"/>
+              </a:rPr>
+              <a:t>AUGUSTUS gene prediction</a:t>
             </a:r>
           </a:p>
           <a:p>
             <a:pPr algn="ctr"/>
             <a:r>
-              <a:rPr lang="en-US" sz="991" dirty="0">
-                <a:latin typeface="Times New Roman" panose="02020603050405020304" pitchFamily="18" charset="0"/>
-                <a:cs typeface="Times New Roman" panose="02020603050405020304" pitchFamily="18" charset="0"/>
-              </a:rPr>
-              <a:t>The Augustus region </a:t>
-            </a:r>
-            <a:r>
-              <a:rPr lang="en-US" sz="991" dirty="0" err="1">
-                <a:latin typeface="Times New Roman" panose="02020603050405020304" pitchFamily="18" charset="0"/>
-                <a:cs typeface="Times New Roman" panose="02020603050405020304" pitchFamily="18" charset="0"/>
-              </a:rPr>
-              <a:t>fasta</a:t>
-            </a:r>
-            <a:r>
-              <a:rPr lang="en-US" sz="991" dirty="0">
-                <a:latin typeface="Times New Roman" panose="02020603050405020304" pitchFamily="18" charset="0"/>
-                <a:cs typeface="Times New Roman" panose="02020603050405020304" pitchFamily="18" charset="0"/>
-              </a:rPr>
-              <a:t> is submitted to Augustus (3.3.3) for gene prediction with the “fusarium” species parameter selected.</a:t>
-            </a:r>
-          </a:p>
-        </p:txBody>
-      </p:sp>
-      <p:sp>
-        <p:nvSpPr>
-          <p:cNvPr id="12" name="TextBox 11">
+              <a:rPr lang="en-US" sz="1050" dirty="0">
+                <a:latin typeface="Times New Roman" panose="02020603050405020304" pitchFamily="18" charset="0"/>
+                <a:cs typeface="Times New Roman" panose="02020603050405020304" pitchFamily="18" charset="0"/>
+              </a:rPr>
+              <a:t>The Augustus region FASTA is submitted to AUGUSTUS (V3.3.3) for gene prediction with the “fusarium” species parameter selected.</a:t>
+            </a:r>
+          </a:p>
+        </p:txBody>
+      </p:sp>
+      <p:sp>
+        <p:nvSpPr>
+          <p:cNvPr id="36" name="TextBox 35">
             <a:extLst>
               <a:ext uri="{FF2B5EF4-FFF2-40B4-BE49-F238E27FC236}">
-                <a16:creationId xmlns:a16="http://schemas.microsoft.com/office/drawing/2014/main" id="{C90FD48A-366A-8BB4-5D94-823BB3FE8237}"/>
+                <a16:creationId xmlns:a16="http://schemas.microsoft.com/office/drawing/2014/main" id="{976CB707-1090-E6D0-E086-A23D5310FC7A}"/>
               </a:ext>
             </a:extLst>
           </p:cNvPr>
@@ -4202,8 +4066,8 @@
         </p:nvSpPr>
         <p:spPr>
           <a:xfrm>
-            <a:off x="1154273" y="4958579"/>
-            <a:ext cx="5847509" cy="515723"/>
+            <a:off x="617817" y="5096516"/>
+            <a:ext cx="6153092" cy="513692"/>
           </a:xfrm>
           <a:prstGeom prst="rect">
             <a:avLst/>
@@ -4218,30 +4082,30 @@
           </a:ln>
         </p:spPr>
         <p:txBody>
-          <a:bodyPr wrap="square" lIns="57726" tIns="28863" rIns="57726" bIns="28863" rtlCol="0" anchor="t">
+          <a:bodyPr wrap="square" lIns="28664" tIns="14332" rIns="28664" bIns="14332" rtlCol="0" anchor="t">
             <a:spAutoFit/>
           </a:bodyPr>
           <a:lstStyle/>
           <a:p>
             <a:pPr algn="ctr"/>
             <a:r>
-              <a:rPr lang="en-US" sz="991" b="1" dirty="0">
-                <a:latin typeface="Times New Roman" panose="02020603050405020304" pitchFamily="18" charset="0"/>
-                <a:cs typeface="Times New Roman" panose="02020603050405020304" pitchFamily="18" charset="0"/>
-              </a:rPr>
-              <a:t>Size Filter.</a:t>
+              <a:rPr lang="en-US" sz="1050" b="1" dirty="0">
+                <a:latin typeface="Times New Roman" panose="02020603050405020304" pitchFamily="18" charset="0"/>
+                <a:cs typeface="Times New Roman" panose="02020603050405020304" pitchFamily="18" charset="0"/>
+              </a:rPr>
+              <a:t>Size filter</a:t>
             </a:r>
           </a:p>
           <a:p>
             <a:pPr algn="ctr"/>
             <a:r>
-              <a:rPr lang="en-US" sz="991" dirty="0">
+              <a:rPr lang="en-US" sz="1050" dirty="0">
                 <a:latin typeface="Times New Roman"/>
                 <a:cs typeface="Times New Roman"/>
               </a:rPr>
-              <a:t>Protein sequences containing a signal peptide predicted by SignalP are filtered based on size, with sequences &lt;450aa and &gt;30aa kept for effector prediction.  </a:t>
-            </a:r>
-            <a:endParaRPr lang="en-US" sz="991" dirty="0">
+              <a:t>Protein sequences containing a signal peptide predicted by SignalP (v4.1) are filtered based on size, with sequences &lt;450aa and &gt;30aa kept for effector prediction.  </a:t>
+            </a:r>
+            <a:endParaRPr lang="en-US" sz="1050" dirty="0">
               <a:latin typeface="Times New Roman" panose="02020603050405020304" pitchFamily="18" charset="0"/>
               <a:cs typeface="Times New Roman" panose="02020603050405020304" pitchFamily="18" charset="0"/>
             </a:endParaRPr>
@@ -4250,10 +4114,10 @@
       </p:sp>
       <p:sp>
         <p:nvSpPr>
-          <p:cNvPr id="13" name="TextBox 12">
+          <p:cNvPr id="37" name="TextBox 36">
             <a:extLst>
               <a:ext uri="{FF2B5EF4-FFF2-40B4-BE49-F238E27FC236}">
-                <a16:creationId xmlns:a16="http://schemas.microsoft.com/office/drawing/2014/main" id="{49251B29-E3BA-FCAE-BBAD-DE9AB0DCFBBA}"/>
+                <a16:creationId xmlns:a16="http://schemas.microsoft.com/office/drawing/2014/main" id="{6DCA523E-F833-5F7E-A65A-30DAA2F76805}"/>
               </a:ext>
             </a:extLst>
           </p:cNvPr>
@@ -4262,8 +4126,8 @@
         </p:nvSpPr>
         <p:spPr>
           <a:xfrm>
-            <a:off x="1146568" y="5655204"/>
-            <a:ext cx="5847379" cy="397288"/>
+            <a:off x="617816" y="5842985"/>
+            <a:ext cx="6153093" cy="415498"/>
           </a:xfrm>
           <a:prstGeom prst="rect">
             <a:avLst/>
@@ -4285,45 +4149,45 @@
           <a:p>
             <a:pPr algn="ctr"/>
             <a:r>
-              <a:rPr lang="en-US" sz="991" b="1" dirty="0">
-                <a:latin typeface="Times New Roman" panose="02020603050405020304" pitchFamily="18" charset="0"/>
-                <a:cs typeface="Times New Roman" panose="02020603050405020304" pitchFamily="18" charset="0"/>
-              </a:rPr>
-              <a:t> EffectorP Scan for Likely Effectors</a:t>
+              <a:rPr lang="en-US" sz="1050" b="1" dirty="0">
+                <a:latin typeface="Times New Roman" panose="02020603050405020304" pitchFamily="18" charset="0"/>
+                <a:cs typeface="Times New Roman" panose="02020603050405020304" pitchFamily="18" charset="0"/>
+              </a:rPr>
+              <a:t> EffectorP (v2.0.1) scan for likely effectors</a:t>
             </a:r>
           </a:p>
           <a:p>
             <a:pPr algn="ctr"/>
             <a:r>
-              <a:rPr lang="en-US" sz="991" dirty="0">
-                <a:latin typeface="Times New Roman" panose="02020603050405020304" pitchFamily="18" charset="0"/>
-                <a:cs typeface="Times New Roman" panose="02020603050405020304" pitchFamily="18" charset="0"/>
-              </a:rPr>
-              <a:t>Each signal peptide and size filtered sequences is submitted to EffectorP (2.0.1) for fungal effector prediction. </a:t>
+              <a:rPr lang="en-US" sz="1050" dirty="0">
+                <a:latin typeface="Times New Roman" panose="02020603050405020304" pitchFamily="18" charset="0"/>
+                <a:cs typeface="Times New Roman" panose="02020603050405020304" pitchFamily="18" charset="0"/>
+              </a:rPr>
+              <a:t>Each signal peptide and size filtered sequences is submitted to EffectorP (v2.0.1) for fungal effector prediction. </a:t>
             </a:r>
           </a:p>
         </p:txBody>
       </p:sp>
       <p:cxnSp>
         <p:nvCxnSpPr>
-          <p:cNvPr id="18" name="Straight Arrow Connector 39">
+          <p:cNvPr id="38" name="Straight Arrow Connector 39">
             <a:extLst>
               <a:ext uri="{FF2B5EF4-FFF2-40B4-BE49-F238E27FC236}">
-                <a16:creationId xmlns:a16="http://schemas.microsoft.com/office/drawing/2014/main" id="{EBCB6742-8038-43F5-1678-7A96CEEAC73A}"/>
+                <a16:creationId xmlns:a16="http://schemas.microsoft.com/office/drawing/2014/main" id="{AC2CB13E-9DD3-CD43-4C1B-156384BB78BC}"/>
               </a:ext>
             </a:extLst>
           </p:cNvPr>
           <p:cNvCxnSpPr>
             <a:cxnSpLocks/>
-            <a:stCxn id="5" idx="2"/>
-            <a:endCxn id="6" idx="0"/>
+            <a:stCxn id="30" idx="2"/>
+            <a:endCxn id="31" idx="0"/>
           </p:cNvCxnSpPr>
           <p:nvPr/>
         </p:nvCxnSpPr>
         <p:spPr>
           <a:xfrm rot="5400000">
-            <a:off x="3184548" y="1573494"/>
-            <a:ext cx="280182" cy="1524857"/>
+            <a:off x="2824746" y="1568608"/>
+            <a:ext cx="180309" cy="1558929"/>
           </a:xfrm>
           <a:prstGeom prst="bentConnector3">
             <a:avLst>
@@ -4355,24 +4219,24 @@
       </p:cxnSp>
       <p:cxnSp>
         <p:nvCxnSpPr>
-          <p:cNvPr id="19" name="Straight Arrow Connector 18">
+          <p:cNvPr id="39" name="Straight Arrow Connector 38">
             <a:extLst>
               <a:ext uri="{FF2B5EF4-FFF2-40B4-BE49-F238E27FC236}">
-                <a16:creationId xmlns:a16="http://schemas.microsoft.com/office/drawing/2014/main" id="{958E7F38-F096-28F4-96C4-8739541D2E43}"/>
+                <a16:creationId xmlns:a16="http://schemas.microsoft.com/office/drawing/2014/main" id="{80B17E49-3031-9706-BDF3-6031A9A28FFA}"/>
               </a:ext>
             </a:extLst>
           </p:cNvPr>
           <p:cNvCxnSpPr>
             <a:cxnSpLocks/>
-            <a:stCxn id="6" idx="2"/>
-            <a:endCxn id="10" idx="0"/>
+            <a:stCxn id="31" idx="2"/>
+            <a:endCxn id="35" idx="0"/>
           </p:cNvCxnSpPr>
           <p:nvPr/>
         </p:nvCxnSpPr>
         <p:spPr>
-          <a:xfrm flipH="1">
-            <a:off x="2551521" y="3330734"/>
-            <a:ext cx="10689" cy="119954"/>
+          <a:xfrm>
+            <a:off x="2135435" y="3500056"/>
+            <a:ext cx="0" cy="130749"/>
           </a:xfrm>
           <a:prstGeom prst="straightConnector1">
             <a:avLst/>
@@ -4402,23 +4266,23 @@
       </p:cxnSp>
       <p:cxnSp>
         <p:nvCxnSpPr>
-          <p:cNvPr id="22" name="Straight Arrow Connector 21">
+          <p:cNvPr id="40" name="Straight Arrow Connector 39">
             <a:extLst>
               <a:ext uri="{FF2B5EF4-FFF2-40B4-BE49-F238E27FC236}">
-                <a16:creationId xmlns:a16="http://schemas.microsoft.com/office/drawing/2014/main" id="{899080EA-63E7-4946-6385-51E866DC83BF}"/>
+                <a16:creationId xmlns:a16="http://schemas.microsoft.com/office/drawing/2014/main" id="{37AD526A-51C8-22C7-ED75-940380912E7C}"/>
               </a:ext>
             </a:extLst>
           </p:cNvPr>
           <p:cNvCxnSpPr>
             <a:cxnSpLocks/>
-            <a:stCxn id="8" idx="2"/>
+            <a:stCxn id="33" idx="2"/>
           </p:cNvCxnSpPr>
           <p:nvPr/>
         </p:nvCxnSpPr>
         <p:spPr>
           <a:xfrm>
-            <a:off x="5589416" y="3988786"/>
-            <a:ext cx="15541" cy="420627"/>
+            <a:off x="5260940" y="4366789"/>
+            <a:ext cx="0" cy="162379"/>
           </a:xfrm>
           <a:prstGeom prst="straightConnector1">
             <a:avLst/>
@@ -4448,153 +4312,24 @@
       </p:cxnSp>
       <p:cxnSp>
         <p:nvCxnSpPr>
-          <p:cNvPr id="26" name="Straight Arrow Connector 25">
+          <p:cNvPr id="41" name="Straight Arrow Connector 40">
             <a:extLst>
               <a:ext uri="{FF2B5EF4-FFF2-40B4-BE49-F238E27FC236}">
-                <a16:creationId xmlns:a16="http://schemas.microsoft.com/office/drawing/2014/main" id="{3B6C4FAA-DA08-295B-0EEB-CC90B2D8F976}"/>
+                <a16:creationId xmlns:a16="http://schemas.microsoft.com/office/drawing/2014/main" id="{E4D9565D-4082-948F-58CB-8BF463E36C28}"/>
               </a:ext>
             </a:extLst>
           </p:cNvPr>
           <p:cNvCxnSpPr>
             <a:cxnSpLocks/>
-            <a:stCxn id="7" idx="2"/>
-            <a:endCxn id="8" idx="0"/>
+            <a:stCxn id="32" idx="2"/>
+            <a:endCxn id="33" idx="0"/>
           </p:cNvCxnSpPr>
           <p:nvPr/>
         </p:nvCxnSpPr>
         <p:spPr>
-          <a:xfrm>
-            <a:off x="5589416" y="3330734"/>
-            <a:ext cx="0" cy="108286"/>
-          </a:xfrm>
-          <a:prstGeom prst="straightConnector1">
-            <a:avLst/>
-          </a:prstGeom>
-          <a:ln w="19050">
-            <a:solidFill>
-              <a:schemeClr val="tx1"/>
-            </a:solidFill>
-            <a:headEnd type="none" w="med" len="med"/>
-            <a:tailEnd type="arrow" w="med" len="med"/>
-          </a:ln>
-        </p:spPr>
-        <p:style>
-          <a:lnRef idx="1">
-            <a:schemeClr val="accent1"/>
-          </a:lnRef>
-          <a:fillRef idx="0">
-            <a:schemeClr val="accent1"/>
-          </a:fillRef>
-          <a:effectRef idx="0">
-            <a:schemeClr val="accent1"/>
-          </a:effectRef>
-          <a:fontRef idx="minor">
-            <a:schemeClr val="tx1"/>
-          </a:fontRef>
-        </p:style>
-      </p:cxnSp>
-      <p:sp>
-        <p:nvSpPr>
-          <p:cNvPr id="28" name="TextBox 27">
-            <a:extLst>
-              <a:ext uri="{FF2B5EF4-FFF2-40B4-BE49-F238E27FC236}">
-                <a16:creationId xmlns:a16="http://schemas.microsoft.com/office/drawing/2014/main" id="{F2CE0C89-EAC4-6CF5-1C87-38667695298D}"/>
-              </a:ext>
-            </a:extLst>
-          </p:cNvPr>
-          <p:cNvSpPr txBox="1"/>
-          <p:nvPr/>
-        </p:nvSpPr>
-        <p:spPr>
-          <a:xfrm>
-            <a:off x="8002248" y="154930"/>
-            <a:ext cx="5288007" cy="1007199"/>
-          </a:xfrm>
-          <a:prstGeom prst="rect">
-            <a:avLst/>
-          </a:prstGeom>
-          <a:noFill/>
-          <a:ln w="19050">
-            <a:solidFill>
-              <a:schemeClr val="tx1"/>
-            </a:solidFill>
-          </a:ln>
-        </p:spPr>
-        <p:txBody>
-          <a:bodyPr wrap="square" rtlCol="0">
-            <a:spAutoFit/>
-          </a:bodyPr>
-          <a:lstStyle/>
-          <a:p>
-            <a:pPr algn="ctr"/>
-            <a:r>
-              <a:rPr lang="en-GB" sz="991" b="1" dirty="0">
-                <a:latin typeface="Times New Roman" panose="02020603050405020304" pitchFamily="18" charset="0"/>
-                <a:cs typeface="Times New Roman" panose="02020603050405020304" pitchFamily="18" charset="0"/>
-              </a:rPr>
-              <a:t>Effector Clustering</a:t>
-            </a:r>
-          </a:p>
-          <a:p>
-            <a:pPr algn="ctr"/>
-            <a:endParaRPr lang="en-GB" sz="991" b="1" dirty="0">
-              <a:latin typeface="Times New Roman" panose="02020603050405020304" pitchFamily="18" charset="0"/>
-              <a:cs typeface="Times New Roman" panose="02020603050405020304" pitchFamily="18" charset="0"/>
-            </a:endParaRPr>
-          </a:p>
-          <a:p>
-            <a:pPr algn="ctr"/>
-            <a:r>
-              <a:rPr lang="en-US" sz="991" dirty="0">
-                <a:latin typeface="Times New Roman"/>
-                <a:cs typeface="Times New Roman"/>
-              </a:rPr>
-              <a:t>Candidate effector sequences are from all assemblies are combined into one FASTA and clustered using CD-HIT (4.8.1) (80% identity (optional using command line input)). </a:t>
-            </a:r>
-          </a:p>
-          <a:p>
-            <a:pPr algn="ctr"/>
-            <a:endParaRPr lang="en-US" sz="991" dirty="0">
-              <a:latin typeface="Times New Roman"/>
-              <a:cs typeface="Times New Roman"/>
-            </a:endParaRPr>
-          </a:p>
-          <a:p>
-            <a:pPr algn="ctr"/>
-            <a:r>
-              <a:rPr lang="en-US" sz="991" dirty="0">
-                <a:latin typeface="Times New Roman"/>
-                <a:cs typeface="Times New Roman"/>
-              </a:rPr>
-              <a:t>  </a:t>
-            </a:r>
-            <a:endParaRPr lang="en-US" sz="991" dirty="0">
-              <a:latin typeface="Times New Roman" panose="02020603050405020304" pitchFamily="18" charset="0"/>
-              <a:cs typeface="Times New Roman" panose="02020603050405020304" pitchFamily="18" charset="0"/>
-            </a:endParaRPr>
-          </a:p>
-        </p:txBody>
-      </p:sp>
-      <p:cxnSp>
-        <p:nvCxnSpPr>
-          <p:cNvPr id="29" name="Straight Arrow Connector 28">
-            <a:extLst>
-              <a:ext uri="{FF2B5EF4-FFF2-40B4-BE49-F238E27FC236}">
-                <a16:creationId xmlns:a16="http://schemas.microsoft.com/office/drawing/2014/main" id="{342327B9-7F11-15B6-716C-5C541C6FDC95}"/>
-              </a:ext>
-            </a:extLst>
-          </p:cNvPr>
-          <p:cNvCxnSpPr>
-            <a:cxnSpLocks/>
-            <a:stCxn id="12" idx="2"/>
-            <a:endCxn id="13" idx="0"/>
-          </p:cNvCxnSpPr>
-          <p:nvPr/>
-        </p:nvCxnSpPr>
-        <p:spPr>
           <a:xfrm flipH="1">
-            <a:off x="4070258" y="5474302"/>
-            <a:ext cx="7770" cy="180902"/>
+            <a:off x="5260940" y="3492362"/>
+            <a:ext cx="6" cy="135763"/>
           </a:xfrm>
           <a:prstGeom prst="straightConnector1">
             <a:avLst/>
@@ -4624,192 +4359,24 @@
       </p:cxnSp>
       <p:cxnSp>
         <p:nvCxnSpPr>
-          <p:cNvPr id="130" name="Straight Arrow Connector 129">
+          <p:cNvPr id="42" name="Straight Arrow Connector 41">
             <a:extLst>
               <a:ext uri="{FF2B5EF4-FFF2-40B4-BE49-F238E27FC236}">
-                <a16:creationId xmlns:a16="http://schemas.microsoft.com/office/drawing/2014/main" id="{0BC320E2-D52D-1264-D75C-8629AF6797A8}"/>
+                <a16:creationId xmlns:a16="http://schemas.microsoft.com/office/drawing/2014/main" id="{5327B655-1121-397A-9CA1-F589B30DD736}"/>
               </a:ext>
             </a:extLst>
           </p:cNvPr>
           <p:cNvCxnSpPr>
             <a:cxnSpLocks/>
-            <a:stCxn id="4" idx="2"/>
-            <a:endCxn id="5" idx="0"/>
+            <a:stCxn id="36" idx="2"/>
+            <a:endCxn id="37" idx="0"/>
           </p:cNvCxnSpPr>
           <p:nvPr/>
         </p:nvCxnSpPr>
         <p:spPr>
           <a:xfrm>
-            <a:off x="4077962" y="1609784"/>
-            <a:ext cx="9105" cy="188759"/>
-          </a:xfrm>
-          <a:prstGeom prst="straightConnector1">
-            <a:avLst/>
-          </a:prstGeom>
-          <a:ln w="19050">
-            <a:solidFill>
-              <a:schemeClr val="tx1"/>
-            </a:solidFill>
-            <a:headEnd type="none" w="med" len="med"/>
-            <a:tailEnd type="arrow" w="med" len="med"/>
-          </a:ln>
-        </p:spPr>
-        <p:style>
-          <a:lnRef idx="1">
-            <a:schemeClr val="accent1"/>
-          </a:lnRef>
-          <a:fillRef idx="0">
-            <a:schemeClr val="accent1"/>
-          </a:fillRef>
-          <a:effectRef idx="0">
-            <a:schemeClr val="accent1"/>
-          </a:effectRef>
-          <a:fontRef idx="minor">
-            <a:schemeClr val="tx1"/>
-          </a:fontRef>
-        </p:style>
-      </p:cxnSp>
-      <p:sp>
-        <p:nvSpPr>
-          <p:cNvPr id="139" name="TextBox 138">
-            <a:extLst>
-              <a:ext uri="{FF2B5EF4-FFF2-40B4-BE49-F238E27FC236}">
-                <a16:creationId xmlns:a16="http://schemas.microsoft.com/office/drawing/2014/main" id="{0C901CD1-6FF2-E973-1768-135A15E28651}"/>
-              </a:ext>
-            </a:extLst>
-          </p:cNvPr>
-          <p:cNvSpPr txBox="1"/>
-          <p:nvPr/>
-        </p:nvSpPr>
-        <p:spPr>
-          <a:xfrm>
-            <a:off x="7995907" y="1632579"/>
-            <a:ext cx="5288007" cy="668200"/>
-          </a:xfrm>
-          <a:prstGeom prst="rect">
-            <a:avLst/>
-          </a:prstGeom>
-          <a:noFill/>
-          <a:ln w="19050">
-            <a:solidFill>
-              <a:schemeClr val="accent6">
-                <a:lumMod val="75000"/>
-              </a:schemeClr>
-            </a:solidFill>
-          </a:ln>
-        </p:spPr>
-        <p:txBody>
-          <a:bodyPr wrap="square" lIns="57726" tIns="28863" rIns="57726" bIns="28863" rtlCol="0" anchor="t">
-            <a:spAutoFit/>
-          </a:bodyPr>
-          <a:lstStyle/>
-          <a:p>
-            <a:pPr algn="ctr"/>
-            <a:r>
-              <a:rPr lang="en-US" sz="991" b="1" dirty="0">
-                <a:latin typeface="Times New Roman"/>
-                <a:cs typeface="Times New Roman"/>
-              </a:rPr>
-              <a:t>Cluster Analysis</a:t>
-            </a:r>
-          </a:p>
-          <a:p>
-            <a:pPr algn="ctr"/>
-            <a:r>
-              <a:rPr lang="en-GB" sz="991" dirty="0">
-                <a:latin typeface="Times New Roman"/>
-                <a:ea typeface="Times New Roman" panose="02020603050405020304" pitchFamily="18" charset="0"/>
-                <a:cs typeface="Times New Roman"/>
-              </a:rPr>
-              <a:t>A custom python script is used to generate a table of effector clusters, containing details on the sequences in each cluster, the assembly from which each sequence originated, and the percentage identity of each sequence within the cluster to the cluster reference.</a:t>
-            </a:r>
-            <a:endParaRPr lang="en-US" sz="991" dirty="0">
-              <a:latin typeface="Times New Roman" panose="02020603050405020304" pitchFamily="18" charset="0"/>
-              <a:cs typeface="Times New Roman" panose="02020603050405020304" pitchFamily="18" charset="0"/>
-            </a:endParaRPr>
-          </a:p>
-        </p:txBody>
-      </p:sp>
-      <p:sp>
-        <p:nvSpPr>
-          <p:cNvPr id="140" name="TextBox 139">
-            <a:extLst>
-              <a:ext uri="{FF2B5EF4-FFF2-40B4-BE49-F238E27FC236}">
-                <a16:creationId xmlns:a16="http://schemas.microsoft.com/office/drawing/2014/main" id="{7B1EE02E-46B2-9ADC-35FD-C9011A9F33C1}"/>
-              </a:ext>
-            </a:extLst>
-          </p:cNvPr>
-          <p:cNvSpPr txBox="1"/>
-          <p:nvPr/>
-        </p:nvSpPr>
-        <p:spPr>
-          <a:xfrm>
-            <a:off x="8006164" y="2678763"/>
-            <a:ext cx="5288006" cy="668200"/>
-          </a:xfrm>
-          <a:prstGeom prst="rect">
-            <a:avLst/>
-          </a:prstGeom>
-          <a:noFill/>
-          <a:ln w="19050">
-            <a:solidFill>
-              <a:schemeClr val="accent6">
-                <a:lumMod val="75000"/>
-              </a:schemeClr>
-            </a:solidFill>
-          </a:ln>
-        </p:spPr>
-        <p:txBody>
-          <a:bodyPr wrap="square" lIns="57726" tIns="28863" rIns="57726" bIns="28863" rtlCol="0" anchor="t">
-            <a:spAutoFit/>
-          </a:bodyPr>
-          <a:lstStyle/>
-          <a:p>
-            <a:pPr algn="ctr"/>
-            <a:r>
-              <a:rPr lang="en-US" sz="991" b="1" dirty="0">
-                <a:latin typeface="Times New Roman" panose="02020603050405020304" pitchFamily="18" charset="0"/>
-                <a:cs typeface="Times New Roman" panose="02020603050405020304" pitchFamily="18" charset="0"/>
-              </a:rPr>
-              <a:t>Effector Profiling</a:t>
-            </a:r>
-          </a:p>
-          <a:p>
-            <a:pPr algn="ctr"/>
-            <a:r>
-              <a:rPr lang="en-US" sz="991" dirty="0">
-                <a:latin typeface="Times New Roman"/>
-                <a:cs typeface="Times New Roman"/>
-              </a:rPr>
-              <a:t>An effector profile generated in R Studio (version 3.6.3), using the package Pheatmap  (version 1.0.12). Data can be converted to binary at this stage to only generate a presence/absence heatmap rather than hit frequency heatmap. </a:t>
-            </a:r>
-            <a:endParaRPr lang="en-US" sz="991" dirty="0">
-              <a:latin typeface="Times New Roman" panose="02020603050405020304" pitchFamily="18" charset="0"/>
-              <a:cs typeface="Times New Roman" panose="02020603050405020304" pitchFamily="18" charset="0"/>
-            </a:endParaRPr>
-          </a:p>
-        </p:txBody>
-      </p:sp>
-      <p:cxnSp>
-        <p:nvCxnSpPr>
-          <p:cNvPr id="144" name="Straight Arrow Connector 143">
-            <a:extLst>
-              <a:ext uri="{FF2B5EF4-FFF2-40B4-BE49-F238E27FC236}">
-                <a16:creationId xmlns:a16="http://schemas.microsoft.com/office/drawing/2014/main" id="{61AA293B-118D-E3C0-3BAF-71090DB16859}"/>
-              </a:ext>
-            </a:extLst>
-          </p:cNvPr>
-          <p:cNvCxnSpPr>
-            <a:cxnSpLocks/>
-            <a:stCxn id="139" idx="2"/>
-            <a:endCxn id="140" idx="0"/>
-          </p:cNvCxnSpPr>
-          <p:nvPr/>
-        </p:nvCxnSpPr>
-        <p:spPr>
-          <a:xfrm>
-            <a:off x="10639911" y="2300779"/>
-            <a:ext cx="10256" cy="377984"/>
+            <a:off x="3694363" y="5610208"/>
+            <a:ext cx="0" cy="232777"/>
           </a:xfrm>
           <a:prstGeom prst="straightConnector1">
             <a:avLst/>
@@ -4839,29 +4406,27 @@
       </p:cxnSp>
       <p:cxnSp>
         <p:nvCxnSpPr>
-          <p:cNvPr id="218" name="Straight Arrow Connector 39">
+          <p:cNvPr id="43" name="Straight Arrow Connector 42">
             <a:extLst>
               <a:ext uri="{FF2B5EF4-FFF2-40B4-BE49-F238E27FC236}">
-                <a16:creationId xmlns:a16="http://schemas.microsoft.com/office/drawing/2014/main" id="{7A62196A-0AF3-D493-C84D-FCC82D66F0A6}"/>
+                <a16:creationId xmlns:a16="http://schemas.microsoft.com/office/drawing/2014/main" id="{B954DB71-9171-6F9A-D14C-86A713998648}"/>
               </a:ext>
             </a:extLst>
           </p:cNvPr>
           <p:cNvCxnSpPr>
             <a:cxnSpLocks/>
-            <a:stCxn id="5" idx="2"/>
-            <a:endCxn id="7" idx="0"/>
+            <a:stCxn id="29" idx="2"/>
+            <a:endCxn id="30" idx="0"/>
           </p:cNvCxnSpPr>
           <p:nvPr/>
         </p:nvCxnSpPr>
         <p:spPr>
-          <a:xfrm rot="16200000" flipH="1">
-            <a:off x="4698150" y="1584747"/>
-            <a:ext cx="280182" cy="1502349"/>
-          </a:xfrm>
-          <a:prstGeom prst="bentConnector3">
-            <a:avLst>
-              <a:gd name="adj1" fmla="val 50000"/>
-            </a:avLst>
+          <a:xfrm>
+            <a:off x="3694364" y="1538174"/>
+            <a:ext cx="0" cy="142663"/>
+          </a:xfrm>
+          <a:prstGeom prst="straightConnector1">
+            <a:avLst/>
           </a:prstGeom>
           <a:ln w="19050">
             <a:solidFill>
@@ -4888,27 +4453,29 @@
       </p:cxnSp>
       <p:cxnSp>
         <p:nvCxnSpPr>
-          <p:cNvPr id="246" name="Straight Arrow Connector 245">
+          <p:cNvPr id="44" name="Straight Arrow Connector 39">
             <a:extLst>
               <a:ext uri="{FF2B5EF4-FFF2-40B4-BE49-F238E27FC236}">
-                <a16:creationId xmlns:a16="http://schemas.microsoft.com/office/drawing/2014/main" id="{E1763037-9E68-0E1B-634A-8F50A0264DA6}"/>
+                <a16:creationId xmlns:a16="http://schemas.microsoft.com/office/drawing/2014/main" id="{28D829CA-2B20-EC7B-5887-5CCFA31D626F}"/>
               </a:ext>
             </a:extLst>
           </p:cNvPr>
           <p:cNvCxnSpPr>
             <a:cxnSpLocks/>
-            <a:stCxn id="9" idx="2"/>
-            <a:endCxn id="12" idx="0"/>
+            <a:stCxn id="30" idx="2"/>
+            <a:endCxn id="32" idx="0"/>
           </p:cNvCxnSpPr>
           <p:nvPr/>
         </p:nvCxnSpPr>
         <p:spPr>
-          <a:xfrm flipH="1">
-            <a:off x="4078028" y="4818368"/>
-            <a:ext cx="13541" cy="140211"/>
-          </a:xfrm>
-          <a:prstGeom prst="straightConnector1">
-            <a:avLst/>
+          <a:xfrm rot="16200000" flipH="1">
+            <a:off x="4387501" y="1564781"/>
+            <a:ext cx="180309" cy="1566582"/>
+          </a:xfrm>
+          <a:prstGeom prst="bentConnector3">
+            <a:avLst>
+              <a:gd name="adj1" fmla="val 50000"/>
+            </a:avLst>
           </a:prstGeom>
           <a:ln w="19050">
             <a:solidFill>
@@ -4935,24 +4502,24 @@
       </p:cxnSp>
       <p:cxnSp>
         <p:nvCxnSpPr>
-          <p:cNvPr id="308" name="Straight Arrow Connector 307">
+          <p:cNvPr id="45" name="Straight Arrow Connector 44">
             <a:extLst>
               <a:ext uri="{FF2B5EF4-FFF2-40B4-BE49-F238E27FC236}">
-                <a16:creationId xmlns:a16="http://schemas.microsoft.com/office/drawing/2014/main" id="{68EB0417-966E-99EA-85AB-50651C2F85D4}"/>
+                <a16:creationId xmlns:a16="http://schemas.microsoft.com/office/drawing/2014/main" id="{B4BAA9E8-2B6B-77BD-293D-288F8B1D232C}"/>
               </a:ext>
             </a:extLst>
           </p:cNvPr>
           <p:cNvCxnSpPr>
             <a:cxnSpLocks/>
-            <a:stCxn id="152" idx="2"/>
-            <a:endCxn id="4" idx="0"/>
+            <a:stCxn id="34" idx="2"/>
+            <a:endCxn id="36" idx="0"/>
           </p:cNvCxnSpPr>
           <p:nvPr/>
         </p:nvCxnSpPr>
         <p:spPr>
-          <a:xfrm flipH="1">
-            <a:off x="4077962" y="908647"/>
-            <a:ext cx="3855" cy="151371"/>
+          <a:xfrm>
+            <a:off x="3694363" y="4944666"/>
+            <a:ext cx="0" cy="151850"/>
           </a:xfrm>
           <a:prstGeom prst="straightConnector1">
             <a:avLst/>
@@ -4982,29 +4549,511 @@
       </p:cxnSp>
       <p:cxnSp>
         <p:nvCxnSpPr>
-          <p:cNvPr id="311" name="Straight Arrow Connector 39">
+          <p:cNvPr id="46" name="Straight Arrow Connector 45">
             <a:extLst>
               <a:ext uri="{FF2B5EF4-FFF2-40B4-BE49-F238E27FC236}">
-                <a16:creationId xmlns:a16="http://schemas.microsoft.com/office/drawing/2014/main" id="{346AE283-557A-67D9-9B38-77E9F8D67A20}"/>
+                <a16:creationId xmlns:a16="http://schemas.microsoft.com/office/drawing/2014/main" id="{E2423F59-D43F-A99B-0BDF-4A053EAD8D7A}"/>
               </a:ext>
             </a:extLst>
           </p:cNvPr>
           <p:cNvCxnSpPr>
             <a:cxnSpLocks/>
-            <a:stCxn id="47" idx="3"/>
-            <a:endCxn id="28" idx="1"/>
+            <a:stCxn id="28" idx="2"/>
+            <a:endCxn id="29" idx="0"/>
           </p:cNvCxnSpPr>
           <p:nvPr/>
         </p:nvCxnSpPr>
         <p:spPr>
-          <a:xfrm flipV="1">
-            <a:off x="6991377" y="658530"/>
-            <a:ext cx="1010871" cy="5790027"/>
-          </a:xfrm>
-          <a:prstGeom prst="bentConnector3">
-            <a:avLst>
-              <a:gd name="adj1" fmla="val 24672"/>
-            </a:avLst>
+          <a:xfrm flipH="1">
+            <a:off x="3694364" y="823954"/>
+            <a:ext cx="4" cy="137139"/>
+          </a:xfrm>
+          <a:prstGeom prst="straightConnector1">
+            <a:avLst/>
+          </a:prstGeom>
+          <a:ln w="19050">
+            <a:solidFill>
+              <a:schemeClr val="tx1"/>
+            </a:solidFill>
+            <a:headEnd type="none" w="med" len="med"/>
+            <a:tailEnd type="arrow" w="med" len="med"/>
+          </a:ln>
+        </p:spPr>
+        <p:style>
+          <a:lnRef idx="1">
+            <a:schemeClr val="accent1"/>
+          </a:lnRef>
+          <a:fillRef idx="0">
+            <a:schemeClr val="accent1"/>
+          </a:fillRef>
+          <a:effectRef idx="0">
+            <a:schemeClr val="accent1"/>
+          </a:effectRef>
+          <a:fontRef idx="minor">
+            <a:schemeClr val="tx1"/>
+          </a:fontRef>
+        </p:style>
+      </p:cxnSp>
+      <p:sp>
+        <p:nvSpPr>
+          <p:cNvPr id="47" name="TextBox 46">
+            <a:extLst>
+              <a:ext uri="{FF2B5EF4-FFF2-40B4-BE49-F238E27FC236}">
+                <a16:creationId xmlns:a16="http://schemas.microsoft.com/office/drawing/2014/main" id="{823958CA-EFBD-77D5-74E8-096A9629CCD4}"/>
+              </a:ext>
+            </a:extLst>
+          </p:cNvPr>
+          <p:cNvSpPr txBox="1"/>
+          <p:nvPr/>
+        </p:nvSpPr>
+        <p:spPr>
+          <a:xfrm rot="16200000">
+            <a:off x="-1362854" y="5208741"/>
+            <a:ext cx="3438224" cy="276993"/>
+          </a:xfrm>
+          <a:prstGeom prst="rect">
+            <a:avLst/>
+          </a:prstGeom>
+          <a:noFill/>
+          <a:ln w="19050">
+            <a:solidFill>
+              <a:srgbClr val="0070C0"/>
+            </a:solidFill>
+          </a:ln>
+        </p:spPr>
+        <p:txBody>
+          <a:bodyPr wrap="square" rtlCol="0">
+            <a:spAutoFit/>
+          </a:bodyPr>
+          <a:lstStyle/>
+          <a:p>
+            <a:pPr algn="ctr"/>
+            <a:r>
+              <a:rPr lang="en-US" sz="1200" b="1" dirty="0">
+                <a:latin typeface="Times New Roman" panose="02020603050405020304" pitchFamily="18" charset="0"/>
+                <a:cs typeface="Times New Roman" panose="02020603050405020304" pitchFamily="18" charset="0"/>
+              </a:rPr>
+              <a:t>Candidate Effector Prediction</a:t>
+            </a:r>
+            <a:r>
+              <a:rPr lang="en-US" sz="1200" dirty="0">
+                <a:latin typeface="Times New Roman" panose="02020603050405020304" pitchFamily="18" charset="0"/>
+                <a:cs typeface="Times New Roman" panose="02020603050405020304" pitchFamily="18" charset="0"/>
+              </a:rPr>
+              <a:t> </a:t>
+            </a:r>
+          </a:p>
+        </p:txBody>
+      </p:sp>
+      <p:sp>
+        <p:nvSpPr>
+          <p:cNvPr id="48" name="TextBox 47">
+            <a:extLst>
+              <a:ext uri="{FF2B5EF4-FFF2-40B4-BE49-F238E27FC236}">
+                <a16:creationId xmlns:a16="http://schemas.microsoft.com/office/drawing/2014/main" id="{42C306F1-5954-A452-B5CB-01FBC99AB1C9}"/>
+              </a:ext>
+            </a:extLst>
+          </p:cNvPr>
+          <p:cNvSpPr txBox="1"/>
+          <p:nvPr/>
+        </p:nvSpPr>
+        <p:spPr>
+          <a:xfrm rot="16200000">
+            <a:off x="-839572" y="2118565"/>
+            <a:ext cx="2374229" cy="276999"/>
+          </a:xfrm>
+          <a:prstGeom prst="rect">
+            <a:avLst/>
+          </a:prstGeom>
+          <a:noFill/>
+          <a:ln w="19050">
+            <a:solidFill>
+              <a:srgbClr val="FFC000"/>
+            </a:solidFill>
+          </a:ln>
+        </p:spPr>
+        <p:txBody>
+          <a:bodyPr wrap="square" rtlCol="0">
+            <a:spAutoFit/>
+          </a:bodyPr>
+          <a:lstStyle/>
+          <a:p>
+            <a:pPr algn="ctr"/>
+            <a:r>
+              <a:rPr lang="en-US" sz="1200" b="1" dirty="0">
+                <a:latin typeface="Times New Roman" panose="02020603050405020304" pitchFamily="18" charset="0"/>
+                <a:cs typeface="Times New Roman" panose="02020603050405020304" pitchFamily="18" charset="0"/>
+              </a:rPr>
+              <a:t>Sequence identification</a:t>
+            </a:r>
+          </a:p>
+        </p:txBody>
+      </p:sp>
+      <p:cxnSp>
+        <p:nvCxnSpPr>
+          <p:cNvPr id="49" name="Straight Arrow Connector 48">
+            <a:extLst>
+              <a:ext uri="{FF2B5EF4-FFF2-40B4-BE49-F238E27FC236}">
+                <a16:creationId xmlns:a16="http://schemas.microsoft.com/office/drawing/2014/main" id="{EA244CC3-F17E-102E-BF10-FC3BA680C682}"/>
+              </a:ext>
+            </a:extLst>
+          </p:cNvPr>
+          <p:cNvCxnSpPr>
+            <a:cxnSpLocks/>
+            <a:stCxn id="35" idx="2"/>
+          </p:cNvCxnSpPr>
+          <p:nvPr/>
+        </p:nvCxnSpPr>
+        <p:spPr>
+          <a:xfrm>
+            <a:off x="2135435" y="4369469"/>
+            <a:ext cx="0" cy="159699"/>
+          </a:xfrm>
+          <a:prstGeom prst="straightConnector1">
+            <a:avLst/>
+          </a:prstGeom>
+          <a:ln w="19050">
+            <a:solidFill>
+              <a:schemeClr val="tx1"/>
+            </a:solidFill>
+            <a:headEnd type="none" w="med" len="med"/>
+            <a:tailEnd type="arrow" w="med" len="med"/>
+          </a:ln>
+        </p:spPr>
+        <p:style>
+          <a:lnRef idx="1">
+            <a:schemeClr val="accent1"/>
+          </a:lnRef>
+          <a:fillRef idx="0">
+            <a:schemeClr val="accent1"/>
+          </a:fillRef>
+          <a:effectRef idx="0">
+            <a:schemeClr val="accent1"/>
+          </a:effectRef>
+          <a:fontRef idx="minor">
+            <a:schemeClr val="tx1"/>
+          </a:fontRef>
+        </p:style>
+      </p:cxnSp>
+      <p:sp>
+        <p:nvSpPr>
+          <p:cNvPr id="50" name="TextBox 49">
+            <a:extLst>
+              <a:ext uri="{FF2B5EF4-FFF2-40B4-BE49-F238E27FC236}">
+                <a16:creationId xmlns:a16="http://schemas.microsoft.com/office/drawing/2014/main" id="{C8F812A7-7034-446A-39B3-B8D6A9E94B08}"/>
+              </a:ext>
+            </a:extLst>
+          </p:cNvPr>
+          <p:cNvSpPr txBox="1"/>
+          <p:nvPr/>
+        </p:nvSpPr>
+        <p:spPr>
+          <a:xfrm>
+            <a:off x="617816" y="6447229"/>
+            <a:ext cx="6153091" cy="577081"/>
+          </a:xfrm>
+          <a:prstGeom prst="rect">
+            <a:avLst/>
+          </a:prstGeom>
+          <a:noFill/>
+          <a:ln w="19050">
+            <a:solidFill>
+              <a:schemeClr val="accent5">
+                <a:lumMod val="75000"/>
+              </a:schemeClr>
+            </a:solidFill>
+          </a:ln>
+        </p:spPr>
+        <p:txBody>
+          <a:bodyPr wrap="square" rtlCol="0">
+            <a:spAutoFit/>
+          </a:bodyPr>
+          <a:lstStyle/>
+          <a:p>
+            <a:pPr algn="ctr"/>
+            <a:r>
+              <a:rPr lang="en-US" sz="1050" b="1" dirty="0">
+                <a:latin typeface="Times New Roman" panose="02020603050405020304" pitchFamily="18" charset="0"/>
+                <a:cs typeface="Times New Roman" panose="02020603050405020304" pitchFamily="18" charset="0"/>
+              </a:rPr>
+              <a:t>FASTA and GFF generated</a:t>
+            </a:r>
+          </a:p>
+          <a:p>
+            <a:pPr algn="ctr"/>
+            <a:r>
+              <a:rPr lang="en-US" sz="1050" dirty="0">
+                <a:latin typeface="Times New Roman" panose="02020603050405020304" pitchFamily="18" charset="0"/>
+                <a:cs typeface="Times New Roman" panose="02020603050405020304" pitchFamily="18" charset="0"/>
+              </a:rPr>
+              <a:t>For each </a:t>
+            </a:r>
+            <a:r>
+              <a:rPr lang="en-US" sz="1050" i="1" dirty="0">
+                <a:latin typeface="Times New Roman" panose="02020603050405020304" pitchFamily="18" charset="0"/>
+                <a:cs typeface="Times New Roman" panose="02020603050405020304" pitchFamily="18" charset="0"/>
+              </a:rPr>
+              <a:t>Fusarium </a:t>
+            </a:r>
+            <a:r>
+              <a:rPr lang="en-US" sz="1050" dirty="0">
+                <a:latin typeface="Times New Roman" panose="02020603050405020304" pitchFamily="18" charset="0"/>
+                <a:cs typeface="Times New Roman" panose="02020603050405020304" pitchFamily="18" charset="0"/>
+              </a:rPr>
+              <a:t>assembly included, a candidate effector FASTA and GFF file is generated using various custom python scripts.. </a:t>
+            </a:r>
+          </a:p>
+        </p:txBody>
+      </p:sp>
+      <p:cxnSp>
+        <p:nvCxnSpPr>
+          <p:cNvPr id="51" name="Straight Arrow Connector 50">
+            <a:extLst>
+              <a:ext uri="{FF2B5EF4-FFF2-40B4-BE49-F238E27FC236}">
+                <a16:creationId xmlns:a16="http://schemas.microsoft.com/office/drawing/2014/main" id="{085083E8-AE12-9C4E-9838-224450859E01}"/>
+              </a:ext>
+            </a:extLst>
+          </p:cNvPr>
+          <p:cNvCxnSpPr>
+            <a:cxnSpLocks/>
+            <a:stCxn id="37" idx="2"/>
+            <a:endCxn id="50" idx="0"/>
+          </p:cNvCxnSpPr>
+          <p:nvPr/>
+        </p:nvCxnSpPr>
+        <p:spPr>
+          <a:xfrm flipH="1">
+            <a:off x="3694362" y="6258483"/>
+            <a:ext cx="1" cy="188746"/>
+          </a:xfrm>
+          <a:prstGeom prst="straightConnector1">
+            <a:avLst/>
+          </a:prstGeom>
+          <a:ln w="19050">
+            <a:solidFill>
+              <a:schemeClr val="tx1"/>
+            </a:solidFill>
+            <a:headEnd type="none" w="med" len="med"/>
+            <a:tailEnd type="arrow" w="med" len="med"/>
+          </a:ln>
+        </p:spPr>
+        <p:style>
+          <a:lnRef idx="1">
+            <a:schemeClr val="accent1"/>
+          </a:lnRef>
+          <a:fillRef idx="0">
+            <a:schemeClr val="accent1"/>
+          </a:fillRef>
+          <a:effectRef idx="0">
+            <a:schemeClr val="accent1"/>
+          </a:effectRef>
+          <a:fontRef idx="minor">
+            <a:schemeClr val="tx1"/>
+          </a:fontRef>
+        </p:style>
+      </p:cxnSp>
+      <p:sp>
+        <p:nvSpPr>
+          <p:cNvPr id="122" name="TextBox 121">
+            <a:extLst>
+              <a:ext uri="{FF2B5EF4-FFF2-40B4-BE49-F238E27FC236}">
+                <a16:creationId xmlns:a16="http://schemas.microsoft.com/office/drawing/2014/main" id="{9A0F104F-1CAC-EE54-751C-52AA12B72BEB}"/>
+              </a:ext>
+            </a:extLst>
+          </p:cNvPr>
+          <p:cNvSpPr txBox="1"/>
+          <p:nvPr/>
+        </p:nvSpPr>
+        <p:spPr>
+          <a:xfrm>
+            <a:off x="617816" y="7183875"/>
+            <a:ext cx="6153091" cy="577081"/>
+          </a:xfrm>
+          <a:prstGeom prst="rect">
+            <a:avLst/>
+          </a:prstGeom>
+          <a:noFill/>
+          <a:ln w="19050">
+            <a:solidFill>
+              <a:srgbClr val="538234"/>
+            </a:solidFill>
+          </a:ln>
+        </p:spPr>
+        <p:txBody>
+          <a:bodyPr wrap="square" rtlCol="0">
+            <a:spAutoFit/>
+          </a:bodyPr>
+          <a:lstStyle/>
+          <a:p>
+            <a:pPr algn="ctr"/>
+            <a:r>
+              <a:rPr lang="en-GB" sz="1050" b="1" dirty="0">
+                <a:latin typeface="Times New Roman" panose="02020603050405020304" pitchFamily="18" charset="0"/>
+                <a:cs typeface="Times New Roman" panose="02020603050405020304" pitchFamily="18" charset="0"/>
+              </a:rPr>
+              <a:t>Candidate effector clustering</a:t>
+            </a:r>
+          </a:p>
+          <a:p>
+            <a:pPr algn="ctr"/>
+            <a:r>
+              <a:rPr lang="en-US" sz="1050" dirty="0">
+                <a:latin typeface="Times New Roman"/>
+                <a:cs typeface="Times New Roman"/>
+              </a:rPr>
+              <a:t>             Candidate effector sequences are from all assemblies are combined into one FASTA and clustered using CD-HIT (4.8.1) (80% identity (optional using command line input)).   </a:t>
+            </a:r>
+            <a:endParaRPr lang="en-US" sz="1050" dirty="0">
+              <a:latin typeface="Times New Roman" panose="02020603050405020304" pitchFamily="18" charset="0"/>
+              <a:cs typeface="Times New Roman" panose="02020603050405020304" pitchFamily="18" charset="0"/>
+            </a:endParaRPr>
+          </a:p>
+        </p:txBody>
+      </p:sp>
+      <p:sp>
+        <p:nvSpPr>
+          <p:cNvPr id="123" name="TextBox 122">
+            <a:extLst>
+              <a:ext uri="{FF2B5EF4-FFF2-40B4-BE49-F238E27FC236}">
+                <a16:creationId xmlns:a16="http://schemas.microsoft.com/office/drawing/2014/main" id="{8B79224C-C268-03A9-5F63-D89D027AB911}"/>
+              </a:ext>
+            </a:extLst>
+          </p:cNvPr>
+          <p:cNvSpPr txBox="1"/>
+          <p:nvPr/>
+        </p:nvSpPr>
+        <p:spPr>
+          <a:xfrm>
+            <a:off x="617816" y="7923826"/>
+            <a:ext cx="6153091" cy="675275"/>
+          </a:xfrm>
+          <a:prstGeom prst="rect">
+            <a:avLst/>
+          </a:prstGeom>
+          <a:noFill/>
+          <a:ln w="19050">
+            <a:solidFill>
+              <a:schemeClr val="accent6">
+                <a:lumMod val="75000"/>
+              </a:schemeClr>
+            </a:solidFill>
+          </a:ln>
+        </p:spPr>
+        <p:txBody>
+          <a:bodyPr wrap="square" lIns="28664" tIns="14332" rIns="28664" bIns="14332" rtlCol="0" anchor="t">
+            <a:spAutoFit/>
+          </a:bodyPr>
+          <a:lstStyle/>
+          <a:p>
+            <a:pPr algn="ctr"/>
+            <a:r>
+              <a:rPr lang="en-US" sz="1050" b="1" dirty="0">
+                <a:latin typeface="Times New Roman"/>
+                <a:cs typeface="Times New Roman"/>
+              </a:rPr>
+              <a:t>Cluster analysis</a:t>
+            </a:r>
+          </a:p>
+          <a:p>
+            <a:pPr algn="ctr"/>
+            <a:r>
+              <a:rPr lang="en-GB" sz="1050" dirty="0">
+                <a:latin typeface="Times New Roman"/>
+                <a:ea typeface="Times New Roman" panose="02020603050405020304" pitchFamily="18" charset="0"/>
+                <a:cs typeface="Times New Roman"/>
+              </a:rPr>
+              <a:t>A custom python script is used to generate a table of effector clusters, containing details on the sequences in each cluster, the assembly from which each sequence originated, and the percentage identity of each sequence within the cluster to the cluster reference.</a:t>
+            </a:r>
+            <a:endParaRPr lang="en-US" sz="1050" dirty="0">
+              <a:latin typeface="Times New Roman" panose="02020603050405020304" pitchFamily="18" charset="0"/>
+              <a:cs typeface="Times New Roman" panose="02020603050405020304" pitchFamily="18" charset="0"/>
+            </a:endParaRPr>
+          </a:p>
+        </p:txBody>
+      </p:sp>
+      <p:sp>
+        <p:nvSpPr>
+          <p:cNvPr id="124" name="TextBox 123">
+            <a:extLst>
+              <a:ext uri="{FF2B5EF4-FFF2-40B4-BE49-F238E27FC236}">
+                <a16:creationId xmlns:a16="http://schemas.microsoft.com/office/drawing/2014/main" id="{23EE0309-6164-6E38-7343-E53A02B5CBA0}"/>
+              </a:ext>
+            </a:extLst>
+          </p:cNvPr>
+          <p:cNvSpPr txBox="1"/>
+          <p:nvPr/>
+        </p:nvSpPr>
+        <p:spPr>
+          <a:xfrm>
+            <a:off x="617817" y="8751461"/>
+            <a:ext cx="6153091" cy="675275"/>
+          </a:xfrm>
+          <a:prstGeom prst="rect">
+            <a:avLst/>
+          </a:prstGeom>
+          <a:noFill/>
+          <a:ln w="19050">
+            <a:solidFill>
+              <a:schemeClr val="accent6">
+                <a:lumMod val="75000"/>
+              </a:schemeClr>
+            </a:solidFill>
+          </a:ln>
+        </p:spPr>
+        <p:txBody>
+          <a:bodyPr wrap="square" lIns="28664" tIns="14332" rIns="28664" bIns="14332" rtlCol="0" anchor="t">
+            <a:spAutoFit/>
+          </a:bodyPr>
+          <a:lstStyle/>
+          <a:p>
+            <a:pPr algn="ctr"/>
+            <a:r>
+              <a:rPr lang="en-US" sz="1050" b="1" dirty="0">
+                <a:latin typeface="Times New Roman" panose="02020603050405020304" pitchFamily="18" charset="0"/>
+                <a:cs typeface="Times New Roman" panose="02020603050405020304" pitchFamily="18" charset="0"/>
+              </a:rPr>
+              <a:t>Candidate effector profiling</a:t>
+            </a:r>
+          </a:p>
+          <a:p>
+            <a:pPr algn="ctr"/>
+            <a:r>
+              <a:rPr lang="en-US" sz="1050" dirty="0">
+                <a:latin typeface="Times New Roman"/>
+                <a:cs typeface="Times New Roman"/>
+              </a:rPr>
+              <a:t>An effector profile generated in R Studio (version 3.6.3), using the package Pheatmap  (version 1.0.12). Data can be converted to binary at this stage to only generate a presence/absence heatmap rather than hit frequency heatmap. </a:t>
+            </a:r>
+            <a:endParaRPr lang="en-US" sz="1050" dirty="0">
+              <a:latin typeface="Times New Roman" panose="02020603050405020304" pitchFamily="18" charset="0"/>
+              <a:cs typeface="Times New Roman" panose="02020603050405020304" pitchFamily="18" charset="0"/>
+            </a:endParaRPr>
+          </a:p>
+        </p:txBody>
+      </p:sp>
+      <p:cxnSp>
+        <p:nvCxnSpPr>
+          <p:cNvPr id="125" name="Straight Arrow Connector 124">
+            <a:extLst>
+              <a:ext uri="{FF2B5EF4-FFF2-40B4-BE49-F238E27FC236}">
+                <a16:creationId xmlns:a16="http://schemas.microsoft.com/office/drawing/2014/main" id="{99DDFF90-F44B-2245-0C90-936A3EDA5853}"/>
+              </a:ext>
+            </a:extLst>
+          </p:cNvPr>
+          <p:cNvCxnSpPr>
+            <a:cxnSpLocks/>
+            <a:stCxn id="123" idx="2"/>
+            <a:endCxn id="124" idx="0"/>
+          </p:cNvCxnSpPr>
+          <p:nvPr/>
+        </p:nvCxnSpPr>
+        <p:spPr>
+          <a:xfrm>
+            <a:off x="3694362" y="8599101"/>
+            <a:ext cx="1" cy="152360"/>
+          </a:xfrm>
+          <a:prstGeom prst="straightConnector1">
+            <a:avLst/>
           </a:prstGeom>
           <a:ln w="19050">
             <a:solidFill>
@@ -5031,24 +5080,24 @@
       </p:cxnSp>
       <p:cxnSp>
         <p:nvCxnSpPr>
-          <p:cNvPr id="321" name="Straight Arrow Connector 320">
+          <p:cNvPr id="126" name="Straight Arrow Connector 125">
             <a:extLst>
               <a:ext uri="{FF2B5EF4-FFF2-40B4-BE49-F238E27FC236}">
-                <a16:creationId xmlns:a16="http://schemas.microsoft.com/office/drawing/2014/main" id="{93231D78-D420-A9D3-64FB-DAC74C7620B6}"/>
+                <a16:creationId xmlns:a16="http://schemas.microsoft.com/office/drawing/2014/main" id="{200F51BD-A2D4-AD7C-1660-FFE4D27EC7BF}"/>
               </a:ext>
             </a:extLst>
           </p:cNvPr>
           <p:cNvCxnSpPr>
             <a:cxnSpLocks/>
-            <a:stCxn id="28" idx="2"/>
-            <a:endCxn id="139" idx="0"/>
+            <a:stCxn id="122" idx="2"/>
+            <a:endCxn id="123" idx="0"/>
           </p:cNvCxnSpPr>
           <p:nvPr/>
         </p:nvCxnSpPr>
         <p:spPr>
-          <a:xfrm flipH="1">
-            <a:off x="10639911" y="1162129"/>
-            <a:ext cx="6341" cy="470450"/>
+          <a:xfrm>
+            <a:off x="3694362" y="7760956"/>
+            <a:ext cx="0" cy="162870"/>
           </a:xfrm>
           <a:prstGeom prst="straightConnector1">
             <a:avLst/>
@@ -5078,10 +5127,63 @@
       </p:cxnSp>
       <p:sp>
         <p:nvSpPr>
-          <p:cNvPr id="355" name="Oval 354">
+          <p:cNvPr id="135" name="TextBox 134">
             <a:extLst>
               <a:ext uri="{FF2B5EF4-FFF2-40B4-BE49-F238E27FC236}">
-                <a16:creationId xmlns:a16="http://schemas.microsoft.com/office/drawing/2014/main" id="{9CE3A49D-08BB-58F6-568F-2498D3A2DAEF}"/>
+                <a16:creationId xmlns:a16="http://schemas.microsoft.com/office/drawing/2014/main" id="{172F94FD-261F-4DD4-A1A0-05DB6852F479}"/>
+              </a:ext>
+            </a:extLst>
+          </p:cNvPr>
+          <p:cNvSpPr txBox="1"/>
+          <p:nvPr/>
+        </p:nvSpPr>
+        <p:spPr>
+          <a:xfrm rot="16200000">
+            <a:off x="-395648" y="8536782"/>
+            <a:ext cx="1502912" cy="276999"/>
+          </a:xfrm>
+          <a:prstGeom prst="rect">
+            <a:avLst/>
+          </a:prstGeom>
+          <a:noFill/>
+          <a:ln w="19050">
+            <a:solidFill>
+              <a:schemeClr val="accent6">
+                <a:lumMod val="75000"/>
+              </a:schemeClr>
+            </a:solidFill>
+          </a:ln>
+        </p:spPr>
+        <p:txBody>
+          <a:bodyPr wrap="square" rtlCol="0">
+            <a:spAutoFit/>
+          </a:bodyPr>
+          <a:lstStyle/>
+          <a:p>
+            <a:pPr algn="ctr"/>
+            <a:r>
+              <a:rPr lang="en-US" sz="1200" b="1" dirty="0">
+                <a:latin typeface="Times New Roman" panose="02020603050405020304" pitchFamily="18" charset="0"/>
+                <a:cs typeface="Times New Roman" panose="02020603050405020304" pitchFamily="18" charset="0"/>
+              </a:rPr>
+              <a:t>Effector Profiling</a:t>
+            </a:r>
+            <a:r>
+              <a:rPr lang="en-US" sz="1200" dirty="0">
+                <a:latin typeface="Times New Roman" panose="02020603050405020304" pitchFamily="18" charset="0"/>
+                <a:cs typeface="Times New Roman" panose="02020603050405020304" pitchFamily="18" charset="0"/>
+              </a:rPr>
+              <a:t> </a:t>
+            </a:r>
+          </a:p>
+        </p:txBody>
+      </p:sp>
+      <p:sp>
+        <p:nvSpPr>
+          <p:cNvPr id="136" name="Oval 135">
+            <a:extLst>
+              <a:ext uri="{FF2B5EF4-FFF2-40B4-BE49-F238E27FC236}">
+                <a16:creationId xmlns:a16="http://schemas.microsoft.com/office/drawing/2014/main" id="{EC7CDFCA-5FC6-5160-BFAA-511EA270E59B}"/>
               </a:ext>
             </a:extLst>
           </p:cNvPr>
@@ -5089,9 +5191,9 @@
           <p:nvPr/>
         </p:nvSpPr>
         <p:spPr>
-          <a:xfrm>
-            <a:off x="7340653" y="841660"/>
-            <a:ext cx="3114264" cy="643293"/>
+          <a:xfrm rot="20647326">
+            <a:off x="66924" y="7180140"/>
+            <a:ext cx="1200177" cy="537117"/>
           </a:xfrm>
           <a:prstGeom prst="ellipse">
             <a:avLst/>
@@ -5130,7 +5232,7 @@
           <a:p>
             <a:pPr algn="ctr"/>
             <a:r>
-              <a:rPr lang="en-US" sz="1274" b="1" i="1" dirty="0">
+              <a:rPr lang="en-US" sz="1000" b="1" i="1" dirty="0">
                 <a:solidFill>
                   <a:schemeClr val="tx1"/>
                 </a:solidFill>
@@ -5139,7 +5241,7 @@
               </a:rPr>
               <a:t>Fusarium</a:t>
             </a:r>
-            <a:endParaRPr lang="en-US" sz="1274" b="1" dirty="0">
+            <a:endParaRPr lang="en-US" sz="1000" b="1" dirty="0">
               <a:solidFill>
                 <a:schemeClr val="tx1"/>
               </a:solidFill>
@@ -5150,7 +5252,7 @@
           <a:p>
             <a:pPr algn="ctr"/>
             <a:r>
-              <a:rPr lang="en-US" sz="1274" b="1" dirty="0">
+              <a:rPr lang="en-US" sz="1000" b="1" dirty="0">
                 <a:solidFill>
                   <a:schemeClr val="tx1"/>
                 </a:solidFill>
@@ -5162,326 +5264,26 @@
           </a:p>
         </p:txBody>
       </p:sp>
-      <p:sp>
-        <p:nvSpPr>
-          <p:cNvPr id="358" name="TextBox 357">
+      <p:cxnSp>
+        <p:nvCxnSpPr>
+          <p:cNvPr id="163" name="Straight Arrow Connector 162">
             <a:extLst>
               <a:ext uri="{FF2B5EF4-FFF2-40B4-BE49-F238E27FC236}">
-                <a16:creationId xmlns:a16="http://schemas.microsoft.com/office/drawing/2014/main" id="{00C9A744-DFA0-FD36-E343-D5C1A09F6D71}"/>
-              </a:ext>
-            </a:extLst>
-          </p:cNvPr>
-          <p:cNvSpPr txBox="1"/>
-          <p:nvPr/>
-        </p:nvSpPr>
-        <p:spPr>
-          <a:xfrm rot="16200000">
-            <a:off x="5045215" y="3980707"/>
-            <a:ext cx="5073927" cy="332079"/>
-          </a:xfrm>
-          <a:prstGeom prst="rect">
-            <a:avLst/>
-          </a:prstGeom>
-          <a:noFill/>
-          <a:ln w="19050">
-            <a:solidFill>
-              <a:schemeClr val="accent6">
-                <a:lumMod val="75000"/>
-              </a:schemeClr>
-            </a:solidFill>
-          </a:ln>
-        </p:spPr>
-        <p:txBody>
-          <a:bodyPr wrap="square" rtlCol="0">
-            <a:spAutoFit/>
-          </a:bodyPr>
-          <a:lstStyle/>
-          <a:p>
-            <a:pPr algn="ctr"/>
-            <a:r>
-              <a:rPr lang="en-US" sz="1558" b="1" dirty="0">
-                <a:latin typeface="Times New Roman" panose="02020603050405020304" pitchFamily="18" charset="0"/>
-                <a:cs typeface="Times New Roman" panose="02020603050405020304" pitchFamily="18" charset="0"/>
-              </a:rPr>
-              <a:t>Effector Profiling</a:t>
-            </a:r>
-            <a:r>
-              <a:rPr lang="en-US" sz="1558" dirty="0">
-                <a:latin typeface="Times New Roman" panose="02020603050405020304" pitchFamily="18" charset="0"/>
-                <a:cs typeface="Times New Roman" panose="02020603050405020304" pitchFamily="18" charset="0"/>
-              </a:rPr>
-              <a:t> </a:t>
-            </a:r>
-          </a:p>
-        </p:txBody>
-      </p:sp>
-      <p:sp>
-        <p:nvSpPr>
-          <p:cNvPr id="359" name="TextBox 358">
-            <a:extLst>
-              <a:ext uri="{FF2B5EF4-FFF2-40B4-BE49-F238E27FC236}">
-                <a16:creationId xmlns:a16="http://schemas.microsoft.com/office/drawing/2014/main" id="{D5142A9F-E411-BB89-6C22-36EEA31128CE}"/>
-              </a:ext>
-            </a:extLst>
-          </p:cNvPr>
-          <p:cNvSpPr txBox="1"/>
-          <p:nvPr/>
-        </p:nvSpPr>
-        <p:spPr>
-          <a:xfrm rot="16200000">
-            <a:off x="-905722" y="4862313"/>
-            <a:ext cx="3271377" cy="332079"/>
-          </a:xfrm>
-          <a:prstGeom prst="rect">
-            <a:avLst/>
-          </a:prstGeom>
-          <a:noFill/>
-          <a:ln w="19050">
-            <a:solidFill>
-              <a:srgbClr val="0070C0"/>
-            </a:solidFill>
-          </a:ln>
-        </p:spPr>
-        <p:txBody>
-          <a:bodyPr wrap="square" rtlCol="0">
-            <a:spAutoFit/>
-          </a:bodyPr>
-          <a:lstStyle/>
-          <a:p>
-            <a:pPr algn="ctr"/>
-            <a:r>
-              <a:rPr lang="en-US" sz="1558" b="1" dirty="0">
-                <a:latin typeface="Times New Roman" panose="02020603050405020304" pitchFamily="18" charset="0"/>
-                <a:cs typeface="Times New Roman" panose="02020603050405020304" pitchFamily="18" charset="0"/>
-              </a:rPr>
-              <a:t>Effector Prediction</a:t>
-            </a:r>
-            <a:r>
-              <a:rPr lang="en-US" sz="1558" dirty="0">
-                <a:latin typeface="Times New Roman" panose="02020603050405020304" pitchFamily="18" charset="0"/>
-                <a:cs typeface="Times New Roman" panose="02020603050405020304" pitchFamily="18" charset="0"/>
-              </a:rPr>
-              <a:t> </a:t>
-            </a:r>
-          </a:p>
-        </p:txBody>
-      </p:sp>
-      <p:sp>
-        <p:nvSpPr>
-          <p:cNvPr id="360" name="TextBox 359">
-            <a:extLst>
-              <a:ext uri="{FF2B5EF4-FFF2-40B4-BE49-F238E27FC236}">
-                <a16:creationId xmlns:a16="http://schemas.microsoft.com/office/drawing/2014/main" id="{25EC434A-B33C-1EDE-AAE1-341741230ECD}"/>
-              </a:ext>
-            </a:extLst>
-          </p:cNvPr>
-          <p:cNvSpPr txBox="1"/>
-          <p:nvPr/>
-        </p:nvSpPr>
-        <p:spPr>
-          <a:xfrm rot="16200000">
-            <a:off x="-878774" y="1511033"/>
-            <a:ext cx="3188842" cy="332079"/>
-          </a:xfrm>
-          <a:prstGeom prst="rect">
-            <a:avLst/>
-          </a:prstGeom>
-          <a:noFill/>
-          <a:ln w="19050">
-            <a:solidFill>
-              <a:srgbClr val="FFC000"/>
-            </a:solidFill>
-          </a:ln>
-        </p:spPr>
-        <p:txBody>
-          <a:bodyPr wrap="square" rtlCol="0">
-            <a:spAutoFit/>
-          </a:bodyPr>
-          <a:lstStyle/>
-          <a:p>
-            <a:pPr algn="ctr"/>
-            <a:r>
-              <a:rPr lang="en-US" sz="1558" b="1" dirty="0">
-                <a:latin typeface="Times New Roman" panose="02020603050405020304" pitchFamily="18" charset="0"/>
-                <a:cs typeface="Times New Roman" panose="02020603050405020304" pitchFamily="18" charset="0"/>
-              </a:rPr>
-              <a:t>Sequence identification</a:t>
-            </a:r>
-          </a:p>
-        </p:txBody>
-      </p:sp>
-      <p:sp>
-        <p:nvSpPr>
-          <p:cNvPr id="391" name="Rectangle 390">
-            <a:extLst>
-              <a:ext uri="{FF2B5EF4-FFF2-40B4-BE49-F238E27FC236}">
-                <a16:creationId xmlns:a16="http://schemas.microsoft.com/office/drawing/2014/main" id="{879FEE0A-730C-EBE4-D9E5-E867407C89DA}"/>
-              </a:ext>
-            </a:extLst>
-          </p:cNvPr>
-          <p:cNvSpPr/>
-          <p:nvPr/>
-        </p:nvSpPr>
-        <p:spPr>
-          <a:xfrm>
-            <a:off x="8006162" y="3815706"/>
-            <a:ext cx="5288007" cy="2868189"/>
-          </a:xfrm>
-          <a:prstGeom prst="rect">
-            <a:avLst/>
-          </a:prstGeom>
-          <a:noFill/>
-          <a:ln w="19050">
-            <a:solidFill>
-              <a:schemeClr val="tx1"/>
-            </a:solidFill>
-            <a:prstDash val="lgDash"/>
-          </a:ln>
-        </p:spPr>
-        <p:style>
-          <a:lnRef idx="2">
-            <a:schemeClr val="accent1">
-              <a:shade val="50000"/>
-            </a:schemeClr>
-          </a:lnRef>
-          <a:fillRef idx="1">
-            <a:schemeClr val="accent1"/>
-          </a:fillRef>
-          <a:effectRef idx="0">
-            <a:schemeClr val="accent1"/>
-          </a:effectRef>
-          <a:fontRef idx="minor">
-            <a:schemeClr val="lt1"/>
-          </a:fontRef>
-        </p:style>
-        <p:txBody>
-          <a:bodyPr rtlCol="0" anchor="ctr"/>
-          <a:lstStyle/>
-          <a:p>
-            <a:pPr algn="ctr"/>
-            <a:endParaRPr lang="en-US" sz="2337" b="1" i="1" dirty="0">
-              <a:solidFill>
-                <a:schemeClr val="tx1"/>
-              </a:solidFill>
-              <a:latin typeface="Times New Roman" panose="02020603050405020304" pitchFamily="18" charset="0"/>
-              <a:cs typeface="Times New Roman" panose="02020603050405020304" pitchFamily="18" charset="0"/>
-            </a:endParaRPr>
-          </a:p>
-          <a:p>
-            <a:pPr algn="ctr"/>
-            <a:r>
-              <a:rPr lang="en-US" sz="2337" b="1" i="1" dirty="0">
-                <a:solidFill>
-                  <a:schemeClr val="tx1"/>
-                </a:solidFill>
-                <a:latin typeface="Times New Roman" panose="02020603050405020304" pitchFamily="18" charset="0"/>
-                <a:cs typeface="Times New Roman" panose="02020603050405020304" pitchFamily="18" charset="0"/>
-              </a:rPr>
-              <a:t>Fusarium</a:t>
-            </a:r>
-            <a:r>
-              <a:rPr lang="en-US" sz="2337" b="1" dirty="0">
-                <a:solidFill>
-                  <a:schemeClr val="tx1"/>
-                </a:solidFill>
-                <a:latin typeface="Times New Roman" panose="02020603050405020304" pitchFamily="18" charset="0"/>
-                <a:cs typeface="Times New Roman" panose="02020603050405020304" pitchFamily="18" charset="0"/>
-              </a:rPr>
-              <a:t> Effector Cluster Profiles</a:t>
-            </a:r>
-          </a:p>
-          <a:p>
-            <a:pPr algn="ctr"/>
-            <a:endParaRPr lang="en-US" sz="2337" b="1" dirty="0">
-              <a:solidFill>
-                <a:schemeClr val="tx1"/>
-              </a:solidFill>
-              <a:latin typeface="Times New Roman" panose="02020603050405020304" pitchFamily="18" charset="0"/>
-              <a:cs typeface="Times New Roman" panose="02020603050405020304" pitchFamily="18" charset="0"/>
-            </a:endParaRPr>
-          </a:p>
-          <a:p>
-            <a:pPr algn="ctr"/>
-            <a:endParaRPr lang="en-US" sz="2337" b="1" dirty="0">
-              <a:solidFill>
-                <a:schemeClr val="tx1"/>
-              </a:solidFill>
-              <a:latin typeface="Times New Roman" panose="02020603050405020304" pitchFamily="18" charset="0"/>
-              <a:cs typeface="Times New Roman" panose="02020603050405020304" pitchFamily="18" charset="0"/>
-            </a:endParaRPr>
-          </a:p>
-          <a:p>
-            <a:pPr algn="ctr"/>
-            <a:endParaRPr lang="en-US" sz="2337" b="1" dirty="0">
-              <a:solidFill>
-                <a:schemeClr val="tx1"/>
-              </a:solidFill>
-              <a:latin typeface="Times New Roman" panose="02020603050405020304" pitchFamily="18" charset="0"/>
-              <a:cs typeface="Times New Roman" panose="02020603050405020304" pitchFamily="18" charset="0"/>
-            </a:endParaRPr>
-          </a:p>
-          <a:p>
-            <a:pPr algn="ctr"/>
-            <a:endParaRPr lang="en-US" sz="2337" b="1" dirty="0">
-              <a:solidFill>
-                <a:schemeClr val="tx1"/>
-              </a:solidFill>
-              <a:latin typeface="Times New Roman" panose="02020603050405020304" pitchFamily="18" charset="0"/>
-              <a:cs typeface="Times New Roman" panose="02020603050405020304" pitchFamily="18" charset="0"/>
-            </a:endParaRPr>
-          </a:p>
-          <a:p>
-            <a:pPr algn="ctr"/>
-            <a:endParaRPr lang="en-US" sz="2337" b="1" dirty="0">
-              <a:solidFill>
-                <a:schemeClr val="tx1"/>
-              </a:solidFill>
-              <a:latin typeface="Times New Roman" panose="02020603050405020304" pitchFamily="18" charset="0"/>
-              <a:cs typeface="Times New Roman" panose="02020603050405020304" pitchFamily="18" charset="0"/>
-            </a:endParaRPr>
-          </a:p>
-          <a:p>
-            <a:pPr algn="ctr"/>
-            <a:endParaRPr lang="en-US" sz="2337" b="1" dirty="0">
-              <a:solidFill>
-                <a:schemeClr val="tx1"/>
-              </a:solidFill>
-              <a:latin typeface="Times New Roman" panose="02020603050405020304" pitchFamily="18" charset="0"/>
-              <a:cs typeface="Times New Roman" panose="02020603050405020304" pitchFamily="18" charset="0"/>
-            </a:endParaRPr>
-          </a:p>
-          <a:p>
-            <a:pPr algn="ctr"/>
-            <a:endParaRPr lang="en-US" sz="2337" b="1" dirty="0">
-              <a:solidFill>
-                <a:schemeClr val="tx1"/>
-              </a:solidFill>
-              <a:latin typeface="Times New Roman" panose="02020603050405020304" pitchFamily="18" charset="0"/>
-              <a:cs typeface="Times New Roman" panose="02020603050405020304" pitchFamily="18" charset="0"/>
-            </a:endParaRPr>
-          </a:p>
-        </p:txBody>
-      </p:sp>
-      <p:cxnSp>
-        <p:nvCxnSpPr>
-          <p:cNvPr id="392" name="Straight Arrow Connector 391">
-            <a:extLst>
-              <a:ext uri="{FF2B5EF4-FFF2-40B4-BE49-F238E27FC236}">
-                <a16:creationId xmlns:a16="http://schemas.microsoft.com/office/drawing/2014/main" id="{A4847749-733E-0D9D-F83A-EE29BABA3073}"/>
+                <a16:creationId xmlns:a16="http://schemas.microsoft.com/office/drawing/2014/main" id="{B5BEDAD8-B981-7F55-7E04-9EDD87DD9D71}"/>
               </a:ext>
             </a:extLst>
           </p:cNvPr>
           <p:cNvCxnSpPr>
             <a:cxnSpLocks/>
-            <a:stCxn id="140" idx="2"/>
-            <a:endCxn id="391" idx="0"/>
+            <a:stCxn id="50" idx="2"/>
+            <a:endCxn id="122" idx="0"/>
           </p:cNvCxnSpPr>
           <p:nvPr/>
         </p:nvCxnSpPr>
         <p:spPr>
-          <a:xfrm flipH="1">
-            <a:off x="10650166" y="3346963"/>
-            <a:ext cx="1" cy="468743"/>
+          <a:xfrm>
+            <a:off x="3694362" y="7024310"/>
+            <a:ext cx="0" cy="159565"/>
           </a:xfrm>
           <a:prstGeom prst="straightConnector1">
             <a:avLst/>
@@ -5509,235 +5311,10 @@
           </a:fontRef>
         </p:style>
       </p:cxnSp>
-      <p:cxnSp>
-        <p:nvCxnSpPr>
-          <p:cNvPr id="21" name="Straight Arrow Connector 20">
-            <a:extLst>
-              <a:ext uri="{FF2B5EF4-FFF2-40B4-BE49-F238E27FC236}">
-                <a16:creationId xmlns:a16="http://schemas.microsoft.com/office/drawing/2014/main" id="{6D953657-3598-88D1-CE98-C46A15FF51A4}"/>
-              </a:ext>
-            </a:extLst>
-          </p:cNvPr>
-          <p:cNvCxnSpPr>
-            <a:cxnSpLocks/>
-            <a:stCxn id="10" idx="2"/>
-          </p:cNvCxnSpPr>
-          <p:nvPr/>
-        </p:nvCxnSpPr>
-        <p:spPr>
-          <a:xfrm>
-            <a:off x="2551521" y="4152932"/>
-            <a:ext cx="0" cy="326173"/>
-          </a:xfrm>
-          <a:prstGeom prst="straightConnector1">
-            <a:avLst/>
-          </a:prstGeom>
-          <a:ln w="19050">
-            <a:solidFill>
-              <a:schemeClr val="tx1"/>
-            </a:solidFill>
-            <a:headEnd type="none" w="med" len="med"/>
-            <a:tailEnd type="arrow" w="med" len="med"/>
-          </a:ln>
-        </p:spPr>
-        <p:style>
-          <a:lnRef idx="1">
-            <a:schemeClr val="accent1"/>
-          </a:lnRef>
-          <a:fillRef idx="0">
-            <a:schemeClr val="accent1"/>
-          </a:fillRef>
-          <a:effectRef idx="0">
-            <a:schemeClr val="accent1"/>
-          </a:effectRef>
-          <a:fontRef idx="minor">
-            <a:schemeClr val="tx1"/>
-          </a:fontRef>
-        </p:style>
-      </p:cxnSp>
-      <p:sp>
-        <p:nvSpPr>
-          <p:cNvPr id="47" name="TextBox 46">
-            <a:extLst>
-              <a:ext uri="{FF2B5EF4-FFF2-40B4-BE49-F238E27FC236}">
-                <a16:creationId xmlns:a16="http://schemas.microsoft.com/office/drawing/2014/main" id="{95733A53-B7AE-5AD3-3B12-9368D0C314FB}"/>
-              </a:ext>
-            </a:extLst>
-          </p:cNvPr>
-          <p:cNvSpPr txBox="1"/>
-          <p:nvPr/>
-        </p:nvSpPr>
-        <p:spPr>
-          <a:xfrm>
-            <a:off x="1143998" y="6173674"/>
-            <a:ext cx="5847379" cy="549766"/>
-          </a:xfrm>
-          <a:prstGeom prst="rect">
-            <a:avLst/>
-          </a:prstGeom>
-          <a:noFill/>
-          <a:ln w="19050">
-            <a:solidFill>
-              <a:schemeClr val="accent5">
-                <a:lumMod val="75000"/>
-              </a:schemeClr>
-            </a:solidFill>
-          </a:ln>
-        </p:spPr>
-        <p:txBody>
-          <a:bodyPr wrap="square" rtlCol="0">
-            <a:spAutoFit/>
-          </a:bodyPr>
-          <a:lstStyle/>
-          <a:p>
-            <a:pPr algn="ctr"/>
-            <a:r>
-              <a:rPr lang="en-US" sz="991" b="1" dirty="0">
-                <a:latin typeface="Times New Roman" panose="02020603050405020304" pitchFamily="18" charset="0"/>
-                <a:cs typeface="Times New Roman" panose="02020603050405020304" pitchFamily="18" charset="0"/>
-              </a:rPr>
-              <a:t>FASTA and GFF generated</a:t>
-            </a:r>
-          </a:p>
-          <a:p>
-            <a:pPr algn="ctr"/>
-            <a:r>
-              <a:rPr lang="en-US" sz="991" dirty="0">
-                <a:latin typeface="Times New Roman" panose="02020603050405020304" pitchFamily="18" charset="0"/>
-                <a:cs typeface="Times New Roman" panose="02020603050405020304" pitchFamily="18" charset="0"/>
-              </a:rPr>
-              <a:t>For each </a:t>
-            </a:r>
-            <a:r>
-              <a:rPr lang="en-US" sz="991" i="1" dirty="0">
-                <a:latin typeface="Times New Roman" panose="02020603050405020304" pitchFamily="18" charset="0"/>
-                <a:cs typeface="Times New Roman" panose="02020603050405020304" pitchFamily="18" charset="0"/>
-              </a:rPr>
-              <a:t>Fusarium </a:t>
-            </a:r>
-            <a:r>
-              <a:rPr lang="en-US" sz="991" dirty="0">
-                <a:latin typeface="Times New Roman" panose="02020603050405020304" pitchFamily="18" charset="0"/>
-                <a:cs typeface="Times New Roman" panose="02020603050405020304" pitchFamily="18" charset="0"/>
-              </a:rPr>
-              <a:t>assembly included, a candidate effector </a:t>
-            </a:r>
-            <a:r>
-              <a:rPr lang="en-US" sz="991" dirty="0" err="1">
-                <a:latin typeface="Times New Roman" panose="02020603050405020304" pitchFamily="18" charset="0"/>
-                <a:cs typeface="Times New Roman" panose="02020603050405020304" pitchFamily="18" charset="0"/>
-              </a:rPr>
-              <a:t>fasta</a:t>
-            </a:r>
-            <a:r>
-              <a:rPr lang="en-US" sz="991" dirty="0">
-                <a:latin typeface="Times New Roman" panose="02020603050405020304" pitchFamily="18" charset="0"/>
-                <a:cs typeface="Times New Roman" panose="02020603050405020304" pitchFamily="18" charset="0"/>
-              </a:rPr>
-              <a:t> and </a:t>
-            </a:r>
-            <a:r>
-              <a:rPr lang="en-US" sz="991" dirty="0" err="1">
-                <a:latin typeface="Times New Roman" panose="02020603050405020304" pitchFamily="18" charset="0"/>
-                <a:cs typeface="Times New Roman" panose="02020603050405020304" pitchFamily="18" charset="0"/>
-              </a:rPr>
-              <a:t>gff</a:t>
-            </a:r>
-            <a:r>
-              <a:rPr lang="en-US" sz="991" dirty="0">
-                <a:latin typeface="Times New Roman" panose="02020603050405020304" pitchFamily="18" charset="0"/>
-                <a:cs typeface="Times New Roman" panose="02020603050405020304" pitchFamily="18" charset="0"/>
-              </a:rPr>
-              <a:t> file is generated using various custom python scripts.. </a:t>
-            </a:r>
-          </a:p>
-        </p:txBody>
-      </p:sp>
-      <p:cxnSp>
-        <p:nvCxnSpPr>
-          <p:cNvPr id="148" name="Straight Arrow Connector 147">
-            <a:extLst>
-              <a:ext uri="{FF2B5EF4-FFF2-40B4-BE49-F238E27FC236}">
-                <a16:creationId xmlns:a16="http://schemas.microsoft.com/office/drawing/2014/main" id="{93C40AD6-6265-768C-F270-979EDB6F303B}"/>
-              </a:ext>
-            </a:extLst>
-          </p:cNvPr>
-          <p:cNvCxnSpPr>
-            <a:cxnSpLocks/>
-            <a:stCxn id="13" idx="2"/>
-            <a:endCxn id="47" idx="0"/>
-          </p:cNvCxnSpPr>
-          <p:nvPr/>
-        </p:nvCxnSpPr>
-        <p:spPr>
-          <a:xfrm flipH="1">
-            <a:off x="4067688" y="6052492"/>
-            <a:ext cx="2570" cy="121182"/>
-          </a:xfrm>
-          <a:prstGeom prst="straightConnector1">
-            <a:avLst/>
-          </a:prstGeom>
-          <a:ln w="19050">
-            <a:solidFill>
-              <a:schemeClr val="tx1"/>
-            </a:solidFill>
-            <a:headEnd type="none" w="med" len="med"/>
-            <a:tailEnd type="arrow" w="med" len="med"/>
-          </a:ln>
-        </p:spPr>
-        <p:style>
-          <a:lnRef idx="1">
-            <a:schemeClr val="accent1"/>
-          </a:lnRef>
-          <a:fillRef idx="0">
-            <a:schemeClr val="accent1"/>
-          </a:fillRef>
-          <a:effectRef idx="0">
-            <a:schemeClr val="accent1"/>
-          </a:effectRef>
-          <a:fontRef idx="minor">
-            <a:schemeClr val="tx1"/>
-          </a:fontRef>
-        </p:style>
-      </p:cxnSp>
-      <p:pic>
-        <p:nvPicPr>
-          <p:cNvPr id="11" name="Picture 10">
-            <a:extLst>
-              <a:ext uri="{FF2B5EF4-FFF2-40B4-BE49-F238E27FC236}">
-                <a16:creationId xmlns:a16="http://schemas.microsoft.com/office/drawing/2014/main" id="{9C2FC347-5A00-FAD1-E83D-8E38F4C2E1A5}"/>
-              </a:ext>
-            </a:extLst>
-          </p:cNvPr>
-          <p:cNvPicPr>
-            <a:picLocks noChangeAspect="1"/>
-          </p:cNvPicPr>
-          <p:nvPr/>
-        </p:nvPicPr>
-        <p:blipFill>
-          <a:blip r:embed="rId3"/>
-          <a:stretch>
-            <a:fillRect/>
-          </a:stretch>
-        </p:blipFill>
-        <p:spPr>
-          <a:xfrm>
-            <a:off x="8162572" y="4546571"/>
-            <a:ext cx="4972242" cy="1986089"/>
-          </a:xfrm>
-          <a:prstGeom prst="rect">
-            <a:avLst/>
-          </a:prstGeom>
-          <a:noFill/>
-          <a:ln w="19050">
-            <a:noFill/>
-          </a:ln>
-        </p:spPr>
-      </p:pic>
     </p:spTree>
     <p:extLst>
       <p:ext uri="{BB962C8B-B14F-4D97-AF65-F5344CB8AC3E}">
-        <p14:creationId xmlns:p14="http://schemas.microsoft.com/office/powerpoint/2010/main" val="3658232728"/>
+        <p14:creationId xmlns:p14="http://schemas.microsoft.com/office/powerpoint/2010/main" val="2994380428"/>
       </p:ext>
     </p:extLst>
   </p:cSld>
@@ -6002,7 +5579,7 @@
   <a:extraClrSchemeLst/>
   <a:extLst>
     <a:ext uri="{05A4C25C-085E-4340-85A3-A5531E510DB2}">
-      <thm15:themeFamily xmlns:thm15="http://schemas.microsoft.com/office/thememl/2012/main" name="Office Theme 2013 - 2022" id="{62F939B6-93AF-4DB8-9C6B-D6C7DFDC589F}" vid="{4A3C46E8-61CC-4603-A589-7422A47A8E4A}"/>
+      <thm15:themeFamily xmlns:thm15="http://schemas.microsoft.com/office/thememl/2012/main" name="Office 2013 - 2022 Theme" id="{62F939B6-93AF-4DB8-9C6B-D6C7DFDC589F}" vid="{4A3C46E8-61CC-4603-A589-7422A47A8E4A}"/>
     </a:ext>
   </a:extLst>
 </a:theme>

</xml_diff>

<commit_message>
adding stats to help with writing and fixing figures
</commit_message>
<xml_diff>
--- a/docs/Maie_v5_Figure.pptx
+++ b/docs/Maie_v5_Figure.pptx
@@ -205,7 +205,7 @@
           <a:p>
             <a:fld id="{69BCE753-FEAF-2346-94B7-4FCB79DBED48}" type="datetimeFigureOut">
               <a:rPr lang="en-US" smtClean="0"/>
-              <a:t>1/25/24</a:t>
+              <a:t>2/6/24</a:t>
             </a:fld>
             <a:endParaRPr lang="en-US"/>
           </a:p>
@@ -604,7 +604,7 @@
           <a:p>
             <a:fld id="{17D8D008-64F1-FB47-AAE7-E5AAE46159A6}" type="datetimeFigureOut">
               <a:rPr lang="en-US" smtClean="0"/>
-              <a:t>1/25/24</a:t>
+              <a:t>2/6/24</a:t>
             </a:fld>
             <a:endParaRPr lang="en-US"/>
           </a:p>
@@ -774,7 +774,7 @@
           <a:p>
             <a:fld id="{17D8D008-64F1-FB47-AAE7-E5AAE46159A6}" type="datetimeFigureOut">
               <a:rPr lang="en-US" smtClean="0"/>
-              <a:t>1/25/24</a:t>
+              <a:t>2/6/24</a:t>
             </a:fld>
             <a:endParaRPr lang="en-US"/>
           </a:p>
@@ -954,7 +954,7 @@
           <a:p>
             <a:fld id="{17D8D008-64F1-FB47-AAE7-E5AAE46159A6}" type="datetimeFigureOut">
               <a:rPr lang="en-US" smtClean="0"/>
-              <a:t>1/25/24</a:t>
+              <a:t>2/6/24</a:t>
             </a:fld>
             <a:endParaRPr lang="en-US"/>
           </a:p>
@@ -1124,7 +1124,7 @@
           <a:p>
             <a:fld id="{17D8D008-64F1-FB47-AAE7-E5AAE46159A6}" type="datetimeFigureOut">
               <a:rPr lang="en-US" smtClean="0"/>
-              <a:t>1/25/24</a:t>
+              <a:t>2/6/24</a:t>
             </a:fld>
             <a:endParaRPr lang="en-US"/>
           </a:p>
@@ -1368,7 +1368,7 @@
           <a:p>
             <a:fld id="{17D8D008-64F1-FB47-AAE7-E5AAE46159A6}" type="datetimeFigureOut">
               <a:rPr lang="en-US" smtClean="0"/>
-              <a:t>1/25/24</a:t>
+              <a:t>2/6/24</a:t>
             </a:fld>
             <a:endParaRPr lang="en-US"/>
           </a:p>
@@ -1600,7 +1600,7 @@
           <a:p>
             <a:fld id="{17D8D008-64F1-FB47-AAE7-E5AAE46159A6}" type="datetimeFigureOut">
               <a:rPr lang="en-US" smtClean="0"/>
-              <a:t>1/25/24</a:t>
+              <a:t>2/6/24</a:t>
             </a:fld>
             <a:endParaRPr lang="en-US"/>
           </a:p>
@@ -1967,7 +1967,7 @@
           <a:p>
             <a:fld id="{17D8D008-64F1-FB47-AAE7-E5AAE46159A6}" type="datetimeFigureOut">
               <a:rPr lang="en-US" smtClean="0"/>
-              <a:t>1/25/24</a:t>
+              <a:t>2/6/24</a:t>
             </a:fld>
             <a:endParaRPr lang="en-US"/>
           </a:p>
@@ -2085,7 +2085,7 @@
           <a:p>
             <a:fld id="{17D8D008-64F1-FB47-AAE7-E5AAE46159A6}" type="datetimeFigureOut">
               <a:rPr lang="en-US" smtClean="0"/>
-              <a:t>1/25/24</a:t>
+              <a:t>2/6/24</a:t>
             </a:fld>
             <a:endParaRPr lang="en-US"/>
           </a:p>
@@ -2180,7 +2180,7 @@
           <a:p>
             <a:fld id="{17D8D008-64F1-FB47-AAE7-E5AAE46159A6}" type="datetimeFigureOut">
               <a:rPr lang="en-US" smtClean="0"/>
-              <a:t>1/25/24</a:t>
+              <a:t>2/6/24</a:t>
             </a:fld>
             <a:endParaRPr lang="en-US"/>
           </a:p>
@@ -2457,7 +2457,7 @@
           <a:p>
             <a:fld id="{17D8D008-64F1-FB47-AAE7-E5AAE46159A6}" type="datetimeFigureOut">
               <a:rPr lang="en-US" smtClean="0"/>
-              <a:t>1/25/24</a:t>
+              <a:t>2/6/24</a:t>
             </a:fld>
             <a:endParaRPr lang="en-US"/>
           </a:p>
@@ -2714,7 +2714,7 @@
           <a:p>
             <a:fld id="{17D8D008-64F1-FB47-AAE7-E5AAE46159A6}" type="datetimeFigureOut">
               <a:rPr lang="en-US" smtClean="0"/>
-              <a:t>1/25/24</a:t>
+              <a:t>2/6/24</a:t>
             </a:fld>
             <a:endParaRPr lang="en-US"/>
           </a:p>
@@ -2927,7 +2927,7 @@
           <a:p>
             <a:fld id="{17D8D008-64F1-FB47-AAE7-E5AAE46159A6}" type="datetimeFigureOut">
               <a:rPr lang="en-US" smtClean="0"/>
-              <a:t>1/25/24</a:t>
+              <a:t>2/6/24</a:t>
             </a:fld>
             <a:endParaRPr lang="en-US"/>
           </a:p>
@@ -3332,1985 +3332,1738 @@
           <a:chExt cx="0" cy="0"/>
         </a:xfrm>
       </p:grpSpPr>
-      <p:sp>
-        <p:nvSpPr>
-          <p:cNvPr id="28" name="Rectangle 27">
+      <p:grpSp>
+        <p:nvGrpSpPr>
+          <p:cNvPr id="3" name="Group 2">
             <a:extLst>
               <a:ext uri="{FF2B5EF4-FFF2-40B4-BE49-F238E27FC236}">
-                <a16:creationId xmlns:a16="http://schemas.microsoft.com/office/drawing/2014/main" id="{5AB97E63-0861-21AA-97A8-B27875069948}"/>
+                <a16:creationId xmlns:a16="http://schemas.microsoft.com/office/drawing/2014/main" id="{C719410D-E89B-23A7-A334-2123311D8DA1}"/>
               </a:ext>
             </a:extLst>
           </p:cNvPr>
-          <p:cNvSpPr/>
+          <p:cNvGrpSpPr/>
           <p:nvPr/>
-        </p:nvSpPr>
-        <p:spPr>
+        </p:nvGrpSpPr>
+        <p:grpSpPr>
           <a:xfrm>
-            <a:off x="617816" y="65971"/>
-            <a:ext cx="6153103" cy="757983"/>
+            <a:off x="0" y="141890"/>
+            <a:ext cx="6703995" cy="9355518"/>
+            <a:chOff x="66924" y="65971"/>
+            <a:chExt cx="6703995" cy="7651286"/>
           </a:xfrm>
-          <a:prstGeom prst="rect">
-            <a:avLst/>
-          </a:prstGeom>
-          <a:noFill/>
-          <a:ln w="19050">
+        </p:grpSpPr>
+        <p:sp>
+          <p:nvSpPr>
+            <p:cNvPr id="47" name="TextBox 46">
+              <a:extLst>
+                <a:ext uri="{FF2B5EF4-FFF2-40B4-BE49-F238E27FC236}">
+                  <a16:creationId xmlns:a16="http://schemas.microsoft.com/office/drawing/2014/main" id="{823958CA-EFBD-77D5-74E8-096A9629CCD4}"/>
+                </a:ext>
+              </a:extLst>
+            </p:cNvPr>
+            <p:cNvSpPr txBox="1"/>
+            <p:nvPr/>
+          </p:nvSpPr>
+          <p:spPr>
+            <a:xfrm rot="16200000">
+              <a:off x="-1341834" y="5187720"/>
+              <a:ext cx="3396186" cy="276993"/>
+            </a:xfrm>
+            <a:prstGeom prst="rect">
+              <a:avLst/>
+            </a:prstGeom>
+            <a:noFill/>
+            <a:ln w="19050">
+              <a:solidFill>
+                <a:srgbClr val="0070C0"/>
+              </a:solidFill>
+            </a:ln>
+          </p:spPr>
+          <p:txBody>
+            <a:bodyPr wrap="square" rtlCol="0">
+              <a:spAutoFit/>
+            </a:bodyPr>
+            <a:lstStyle/>
+            <a:p>
+              <a:pPr algn="ctr"/>
+              <a:r>
+                <a:rPr lang="en-US" sz="1200" b="1" dirty="0">
+                  <a:latin typeface="Times New Roman" panose="02020603050405020304" pitchFamily="18" charset="0"/>
+                  <a:cs typeface="Times New Roman" panose="02020603050405020304" pitchFamily="18" charset="0"/>
+                </a:rPr>
+                <a:t>Candidate Effector Prediction</a:t>
+              </a:r>
+              <a:r>
+                <a:rPr lang="en-US" sz="1200" dirty="0">
+                  <a:latin typeface="Times New Roman" panose="02020603050405020304" pitchFamily="18" charset="0"/>
+                  <a:cs typeface="Times New Roman" panose="02020603050405020304" pitchFamily="18" charset="0"/>
+                </a:rPr>
+                <a:t> </a:t>
+              </a:r>
+            </a:p>
+          </p:txBody>
+        </p:sp>
+        <p:sp>
+          <p:nvSpPr>
+            <p:cNvPr id="48" name="TextBox 47">
+              <a:extLst>
+                <a:ext uri="{FF2B5EF4-FFF2-40B4-BE49-F238E27FC236}">
+                  <a16:creationId xmlns:a16="http://schemas.microsoft.com/office/drawing/2014/main" id="{42C306F1-5954-A452-B5CB-01FBC99AB1C9}"/>
+                </a:ext>
+              </a:extLst>
+            </p:cNvPr>
+            <p:cNvSpPr txBox="1"/>
+            <p:nvPr/>
+          </p:nvSpPr>
+          <p:spPr>
+            <a:xfrm rot="16200000">
+              <a:off x="-918139" y="2088276"/>
+              <a:ext cx="2531269" cy="276901"/>
+            </a:xfrm>
+            <a:prstGeom prst="rect">
+              <a:avLst/>
+            </a:prstGeom>
+            <a:noFill/>
+            <a:ln w="19050">
+              <a:solidFill>
+                <a:srgbClr val="FFC000"/>
+              </a:solidFill>
+            </a:ln>
+          </p:spPr>
+          <p:txBody>
+            <a:bodyPr wrap="square" rtlCol="0">
+              <a:spAutoFit/>
+            </a:bodyPr>
+            <a:lstStyle/>
+            <a:p>
+              <a:pPr algn="ctr"/>
+              <a:r>
+                <a:rPr lang="en-US" sz="1200" b="1" dirty="0">
+                  <a:latin typeface="Times New Roman" panose="02020603050405020304" pitchFamily="18" charset="0"/>
+                  <a:cs typeface="Times New Roman" panose="02020603050405020304" pitchFamily="18" charset="0"/>
+                </a:rPr>
+                <a:t>Sequence identification</a:t>
+              </a:r>
+            </a:p>
+          </p:txBody>
+        </p:sp>
+        <p:sp>
+          <p:nvSpPr>
+            <p:cNvPr id="28" name="Rectangle 27">
+              <a:extLst>
+                <a:ext uri="{FF2B5EF4-FFF2-40B4-BE49-F238E27FC236}">
+                  <a16:creationId xmlns:a16="http://schemas.microsoft.com/office/drawing/2014/main" id="{5AB97E63-0861-21AA-97A8-B27875069948}"/>
+                </a:ext>
+              </a:extLst>
+            </p:cNvPr>
+            <p:cNvSpPr/>
+            <p:nvPr/>
+          </p:nvSpPr>
+          <p:spPr>
+            <a:xfrm>
+              <a:off x="617816" y="65971"/>
+              <a:ext cx="6153103" cy="757983"/>
+            </a:xfrm>
+            <a:prstGeom prst="rect">
+              <a:avLst/>
+            </a:prstGeom>
+            <a:noFill/>
+            <a:ln w="19050">
+              <a:solidFill>
+                <a:schemeClr val="tx1"/>
+              </a:solidFill>
+              <a:prstDash val="lgDash"/>
+            </a:ln>
+          </p:spPr>
+          <p:style>
+            <a:lnRef idx="2">
+              <a:schemeClr val="accent1">
+                <a:shade val="50000"/>
+              </a:schemeClr>
+            </a:lnRef>
+            <a:fillRef idx="1">
+              <a:schemeClr val="accent1"/>
+            </a:fillRef>
+            <a:effectRef idx="0">
+              <a:schemeClr val="accent1"/>
+            </a:effectRef>
+            <a:fontRef idx="minor">
+              <a:schemeClr val="lt1"/>
+            </a:fontRef>
+          </p:style>
+          <p:txBody>
+            <a:bodyPr rtlCol="0" anchor="ctr"/>
+            <a:lstStyle/>
+            <a:p>
+              <a:pPr algn="ctr"/>
+              <a:r>
+                <a:rPr lang="en-US" sz="2000" b="1" i="1" dirty="0">
+                  <a:solidFill>
+                    <a:schemeClr val="tx1"/>
+                  </a:solidFill>
+                  <a:latin typeface="Times New Roman" panose="02020603050405020304" pitchFamily="18" charset="0"/>
+                  <a:cs typeface="Times New Roman" panose="02020603050405020304" pitchFamily="18" charset="0"/>
+                </a:rPr>
+                <a:t>Fusarium</a:t>
+              </a:r>
+              <a:r>
+                <a:rPr lang="en-US" sz="2000" b="1" dirty="0">
+                  <a:solidFill>
+                    <a:schemeClr val="tx1"/>
+                  </a:solidFill>
+                  <a:latin typeface="Times New Roman" panose="02020603050405020304" pitchFamily="18" charset="0"/>
+                  <a:cs typeface="Times New Roman" panose="02020603050405020304" pitchFamily="18" charset="0"/>
+                </a:rPr>
+                <a:t> Assemblies</a:t>
+              </a:r>
+            </a:p>
+            <a:p>
+              <a:pPr algn="ctr"/>
+              <a:r>
+                <a:rPr lang="en-US" sz="1000" i="1" dirty="0">
+                  <a:solidFill>
+                    <a:schemeClr val="tx1"/>
+                  </a:solidFill>
+                  <a:latin typeface="Times New Roman" panose="02020603050405020304" pitchFamily="18" charset="0"/>
+                  <a:cs typeface="Times New Roman" panose="02020603050405020304" pitchFamily="18" charset="0"/>
+                </a:rPr>
+                <a:t>Fusarium</a:t>
+              </a:r>
+              <a:r>
+                <a:rPr lang="en-US" sz="1000" dirty="0">
+                  <a:solidFill>
+                    <a:schemeClr val="tx1"/>
+                  </a:solidFill>
+                  <a:latin typeface="Times New Roman" panose="02020603050405020304" pitchFamily="18" charset="0"/>
+                  <a:cs typeface="Times New Roman" panose="02020603050405020304" pitchFamily="18" charset="0"/>
+                </a:rPr>
+                <a:t> species genome assemblies in FASTA format, as well as a list of the assemblies and a </a:t>
+              </a:r>
+              <a:r>
+                <a:rPr lang="en-US" sz="1000" i="1" dirty="0">
+                  <a:solidFill>
+                    <a:schemeClr val="tx1"/>
+                  </a:solidFill>
+                  <a:latin typeface="Times New Roman" panose="02020603050405020304" pitchFamily="18" charset="0"/>
+                  <a:cs typeface="Times New Roman" panose="02020603050405020304" pitchFamily="18" charset="0"/>
+                </a:rPr>
+                <a:t>mimp </a:t>
+              </a:r>
+              <a:r>
+                <a:rPr lang="en-US" sz="1000" dirty="0">
+                  <a:solidFill>
+                    <a:schemeClr val="tx1"/>
+                  </a:solidFill>
+                  <a:latin typeface="Times New Roman" panose="02020603050405020304" pitchFamily="18" charset="0"/>
+                  <a:cs typeface="Times New Roman" panose="02020603050405020304" pitchFamily="18" charset="0"/>
+                </a:rPr>
+                <a:t>profile HMM, are prepared as input. </a:t>
+              </a:r>
+            </a:p>
+          </p:txBody>
+        </p:sp>
+        <p:sp>
+          <p:nvSpPr>
+            <p:cNvPr id="29" name="TextBox 28">
+              <a:extLst>
+                <a:ext uri="{FF2B5EF4-FFF2-40B4-BE49-F238E27FC236}">
+                  <a16:creationId xmlns:a16="http://schemas.microsoft.com/office/drawing/2014/main" id="{7ACB2F06-EF52-CA7D-F30C-9FDD268FAE7D}"/>
+                </a:ext>
+              </a:extLst>
+            </p:cNvPr>
+            <p:cNvSpPr txBox="1"/>
+            <p:nvPr/>
+          </p:nvSpPr>
+          <p:spPr>
+            <a:xfrm>
+              <a:off x="617815" y="961093"/>
+              <a:ext cx="6153098" cy="471958"/>
+            </a:xfrm>
+            <a:prstGeom prst="rect">
+              <a:avLst/>
+            </a:prstGeom>
+            <a:noFill/>
+            <a:ln w="19050">
+              <a:solidFill>
+                <a:schemeClr val="accent4"/>
+              </a:solidFill>
+            </a:ln>
+          </p:spPr>
+          <p:txBody>
+            <a:bodyPr wrap="square" rtlCol="0">
+              <a:spAutoFit/>
+            </a:bodyPr>
+            <a:lstStyle/>
+            <a:p>
+              <a:pPr algn="ctr"/>
+              <a:r>
+                <a:rPr lang="en-US" sz="1050" b="1" i="1" dirty="0">
+                  <a:latin typeface="Times New Roman" panose="02020603050405020304" pitchFamily="18" charset="0"/>
+                  <a:cs typeface="Times New Roman" panose="02020603050405020304" pitchFamily="18" charset="0"/>
+                </a:rPr>
+                <a:t>Mimp </a:t>
+              </a:r>
+              <a:r>
+                <a:rPr lang="en-US" sz="1050" b="1" dirty="0">
+                  <a:latin typeface="Times New Roman" panose="02020603050405020304" pitchFamily="18" charset="0"/>
+                  <a:cs typeface="Times New Roman" panose="02020603050405020304" pitchFamily="18" charset="0"/>
+                </a:rPr>
+                <a:t>identification</a:t>
+              </a:r>
+            </a:p>
+            <a:p>
+              <a:pPr algn="ctr"/>
+              <a:r>
+                <a:rPr lang="en-US" sz="1050" dirty="0">
+                  <a:latin typeface="Times New Roman" panose="02020603050405020304" pitchFamily="18" charset="0"/>
+                  <a:cs typeface="Times New Roman" panose="02020603050405020304" pitchFamily="18" charset="0"/>
+                </a:rPr>
+                <a:t>Each </a:t>
+              </a:r>
+              <a:r>
+                <a:rPr lang="en-US" sz="1050" i="1" dirty="0">
+                  <a:latin typeface="Times New Roman" panose="02020603050405020304" pitchFamily="18" charset="0"/>
+                  <a:cs typeface="Times New Roman" panose="02020603050405020304" pitchFamily="18" charset="0"/>
+                </a:rPr>
+                <a:t>Fusarium</a:t>
+              </a:r>
+              <a:r>
+                <a:rPr lang="en-US" sz="1050" dirty="0">
+                  <a:latin typeface="Times New Roman" panose="02020603050405020304" pitchFamily="18" charset="0"/>
+                  <a:cs typeface="Times New Roman" panose="02020603050405020304" pitchFamily="18" charset="0"/>
+                </a:rPr>
+                <a:t> assembly is searched for </a:t>
+              </a:r>
+              <a:r>
+                <a:rPr lang="en-US" sz="1050" i="1" dirty="0">
+                  <a:latin typeface="Times New Roman" panose="02020603050405020304" pitchFamily="18" charset="0"/>
+                  <a:cs typeface="Times New Roman" panose="02020603050405020304" pitchFamily="18" charset="0"/>
+                </a:rPr>
+                <a:t>mimps </a:t>
+              </a:r>
+              <a:r>
+                <a:rPr lang="en-US" sz="1050" dirty="0">
+                  <a:latin typeface="Times New Roman" panose="02020603050405020304" pitchFamily="18" charset="0"/>
+                  <a:cs typeface="Times New Roman" panose="02020603050405020304" pitchFamily="18" charset="0"/>
+                </a:rPr>
+                <a:t>using a custom python script (using </a:t>
+              </a:r>
+              <a:r>
+                <a:rPr lang="en-US" sz="1050" i="1" dirty="0">
+                  <a:latin typeface="Times New Roman" panose="02020603050405020304" pitchFamily="18" charset="0"/>
+                  <a:cs typeface="Times New Roman" panose="02020603050405020304" pitchFamily="18" charset="0"/>
+                </a:rPr>
+                <a:t>mimp </a:t>
+              </a:r>
+              <a:r>
+                <a:rPr lang="en-US" sz="1050" dirty="0">
+                  <a:latin typeface="Times New Roman" panose="02020603050405020304" pitchFamily="18" charset="0"/>
+                  <a:cs typeface="Times New Roman" panose="02020603050405020304" pitchFamily="18" charset="0"/>
+                </a:rPr>
+                <a:t>TIRs) and NHMMER </a:t>
+              </a:r>
+              <a:r>
+                <a:rPr lang="en-GB" sz="1050" dirty="0">
+                  <a:latin typeface="Times New Roman" panose="02020603050405020304" pitchFamily="18" charset="0"/>
+                  <a:ea typeface="Times New Roman" panose="02020603050405020304" pitchFamily="18" charset="0"/>
+                </a:rPr>
+                <a:t>(v3.3.1) (</a:t>
+              </a:r>
+              <a:r>
+                <a:rPr lang="en-US" sz="1050" dirty="0">
+                  <a:latin typeface="Times New Roman" panose="02020603050405020304" pitchFamily="18" charset="0"/>
+                  <a:cs typeface="Times New Roman" panose="02020603050405020304" pitchFamily="18" charset="0"/>
+                </a:rPr>
+                <a:t>using a </a:t>
+              </a:r>
+              <a:r>
+                <a:rPr lang="en-US" sz="1050" i="1" dirty="0">
+                  <a:latin typeface="Times New Roman" panose="02020603050405020304" pitchFamily="18" charset="0"/>
+                  <a:cs typeface="Times New Roman" panose="02020603050405020304" pitchFamily="18" charset="0"/>
+                </a:rPr>
+                <a:t>mimp </a:t>
+              </a:r>
+              <a:r>
+                <a:rPr lang="en-US" sz="1050" dirty="0">
+                  <a:latin typeface="Times New Roman" panose="02020603050405020304" pitchFamily="18" charset="0"/>
+                  <a:cs typeface="Times New Roman" panose="02020603050405020304" pitchFamily="18" charset="0"/>
+                </a:rPr>
+                <a:t>profile-HMM).</a:t>
+              </a:r>
+            </a:p>
+          </p:txBody>
+        </p:sp>
+        <p:sp>
+          <p:nvSpPr>
+            <p:cNvPr id="30" name="TextBox 29">
+              <a:extLst>
+                <a:ext uri="{FF2B5EF4-FFF2-40B4-BE49-F238E27FC236}">
+                  <a16:creationId xmlns:a16="http://schemas.microsoft.com/office/drawing/2014/main" id="{691DA270-25BC-ECFF-7EED-18C8390263C9}"/>
+                </a:ext>
+              </a:extLst>
+            </p:cNvPr>
+            <p:cNvSpPr txBox="1"/>
+            <p:nvPr/>
+          </p:nvSpPr>
+          <p:spPr>
+            <a:xfrm>
+              <a:off x="617814" y="1680837"/>
+              <a:ext cx="6153099" cy="577081"/>
+            </a:xfrm>
+            <a:prstGeom prst="rect">
+              <a:avLst/>
+            </a:prstGeom>
+            <a:noFill/>
+            <a:ln w="19050">
+              <a:solidFill>
+                <a:schemeClr val="accent4"/>
+              </a:solidFill>
+            </a:ln>
+          </p:spPr>
+          <p:txBody>
+            <a:bodyPr wrap="square" rtlCol="0">
+              <a:spAutoFit/>
+            </a:bodyPr>
+            <a:lstStyle/>
+            <a:p>
+              <a:pPr algn="ctr"/>
+              <a:r>
+                <a:rPr lang="en-US" sz="1050" b="1" i="1" dirty="0">
+                  <a:latin typeface="Times New Roman" panose="02020603050405020304" pitchFamily="18" charset="0"/>
+                  <a:cs typeface="Times New Roman" panose="02020603050405020304" pitchFamily="18" charset="0"/>
+                </a:rPr>
+                <a:t>Mimp </a:t>
+              </a:r>
+              <a:r>
+                <a:rPr lang="en-US" sz="1050" b="1" dirty="0">
+                  <a:latin typeface="Times New Roman" panose="02020603050405020304" pitchFamily="18" charset="0"/>
+                  <a:cs typeface="Times New Roman" panose="02020603050405020304" pitchFamily="18" charset="0"/>
+                </a:rPr>
+                <a:t>region sequence identification</a:t>
+              </a:r>
+            </a:p>
+            <a:p>
+              <a:pPr algn="ctr"/>
+              <a:r>
+                <a:rPr lang="en-US" sz="1050" dirty="0">
+                  <a:latin typeface="Times New Roman" panose="02020603050405020304" pitchFamily="18" charset="0"/>
+                  <a:cs typeface="Times New Roman" panose="02020603050405020304" pitchFamily="18" charset="0"/>
+                </a:rPr>
+                <a:t>Identify regions 2.5kb either side of a </a:t>
+              </a:r>
+              <a:r>
+                <a:rPr lang="en-US" sz="1050" i="1" dirty="0">
+                  <a:latin typeface="Times New Roman" panose="02020603050405020304" pitchFamily="18" charset="0"/>
+                  <a:cs typeface="Times New Roman" panose="02020603050405020304" pitchFamily="18" charset="0"/>
+                </a:rPr>
+                <a:t>mimp </a:t>
+              </a:r>
+              <a:r>
+                <a:rPr lang="en-US" sz="1050" dirty="0">
+                  <a:latin typeface="Times New Roman" panose="02020603050405020304" pitchFamily="18" charset="0"/>
+                  <a:cs typeface="Times New Roman" panose="02020603050405020304" pitchFamily="18" charset="0"/>
+                </a:rPr>
+                <a:t>(</a:t>
+              </a:r>
+              <a:r>
+                <a:rPr lang="en-US" sz="1050" i="1" dirty="0">
+                  <a:latin typeface="Times New Roman" panose="02020603050405020304" pitchFamily="18" charset="0"/>
+                  <a:cs typeface="Times New Roman" panose="02020603050405020304" pitchFamily="18" charset="0"/>
+                </a:rPr>
+                <a:t>mimp</a:t>
+              </a:r>
+              <a:r>
+                <a:rPr lang="en-US" sz="1050" dirty="0">
+                  <a:latin typeface="Times New Roman" panose="02020603050405020304" pitchFamily="18" charset="0"/>
+                  <a:cs typeface="Times New Roman" panose="02020603050405020304" pitchFamily="18" charset="0"/>
+                </a:rPr>
+                <a:t> region), generating a </a:t>
+              </a:r>
+              <a:r>
+                <a:rPr lang="en-US" sz="1050" i="1" dirty="0">
+                  <a:latin typeface="Times New Roman" panose="02020603050405020304" pitchFamily="18" charset="0"/>
+                  <a:cs typeface="Times New Roman" panose="02020603050405020304" pitchFamily="18" charset="0"/>
+                </a:rPr>
+                <a:t>mimp </a:t>
+              </a:r>
+              <a:r>
+                <a:rPr lang="en-US" sz="1050" dirty="0">
+                  <a:latin typeface="Times New Roman" panose="02020603050405020304" pitchFamily="18" charset="0"/>
+                  <a:cs typeface="Times New Roman" panose="02020603050405020304" pitchFamily="18" charset="0"/>
+                </a:rPr>
+                <a:t>region GFF file for each genome assembly. </a:t>
+              </a:r>
+            </a:p>
+          </p:txBody>
+        </p:sp>
+        <p:sp>
+          <p:nvSpPr>
+            <p:cNvPr id="31" name="TextBox 30">
+              <a:extLst>
+                <a:ext uri="{FF2B5EF4-FFF2-40B4-BE49-F238E27FC236}">
+                  <a16:creationId xmlns:a16="http://schemas.microsoft.com/office/drawing/2014/main" id="{5540790C-75EC-AE43-DFFA-A968FC71989D}"/>
+                </a:ext>
+              </a:extLst>
+            </p:cNvPr>
+            <p:cNvSpPr txBox="1"/>
+            <p:nvPr/>
+          </p:nvSpPr>
+          <p:spPr>
+            <a:xfrm>
+              <a:off x="617817" y="2438227"/>
+              <a:ext cx="3035236" cy="1061829"/>
+            </a:xfrm>
+            <a:prstGeom prst="rect">
+              <a:avLst/>
+            </a:prstGeom>
+            <a:noFill/>
+            <a:ln w="19050">
+              <a:solidFill>
+                <a:schemeClr val="accent4"/>
+              </a:solidFill>
+            </a:ln>
+          </p:spPr>
+          <p:txBody>
+            <a:bodyPr wrap="square" rtlCol="0">
+              <a:spAutoFit/>
+            </a:bodyPr>
+            <a:lstStyle/>
+            <a:p>
+              <a:pPr algn="ctr"/>
+              <a:r>
+                <a:rPr lang="en-US" sz="1050" b="1" dirty="0">
+                  <a:latin typeface="Times New Roman" panose="02020603050405020304" pitchFamily="18" charset="0"/>
+                  <a:cs typeface="Times New Roman" panose="02020603050405020304" pitchFamily="18" charset="0"/>
+                </a:rPr>
+                <a:t>Augustus regions identification</a:t>
+              </a:r>
+            </a:p>
+            <a:p>
+              <a:pPr algn="ctr"/>
+              <a:r>
+                <a:rPr lang="en-US" sz="1050" dirty="0">
+                  <a:latin typeface="Times New Roman" panose="02020603050405020304" pitchFamily="18" charset="0"/>
+                  <a:cs typeface="Times New Roman" panose="02020603050405020304" pitchFamily="18" charset="0"/>
+                </a:rPr>
+                <a:t>Expand 20kb either side of the </a:t>
+              </a:r>
+              <a:r>
+                <a:rPr lang="en-US" sz="1050" i="1" dirty="0">
+                  <a:latin typeface="Times New Roman" panose="02020603050405020304" pitchFamily="18" charset="0"/>
+                  <a:cs typeface="Times New Roman" panose="02020603050405020304" pitchFamily="18" charset="0"/>
+                </a:rPr>
+                <a:t>mimp </a:t>
+              </a:r>
+              <a:r>
+                <a:rPr lang="en-US" sz="1050" dirty="0">
+                  <a:latin typeface="Times New Roman" panose="02020603050405020304" pitchFamily="18" charset="0"/>
+                  <a:cs typeface="Times New Roman" panose="02020603050405020304" pitchFamily="18" charset="0"/>
+                </a:rPr>
+                <a:t>regions to identify regions for AUGUSTUS (v3.3.3) annotation. Generate an Augustus (v3.3.3) region GFF, and FASTAs where all non-Augustus have been hard masked.   </a:t>
+              </a:r>
+            </a:p>
+          </p:txBody>
+        </p:sp>
+        <p:sp>
+          <p:nvSpPr>
+            <p:cNvPr id="32" name="TextBox 31">
+              <a:extLst>
+                <a:ext uri="{FF2B5EF4-FFF2-40B4-BE49-F238E27FC236}">
+                  <a16:creationId xmlns:a16="http://schemas.microsoft.com/office/drawing/2014/main" id="{6324A5E0-C5F2-41E9-B0B7-ED4197F885BA}"/>
+                </a:ext>
+              </a:extLst>
+            </p:cNvPr>
+            <p:cNvSpPr txBox="1"/>
+            <p:nvPr/>
+          </p:nvSpPr>
+          <p:spPr>
+            <a:xfrm>
+              <a:off x="3750979" y="2438227"/>
+              <a:ext cx="3019934" cy="1054135"/>
+            </a:xfrm>
+            <a:prstGeom prst="rect">
+              <a:avLst/>
+            </a:prstGeom>
+            <a:noFill/>
+            <a:ln w="19050">
+              <a:solidFill>
+                <a:schemeClr val="accent4"/>
+              </a:solidFill>
+            </a:ln>
+          </p:spPr>
+          <p:txBody>
+            <a:bodyPr wrap="square" rtlCol="0">
+              <a:spAutoFit/>
+            </a:bodyPr>
+            <a:lstStyle/>
+            <a:p>
+              <a:pPr algn="ctr"/>
+              <a:r>
+                <a:rPr lang="en-US" sz="1050" b="1" dirty="0">
+                  <a:latin typeface="Times New Roman" panose="02020603050405020304" pitchFamily="18" charset="0"/>
+                  <a:cs typeface="Times New Roman" panose="02020603050405020304" pitchFamily="18" charset="0"/>
+                </a:rPr>
+                <a:t>Mask non-</a:t>
+              </a:r>
+              <a:r>
+                <a:rPr lang="en-US" sz="1050" b="1" i="1" dirty="0">
+                  <a:latin typeface="Times New Roman" panose="02020603050405020304" pitchFamily="18" charset="0"/>
+                  <a:cs typeface="Times New Roman" panose="02020603050405020304" pitchFamily="18" charset="0"/>
+                </a:rPr>
+                <a:t>mimp</a:t>
+              </a:r>
+              <a:r>
+                <a:rPr lang="en-US" sz="1050" b="1" dirty="0">
+                  <a:latin typeface="Times New Roman" panose="02020603050405020304" pitchFamily="18" charset="0"/>
+                  <a:cs typeface="Times New Roman" panose="02020603050405020304" pitchFamily="18" charset="0"/>
+                </a:rPr>
+                <a:t> regions</a:t>
+              </a:r>
+            </a:p>
+            <a:p>
+              <a:pPr algn="ctr"/>
+              <a:r>
+                <a:rPr lang="en-US" sz="1050" dirty="0">
+                  <a:latin typeface="Times New Roman" panose="02020603050405020304" pitchFamily="18" charset="0"/>
+                  <a:cs typeface="Times New Roman" panose="02020603050405020304" pitchFamily="18" charset="0"/>
+                </a:rPr>
+                <a:t>Using the </a:t>
+              </a:r>
+              <a:r>
+                <a:rPr lang="en-US" sz="1050" i="1" dirty="0">
+                  <a:latin typeface="Times New Roman" panose="02020603050405020304" pitchFamily="18" charset="0"/>
+                  <a:cs typeface="Times New Roman" panose="02020603050405020304" pitchFamily="18" charset="0"/>
+                </a:rPr>
+                <a:t>mimp </a:t>
+              </a:r>
+              <a:r>
+                <a:rPr lang="en-US" sz="1050" dirty="0">
+                  <a:latin typeface="Times New Roman" panose="02020603050405020304" pitchFamily="18" charset="0"/>
+                  <a:cs typeface="Times New Roman" panose="02020603050405020304" pitchFamily="18" charset="0"/>
+                </a:rPr>
+                <a:t>region GFF, create a </a:t>
+              </a:r>
+              <a:r>
+                <a:rPr lang="en-US" sz="1050" i="1" dirty="0">
+                  <a:latin typeface="Times New Roman" panose="02020603050405020304" pitchFamily="18" charset="0"/>
+                  <a:cs typeface="Times New Roman" panose="02020603050405020304" pitchFamily="18" charset="0"/>
+                </a:rPr>
+                <a:t>mimp</a:t>
+              </a:r>
+              <a:r>
+                <a:rPr lang="en-US" sz="1050" dirty="0">
+                  <a:latin typeface="Times New Roman" panose="02020603050405020304" pitchFamily="18" charset="0"/>
+                  <a:cs typeface="Times New Roman" panose="02020603050405020304" pitchFamily="18" charset="0"/>
+                </a:rPr>
+                <a:t> region FASTAS, where all non-</a:t>
+              </a:r>
+              <a:r>
+                <a:rPr lang="en-US" sz="1050" i="1" dirty="0">
+                  <a:latin typeface="Times New Roman" panose="02020603050405020304" pitchFamily="18" charset="0"/>
+                  <a:cs typeface="Times New Roman" panose="02020603050405020304" pitchFamily="18" charset="0"/>
+                </a:rPr>
+                <a:t>mimp </a:t>
+              </a:r>
+              <a:r>
+                <a:rPr lang="en-US" sz="1050" dirty="0">
+                  <a:latin typeface="Times New Roman" panose="02020603050405020304" pitchFamily="18" charset="0"/>
+                  <a:cs typeface="Times New Roman" panose="02020603050405020304" pitchFamily="18" charset="0"/>
+                </a:rPr>
+                <a:t>regions have been hard masked.</a:t>
+              </a:r>
+            </a:p>
+            <a:p>
+              <a:pPr algn="ctr"/>
+              <a:endParaRPr lang="en-US" sz="1050" dirty="0">
+                <a:latin typeface="Times New Roman" panose="02020603050405020304" pitchFamily="18" charset="0"/>
+                <a:cs typeface="Times New Roman" panose="02020603050405020304" pitchFamily="18" charset="0"/>
+              </a:endParaRPr>
+            </a:p>
+            <a:p>
+              <a:pPr algn="ctr"/>
+              <a:r>
+                <a:rPr lang="en-US" sz="1000" dirty="0">
+                  <a:latin typeface="Times New Roman" panose="02020603050405020304" pitchFamily="18" charset="0"/>
+                  <a:cs typeface="Times New Roman" panose="02020603050405020304" pitchFamily="18" charset="0"/>
+                </a:rPr>
+                <a:t> </a:t>
+              </a:r>
+              <a:endParaRPr lang="en-US" sz="900" dirty="0">
+                <a:latin typeface="Times New Roman" panose="02020603050405020304" pitchFamily="18" charset="0"/>
+                <a:cs typeface="Times New Roman" panose="02020603050405020304" pitchFamily="18" charset="0"/>
+              </a:endParaRPr>
+            </a:p>
+          </p:txBody>
+        </p:sp>
+        <p:sp>
+          <p:nvSpPr>
+            <p:cNvPr id="33" name="TextBox 32">
+              <a:extLst>
+                <a:ext uri="{FF2B5EF4-FFF2-40B4-BE49-F238E27FC236}">
+                  <a16:creationId xmlns:a16="http://schemas.microsoft.com/office/drawing/2014/main" id="{B711EA04-8776-BB1F-533B-25F5827492B4}"/>
+                </a:ext>
+              </a:extLst>
+            </p:cNvPr>
+            <p:cNvSpPr txBox="1"/>
+            <p:nvPr/>
+          </p:nvSpPr>
+          <p:spPr>
+            <a:xfrm>
+              <a:off x="3750973" y="3628125"/>
+              <a:ext cx="3019934" cy="738664"/>
+            </a:xfrm>
+            <a:prstGeom prst="rect">
+              <a:avLst/>
+            </a:prstGeom>
+            <a:noFill/>
+            <a:ln w="19050">
+              <a:solidFill>
+                <a:srgbClr val="0070C0"/>
+              </a:solidFill>
+            </a:ln>
+          </p:spPr>
+          <p:txBody>
+            <a:bodyPr wrap="square" rtlCol="0">
+              <a:spAutoFit/>
+            </a:bodyPr>
+            <a:lstStyle/>
+            <a:p>
+              <a:pPr algn="ctr"/>
+              <a:r>
+                <a:rPr lang="en-US" sz="1050" b="1" dirty="0">
+                  <a:latin typeface="Times New Roman" panose="02020603050405020304" pitchFamily="18" charset="0"/>
+                  <a:cs typeface="Times New Roman" panose="02020603050405020304" pitchFamily="18" charset="0"/>
+                </a:rPr>
+                <a:t>ORF Prediction </a:t>
+              </a:r>
+            </a:p>
+            <a:p>
+              <a:pPr algn="ctr"/>
+              <a:r>
+                <a:rPr lang="en-US" sz="1050" dirty="0">
+                  <a:latin typeface="Times New Roman" panose="02020603050405020304" pitchFamily="18" charset="0"/>
+                  <a:cs typeface="Times New Roman" panose="02020603050405020304" pitchFamily="18" charset="0"/>
+                </a:rPr>
+                <a:t>Getorf from Emboss (v6.6.0.0) is used to find open reading frames (ORFs) in the 2.5kb region. </a:t>
+              </a:r>
+            </a:p>
+            <a:p>
+              <a:pPr algn="ctr"/>
+              <a:r>
+                <a:rPr lang="en-US" sz="900" dirty="0">
+                  <a:latin typeface="Times New Roman" panose="02020603050405020304" pitchFamily="18" charset="0"/>
+                  <a:cs typeface="Times New Roman" panose="02020603050405020304" pitchFamily="18" charset="0"/>
+                </a:rPr>
+                <a:t> </a:t>
+              </a:r>
+            </a:p>
+          </p:txBody>
+        </p:sp>
+        <p:sp>
+          <p:nvSpPr>
+            <p:cNvPr id="34" name="TextBox 33">
+              <a:extLst>
+                <a:ext uri="{FF2B5EF4-FFF2-40B4-BE49-F238E27FC236}">
+                  <a16:creationId xmlns:a16="http://schemas.microsoft.com/office/drawing/2014/main" id="{2CF06320-44C5-7F77-6DA0-DC4B361DFD27}"/>
+                </a:ext>
+              </a:extLst>
+            </p:cNvPr>
+            <p:cNvSpPr txBox="1"/>
+            <p:nvPr/>
+          </p:nvSpPr>
+          <p:spPr>
+            <a:xfrm>
+              <a:off x="617816" y="4529168"/>
+              <a:ext cx="6153093" cy="339810"/>
+            </a:xfrm>
+            <a:prstGeom prst="rect">
+              <a:avLst/>
+            </a:prstGeom>
+            <a:noFill/>
+            <a:ln w="19050">
+              <a:solidFill>
+                <a:srgbClr val="0070C0"/>
+              </a:solidFill>
+            </a:ln>
+          </p:spPr>
+          <p:txBody>
+            <a:bodyPr wrap="square" rtlCol="0">
+              <a:spAutoFit/>
+            </a:bodyPr>
+            <a:lstStyle/>
+            <a:p>
+              <a:pPr algn="ctr"/>
+              <a:r>
+                <a:rPr lang="en-US" sz="1050" b="1" dirty="0">
+                  <a:latin typeface="Times New Roman" panose="02020603050405020304" pitchFamily="18" charset="0"/>
+                  <a:cs typeface="Times New Roman" panose="02020603050405020304" pitchFamily="18" charset="0"/>
+                </a:rPr>
+                <a:t>Signal peptide filtering</a:t>
+              </a:r>
+            </a:p>
+            <a:p>
+              <a:pPr algn="ctr"/>
+              <a:r>
+                <a:rPr lang="en-US" sz="1050" dirty="0">
+                  <a:latin typeface="Times New Roman" panose="02020603050405020304" pitchFamily="18" charset="0"/>
+                  <a:cs typeface="Times New Roman" panose="02020603050405020304" pitchFamily="18" charset="0"/>
+                </a:rPr>
+                <a:t>SignalP (v4.1) is used search all AUGUSTUS gene models and ORFs for a signal peptide.</a:t>
+              </a:r>
+            </a:p>
+          </p:txBody>
+        </p:sp>
+        <p:sp>
+          <p:nvSpPr>
+            <p:cNvPr id="35" name="TextBox 34">
+              <a:extLst>
+                <a:ext uri="{FF2B5EF4-FFF2-40B4-BE49-F238E27FC236}">
+                  <a16:creationId xmlns:a16="http://schemas.microsoft.com/office/drawing/2014/main" id="{AE157376-0193-94C8-7444-E50B1DB6C7C4}"/>
+                </a:ext>
+              </a:extLst>
+            </p:cNvPr>
+            <p:cNvSpPr txBox="1"/>
+            <p:nvPr/>
+          </p:nvSpPr>
+          <p:spPr>
+            <a:xfrm>
+              <a:off x="617817" y="3630805"/>
+              <a:ext cx="3035235" cy="604107"/>
+            </a:xfrm>
+            <a:prstGeom prst="rect">
+              <a:avLst/>
+            </a:prstGeom>
+            <a:noFill/>
+            <a:ln w="19050">
+              <a:solidFill>
+                <a:srgbClr val="0070C0"/>
+              </a:solidFill>
+            </a:ln>
+          </p:spPr>
+          <p:txBody>
+            <a:bodyPr wrap="square" rtlCol="0">
+              <a:spAutoFit/>
+            </a:bodyPr>
+            <a:lstStyle/>
+            <a:p>
+              <a:pPr algn="ctr"/>
+              <a:r>
+                <a:rPr lang="en-US" sz="1050" b="1" dirty="0">
+                  <a:latin typeface="Times New Roman" panose="02020603050405020304" pitchFamily="18" charset="0"/>
+                  <a:cs typeface="Times New Roman" panose="02020603050405020304" pitchFamily="18" charset="0"/>
+                </a:rPr>
+                <a:t>AUGUSTUS gene prediction</a:t>
+              </a:r>
+            </a:p>
+            <a:p>
+              <a:pPr algn="ctr"/>
+              <a:r>
+                <a:rPr lang="en-US" sz="1050" dirty="0">
+                  <a:latin typeface="Times New Roman" panose="02020603050405020304" pitchFamily="18" charset="0"/>
+                  <a:cs typeface="Times New Roman" panose="02020603050405020304" pitchFamily="18" charset="0"/>
+                </a:rPr>
+                <a:t>The Augustus region FASTA is submitted to AUGUSTUS (v3.3.3) for gene prediction with the “fusarium” species parameter selected.</a:t>
+              </a:r>
+            </a:p>
+          </p:txBody>
+        </p:sp>
+        <p:sp>
+          <p:nvSpPr>
+            <p:cNvPr id="36" name="TextBox 35">
+              <a:extLst>
+                <a:ext uri="{FF2B5EF4-FFF2-40B4-BE49-F238E27FC236}">
+                  <a16:creationId xmlns:a16="http://schemas.microsoft.com/office/drawing/2014/main" id="{976CB707-1090-E6D0-E086-A23D5310FC7A}"/>
+                </a:ext>
+              </a:extLst>
+            </p:cNvPr>
+            <p:cNvSpPr txBox="1"/>
+            <p:nvPr/>
+          </p:nvSpPr>
+          <p:spPr>
+            <a:xfrm>
+              <a:off x="617817" y="5096516"/>
+              <a:ext cx="6153092" cy="513692"/>
+            </a:xfrm>
+            <a:prstGeom prst="rect">
+              <a:avLst/>
+            </a:prstGeom>
+            <a:noFill/>
+            <a:ln w="19050">
+              <a:solidFill>
+                <a:schemeClr val="accent5">
+                  <a:lumMod val="75000"/>
+                </a:schemeClr>
+              </a:solidFill>
+            </a:ln>
+          </p:spPr>
+          <p:txBody>
+            <a:bodyPr wrap="square" lIns="28664" tIns="14332" rIns="28664" bIns="14332" rtlCol="0" anchor="t">
+              <a:spAutoFit/>
+            </a:bodyPr>
+            <a:lstStyle/>
+            <a:p>
+              <a:pPr algn="ctr"/>
+              <a:r>
+                <a:rPr lang="en-US" sz="1050" b="1" dirty="0">
+                  <a:latin typeface="Times New Roman" panose="02020603050405020304" pitchFamily="18" charset="0"/>
+                  <a:cs typeface="Times New Roman" panose="02020603050405020304" pitchFamily="18" charset="0"/>
+                </a:rPr>
+                <a:t>Size filter</a:t>
+              </a:r>
+            </a:p>
+            <a:p>
+              <a:pPr algn="ctr"/>
+              <a:r>
+                <a:rPr lang="en-US" sz="1050" dirty="0">
+                  <a:latin typeface="Times New Roman"/>
+                  <a:cs typeface="Times New Roman"/>
+                </a:rPr>
+                <a:t>Protein sequences containing a signal peptide predicted by SignalP (v4.1) are filtered based on size, with sequences &lt;450aa and &gt;30aa kept for effector prediction.  </a:t>
+              </a:r>
+              <a:endParaRPr lang="en-US" sz="1050" dirty="0">
+                <a:latin typeface="Times New Roman" panose="02020603050405020304" pitchFamily="18" charset="0"/>
+                <a:cs typeface="Times New Roman" panose="02020603050405020304" pitchFamily="18" charset="0"/>
+              </a:endParaRPr>
+            </a:p>
+          </p:txBody>
+        </p:sp>
+        <p:sp>
+          <p:nvSpPr>
+            <p:cNvPr id="37" name="TextBox 36">
+              <a:extLst>
+                <a:ext uri="{FF2B5EF4-FFF2-40B4-BE49-F238E27FC236}">
+                  <a16:creationId xmlns:a16="http://schemas.microsoft.com/office/drawing/2014/main" id="{6DCA523E-F833-5F7E-A65A-30DAA2F76805}"/>
+                </a:ext>
+              </a:extLst>
+            </p:cNvPr>
+            <p:cNvSpPr txBox="1"/>
+            <p:nvPr/>
+          </p:nvSpPr>
+          <p:spPr>
+            <a:xfrm>
+              <a:off x="617816" y="5842985"/>
+              <a:ext cx="6153093" cy="415498"/>
+            </a:xfrm>
+            <a:prstGeom prst="rect">
+              <a:avLst/>
+            </a:prstGeom>
+            <a:noFill/>
+            <a:ln w="19050">
+              <a:solidFill>
+                <a:schemeClr val="accent5">
+                  <a:lumMod val="75000"/>
+                </a:schemeClr>
+              </a:solidFill>
+            </a:ln>
+          </p:spPr>
+          <p:txBody>
+            <a:bodyPr wrap="square" rtlCol="0">
+              <a:spAutoFit/>
+            </a:bodyPr>
+            <a:lstStyle/>
+            <a:p>
+              <a:pPr algn="ctr"/>
+              <a:r>
+                <a:rPr lang="en-US" sz="1050" b="1" dirty="0">
+                  <a:latin typeface="Times New Roman" panose="02020603050405020304" pitchFamily="18" charset="0"/>
+                  <a:cs typeface="Times New Roman" panose="02020603050405020304" pitchFamily="18" charset="0"/>
+                </a:rPr>
+                <a:t> EffectorP (v2.0.1) scan for likely effectors</a:t>
+              </a:r>
+            </a:p>
+            <a:p>
+              <a:pPr algn="ctr"/>
+              <a:r>
+                <a:rPr lang="en-US" sz="1050" dirty="0">
+                  <a:latin typeface="Times New Roman" panose="02020603050405020304" pitchFamily="18" charset="0"/>
+                  <a:cs typeface="Times New Roman" panose="02020603050405020304" pitchFamily="18" charset="0"/>
+                </a:rPr>
+                <a:t>Each signal peptide and size filtered sequences is submitted to EffectorP (v2.0.1) for fungal effector prediction. </a:t>
+              </a:r>
+            </a:p>
+          </p:txBody>
+        </p:sp>
+        <p:cxnSp>
+          <p:nvCxnSpPr>
+            <p:cNvPr id="38" name="Straight Arrow Connector 39">
+              <a:extLst>
+                <a:ext uri="{FF2B5EF4-FFF2-40B4-BE49-F238E27FC236}">
+                  <a16:creationId xmlns:a16="http://schemas.microsoft.com/office/drawing/2014/main" id="{AC2CB13E-9DD3-CD43-4C1B-156384BB78BC}"/>
+                </a:ext>
+              </a:extLst>
+            </p:cNvPr>
+            <p:cNvCxnSpPr>
+              <a:cxnSpLocks/>
+              <a:stCxn id="30" idx="2"/>
+              <a:endCxn id="31" idx="0"/>
+            </p:cNvCxnSpPr>
+            <p:nvPr/>
+          </p:nvCxnSpPr>
+          <p:spPr>
+            <a:xfrm rot="5400000">
+              <a:off x="2824746" y="1568608"/>
+              <a:ext cx="180309" cy="1558929"/>
+            </a:xfrm>
+            <a:prstGeom prst="bentConnector3">
+              <a:avLst>
+                <a:gd name="adj1" fmla="val 50000"/>
+              </a:avLst>
+            </a:prstGeom>
+            <a:ln w="19050">
+              <a:solidFill>
+                <a:schemeClr val="tx1"/>
+              </a:solidFill>
+              <a:headEnd type="none" w="med" len="med"/>
+              <a:tailEnd type="arrow" w="med" len="med"/>
+            </a:ln>
+          </p:spPr>
+          <p:style>
+            <a:lnRef idx="1">
+              <a:schemeClr val="accent1"/>
+            </a:lnRef>
+            <a:fillRef idx="0">
+              <a:schemeClr val="accent1"/>
+            </a:fillRef>
+            <a:effectRef idx="0">
+              <a:schemeClr val="accent1"/>
+            </a:effectRef>
+            <a:fontRef idx="minor">
+              <a:schemeClr val="tx1"/>
+            </a:fontRef>
+          </p:style>
+        </p:cxnSp>
+        <p:cxnSp>
+          <p:nvCxnSpPr>
+            <p:cNvPr id="39" name="Straight Arrow Connector 38">
+              <a:extLst>
+                <a:ext uri="{FF2B5EF4-FFF2-40B4-BE49-F238E27FC236}">
+                  <a16:creationId xmlns:a16="http://schemas.microsoft.com/office/drawing/2014/main" id="{80B17E49-3031-9706-BDF3-6031A9A28FFA}"/>
+                </a:ext>
+              </a:extLst>
+            </p:cNvPr>
+            <p:cNvCxnSpPr>
+              <a:cxnSpLocks/>
+              <a:stCxn id="31" idx="2"/>
+              <a:endCxn id="35" idx="0"/>
+            </p:cNvCxnSpPr>
+            <p:nvPr/>
+          </p:nvCxnSpPr>
+          <p:spPr>
+            <a:xfrm>
+              <a:off x="2135435" y="3500056"/>
+              <a:ext cx="0" cy="130749"/>
+            </a:xfrm>
+            <a:prstGeom prst="straightConnector1">
+              <a:avLst/>
+            </a:prstGeom>
+            <a:ln w="19050">
+              <a:solidFill>
+                <a:schemeClr val="tx1"/>
+              </a:solidFill>
+              <a:headEnd type="none" w="med" len="med"/>
+              <a:tailEnd type="arrow" w="med" len="med"/>
+            </a:ln>
+          </p:spPr>
+          <p:style>
+            <a:lnRef idx="1">
+              <a:schemeClr val="accent1"/>
+            </a:lnRef>
+            <a:fillRef idx="0">
+              <a:schemeClr val="accent1"/>
+            </a:fillRef>
+            <a:effectRef idx="0">
+              <a:schemeClr val="accent1"/>
+            </a:effectRef>
+            <a:fontRef idx="minor">
+              <a:schemeClr val="tx1"/>
+            </a:fontRef>
+          </p:style>
+        </p:cxnSp>
+        <p:cxnSp>
+          <p:nvCxnSpPr>
+            <p:cNvPr id="40" name="Straight Arrow Connector 39">
+              <a:extLst>
+                <a:ext uri="{FF2B5EF4-FFF2-40B4-BE49-F238E27FC236}">
+                  <a16:creationId xmlns:a16="http://schemas.microsoft.com/office/drawing/2014/main" id="{37AD526A-51C8-22C7-ED75-940380912E7C}"/>
+                </a:ext>
+              </a:extLst>
+            </p:cNvPr>
+            <p:cNvCxnSpPr>
+              <a:cxnSpLocks/>
+              <a:stCxn id="33" idx="2"/>
+            </p:cNvCxnSpPr>
+            <p:nvPr/>
+          </p:nvCxnSpPr>
+          <p:spPr>
+            <a:xfrm>
+              <a:off x="5260940" y="4366789"/>
+              <a:ext cx="0" cy="162379"/>
+            </a:xfrm>
+            <a:prstGeom prst="straightConnector1">
+              <a:avLst/>
+            </a:prstGeom>
+            <a:ln w="19050">
+              <a:solidFill>
+                <a:schemeClr val="tx1"/>
+              </a:solidFill>
+              <a:headEnd type="none" w="med" len="med"/>
+              <a:tailEnd type="arrow" w="med" len="med"/>
+            </a:ln>
+          </p:spPr>
+          <p:style>
+            <a:lnRef idx="1">
+              <a:schemeClr val="accent1"/>
+            </a:lnRef>
+            <a:fillRef idx="0">
+              <a:schemeClr val="accent1"/>
+            </a:fillRef>
+            <a:effectRef idx="0">
+              <a:schemeClr val="accent1"/>
+            </a:effectRef>
+            <a:fontRef idx="minor">
+              <a:schemeClr val="tx1"/>
+            </a:fontRef>
+          </p:style>
+        </p:cxnSp>
+        <p:cxnSp>
+          <p:nvCxnSpPr>
+            <p:cNvPr id="41" name="Straight Arrow Connector 40">
+              <a:extLst>
+                <a:ext uri="{FF2B5EF4-FFF2-40B4-BE49-F238E27FC236}">
+                  <a16:creationId xmlns:a16="http://schemas.microsoft.com/office/drawing/2014/main" id="{E4D9565D-4082-948F-58CB-8BF463E36C28}"/>
+                </a:ext>
+              </a:extLst>
+            </p:cNvPr>
+            <p:cNvCxnSpPr>
+              <a:cxnSpLocks/>
+              <a:stCxn id="32" idx="2"/>
+              <a:endCxn id="33" idx="0"/>
+            </p:cNvCxnSpPr>
+            <p:nvPr/>
+          </p:nvCxnSpPr>
+          <p:spPr>
+            <a:xfrm flipH="1">
+              <a:off x="5260940" y="3492362"/>
+              <a:ext cx="6" cy="135763"/>
+            </a:xfrm>
+            <a:prstGeom prst="straightConnector1">
+              <a:avLst/>
+            </a:prstGeom>
+            <a:ln w="19050">
+              <a:solidFill>
+                <a:schemeClr val="tx1"/>
+              </a:solidFill>
+              <a:headEnd type="none" w="med" len="med"/>
+              <a:tailEnd type="arrow" w="med" len="med"/>
+            </a:ln>
+          </p:spPr>
+          <p:style>
+            <a:lnRef idx="1">
+              <a:schemeClr val="accent1"/>
+            </a:lnRef>
+            <a:fillRef idx="0">
+              <a:schemeClr val="accent1"/>
+            </a:fillRef>
+            <a:effectRef idx="0">
+              <a:schemeClr val="accent1"/>
+            </a:effectRef>
+            <a:fontRef idx="minor">
+              <a:schemeClr val="tx1"/>
+            </a:fontRef>
+          </p:style>
+        </p:cxnSp>
+        <p:cxnSp>
+          <p:nvCxnSpPr>
+            <p:cNvPr id="42" name="Straight Arrow Connector 41">
+              <a:extLst>
+                <a:ext uri="{FF2B5EF4-FFF2-40B4-BE49-F238E27FC236}">
+                  <a16:creationId xmlns:a16="http://schemas.microsoft.com/office/drawing/2014/main" id="{5327B655-1121-397A-9CA1-F589B30DD736}"/>
+                </a:ext>
+              </a:extLst>
+            </p:cNvPr>
+            <p:cNvCxnSpPr>
+              <a:cxnSpLocks/>
+              <a:stCxn id="36" idx="2"/>
+              <a:endCxn id="37" idx="0"/>
+            </p:cNvCxnSpPr>
+            <p:nvPr/>
+          </p:nvCxnSpPr>
+          <p:spPr>
+            <a:xfrm>
+              <a:off x="3694363" y="5610208"/>
+              <a:ext cx="0" cy="232777"/>
+            </a:xfrm>
+            <a:prstGeom prst="straightConnector1">
+              <a:avLst/>
+            </a:prstGeom>
+            <a:ln w="19050">
+              <a:solidFill>
+                <a:schemeClr val="tx1"/>
+              </a:solidFill>
+              <a:headEnd type="none" w="med" len="med"/>
+              <a:tailEnd type="arrow" w="med" len="med"/>
+            </a:ln>
+          </p:spPr>
+          <p:style>
+            <a:lnRef idx="1">
+              <a:schemeClr val="accent1"/>
+            </a:lnRef>
+            <a:fillRef idx="0">
+              <a:schemeClr val="accent1"/>
+            </a:fillRef>
+            <a:effectRef idx="0">
+              <a:schemeClr val="accent1"/>
+            </a:effectRef>
+            <a:fontRef idx="minor">
+              <a:schemeClr val="tx1"/>
+            </a:fontRef>
+          </p:style>
+        </p:cxnSp>
+        <p:cxnSp>
+          <p:nvCxnSpPr>
+            <p:cNvPr id="43" name="Straight Arrow Connector 42">
+              <a:extLst>
+                <a:ext uri="{FF2B5EF4-FFF2-40B4-BE49-F238E27FC236}">
+                  <a16:creationId xmlns:a16="http://schemas.microsoft.com/office/drawing/2014/main" id="{B954DB71-9171-6F9A-D14C-86A713998648}"/>
+                </a:ext>
+              </a:extLst>
+            </p:cNvPr>
+            <p:cNvCxnSpPr>
+              <a:cxnSpLocks/>
+              <a:stCxn id="29" idx="2"/>
+              <a:endCxn id="30" idx="0"/>
+            </p:cNvCxnSpPr>
+            <p:nvPr/>
+          </p:nvCxnSpPr>
+          <p:spPr>
+            <a:xfrm>
+              <a:off x="3694364" y="1433051"/>
+              <a:ext cx="0" cy="247786"/>
+            </a:xfrm>
+            <a:prstGeom prst="straightConnector1">
+              <a:avLst/>
+            </a:prstGeom>
+            <a:ln w="19050">
+              <a:solidFill>
+                <a:schemeClr val="tx1"/>
+              </a:solidFill>
+              <a:headEnd type="none" w="med" len="med"/>
+              <a:tailEnd type="arrow" w="med" len="med"/>
+            </a:ln>
+          </p:spPr>
+          <p:style>
+            <a:lnRef idx="1">
+              <a:schemeClr val="accent1"/>
+            </a:lnRef>
+            <a:fillRef idx="0">
+              <a:schemeClr val="accent1"/>
+            </a:fillRef>
+            <a:effectRef idx="0">
+              <a:schemeClr val="accent1"/>
+            </a:effectRef>
+            <a:fontRef idx="minor">
+              <a:schemeClr val="tx1"/>
+            </a:fontRef>
+          </p:style>
+        </p:cxnSp>
+        <p:cxnSp>
+          <p:nvCxnSpPr>
+            <p:cNvPr id="44" name="Straight Arrow Connector 39">
+              <a:extLst>
+                <a:ext uri="{FF2B5EF4-FFF2-40B4-BE49-F238E27FC236}">
+                  <a16:creationId xmlns:a16="http://schemas.microsoft.com/office/drawing/2014/main" id="{28D829CA-2B20-EC7B-5887-5CCFA31D626F}"/>
+                </a:ext>
+              </a:extLst>
+            </p:cNvPr>
+            <p:cNvCxnSpPr>
+              <a:cxnSpLocks/>
+              <a:stCxn id="30" idx="2"/>
+              <a:endCxn id="32" idx="0"/>
+            </p:cNvCxnSpPr>
+            <p:nvPr/>
+          </p:nvCxnSpPr>
+          <p:spPr>
+            <a:xfrm rot="16200000" flipH="1">
+              <a:off x="4387501" y="1564781"/>
+              <a:ext cx="180309" cy="1566582"/>
+            </a:xfrm>
+            <a:prstGeom prst="bentConnector3">
+              <a:avLst>
+                <a:gd name="adj1" fmla="val 50000"/>
+              </a:avLst>
+            </a:prstGeom>
+            <a:ln w="19050">
+              <a:solidFill>
+                <a:schemeClr val="tx1"/>
+              </a:solidFill>
+              <a:headEnd type="none" w="med" len="med"/>
+              <a:tailEnd type="arrow" w="med" len="med"/>
+            </a:ln>
+          </p:spPr>
+          <p:style>
+            <a:lnRef idx="1">
+              <a:schemeClr val="accent1"/>
+            </a:lnRef>
+            <a:fillRef idx="0">
+              <a:schemeClr val="accent1"/>
+            </a:fillRef>
+            <a:effectRef idx="0">
+              <a:schemeClr val="accent1"/>
+            </a:effectRef>
+            <a:fontRef idx="minor">
+              <a:schemeClr val="tx1"/>
+            </a:fontRef>
+          </p:style>
+        </p:cxnSp>
+        <p:cxnSp>
+          <p:nvCxnSpPr>
+            <p:cNvPr id="45" name="Straight Arrow Connector 44">
+              <a:extLst>
+                <a:ext uri="{FF2B5EF4-FFF2-40B4-BE49-F238E27FC236}">
+                  <a16:creationId xmlns:a16="http://schemas.microsoft.com/office/drawing/2014/main" id="{B4BAA9E8-2B6B-77BD-293D-288F8B1D232C}"/>
+                </a:ext>
+              </a:extLst>
+            </p:cNvPr>
+            <p:cNvCxnSpPr>
+              <a:cxnSpLocks/>
+              <a:stCxn id="34" idx="2"/>
+              <a:endCxn id="36" idx="0"/>
+            </p:cNvCxnSpPr>
+            <p:nvPr/>
+          </p:nvCxnSpPr>
+          <p:spPr>
+            <a:xfrm>
+              <a:off x="3694363" y="4868978"/>
+              <a:ext cx="0" cy="227538"/>
+            </a:xfrm>
+            <a:prstGeom prst="straightConnector1">
+              <a:avLst/>
+            </a:prstGeom>
+            <a:ln w="19050">
+              <a:solidFill>
+                <a:schemeClr val="tx1"/>
+              </a:solidFill>
+              <a:headEnd type="none" w="med" len="med"/>
+              <a:tailEnd type="arrow" w="med" len="med"/>
+            </a:ln>
+          </p:spPr>
+          <p:style>
+            <a:lnRef idx="1">
+              <a:schemeClr val="accent1"/>
+            </a:lnRef>
+            <a:fillRef idx="0">
+              <a:schemeClr val="accent1"/>
+            </a:fillRef>
+            <a:effectRef idx="0">
+              <a:schemeClr val="accent1"/>
+            </a:effectRef>
+            <a:fontRef idx="minor">
+              <a:schemeClr val="tx1"/>
+            </a:fontRef>
+          </p:style>
+        </p:cxnSp>
+        <p:cxnSp>
+          <p:nvCxnSpPr>
+            <p:cNvPr id="46" name="Straight Arrow Connector 45">
+              <a:extLst>
+                <a:ext uri="{FF2B5EF4-FFF2-40B4-BE49-F238E27FC236}">
+                  <a16:creationId xmlns:a16="http://schemas.microsoft.com/office/drawing/2014/main" id="{E2423F59-D43F-A99B-0BDF-4A053EAD8D7A}"/>
+                </a:ext>
+              </a:extLst>
+            </p:cNvPr>
+            <p:cNvCxnSpPr>
+              <a:cxnSpLocks/>
+              <a:stCxn id="28" idx="2"/>
+              <a:endCxn id="29" idx="0"/>
+            </p:cNvCxnSpPr>
+            <p:nvPr/>
+          </p:nvCxnSpPr>
+          <p:spPr>
+            <a:xfrm flipH="1">
+              <a:off x="3694364" y="823954"/>
+              <a:ext cx="4" cy="137139"/>
+            </a:xfrm>
+            <a:prstGeom prst="straightConnector1">
+              <a:avLst/>
+            </a:prstGeom>
+            <a:ln w="19050">
+              <a:solidFill>
+                <a:schemeClr val="tx1"/>
+              </a:solidFill>
+              <a:headEnd type="none" w="med" len="med"/>
+              <a:tailEnd type="arrow" w="med" len="med"/>
+            </a:ln>
+          </p:spPr>
+          <p:style>
+            <a:lnRef idx="1">
+              <a:schemeClr val="accent1"/>
+            </a:lnRef>
+            <a:fillRef idx="0">
+              <a:schemeClr val="accent1"/>
+            </a:fillRef>
+            <a:effectRef idx="0">
+              <a:schemeClr val="accent1"/>
+            </a:effectRef>
+            <a:fontRef idx="minor">
+              <a:schemeClr val="tx1"/>
+            </a:fontRef>
+          </p:style>
+        </p:cxnSp>
+        <p:cxnSp>
+          <p:nvCxnSpPr>
+            <p:cNvPr id="49" name="Straight Arrow Connector 48">
+              <a:extLst>
+                <a:ext uri="{FF2B5EF4-FFF2-40B4-BE49-F238E27FC236}">
+                  <a16:creationId xmlns:a16="http://schemas.microsoft.com/office/drawing/2014/main" id="{EA244CC3-F17E-102E-BF10-FC3BA680C682}"/>
+                </a:ext>
+              </a:extLst>
+            </p:cNvPr>
+            <p:cNvCxnSpPr>
+              <a:cxnSpLocks/>
+              <a:stCxn id="35" idx="2"/>
+            </p:cNvCxnSpPr>
+            <p:nvPr/>
+          </p:nvCxnSpPr>
+          <p:spPr>
+            <a:xfrm>
+              <a:off x="2135435" y="4234913"/>
+              <a:ext cx="0" cy="294255"/>
+            </a:xfrm>
+            <a:prstGeom prst="straightConnector1">
+              <a:avLst/>
+            </a:prstGeom>
+            <a:ln w="19050">
+              <a:solidFill>
+                <a:schemeClr val="tx1"/>
+              </a:solidFill>
+              <a:headEnd type="none" w="med" len="med"/>
+              <a:tailEnd type="arrow" w="med" len="med"/>
+            </a:ln>
+          </p:spPr>
+          <p:style>
+            <a:lnRef idx="1">
+              <a:schemeClr val="accent1"/>
+            </a:lnRef>
+            <a:fillRef idx="0">
+              <a:schemeClr val="accent1"/>
+            </a:fillRef>
+            <a:effectRef idx="0">
+              <a:schemeClr val="accent1"/>
+            </a:effectRef>
+            <a:fontRef idx="minor">
+              <a:schemeClr val="tx1"/>
+            </a:fontRef>
+          </p:style>
+        </p:cxnSp>
+        <p:sp>
+          <p:nvSpPr>
+            <p:cNvPr id="50" name="TextBox 49">
+              <a:extLst>
+                <a:ext uri="{FF2B5EF4-FFF2-40B4-BE49-F238E27FC236}">
+                  <a16:creationId xmlns:a16="http://schemas.microsoft.com/office/drawing/2014/main" id="{C8F812A7-7034-446A-39B3-B8D6A9E94B08}"/>
+                </a:ext>
+              </a:extLst>
+            </p:cNvPr>
+            <p:cNvSpPr txBox="1"/>
+            <p:nvPr/>
+          </p:nvSpPr>
+          <p:spPr>
+            <a:xfrm>
+              <a:off x="617816" y="6447229"/>
+              <a:ext cx="6153091" cy="471958"/>
+            </a:xfrm>
+            <a:prstGeom prst="rect">
+              <a:avLst/>
+            </a:prstGeom>
+            <a:noFill/>
+            <a:ln w="19050">
+              <a:solidFill>
+                <a:schemeClr val="accent5">
+                  <a:lumMod val="75000"/>
+                </a:schemeClr>
+              </a:solidFill>
+            </a:ln>
+          </p:spPr>
+          <p:txBody>
+            <a:bodyPr wrap="square" rtlCol="0">
+              <a:spAutoFit/>
+            </a:bodyPr>
+            <a:lstStyle/>
+            <a:p>
+              <a:pPr algn="ctr"/>
+              <a:r>
+                <a:rPr lang="en-US" sz="1050" b="1" dirty="0">
+                  <a:latin typeface="Times New Roman" panose="02020603050405020304" pitchFamily="18" charset="0"/>
+                  <a:cs typeface="Times New Roman" panose="02020603050405020304" pitchFamily="18" charset="0"/>
+                </a:rPr>
+                <a:t>FASTA and GFF generated</a:t>
+              </a:r>
+            </a:p>
+            <a:p>
+              <a:pPr algn="ctr"/>
+              <a:r>
+                <a:rPr lang="en-US" sz="1050" dirty="0">
+                  <a:latin typeface="Times New Roman" panose="02020603050405020304" pitchFamily="18" charset="0"/>
+                  <a:cs typeface="Times New Roman" panose="02020603050405020304" pitchFamily="18" charset="0"/>
+                </a:rPr>
+                <a:t>For each </a:t>
+              </a:r>
+              <a:r>
+                <a:rPr lang="en-US" sz="1050" i="1" dirty="0">
+                  <a:latin typeface="Times New Roman" panose="02020603050405020304" pitchFamily="18" charset="0"/>
+                  <a:cs typeface="Times New Roman" panose="02020603050405020304" pitchFamily="18" charset="0"/>
+                </a:rPr>
+                <a:t>Fusarium </a:t>
+              </a:r>
+              <a:r>
+                <a:rPr lang="en-US" sz="1050" dirty="0">
+                  <a:latin typeface="Times New Roman" panose="02020603050405020304" pitchFamily="18" charset="0"/>
+                  <a:cs typeface="Times New Roman" panose="02020603050405020304" pitchFamily="18" charset="0"/>
+                </a:rPr>
+                <a:t>assembly included, a candidate effector FASTA and GFF file is generated using various custom python scripts. </a:t>
+              </a:r>
+            </a:p>
+          </p:txBody>
+        </p:sp>
+        <p:cxnSp>
+          <p:nvCxnSpPr>
+            <p:cNvPr id="51" name="Straight Arrow Connector 50">
+              <a:extLst>
+                <a:ext uri="{FF2B5EF4-FFF2-40B4-BE49-F238E27FC236}">
+                  <a16:creationId xmlns:a16="http://schemas.microsoft.com/office/drawing/2014/main" id="{085083E8-AE12-9C4E-9838-224450859E01}"/>
+                </a:ext>
+              </a:extLst>
+            </p:cNvPr>
+            <p:cNvCxnSpPr>
+              <a:cxnSpLocks/>
+              <a:stCxn id="37" idx="2"/>
+              <a:endCxn id="50" idx="0"/>
+            </p:cNvCxnSpPr>
+            <p:nvPr/>
+          </p:nvCxnSpPr>
+          <p:spPr>
+            <a:xfrm flipH="1">
+              <a:off x="3694362" y="6258483"/>
+              <a:ext cx="1" cy="188746"/>
+            </a:xfrm>
+            <a:prstGeom prst="straightConnector1">
+              <a:avLst/>
+            </a:prstGeom>
+            <a:ln w="19050">
+              <a:solidFill>
+                <a:schemeClr val="tx1"/>
+              </a:solidFill>
+              <a:headEnd type="none" w="med" len="med"/>
+              <a:tailEnd type="arrow" w="med" len="med"/>
+            </a:ln>
+          </p:spPr>
+          <p:style>
+            <a:lnRef idx="1">
+              <a:schemeClr val="accent1"/>
+            </a:lnRef>
+            <a:fillRef idx="0">
+              <a:schemeClr val="accent1"/>
+            </a:fillRef>
+            <a:effectRef idx="0">
+              <a:schemeClr val="accent1"/>
+            </a:effectRef>
+            <a:fontRef idx="minor">
+              <a:schemeClr val="tx1"/>
+            </a:fontRef>
+          </p:style>
+        </p:cxnSp>
+        <p:sp>
+          <p:nvSpPr>
+            <p:cNvPr id="122" name="TextBox 121">
+              <a:extLst>
+                <a:ext uri="{FF2B5EF4-FFF2-40B4-BE49-F238E27FC236}">
+                  <a16:creationId xmlns:a16="http://schemas.microsoft.com/office/drawing/2014/main" id="{9A0F104F-1CAC-EE54-751C-52AA12B72BEB}"/>
+                </a:ext>
+              </a:extLst>
+            </p:cNvPr>
+            <p:cNvSpPr txBox="1"/>
+            <p:nvPr/>
+          </p:nvSpPr>
+          <p:spPr>
+            <a:xfrm>
+              <a:off x="617816" y="7183875"/>
+              <a:ext cx="6153091" cy="471958"/>
+            </a:xfrm>
+            <a:prstGeom prst="rect">
+              <a:avLst/>
+            </a:prstGeom>
+            <a:noFill/>
+            <a:ln w="19050">
+              <a:solidFill>
+                <a:srgbClr val="538234"/>
+              </a:solidFill>
+            </a:ln>
+          </p:spPr>
+          <p:txBody>
+            <a:bodyPr wrap="square" rtlCol="0">
+              <a:spAutoFit/>
+            </a:bodyPr>
+            <a:lstStyle/>
+            <a:p>
+              <a:pPr algn="ctr"/>
+              <a:r>
+                <a:rPr lang="en-GB" sz="1050" b="1" dirty="0">
+                  <a:latin typeface="Times New Roman" panose="02020603050405020304" pitchFamily="18" charset="0"/>
+                  <a:cs typeface="Times New Roman" panose="02020603050405020304" pitchFamily="18" charset="0"/>
+                </a:rPr>
+                <a:t>Candidate effector clustering</a:t>
+              </a:r>
+            </a:p>
+            <a:p>
+              <a:pPr algn="ctr"/>
+              <a:r>
+                <a:rPr lang="en-US" sz="1050" dirty="0">
+                  <a:latin typeface="Times New Roman"/>
+                  <a:cs typeface="Times New Roman"/>
+                </a:rPr>
+                <a:t>             Candidate effector sequences are from all assemblies are combined into one FASTA and clustered using CD-HIT (v4.8.1) (80% identity).  </a:t>
+              </a:r>
+              <a:endParaRPr lang="en-US" sz="1050" dirty="0">
+                <a:latin typeface="Times New Roman" panose="02020603050405020304" pitchFamily="18" charset="0"/>
+                <a:cs typeface="Times New Roman" panose="02020603050405020304" pitchFamily="18" charset="0"/>
+              </a:endParaRPr>
+            </a:p>
+          </p:txBody>
+        </p:sp>
+        <p:cxnSp>
+          <p:nvCxnSpPr>
+            <p:cNvPr id="163" name="Straight Arrow Connector 162">
+              <a:extLst>
+                <a:ext uri="{FF2B5EF4-FFF2-40B4-BE49-F238E27FC236}">
+                  <a16:creationId xmlns:a16="http://schemas.microsoft.com/office/drawing/2014/main" id="{B5BEDAD8-B981-7F55-7E04-9EDD87DD9D71}"/>
+                </a:ext>
+              </a:extLst>
+            </p:cNvPr>
+            <p:cNvCxnSpPr>
+              <a:cxnSpLocks/>
+              <a:stCxn id="50" idx="2"/>
+              <a:endCxn id="122" idx="0"/>
+            </p:cNvCxnSpPr>
+            <p:nvPr/>
+          </p:nvCxnSpPr>
+          <p:spPr>
+            <a:xfrm>
+              <a:off x="3694362" y="6919187"/>
+              <a:ext cx="0" cy="264688"/>
+            </a:xfrm>
+            <a:prstGeom prst="straightConnector1">
+              <a:avLst/>
+            </a:prstGeom>
+            <a:ln w="19050">
+              <a:solidFill>
+                <a:schemeClr val="tx1"/>
+              </a:solidFill>
+              <a:headEnd type="none" w="med" len="med"/>
+              <a:tailEnd type="arrow" w="med" len="med"/>
+            </a:ln>
+          </p:spPr>
+          <p:style>
+            <a:lnRef idx="1">
+              <a:schemeClr val="accent1"/>
+            </a:lnRef>
+            <a:fillRef idx="0">
+              <a:schemeClr val="accent1"/>
+            </a:fillRef>
+            <a:effectRef idx="0">
+              <a:schemeClr val="accent1"/>
+            </a:effectRef>
+            <a:fontRef idx="minor">
+              <a:schemeClr val="tx1"/>
+            </a:fontRef>
+          </p:style>
+        </p:cxnSp>
+        <p:sp>
+          <p:nvSpPr>
+            <p:cNvPr id="136" name="Oval 135">
+              <a:extLst>
+                <a:ext uri="{FF2B5EF4-FFF2-40B4-BE49-F238E27FC236}">
+                  <a16:creationId xmlns:a16="http://schemas.microsoft.com/office/drawing/2014/main" id="{EC7CDFCA-5FC6-5160-BFAA-511EA270E59B}"/>
+                </a:ext>
+              </a:extLst>
+            </p:cNvPr>
+            <p:cNvSpPr/>
+            <p:nvPr/>
+          </p:nvSpPr>
+          <p:spPr>
+            <a:xfrm rot="20647326">
+              <a:off x="66924" y="7180140"/>
+              <a:ext cx="1200177" cy="537117"/>
+            </a:xfrm>
+            <a:prstGeom prst="ellipse">
+              <a:avLst/>
+            </a:prstGeom>
             <a:solidFill>
-              <a:schemeClr val="tx1"/>
+              <a:schemeClr val="accent2">
+                <a:lumMod val="20000"/>
+                <a:lumOff val="80000"/>
+              </a:schemeClr>
             </a:solidFill>
-            <a:prstDash val="lgDash"/>
-          </a:ln>
-        </p:spPr>
-        <p:style>
-          <a:lnRef idx="2">
-            <a:schemeClr val="accent1">
-              <a:shade val="50000"/>
-            </a:schemeClr>
-          </a:lnRef>
-          <a:fillRef idx="1">
-            <a:schemeClr val="accent1"/>
-          </a:fillRef>
-          <a:effectRef idx="0">
-            <a:schemeClr val="accent1"/>
-          </a:effectRef>
-          <a:fontRef idx="minor">
-            <a:schemeClr val="lt1"/>
-          </a:fontRef>
-        </p:style>
-        <p:txBody>
-          <a:bodyPr rtlCol="0" anchor="ctr"/>
-          <a:lstStyle/>
-          <a:p>
-            <a:pPr algn="ctr"/>
-            <a:r>
-              <a:rPr lang="en-US" sz="2000" b="1" i="1" dirty="0">
+            <a:ln w="19050">
+              <a:solidFill>
+                <a:srgbClr val="FF0000"/>
+              </a:solidFill>
+            </a:ln>
+          </p:spPr>
+          <p:style>
+            <a:lnRef idx="2">
+              <a:schemeClr val="accent1">
+                <a:shade val="50000"/>
+              </a:schemeClr>
+            </a:lnRef>
+            <a:fillRef idx="1">
+              <a:schemeClr val="accent1"/>
+            </a:fillRef>
+            <a:effectRef idx="0">
+              <a:schemeClr val="accent1"/>
+            </a:effectRef>
+            <a:fontRef idx="minor">
+              <a:schemeClr val="lt1"/>
+            </a:fontRef>
+          </p:style>
+          <p:txBody>
+            <a:bodyPr rtlCol="0" anchor="ctr"/>
+            <a:lstStyle/>
+            <a:p>
+              <a:pPr algn="ctr"/>
+              <a:r>
+                <a:rPr lang="en-US" sz="1000" b="1" i="1" dirty="0">
+                  <a:solidFill>
+                    <a:schemeClr val="tx1"/>
+                  </a:solidFill>
+                  <a:latin typeface="Times New Roman" panose="02020603050405020304" pitchFamily="18" charset="0"/>
+                  <a:cs typeface="Times New Roman" panose="02020603050405020304" pitchFamily="18" charset="0"/>
+                </a:rPr>
+                <a:t>Fusarium</a:t>
+              </a:r>
+              <a:endParaRPr lang="en-US" sz="1000" b="1" dirty="0">
                 <a:solidFill>
                   <a:schemeClr val="tx1"/>
                 </a:solidFill>
                 <a:latin typeface="Times New Roman" panose="02020603050405020304" pitchFamily="18" charset="0"/>
                 <a:cs typeface="Times New Roman" panose="02020603050405020304" pitchFamily="18" charset="0"/>
-              </a:rPr>
-              <a:t>Fusarium</a:t>
-            </a:r>
-            <a:r>
-              <a:rPr lang="en-US" sz="2000" b="1" dirty="0">
-                <a:solidFill>
-                  <a:schemeClr val="tx1"/>
-                </a:solidFill>
-                <a:latin typeface="Times New Roman" panose="02020603050405020304" pitchFamily="18" charset="0"/>
-                <a:cs typeface="Times New Roman" panose="02020603050405020304" pitchFamily="18" charset="0"/>
-              </a:rPr>
-              <a:t> Assemblies</a:t>
-            </a:r>
-          </a:p>
-          <a:p>
-            <a:pPr algn="ctr"/>
-            <a:r>
-              <a:rPr lang="en-US" sz="1000" i="1" dirty="0">
-                <a:solidFill>
-                  <a:schemeClr val="tx1"/>
-                </a:solidFill>
-                <a:latin typeface="Times New Roman" panose="02020603050405020304" pitchFamily="18" charset="0"/>
-                <a:cs typeface="Times New Roman" panose="02020603050405020304" pitchFamily="18" charset="0"/>
-              </a:rPr>
-              <a:t>Fusarium</a:t>
-            </a:r>
-            <a:r>
-              <a:rPr lang="en-US" sz="1000" dirty="0">
-                <a:solidFill>
-                  <a:schemeClr val="tx1"/>
-                </a:solidFill>
-                <a:latin typeface="Times New Roman" panose="02020603050405020304" pitchFamily="18" charset="0"/>
-                <a:cs typeface="Times New Roman" panose="02020603050405020304" pitchFamily="18" charset="0"/>
-              </a:rPr>
-              <a:t> species genome assemblies in FASTA format, as well as a list of the assemblies and a </a:t>
-            </a:r>
-            <a:r>
-              <a:rPr lang="en-US" sz="1000" i="1" dirty="0">
-                <a:solidFill>
-                  <a:schemeClr val="tx1"/>
-                </a:solidFill>
-                <a:latin typeface="Times New Roman" panose="02020603050405020304" pitchFamily="18" charset="0"/>
-                <a:cs typeface="Times New Roman" panose="02020603050405020304" pitchFamily="18" charset="0"/>
-              </a:rPr>
-              <a:t>mimp </a:t>
-            </a:r>
-            <a:r>
-              <a:rPr lang="en-US" sz="1000" dirty="0">
-                <a:solidFill>
-                  <a:schemeClr val="tx1"/>
-                </a:solidFill>
-                <a:latin typeface="Times New Roman" panose="02020603050405020304" pitchFamily="18" charset="0"/>
-                <a:cs typeface="Times New Roman" panose="02020603050405020304" pitchFamily="18" charset="0"/>
-              </a:rPr>
-              <a:t>profile HMM, are prepared as input. </a:t>
-            </a:r>
-          </a:p>
-        </p:txBody>
-      </p:sp>
-      <p:sp>
-        <p:nvSpPr>
-          <p:cNvPr id="29" name="TextBox 28">
-            <a:extLst>
-              <a:ext uri="{FF2B5EF4-FFF2-40B4-BE49-F238E27FC236}">
-                <a16:creationId xmlns:a16="http://schemas.microsoft.com/office/drawing/2014/main" id="{7ACB2F06-EF52-CA7D-F30C-9FDD268FAE7D}"/>
-              </a:ext>
-            </a:extLst>
-          </p:cNvPr>
-          <p:cNvSpPr txBox="1"/>
-          <p:nvPr/>
-        </p:nvSpPr>
-        <p:spPr>
-          <a:xfrm>
-            <a:off x="617815" y="961093"/>
-            <a:ext cx="6153098" cy="577081"/>
-          </a:xfrm>
-          <a:prstGeom prst="rect">
-            <a:avLst/>
-          </a:prstGeom>
-          <a:noFill/>
-          <a:ln w="19050">
-            <a:solidFill>
-              <a:schemeClr val="accent4"/>
-            </a:solidFill>
-          </a:ln>
-        </p:spPr>
-        <p:txBody>
-          <a:bodyPr wrap="square" rtlCol="0">
-            <a:spAutoFit/>
-          </a:bodyPr>
-          <a:lstStyle/>
-          <a:p>
-            <a:pPr algn="ctr"/>
-            <a:r>
-              <a:rPr lang="en-US" sz="1050" b="1" i="1" dirty="0">
-                <a:latin typeface="Times New Roman" panose="02020603050405020304" pitchFamily="18" charset="0"/>
-                <a:cs typeface="Times New Roman" panose="02020603050405020304" pitchFamily="18" charset="0"/>
-              </a:rPr>
-              <a:t>Mimp </a:t>
-            </a:r>
-            <a:r>
-              <a:rPr lang="en-US" sz="1050" b="1" dirty="0">
-                <a:latin typeface="Times New Roman" panose="02020603050405020304" pitchFamily="18" charset="0"/>
-                <a:cs typeface="Times New Roman" panose="02020603050405020304" pitchFamily="18" charset="0"/>
-              </a:rPr>
-              <a:t>identification</a:t>
-            </a:r>
-          </a:p>
-          <a:p>
-            <a:pPr algn="ctr"/>
-            <a:r>
-              <a:rPr lang="en-US" sz="1050" dirty="0">
-                <a:latin typeface="Times New Roman" panose="02020603050405020304" pitchFamily="18" charset="0"/>
-                <a:cs typeface="Times New Roman" panose="02020603050405020304" pitchFamily="18" charset="0"/>
-              </a:rPr>
-              <a:t>Each </a:t>
-            </a:r>
-            <a:r>
-              <a:rPr lang="en-US" sz="1050" i="1" dirty="0">
-                <a:latin typeface="Times New Roman" panose="02020603050405020304" pitchFamily="18" charset="0"/>
-                <a:cs typeface="Times New Roman" panose="02020603050405020304" pitchFamily="18" charset="0"/>
-              </a:rPr>
-              <a:t>Fusarium</a:t>
-            </a:r>
-            <a:r>
-              <a:rPr lang="en-US" sz="1050" dirty="0">
-                <a:latin typeface="Times New Roman" panose="02020603050405020304" pitchFamily="18" charset="0"/>
-                <a:cs typeface="Times New Roman" panose="02020603050405020304" pitchFamily="18" charset="0"/>
-              </a:rPr>
-              <a:t> assembly is searched for </a:t>
-            </a:r>
-            <a:r>
-              <a:rPr lang="en-US" sz="1050" i="1" dirty="0">
-                <a:latin typeface="Times New Roman" panose="02020603050405020304" pitchFamily="18" charset="0"/>
-                <a:cs typeface="Times New Roman" panose="02020603050405020304" pitchFamily="18" charset="0"/>
-              </a:rPr>
-              <a:t>mimps </a:t>
-            </a:r>
-            <a:r>
-              <a:rPr lang="en-US" sz="1050" dirty="0">
-                <a:latin typeface="Times New Roman" panose="02020603050405020304" pitchFamily="18" charset="0"/>
-                <a:cs typeface="Times New Roman" panose="02020603050405020304" pitchFamily="18" charset="0"/>
-              </a:rPr>
-              <a:t>using a custom python script (using </a:t>
-            </a:r>
-            <a:r>
-              <a:rPr lang="en-US" sz="1050" i="1" dirty="0">
-                <a:latin typeface="Times New Roman" panose="02020603050405020304" pitchFamily="18" charset="0"/>
-                <a:cs typeface="Times New Roman" panose="02020603050405020304" pitchFamily="18" charset="0"/>
-              </a:rPr>
-              <a:t>mimp </a:t>
-            </a:r>
-            <a:r>
-              <a:rPr lang="en-US" sz="1050" dirty="0">
-                <a:latin typeface="Times New Roman" panose="02020603050405020304" pitchFamily="18" charset="0"/>
-                <a:cs typeface="Times New Roman" panose="02020603050405020304" pitchFamily="18" charset="0"/>
-              </a:rPr>
-              <a:t>TIRs) and NHMMER </a:t>
-            </a:r>
-            <a:r>
-              <a:rPr lang="en-GB" sz="1050" dirty="0">
-                <a:latin typeface="Times New Roman" panose="02020603050405020304" pitchFamily="18" charset="0"/>
-                <a:ea typeface="Times New Roman" panose="02020603050405020304" pitchFamily="18" charset="0"/>
-              </a:rPr>
-              <a:t>(3.3.1) (</a:t>
-            </a:r>
-            <a:r>
-              <a:rPr lang="en-US" sz="1050" dirty="0">
-                <a:latin typeface="Times New Roman" panose="02020603050405020304" pitchFamily="18" charset="0"/>
-                <a:cs typeface="Times New Roman" panose="02020603050405020304" pitchFamily="18" charset="0"/>
-              </a:rPr>
-              <a:t>using a </a:t>
-            </a:r>
-            <a:r>
-              <a:rPr lang="en-US" sz="1050" i="1" dirty="0">
-                <a:latin typeface="Times New Roman" panose="02020603050405020304" pitchFamily="18" charset="0"/>
-                <a:cs typeface="Times New Roman" panose="02020603050405020304" pitchFamily="18" charset="0"/>
-              </a:rPr>
-              <a:t>mimp </a:t>
-            </a:r>
-            <a:r>
-              <a:rPr lang="en-US" sz="1050" dirty="0">
-                <a:latin typeface="Times New Roman" panose="02020603050405020304" pitchFamily="18" charset="0"/>
-                <a:cs typeface="Times New Roman" panose="02020603050405020304" pitchFamily="18" charset="0"/>
-              </a:rPr>
-              <a:t>profile-HMM).</a:t>
-            </a:r>
-          </a:p>
-        </p:txBody>
-      </p:sp>
-      <p:sp>
-        <p:nvSpPr>
-          <p:cNvPr id="30" name="TextBox 29">
-            <a:extLst>
-              <a:ext uri="{FF2B5EF4-FFF2-40B4-BE49-F238E27FC236}">
-                <a16:creationId xmlns:a16="http://schemas.microsoft.com/office/drawing/2014/main" id="{691DA270-25BC-ECFF-7EED-18C8390263C9}"/>
-              </a:ext>
-            </a:extLst>
-          </p:cNvPr>
-          <p:cNvSpPr txBox="1"/>
-          <p:nvPr/>
-        </p:nvSpPr>
-        <p:spPr>
-          <a:xfrm>
-            <a:off x="617814" y="1680837"/>
-            <a:ext cx="6153099" cy="577081"/>
-          </a:xfrm>
-          <a:prstGeom prst="rect">
-            <a:avLst/>
-          </a:prstGeom>
-          <a:noFill/>
-          <a:ln w="19050">
-            <a:solidFill>
-              <a:schemeClr val="accent4"/>
-            </a:solidFill>
-          </a:ln>
-        </p:spPr>
-        <p:txBody>
-          <a:bodyPr wrap="square" rtlCol="0">
-            <a:spAutoFit/>
-          </a:bodyPr>
-          <a:lstStyle/>
-          <a:p>
-            <a:pPr algn="ctr"/>
-            <a:r>
-              <a:rPr lang="en-US" sz="1050" b="1" i="1" dirty="0">
-                <a:latin typeface="Times New Roman" panose="02020603050405020304" pitchFamily="18" charset="0"/>
-                <a:cs typeface="Times New Roman" panose="02020603050405020304" pitchFamily="18" charset="0"/>
-              </a:rPr>
-              <a:t>Mimp </a:t>
-            </a:r>
-            <a:r>
-              <a:rPr lang="en-US" sz="1050" b="1" dirty="0">
-                <a:latin typeface="Times New Roman" panose="02020603050405020304" pitchFamily="18" charset="0"/>
-                <a:cs typeface="Times New Roman" panose="02020603050405020304" pitchFamily="18" charset="0"/>
-              </a:rPr>
-              <a:t>region sequence identification</a:t>
-            </a:r>
-          </a:p>
-          <a:p>
-            <a:pPr algn="ctr"/>
-            <a:r>
-              <a:rPr lang="en-US" sz="1050" dirty="0">
-                <a:latin typeface="Times New Roman" panose="02020603050405020304" pitchFamily="18" charset="0"/>
-                <a:cs typeface="Times New Roman" panose="02020603050405020304" pitchFamily="18" charset="0"/>
-              </a:rPr>
-              <a:t>Identify regions 2.5kb either side of a </a:t>
-            </a:r>
-            <a:r>
-              <a:rPr lang="en-US" sz="1050" i="1" dirty="0">
-                <a:latin typeface="Times New Roman" panose="02020603050405020304" pitchFamily="18" charset="0"/>
-                <a:cs typeface="Times New Roman" panose="02020603050405020304" pitchFamily="18" charset="0"/>
-              </a:rPr>
-              <a:t>mimp </a:t>
-            </a:r>
-            <a:r>
-              <a:rPr lang="en-US" sz="1050" dirty="0">
-                <a:latin typeface="Times New Roman" panose="02020603050405020304" pitchFamily="18" charset="0"/>
-                <a:cs typeface="Times New Roman" panose="02020603050405020304" pitchFamily="18" charset="0"/>
-              </a:rPr>
-              <a:t>(</a:t>
-            </a:r>
-            <a:r>
-              <a:rPr lang="en-US" sz="1050" i="1" dirty="0">
-                <a:latin typeface="Times New Roman" panose="02020603050405020304" pitchFamily="18" charset="0"/>
-                <a:cs typeface="Times New Roman" panose="02020603050405020304" pitchFamily="18" charset="0"/>
-              </a:rPr>
-              <a:t>mimp</a:t>
-            </a:r>
-            <a:r>
-              <a:rPr lang="en-US" sz="1050" dirty="0">
-                <a:latin typeface="Times New Roman" panose="02020603050405020304" pitchFamily="18" charset="0"/>
-                <a:cs typeface="Times New Roman" panose="02020603050405020304" pitchFamily="18" charset="0"/>
-              </a:rPr>
-              <a:t> region), generating a </a:t>
-            </a:r>
-            <a:r>
-              <a:rPr lang="en-US" sz="1050" i="1" dirty="0">
-                <a:latin typeface="Times New Roman" panose="02020603050405020304" pitchFamily="18" charset="0"/>
-                <a:cs typeface="Times New Roman" panose="02020603050405020304" pitchFamily="18" charset="0"/>
-              </a:rPr>
-              <a:t>mimp </a:t>
-            </a:r>
-            <a:r>
-              <a:rPr lang="en-US" sz="1050" dirty="0">
-                <a:latin typeface="Times New Roman" panose="02020603050405020304" pitchFamily="18" charset="0"/>
-                <a:cs typeface="Times New Roman" panose="02020603050405020304" pitchFamily="18" charset="0"/>
-              </a:rPr>
-              <a:t>region GFF file for each genome assembly. </a:t>
-            </a:r>
-          </a:p>
-        </p:txBody>
-      </p:sp>
-      <p:sp>
-        <p:nvSpPr>
-          <p:cNvPr id="31" name="TextBox 30">
-            <a:extLst>
-              <a:ext uri="{FF2B5EF4-FFF2-40B4-BE49-F238E27FC236}">
-                <a16:creationId xmlns:a16="http://schemas.microsoft.com/office/drawing/2014/main" id="{5540790C-75EC-AE43-DFFA-A968FC71989D}"/>
-              </a:ext>
-            </a:extLst>
-          </p:cNvPr>
-          <p:cNvSpPr txBox="1"/>
-          <p:nvPr/>
-        </p:nvSpPr>
-        <p:spPr>
-          <a:xfrm>
-            <a:off x="617817" y="2438227"/>
-            <a:ext cx="3035236" cy="1061829"/>
-          </a:xfrm>
-          <a:prstGeom prst="rect">
-            <a:avLst/>
-          </a:prstGeom>
-          <a:noFill/>
-          <a:ln w="19050">
-            <a:solidFill>
-              <a:schemeClr val="accent4"/>
-            </a:solidFill>
-          </a:ln>
-        </p:spPr>
-        <p:txBody>
-          <a:bodyPr wrap="square" rtlCol="0">
-            <a:spAutoFit/>
-          </a:bodyPr>
-          <a:lstStyle/>
-          <a:p>
-            <a:pPr algn="ctr"/>
-            <a:r>
-              <a:rPr lang="en-US" sz="1050" b="1" dirty="0">
-                <a:latin typeface="Times New Roman" panose="02020603050405020304" pitchFamily="18" charset="0"/>
-                <a:cs typeface="Times New Roman" panose="02020603050405020304" pitchFamily="18" charset="0"/>
-              </a:rPr>
-              <a:t>Augustus regions identification</a:t>
-            </a:r>
-          </a:p>
-          <a:p>
-            <a:pPr algn="ctr"/>
-            <a:r>
-              <a:rPr lang="en-US" sz="1050" dirty="0">
-                <a:latin typeface="Times New Roman" panose="02020603050405020304" pitchFamily="18" charset="0"/>
-                <a:cs typeface="Times New Roman" panose="02020603050405020304" pitchFamily="18" charset="0"/>
-              </a:rPr>
-              <a:t>Expand 20kb either side of the </a:t>
-            </a:r>
-            <a:r>
-              <a:rPr lang="en-US" sz="1050" i="1" dirty="0">
-                <a:latin typeface="Times New Roman" panose="02020603050405020304" pitchFamily="18" charset="0"/>
-                <a:cs typeface="Times New Roman" panose="02020603050405020304" pitchFamily="18" charset="0"/>
-              </a:rPr>
-              <a:t>mimp </a:t>
-            </a:r>
-            <a:r>
-              <a:rPr lang="en-US" sz="1050" dirty="0">
-                <a:latin typeface="Times New Roman" panose="02020603050405020304" pitchFamily="18" charset="0"/>
-                <a:cs typeface="Times New Roman" panose="02020603050405020304" pitchFamily="18" charset="0"/>
-              </a:rPr>
-              <a:t>regions to identify regions for AUGUSTUS (v3.3.3) annotation. Generate an Augustus (v3.3.3) region GFF, and FASTAs where all non-Augustus have been hard masked.   </a:t>
-            </a:r>
-          </a:p>
-        </p:txBody>
-      </p:sp>
-      <p:sp>
-        <p:nvSpPr>
-          <p:cNvPr id="32" name="TextBox 31">
-            <a:extLst>
-              <a:ext uri="{FF2B5EF4-FFF2-40B4-BE49-F238E27FC236}">
-                <a16:creationId xmlns:a16="http://schemas.microsoft.com/office/drawing/2014/main" id="{6324A5E0-C5F2-41E9-B0B7-ED4197F885BA}"/>
-              </a:ext>
-            </a:extLst>
-          </p:cNvPr>
-          <p:cNvSpPr txBox="1"/>
-          <p:nvPr/>
-        </p:nvSpPr>
-        <p:spPr>
-          <a:xfrm>
-            <a:off x="3750979" y="2438227"/>
-            <a:ext cx="3019934" cy="1054135"/>
-          </a:xfrm>
-          <a:prstGeom prst="rect">
-            <a:avLst/>
-          </a:prstGeom>
-          <a:noFill/>
-          <a:ln w="19050">
-            <a:solidFill>
-              <a:schemeClr val="accent4"/>
-            </a:solidFill>
-          </a:ln>
-        </p:spPr>
-        <p:txBody>
-          <a:bodyPr wrap="square" rtlCol="0">
-            <a:spAutoFit/>
-          </a:bodyPr>
-          <a:lstStyle/>
-          <a:p>
-            <a:pPr algn="ctr"/>
-            <a:r>
-              <a:rPr lang="en-US" sz="1050" b="1" dirty="0">
-                <a:latin typeface="Times New Roman" panose="02020603050405020304" pitchFamily="18" charset="0"/>
-                <a:cs typeface="Times New Roman" panose="02020603050405020304" pitchFamily="18" charset="0"/>
-              </a:rPr>
-              <a:t>Mask non-</a:t>
-            </a:r>
-            <a:r>
-              <a:rPr lang="en-US" sz="1050" b="1" i="1" dirty="0">
-                <a:latin typeface="Times New Roman" panose="02020603050405020304" pitchFamily="18" charset="0"/>
-                <a:cs typeface="Times New Roman" panose="02020603050405020304" pitchFamily="18" charset="0"/>
-              </a:rPr>
-              <a:t>mimp</a:t>
-            </a:r>
-            <a:r>
-              <a:rPr lang="en-US" sz="1050" b="1" dirty="0">
-                <a:latin typeface="Times New Roman" panose="02020603050405020304" pitchFamily="18" charset="0"/>
-                <a:cs typeface="Times New Roman" panose="02020603050405020304" pitchFamily="18" charset="0"/>
-              </a:rPr>
-              <a:t> regions</a:t>
-            </a:r>
-          </a:p>
-          <a:p>
-            <a:pPr algn="ctr"/>
-            <a:r>
-              <a:rPr lang="en-US" sz="1050" dirty="0">
-                <a:latin typeface="Times New Roman" panose="02020603050405020304" pitchFamily="18" charset="0"/>
-                <a:cs typeface="Times New Roman" panose="02020603050405020304" pitchFamily="18" charset="0"/>
-              </a:rPr>
-              <a:t>Using the </a:t>
-            </a:r>
-            <a:r>
-              <a:rPr lang="en-US" sz="1050" i="1" dirty="0">
-                <a:latin typeface="Times New Roman" panose="02020603050405020304" pitchFamily="18" charset="0"/>
-                <a:cs typeface="Times New Roman" panose="02020603050405020304" pitchFamily="18" charset="0"/>
-              </a:rPr>
-              <a:t>mimp </a:t>
-            </a:r>
-            <a:r>
-              <a:rPr lang="en-US" sz="1050" dirty="0">
-                <a:latin typeface="Times New Roman" panose="02020603050405020304" pitchFamily="18" charset="0"/>
-                <a:cs typeface="Times New Roman" panose="02020603050405020304" pitchFamily="18" charset="0"/>
-              </a:rPr>
-              <a:t>region GFF, create a </a:t>
-            </a:r>
-            <a:r>
-              <a:rPr lang="en-US" sz="1050" i="1" dirty="0">
-                <a:latin typeface="Times New Roman" panose="02020603050405020304" pitchFamily="18" charset="0"/>
-                <a:cs typeface="Times New Roman" panose="02020603050405020304" pitchFamily="18" charset="0"/>
-              </a:rPr>
-              <a:t>mimp</a:t>
-            </a:r>
-            <a:r>
-              <a:rPr lang="en-US" sz="1050" dirty="0">
-                <a:latin typeface="Times New Roman" panose="02020603050405020304" pitchFamily="18" charset="0"/>
-                <a:cs typeface="Times New Roman" panose="02020603050405020304" pitchFamily="18" charset="0"/>
-              </a:rPr>
-              <a:t> region FASTAS, where all non-</a:t>
-            </a:r>
-            <a:r>
-              <a:rPr lang="en-US" sz="1050" i="1" dirty="0">
-                <a:latin typeface="Times New Roman" panose="02020603050405020304" pitchFamily="18" charset="0"/>
-                <a:cs typeface="Times New Roman" panose="02020603050405020304" pitchFamily="18" charset="0"/>
-              </a:rPr>
-              <a:t>mimp </a:t>
-            </a:r>
-            <a:r>
-              <a:rPr lang="en-US" sz="1050" dirty="0">
-                <a:latin typeface="Times New Roman" panose="02020603050405020304" pitchFamily="18" charset="0"/>
-                <a:cs typeface="Times New Roman" panose="02020603050405020304" pitchFamily="18" charset="0"/>
-              </a:rPr>
-              <a:t>regions have been hard masked.</a:t>
-            </a:r>
-          </a:p>
-          <a:p>
-            <a:pPr algn="ctr"/>
-            <a:endParaRPr lang="en-US" sz="1050" dirty="0">
-              <a:latin typeface="Times New Roman" panose="02020603050405020304" pitchFamily="18" charset="0"/>
-              <a:cs typeface="Times New Roman" panose="02020603050405020304" pitchFamily="18" charset="0"/>
-            </a:endParaRPr>
-          </a:p>
-          <a:p>
-            <a:pPr algn="ctr"/>
-            <a:r>
-              <a:rPr lang="en-US" sz="1000" dirty="0">
-                <a:latin typeface="Times New Roman" panose="02020603050405020304" pitchFamily="18" charset="0"/>
-                <a:cs typeface="Times New Roman" panose="02020603050405020304" pitchFamily="18" charset="0"/>
-              </a:rPr>
-              <a:t> </a:t>
-            </a:r>
-            <a:endParaRPr lang="en-US" sz="900" dirty="0">
-              <a:latin typeface="Times New Roman" panose="02020603050405020304" pitchFamily="18" charset="0"/>
-              <a:cs typeface="Times New Roman" panose="02020603050405020304" pitchFamily="18" charset="0"/>
-            </a:endParaRPr>
-          </a:p>
-        </p:txBody>
-      </p:sp>
-      <p:sp>
-        <p:nvSpPr>
-          <p:cNvPr id="33" name="TextBox 32">
-            <a:extLst>
-              <a:ext uri="{FF2B5EF4-FFF2-40B4-BE49-F238E27FC236}">
-                <a16:creationId xmlns:a16="http://schemas.microsoft.com/office/drawing/2014/main" id="{B711EA04-8776-BB1F-533B-25F5827492B4}"/>
-              </a:ext>
-            </a:extLst>
-          </p:cNvPr>
-          <p:cNvSpPr txBox="1"/>
-          <p:nvPr/>
-        </p:nvSpPr>
-        <p:spPr>
-          <a:xfrm>
-            <a:off x="3750973" y="3628125"/>
-            <a:ext cx="3019934" cy="738664"/>
-          </a:xfrm>
-          <a:prstGeom prst="rect">
-            <a:avLst/>
-          </a:prstGeom>
-          <a:noFill/>
-          <a:ln w="19050">
-            <a:solidFill>
-              <a:srgbClr val="0070C0"/>
-            </a:solidFill>
-          </a:ln>
-        </p:spPr>
-        <p:txBody>
-          <a:bodyPr wrap="square" rtlCol="0">
-            <a:spAutoFit/>
-          </a:bodyPr>
-          <a:lstStyle/>
-          <a:p>
-            <a:pPr algn="ctr"/>
-            <a:r>
-              <a:rPr lang="en-US" sz="1050" b="1" dirty="0">
-                <a:latin typeface="Times New Roman" panose="02020603050405020304" pitchFamily="18" charset="0"/>
-                <a:cs typeface="Times New Roman" panose="02020603050405020304" pitchFamily="18" charset="0"/>
-              </a:rPr>
-              <a:t>ORF Prediction </a:t>
-            </a:r>
-          </a:p>
-          <a:p>
-            <a:pPr algn="ctr"/>
-            <a:r>
-              <a:rPr lang="en-US" sz="1050" dirty="0">
-                <a:latin typeface="Times New Roman" panose="02020603050405020304" pitchFamily="18" charset="0"/>
-                <a:cs typeface="Times New Roman" panose="02020603050405020304" pitchFamily="18" charset="0"/>
-              </a:rPr>
-              <a:t>Getorf from Emboss (v6.6.0.0) is used to find open reading frames (ORFs) in the 2.5kb region. </a:t>
-            </a:r>
-          </a:p>
-          <a:p>
-            <a:pPr algn="ctr"/>
-            <a:r>
-              <a:rPr lang="en-US" sz="900" dirty="0">
-                <a:latin typeface="Times New Roman" panose="02020603050405020304" pitchFamily="18" charset="0"/>
-                <a:cs typeface="Times New Roman" panose="02020603050405020304" pitchFamily="18" charset="0"/>
-              </a:rPr>
-              <a:t> </a:t>
-            </a:r>
-          </a:p>
-        </p:txBody>
-      </p:sp>
-      <p:sp>
-        <p:nvSpPr>
-          <p:cNvPr id="34" name="TextBox 33">
-            <a:extLst>
-              <a:ext uri="{FF2B5EF4-FFF2-40B4-BE49-F238E27FC236}">
-                <a16:creationId xmlns:a16="http://schemas.microsoft.com/office/drawing/2014/main" id="{2CF06320-44C5-7F77-6DA0-DC4B361DFD27}"/>
-              </a:ext>
-            </a:extLst>
-          </p:cNvPr>
-          <p:cNvSpPr txBox="1"/>
-          <p:nvPr/>
-        </p:nvSpPr>
-        <p:spPr>
-          <a:xfrm>
-            <a:off x="617816" y="4529168"/>
-            <a:ext cx="6153093" cy="415498"/>
-          </a:xfrm>
-          <a:prstGeom prst="rect">
-            <a:avLst/>
-          </a:prstGeom>
-          <a:noFill/>
-          <a:ln w="19050">
-            <a:solidFill>
-              <a:srgbClr val="0070C0"/>
-            </a:solidFill>
-          </a:ln>
-        </p:spPr>
-        <p:txBody>
-          <a:bodyPr wrap="square" rtlCol="0">
-            <a:spAutoFit/>
-          </a:bodyPr>
-          <a:lstStyle/>
-          <a:p>
-            <a:pPr algn="ctr"/>
-            <a:r>
-              <a:rPr lang="en-US" sz="1050" b="1" dirty="0">
-                <a:latin typeface="Times New Roman" panose="02020603050405020304" pitchFamily="18" charset="0"/>
-                <a:cs typeface="Times New Roman" panose="02020603050405020304" pitchFamily="18" charset="0"/>
-              </a:rPr>
-              <a:t>Signal peptide filtering</a:t>
-            </a:r>
-          </a:p>
-          <a:p>
-            <a:pPr algn="ctr"/>
-            <a:r>
-              <a:rPr lang="en-US" sz="1050" dirty="0">
-                <a:latin typeface="Times New Roman" panose="02020603050405020304" pitchFamily="18" charset="0"/>
-                <a:cs typeface="Times New Roman" panose="02020603050405020304" pitchFamily="18" charset="0"/>
-              </a:rPr>
-              <a:t>SignalP (4.1) is used search all AUGUSTUS gene models and ORFs for a signal peptide.</a:t>
-            </a:r>
-          </a:p>
-        </p:txBody>
-      </p:sp>
-      <p:sp>
-        <p:nvSpPr>
-          <p:cNvPr id="35" name="TextBox 34">
-            <a:extLst>
-              <a:ext uri="{FF2B5EF4-FFF2-40B4-BE49-F238E27FC236}">
-                <a16:creationId xmlns:a16="http://schemas.microsoft.com/office/drawing/2014/main" id="{AE157376-0193-94C8-7444-E50B1DB6C7C4}"/>
-              </a:ext>
-            </a:extLst>
-          </p:cNvPr>
-          <p:cNvSpPr txBox="1"/>
-          <p:nvPr/>
-        </p:nvSpPr>
-        <p:spPr>
-          <a:xfrm>
-            <a:off x="617817" y="3630805"/>
-            <a:ext cx="3035235" cy="738664"/>
-          </a:xfrm>
-          <a:prstGeom prst="rect">
-            <a:avLst/>
-          </a:prstGeom>
-          <a:noFill/>
-          <a:ln w="19050">
-            <a:solidFill>
-              <a:srgbClr val="0070C0"/>
-            </a:solidFill>
-          </a:ln>
-        </p:spPr>
-        <p:txBody>
-          <a:bodyPr wrap="square" rtlCol="0">
-            <a:spAutoFit/>
-          </a:bodyPr>
-          <a:lstStyle/>
-          <a:p>
-            <a:pPr algn="ctr"/>
-            <a:r>
-              <a:rPr lang="en-US" sz="1050" b="1" dirty="0">
-                <a:latin typeface="Times New Roman" panose="02020603050405020304" pitchFamily="18" charset="0"/>
-                <a:cs typeface="Times New Roman" panose="02020603050405020304" pitchFamily="18" charset="0"/>
-              </a:rPr>
-              <a:t>AUGUSTUS gene prediction</a:t>
-            </a:r>
-          </a:p>
-          <a:p>
-            <a:pPr algn="ctr"/>
-            <a:r>
-              <a:rPr lang="en-US" sz="1050" dirty="0">
-                <a:latin typeface="Times New Roman" panose="02020603050405020304" pitchFamily="18" charset="0"/>
-                <a:cs typeface="Times New Roman" panose="02020603050405020304" pitchFamily="18" charset="0"/>
-              </a:rPr>
-              <a:t>The Augustus region FASTA is submitted to AUGUSTUS (V3.3.3) for gene prediction with the “fusarium” species parameter selected.</a:t>
-            </a:r>
-          </a:p>
-        </p:txBody>
-      </p:sp>
-      <p:sp>
-        <p:nvSpPr>
-          <p:cNvPr id="36" name="TextBox 35">
-            <a:extLst>
-              <a:ext uri="{FF2B5EF4-FFF2-40B4-BE49-F238E27FC236}">
-                <a16:creationId xmlns:a16="http://schemas.microsoft.com/office/drawing/2014/main" id="{976CB707-1090-E6D0-E086-A23D5310FC7A}"/>
-              </a:ext>
-            </a:extLst>
-          </p:cNvPr>
-          <p:cNvSpPr txBox="1"/>
-          <p:nvPr/>
-        </p:nvSpPr>
-        <p:spPr>
-          <a:xfrm>
-            <a:off x="617817" y="5096516"/>
-            <a:ext cx="6153092" cy="513692"/>
-          </a:xfrm>
-          <a:prstGeom prst="rect">
-            <a:avLst/>
-          </a:prstGeom>
-          <a:noFill/>
-          <a:ln w="19050">
-            <a:solidFill>
-              <a:schemeClr val="accent5">
-                <a:lumMod val="75000"/>
-              </a:schemeClr>
-            </a:solidFill>
-          </a:ln>
-        </p:spPr>
-        <p:txBody>
-          <a:bodyPr wrap="square" lIns="28664" tIns="14332" rIns="28664" bIns="14332" rtlCol="0" anchor="t">
-            <a:spAutoFit/>
-          </a:bodyPr>
-          <a:lstStyle/>
-          <a:p>
-            <a:pPr algn="ctr"/>
-            <a:r>
-              <a:rPr lang="en-US" sz="1050" b="1" dirty="0">
-                <a:latin typeface="Times New Roman" panose="02020603050405020304" pitchFamily="18" charset="0"/>
-                <a:cs typeface="Times New Roman" panose="02020603050405020304" pitchFamily="18" charset="0"/>
-              </a:rPr>
-              <a:t>Size filter</a:t>
-            </a:r>
-          </a:p>
-          <a:p>
-            <a:pPr algn="ctr"/>
-            <a:r>
-              <a:rPr lang="en-US" sz="1050" dirty="0">
-                <a:latin typeface="Times New Roman"/>
-                <a:cs typeface="Times New Roman"/>
-              </a:rPr>
-              <a:t>Protein sequences containing a signal peptide predicted by SignalP (v4.1) are filtered based on size, with sequences &lt;450aa and &gt;30aa kept for effector prediction.  </a:t>
-            </a:r>
-            <a:endParaRPr lang="en-US" sz="1050" dirty="0">
-              <a:latin typeface="Times New Roman" panose="02020603050405020304" pitchFamily="18" charset="0"/>
-              <a:cs typeface="Times New Roman" panose="02020603050405020304" pitchFamily="18" charset="0"/>
-            </a:endParaRPr>
-          </a:p>
-        </p:txBody>
-      </p:sp>
-      <p:sp>
-        <p:nvSpPr>
-          <p:cNvPr id="37" name="TextBox 36">
-            <a:extLst>
-              <a:ext uri="{FF2B5EF4-FFF2-40B4-BE49-F238E27FC236}">
-                <a16:creationId xmlns:a16="http://schemas.microsoft.com/office/drawing/2014/main" id="{6DCA523E-F833-5F7E-A65A-30DAA2F76805}"/>
-              </a:ext>
-            </a:extLst>
-          </p:cNvPr>
-          <p:cNvSpPr txBox="1"/>
-          <p:nvPr/>
-        </p:nvSpPr>
-        <p:spPr>
-          <a:xfrm>
-            <a:off x="617816" y="5842985"/>
-            <a:ext cx="6153093" cy="415498"/>
-          </a:xfrm>
-          <a:prstGeom prst="rect">
-            <a:avLst/>
-          </a:prstGeom>
-          <a:noFill/>
-          <a:ln w="19050">
-            <a:solidFill>
-              <a:schemeClr val="accent5">
-                <a:lumMod val="75000"/>
-              </a:schemeClr>
-            </a:solidFill>
-          </a:ln>
-        </p:spPr>
-        <p:txBody>
-          <a:bodyPr wrap="square" rtlCol="0">
-            <a:spAutoFit/>
-          </a:bodyPr>
-          <a:lstStyle/>
-          <a:p>
-            <a:pPr algn="ctr"/>
-            <a:r>
-              <a:rPr lang="en-US" sz="1050" b="1" dirty="0">
-                <a:latin typeface="Times New Roman" panose="02020603050405020304" pitchFamily="18" charset="0"/>
-                <a:cs typeface="Times New Roman" panose="02020603050405020304" pitchFamily="18" charset="0"/>
-              </a:rPr>
-              <a:t> EffectorP (v2.0.1) scan for likely effectors</a:t>
-            </a:r>
-          </a:p>
-          <a:p>
-            <a:pPr algn="ctr"/>
-            <a:r>
-              <a:rPr lang="en-US" sz="1050" dirty="0">
-                <a:latin typeface="Times New Roman" panose="02020603050405020304" pitchFamily="18" charset="0"/>
-                <a:cs typeface="Times New Roman" panose="02020603050405020304" pitchFamily="18" charset="0"/>
-              </a:rPr>
-              <a:t>Each signal peptide and size filtered sequences is submitted to EffectorP (v2.0.1) for fungal effector prediction. </a:t>
-            </a:r>
-          </a:p>
-        </p:txBody>
-      </p:sp>
-      <p:cxnSp>
-        <p:nvCxnSpPr>
-          <p:cNvPr id="38" name="Straight Arrow Connector 39">
-            <a:extLst>
-              <a:ext uri="{FF2B5EF4-FFF2-40B4-BE49-F238E27FC236}">
-                <a16:creationId xmlns:a16="http://schemas.microsoft.com/office/drawing/2014/main" id="{AC2CB13E-9DD3-CD43-4C1B-156384BB78BC}"/>
-              </a:ext>
-            </a:extLst>
-          </p:cNvPr>
-          <p:cNvCxnSpPr>
-            <a:cxnSpLocks/>
-            <a:stCxn id="30" idx="2"/>
-            <a:endCxn id="31" idx="0"/>
-          </p:cNvCxnSpPr>
-          <p:nvPr/>
-        </p:nvCxnSpPr>
-        <p:spPr>
-          <a:xfrm rot="5400000">
-            <a:off x="2824746" y="1568608"/>
-            <a:ext cx="180309" cy="1558929"/>
-          </a:xfrm>
-          <a:prstGeom prst="bentConnector3">
-            <a:avLst>
-              <a:gd name="adj1" fmla="val 50000"/>
-            </a:avLst>
-          </a:prstGeom>
-          <a:ln w="19050">
-            <a:solidFill>
-              <a:schemeClr val="tx1"/>
-            </a:solidFill>
-            <a:headEnd type="none" w="med" len="med"/>
-            <a:tailEnd type="arrow" w="med" len="med"/>
-          </a:ln>
-        </p:spPr>
-        <p:style>
-          <a:lnRef idx="1">
-            <a:schemeClr val="accent1"/>
-          </a:lnRef>
-          <a:fillRef idx="0">
-            <a:schemeClr val="accent1"/>
-          </a:fillRef>
-          <a:effectRef idx="0">
-            <a:schemeClr val="accent1"/>
-          </a:effectRef>
-          <a:fontRef idx="minor">
-            <a:schemeClr val="tx1"/>
-          </a:fontRef>
-        </p:style>
-      </p:cxnSp>
-      <p:cxnSp>
-        <p:nvCxnSpPr>
-          <p:cNvPr id="39" name="Straight Arrow Connector 38">
-            <a:extLst>
-              <a:ext uri="{FF2B5EF4-FFF2-40B4-BE49-F238E27FC236}">
-                <a16:creationId xmlns:a16="http://schemas.microsoft.com/office/drawing/2014/main" id="{80B17E49-3031-9706-BDF3-6031A9A28FFA}"/>
-              </a:ext>
-            </a:extLst>
-          </p:cNvPr>
-          <p:cNvCxnSpPr>
-            <a:cxnSpLocks/>
-            <a:stCxn id="31" idx="2"/>
-            <a:endCxn id="35" idx="0"/>
-          </p:cNvCxnSpPr>
-          <p:nvPr/>
-        </p:nvCxnSpPr>
-        <p:spPr>
-          <a:xfrm>
-            <a:off x="2135435" y="3500056"/>
-            <a:ext cx="0" cy="130749"/>
-          </a:xfrm>
-          <a:prstGeom prst="straightConnector1">
-            <a:avLst/>
-          </a:prstGeom>
-          <a:ln w="19050">
-            <a:solidFill>
-              <a:schemeClr val="tx1"/>
-            </a:solidFill>
-            <a:headEnd type="none" w="med" len="med"/>
-            <a:tailEnd type="arrow" w="med" len="med"/>
-          </a:ln>
-        </p:spPr>
-        <p:style>
-          <a:lnRef idx="1">
-            <a:schemeClr val="accent1"/>
-          </a:lnRef>
-          <a:fillRef idx="0">
-            <a:schemeClr val="accent1"/>
-          </a:fillRef>
-          <a:effectRef idx="0">
-            <a:schemeClr val="accent1"/>
-          </a:effectRef>
-          <a:fontRef idx="minor">
-            <a:schemeClr val="tx1"/>
-          </a:fontRef>
-        </p:style>
-      </p:cxnSp>
-      <p:cxnSp>
-        <p:nvCxnSpPr>
-          <p:cNvPr id="40" name="Straight Arrow Connector 39">
-            <a:extLst>
-              <a:ext uri="{FF2B5EF4-FFF2-40B4-BE49-F238E27FC236}">
-                <a16:creationId xmlns:a16="http://schemas.microsoft.com/office/drawing/2014/main" id="{37AD526A-51C8-22C7-ED75-940380912E7C}"/>
-              </a:ext>
-            </a:extLst>
-          </p:cNvPr>
-          <p:cNvCxnSpPr>
-            <a:cxnSpLocks/>
-            <a:stCxn id="33" idx="2"/>
-          </p:cNvCxnSpPr>
-          <p:nvPr/>
-        </p:nvCxnSpPr>
-        <p:spPr>
-          <a:xfrm>
-            <a:off x="5260940" y="4366789"/>
-            <a:ext cx="0" cy="162379"/>
-          </a:xfrm>
-          <a:prstGeom prst="straightConnector1">
-            <a:avLst/>
-          </a:prstGeom>
-          <a:ln w="19050">
-            <a:solidFill>
-              <a:schemeClr val="tx1"/>
-            </a:solidFill>
-            <a:headEnd type="none" w="med" len="med"/>
-            <a:tailEnd type="arrow" w="med" len="med"/>
-          </a:ln>
-        </p:spPr>
-        <p:style>
-          <a:lnRef idx="1">
-            <a:schemeClr val="accent1"/>
-          </a:lnRef>
-          <a:fillRef idx="0">
-            <a:schemeClr val="accent1"/>
-          </a:fillRef>
-          <a:effectRef idx="0">
-            <a:schemeClr val="accent1"/>
-          </a:effectRef>
-          <a:fontRef idx="minor">
-            <a:schemeClr val="tx1"/>
-          </a:fontRef>
-        </p:style>
-      </p:cxnSp>
-      <p:cxnSp>
-        <p:nvCxnSpPr>
-          <p:cNvPr id="41" name="Straight Arrow Connector 40">
-            <a:extLst>
-              <a:ext uri="{FF2B5EF4-FFF2-40B4-BE49-F238E27FC236}">
-                <a16:creationId xmlns:a16="http://schemas.microsoft.com/office/drawing/2014/main" id="{E4D9565D-4082-948F-58CB-8BF463E36C28}"/>
-              </a:ext>
-            </a:extLst>
-          </p:cNvPr>
-          <p:cNvCxnSpPr>
-            <a:cxnSpLocks/>
-            <a:stCxn id="32" idx="2"/>
-            <a:endCxn id="33" idx="0"/>
-          </p:cNvCxnSpPr>
-          <p:nvPr/>
-        </p:nvCxnSpPr>
-        <p:spPr>
-          <a:xfrm flipH="1">
-            <a:off x="5260940" y="3492362"/>
-            <a:ext cx="6" cy="135763"/>
-          </a:xfrm>
-          <a:prstGeom prst="straightConnector1">
-            <a:avLst/>
-          </a:prstGeom>
-          <a:ln w="19050">
-            <a:solidFill>
-              <a:schemeClr val="tx1"/>
-            </a:solidFill>
-            <a:headEnd type="none" w="med" len="med"/>
-            <a:tailEnd type="arrow" w="med" len="med"/>
-          </a:ln>
-        </p:spPr>
-        <p:style>
-          <a:lnRef idx="1">
-            <a:schemeClr val="accent1"/>
-          </a:lnRef>
-          <a:fillRef idx="0">
-            <a:schemeClr val="accent1"/>
-          </a:fillRef>
-          <a:effectRef idx="0">
-            <a:schemeClr val="accent1"/>
-          </a:effectRef>
-          <a:fontRef idx="minor">
-            <a:schemeClr val="tx1"/>
-          </a:fontRef>
-        </p:style>
-      </p:cxnSp>
-      <p:cxnSp>
-        <p:nvCxnSpPr>
-          <p:cNvPr id="42" name="Straight Arrow Connector 41">
-            <a:extLst>
-              <a:ext uri="{FF2B5EF4-FFF2-40B4-BE49-F238E27FC236}">
-                <a16:creationId xmlns:a16="http://schemas.microsoft.com/office/drawing/2014/main" id="{5327B655-1121-397A-9CA1-F589B30DD736}"/>
-              </a:ext>
-            </a:extLst>
-          </p:cNvPr>
-          <p:cNvCxnSpPr>
-            <a:cxnSpLocks/>
-            <a:stCxn id="36" idx="2"/>
-            <a:endCxn id="37" idx="0"/>
-          </p:cNvCxnSpPr>
-          <p:nvPr/>
-        </p:nvCxnSpPr>
-        <p:spPr>
-          <a:xfrm>
-            <a:off x="3694363" y="5610208"/>
-            <a:ext cx="0" cy="232777"/>
-          </a:xfrm>
-          <a:prstGeom prst="straightConnector1">
-            <a:avLst/>
-          </a:prstGeom>
-          <a:ln w="19050">
-            <a:solidFill>
-              <a:schemeClr val="tx1"/>
-            </a:solidFill>
-            <a:headEnd type="none" w="med" len="med"/>
-            <a:tailEnd type="arrow" w="med" len="med"/>
-          </a:ln>
-        </p:spPr>
-        <p:style>
-          <a:lnRef idx="1">
-            <a:schemeClr val="accent1"/>
-          </a:lnRef>
-          <a:fillRef idx="0">
-            <a:schemeClr val="accent1"/>
-          </a:fillRef>
-          <a:effectRef idx="0">
-            <a:schemeClr val="accent1"/>
-          </a:effectRef>
-          <a:fontRef idx="minor">
-            <a:schemeClr val="tx1"/>
-          </a:fontRef>
-        </p:style>
-      </p:cxnSp>
-      <p:cxnSp>
-        <p:nvCxnSpPr>
-          <p:cNvPr id="43" name="Straight Arrow Connector 42">
-            <a:extLst>
-              <a:ext uri="{FF2B5EF4-FFF2-40B4-BE49-F238E27FC236}">
-                <a16:creationId xmlns:a16="http://schemas.microsoft.com/office/drawing/2014/main" id="{B954DB71-9171-6F9A-D14C-86A713998648}"/>
-              </a:ext>
-            </a:extLst>
-          </p:cNvPr>
-          <p:cNvCxnSpPr>
-            <a:cxnSpLocks/>
-            <a:stCxn id="29" idx="2"/>
-            <a:endCxn id="30" idx="0"/>
-          </p:cNvCxnSpPr>
-          <p:nvPr/>
-        </p:nvCxnSpPr>
-        <p:spPr>
-          <a:xfrm>
-            <a:off x="3694364" y="1538174"/>
-            <a:ext cx="0" cy="142663"/>
-          </a:xfrm>
-          <a:prstGeom prst="straightConnector1">
-            <a:avLst/>
-          </a:prstGeom>
-          <a:ln w="19050">
-            <a:solidFill>
-              <a:schemeClr val="tx1"/>
-            </a:solidFill>
-            <a:headEnd type="none" w="med" len="med"/>
-            <a:tailEnd type="arrow" w="med" len="med"/>
-          </a:ln>
-        </p:spPr>
-        <p:style>
-          <a:lnRef idx="1">
-            <a:schemeClr val="accent1"/>
-          </a:lnRef>
-          <a:fillRef idx="0">
-            <a:schemeClr val="accent1"/>
-          </a:fillRef>
-          <a:effectRef idx="0">
-            <a:schemeClr val="accent1"/>
-          </a:effectRef>
-          <a:fontRef idx="minor">
-            <a:schemeClr val="tx1"/>
-          </a:fontRef>
-        </p:style>
-      </p:cxnSp>
-      <p:cxnSp>
-        <p:nvCxnSpPr>
-          <p:cNvPr id="44" name="Straight Arrow Connector 39">
-            <a:extLst>
-              <a:ext uri="{FF2B5EF4-FFF2-40B4-BE49-F238E27FC236}">
-                <a16:creationId xmlns:a16="http://schemas.microsoft.com/office/drawing/2014/main" id="{28D829CA-2B20-EC7B-5887-5CCFA31D626F}"/>
-              </a:ext>
-            </a:extLst>
-          </p:cNvPr>
-          <p:cNvCxnSpPr>
-            <a:cxnSpLocks/>
-            <a:stCxn id="30" idx="2"/>
-            <a:endCxn id="32" idx="0"/>
-          </p:cNvCxnSpPr>
-          <p:nvPr/>
-        </p:nvCxnSpPr>
-        <p:spPr>
-          <a:xfrm rot="16200000" flipH="1">
-            <a:off x="4387501" y="1564781"/>
-            <a:ext cx="180309" cy="1566582"/>
-          </a:xfrm>
-          <a:prstGeom prst="bentConnector3">
-            <a:avLst>
-              <a:gd name="adj1" fmla="val 50000"/>
-            </a:avLst>
-          </a:prstGeom>
-          <a:ln w="19050">
-            <a:solidFill>
-              <a:schemeClr val="tx1"/>
-            </a:solidFill>
-            <a:headEnd type="none" w="med" len="med"/>
-            <a:tailEnd type="arrow" w="med" len="med"/>
-          </a:ln>
-        </p:spPr>
-        <p:style>
-          <a:lnRef idx="1">
-            <a:schemeClr val="accent1"/>
-          </a:lnRef>
-          <a:fillRef idx="0">
-            <a:schemeClr val="accent1"/>
-          </a:fillRef>
-          <a:effectRef idx="0">
-            <a:schemeClr val="accent1"/>
-          </a:effectRef>
-          <a:fontRef idx="minor">
-            <a:schemeClr val="tx1"/>
-          </a:fontRef>
-        </p:style>
-      </p:cxnSp>
-      <p:cxnSp>
-        <p:nvCxnSpPr>
-          <p:cNvPr id="45" name="Straight Arrow Connector 44">
-            <a:extLst>
-              <a:ext uri="{FF2B5EF4-FFF2-40B4-BE49-F238E27FC236}">
-                <a16:creationId xmlns:a16="http://schemas.microsoft.com/office/drawing/2014/main" id="{B4BAA9E8-2B6B-77BD-293D-288F8B1D232C}"/>
-              </a:ext>
-            </a:extLst>
-          </p:cNvPr>
-          <p:cNvCxnSpPr>
-            <a:cxnSpLocks/>
-            <a:stCxn id="34" idx="2"/>
-            <a:endCxn id="36" idx="0"/>
-          </p:cNvCxnSpPr>
-          <p:nvPr/>
-        </p:nvCxnSpPr>
-        <p:spPr>
-          <a:xfrm>
-            <a:off x="3694363" y="4944666"/>
-            <a:ext cx="0" cy="151850"/>
-          </a:xfrm>
-          <a:prstGeom prst="straightConnector1">
-            <a:avLst/>
-          </a:prstGeom>
-          <a:ln w="19050">
-            <a:solidFill>
-              <a:schemeClr val="tx1"/>
-            </a:solidFill>
-            <a:headEnd type="none" w="med" len="med"/>
-            <a:tailEnd type="arrow" w="med" len="med"/>
-          </a:ln>
-        </p:spPr>
-        <p:style>
-          <a:lnRef idx="1">
-            <a:schemeClr val="accent1"/>
-          </a:lnRef>
-          <a:fillRef idx="0">
-            <a:schemeClr val="accent1"/>
-          </a:fillRef>
-          <a:effectRef idx="0">
-            <a:schemeClr val="accent1"/>
-          </a:effectRef>
-          <a:fontRef idx="minor">
-            <a:schemeClr val="tx1"/>
-          </a:fontRef>
-        </p:style>
-      </p:cxnSp>
-      <p:cxnSp>
-        <p:nvCxnSpPr>
-          <p:cNvPr id="46" name="Straight Arrow Connector 45">
-            <a:extLst>
-              <a:ext uri="{FF2B5EF4-FFF2-40B4-BE49-F238E27FC236}">
-                <a16:creationId xmlns:a16="http://schemas.microsoft.com/office/drawing/2014/main" id="{E2423F59-D43F-A99B-0BDF-4A053EAD8D7A}"/>
-              </a:ext>
-            </a:extLst>
-          </p:cNvPr>
-          <p:cNvCxnSpPr>
-            <a:cxnSpLocks/>
-            <a:stCxn id="28" idx="2"/>
-            <a:endCxn id="29" idx="0"/>
-          </p:cNvCxnSpPr>
-          <p:nvPr/>
-        </p:nvCxnSpPr>
-        <p:spPr>
-          <a:xfrm flipH="1">
-            <a:off x="3694364" y="823954"/>
-            <a:ext cx="4" cy="137139"/>
-          </a:xfrm>
-          <a:prstGeom prst="straightConnector1">
-            <a:avLst/>
-          </a:prstGeom>
-          <a:ln w="19050">
-            <a:solidFill>
-              <a:schemeClr val="tx1"/>
-            </a:solidFill>
-            <a:headEnd type="none" w="med" len="med"/>
-            <a:tailEnd type="arrow" w="med" len="med"/>
-          </a:ln>
-        </p:spPr>
-        <p:style>
-          <a:lnRef idx="1">
-            <a:schemeClr val="accent1"/>
-          </a:lnRef>
-          <a:fillRef idx="0">
-            <a:schemeClr val="accent1"/>
-          </a:fillRef>
-          <a:effectRef idx="0">
-            <a:schemeClr val="accent1"/>
-          </a:effectRef>
-          <a:fontRef idx="minor">
-            <a:schemeClr val="tx1"/>
-          </a:fontRef>
-        </p:style>
-      </p:cxnSp>
-      <p:sp>
-        <p:nvSpPr>
-          <p:cNvPr id="47" name="TextBox 46">
-            <a:extLst>
-              <a:ext uri="{FF2B5EF4-FFF2-40B4-BE49-F238E27FC236}">
-                <a16:creationId xmlns:a16="http://schemas.microsoft.com/office/drawing/2014/main" id="{823958CA-EFBD-77D5-74E8-096A9629CCD4}"/>
-              </a:ext>
-            </a:extLst>
-          </p:cNvPr>
-          <p:cNvSpPr txBox="1"/>
-          <p:nvPr/>
-        </p:nvSpPr>
-        <p:spPr>
-          <a:xfrm rot="16200000">
-            <a:off x="-1362854" y="5208741"/>
-            <a:ext cx="3438224" cy="276993"/>
-          </a:xfrm>
-          <a:prstGeom prst="rect">
-            <a:avLst/>
-          </a:prstGeom>
-          <a:noFill/>
-          <a:ln w="19050">
-            <a:solidFill>
-              <a:srgbClr val="0070C0"/>
-            </a:solidFill>
-          </a:ln>
-        </p:spPr>
-        <p:txBody>
-          <a:bodyPr wrap="square" rtlCol="0">
-            <a:spAutoFit/>
-          </a:bodyPr>
-          <a:lstStyle/>
-          <a:p>
-            <a:pPr algn="ctr"/>
-            <a:r>
-              <a:rPr lang="en-US" sz="1200" b="1" dirty="0">
-                <a:latin typeface="Times New Roman" panose="02020603050405020304" pitchFamily="18" charset="0"/>
-                <a:cs typeface="Times New Roman" panose="02020603050405020304" pitchFamily="18" charset="0"/>
-              </a:rPr>
-              <a:t>Candidate Effector Prediction</a:t>
-            </a:r>
-            <a:r>
-              <a:rPr lang="en-US" sz="1200" dirty="0">
-                <a:latin typeface="Times New Roman" panose="02020603050405020304" pitchFamily="18" charset="0"/>
-                <a:cs typeface="Times New Roman" panose="02020603050405020304" pitchFamily="18" charset="0"/>
-              </a:rPr>
-              <a:t> </a:t>
-            </a:r>
-          </a:p>
-        </p:txBody>
-      </p:sp>
-      <p:sp>
-        <p:nvSpPr>
-          <p:cNvPr id="48" name="TextBox 47">
-            <a:extLst>
-              <a:ext uri="{FF2B5EF4-FFF2-40B4-BE49-F238E27FC236}">
-                <a16:creationId xmlns:a16="http://schemas.microsoft.com/office/drawing/2014/main" id="{42C306F1-5954-A452-B5CB-01FBC99AB1C9}"/>
-              </a:ext>
-            </a:extLst>
-          </p:cNvPr>
-          <p:cNvSpPr txBox="1"/>
-          <p:nvPr/>
-        </p:nvSpPr>
-        <p:spPr>
-          <a:xfrm rot="16200000">
-            <a:off x="-839572" y="2118565"/>
-            <a:ext cx="2374229" cy="276999"/>
-          </a:xfrm>
-          <a:prstGeom prst="rect">
-            <a:avLst/>
-          </a:prstGeom>
-          <a:noFill/>
-          <a:ln w="19050">
-            <a:solidFill>
-              <a:srgbClr val="FFC000"/>
-            </a:solidFill>
-          </a:ln>
-        </p:spPr>
-        <p:txBody>
-          <a:bodyPr wrap="square" rtlCol="0">
-            <a:spAutoFit/>
-          </a:bodyPr>
-          <a:lstStyle/>
-          <a:p>
-            <a:pPr algn="ctr"/>
-            <a:r>
-              <a:rPr lang="en-US" sz="1200" b="1" dirty="0">
-                <a:latin typeface="Times New Roman" panose="02020603050405020304" pitchFamily="18" charset="0"/>
-                <a:cs typeface="Times New Roman" panose="02020603050405020304" pitchFamily="18" charset="0"/>
-              </a:rPr>
-              <a:t>Sequence identification</a:t>
-            </a:r>
-          </a:p>
-        </p:txBody>
-      </p:sp>
-      <p:cxnSp>
-        <p:nvCxnSpPr>
-          <p:cNvPr id="49" name="Straight Arrow Connector 48">
-            <a:extLst>
-              <a:ext uri="{FF2B5EF4-FFF2-40B4-BE49-F238E27FC236}">
-                <a16:creationId xmlns:a16="http://schemas.microsoft.com/office/drawing/2014/main" id="{EA244CC3-F17E-102E-BF10-FC3BA680C682}"/>
-              </a:ext>
-            </a:extLst>
-          </p:cNvPr>
-          <p:cNvCxnSpPr>
-            <a:cxnSpLocks/>
-            <a:stCxn id="35" idx="2"/>
-          </p:cNvCxnSpPr>
-          <p:nvPr/>
-        </p:nvCxnSpPr>
-        <p:spPr>
-          <a:xfrm>
-            <a:off x="2135435" y="4369469"/>
-            <a:ext cx="0" cy="159699"/>
-          </a:xfrm>
-          <a:prstGeom prst="straightConnector1">
-            <a:avLst/>
-          </a:prstGeom>
-          <a:ln w="19050">
-            <a:solidFill>
-              <a:schemeClr val="tx1"/>
-            </a:solidFill>
-            <a:headEnd type="none" w="med" len="med"/>
-            <a:tailEnd type="arrow" w="med" len="med"/>
-          </a:ln>
-        </p:spPr>
-        <p:style>
-          <a:lnRef idx="1">
-            <a:schemeClr val="accent1"/>
-          </a:lnRef>
-          <a:fillRef idx="0">
-            <a:schemeClr val="accent1"/>
-          </a:fillRef>
-          <a:effectRef idx="0">
-            <a:schemeClr val="accent1"/>
-          </a:effectRef>
-          <a:fontRef idx="minor">
-            <a:schemeClr val="tx1"/>
-          </a:fontRef>
-        </p:style>
-      </p:cxnSp>
-      <p:sp>
-        <p:nvSpPr>
-          <p:cNvPr id="50" name="TextBox 49">
-            <a:extLst>
-              <a:ext uri="{FF2B5EF4-FFF2-40B4-BE49-F238E27FC236}">
-                <a16:creationId xmlns:a16="http://schemas.microsoft.com/office/drawing/2014/main" id="{C8F812A7-7034-446A-39B3-B8D6A9E94B08}"/>
-              </a:ext>
-            </a:extLst>
-          </p:cNvPr>
-          <p:cNvSpPr txBox="1"/>
-          <p:nvPr/>
-        </p:nvSpPr>
-        <p:spPr>
-          <a:xfrm>
-            <a:off x="617816" y="6447229"/>
-            <a:ext cx="6153091" cy="577081"/>
-          </a:xfrm>
-          <a:prstGeom prst="rect">
-            <a:avLst/>
-          </a:prstGeom>
-          <a:noFill/>
-          <a:ln w="19050">
-            <a:solidFill>
-              <a:schemeClr val="accent5">
-                <a:lumMod val="75000"/>
-              </a:schemeClr>
-            </a:solidFill>
-          </a:ln>
-        </p:spPr>
-        <p:txBody>
-          <a:bodyPr wrap="square" rtlCol="0">
-            <a:spAutoFit/>
-          </a:bodyPr>
-          <a:lstStyle/>
-          <a:p>
-            <a:pPr algn="ctr"/>
-            <a:r>
-              <a:rPr lang="en-US" sz="1050" b="1" dirty="0">
-                <a:latin typeface="Times New Roman" panose="02020603050405020304" pitchFamily="18" charset="0"/>
-                <a:cs typeface="Times New Roman" panose="02020603050405020304" pitchFamily="18" charset="0"/>
-              </a:rPr>
-              <a:t>FASTA and GFF generated</a:t>
-            </a:r>
-          </a:p>
-          <a:p>
-            <a:pPr algn="ctr"/>
-            <a:r>
-              <a:rPr lang="en-US" sz="1050" dirty="0">
-                <a:latin typeface="Times New Roman" panose="02020603050405020304" pitchFamily="18" charset="0"/>
-                <a:cs typeface="Times New Roman" panose="02020603050405020304" pitchFamily="18" charset="0"/>
-              </a:rPr>
-              <a:t>For each </a:t>
-            </a:r>
-            <a:r>
-              <a:rPr lang="en-US" sz="1050" i="1" dirty="0">
-                <a:latin typeface="Times New Roman" panose="02020603050405020304" pitchFamily="18" charset="0"/>
-                <a:cs typeface="Times New Roman" panose="02020603050405020304" pitchFamily="18" charset="0"/>
-              </a:rPr>
-              <a:t>Fusarium </a:t>
-            </a:r>
-            <a:r>
-              <a:rPr lang="en-US" sz="1050" dirty="0">
-                <a:latin typeface="Times New Roman" panose="02020603050405020304" pitchFamily="18" charset="0"/>
-                <a:cs typeface="Times New Roman" panose="02020603050405020304" pitchFamily="18" charset="0"/>
-              </a:rPr>
-              <a:t>assembly included, a candidate effector FASTA and GFF file is generated using various custom python scripts.. </a:t>
-            </a:r>
-          </a:p>
-        </p:txBody>
-      </p:sp>
-      <p:cxnSp>
-        <p:nvCxnSpPr>
-          <p:cNvPr id="51" name="Straight Arrow Connector 50">
-            <a:extLst>
-              <a:ext uri="{FF2B5EF4-FFF2-40B4-BE49-F238E27FC236}">
-                <a16:creationId xmlns:a16="http://schemas.microsoft.com/office/drawing/2014/main" id="{085083E8-AE12-9C4E-9838-224450859E01}"/>
-              </a:ext>
-            </a:extLst>
-          </p:cNvPr>
-          <p:cNvCxnSpPr>
-            <a:cxnSpLocks/>
-            <a:stCxn id="37" idx="2"/>
-            <a:endCxn id="50" idx="0"/>
-          </p:cNvCxnSpPr>
-          <p:nvPr/>
-        </p:nvCxnSpPr>
-        <p:spPr>
-          <a:xfrm flipH="1">
-            <a:off x="3694362" y="6258483"/>
-            <a:ext cx="1" cy="188746"/>
-          </a:xfrm>
-          <a:prstGeom prst="straightConnector1">
-            <a:avLst/>
-          </a:prstGeom>
-          <a:ln w="19050">
-            <a:solidFill>
-              <a:schemeClr val="tx1"/>
-            </a:solidFill>
-            <a:headEnd type="none" w="med" len="med"/>
-            <a:tailEnd type="arrow" w="med" len="med"/>
-          </a:ln>
-        </p:spPr>
-        <p:style>
-          <a:lnRef idx="1">
-            <a:schemeClr val="accent1"/>
-          </a:lnRef>
-          <a:fillRef idx="0">
-            <a:schemeClr val="accent1"/>
-          </a:fillRef>
-          <a:effectRef idx="0">
-            <a:schemeClr val="accent1"/>
-          </a:effectRef>
-          <a:fontRef idx="minor">
-            <a:schemeClr val="tx1"/>
-          </a:fontRef>
-        </p:style>
-      </p:cxnSp>
-      <p:sp>
-        <p:nvSpPr>
-          <p:cNvPr id="122" name="TextBox 121">
-            <a:extLst>
-              <a:ext uri="{FF2B5EF4-FFF2-40B4-BE49-F238E27FC236}">
-                <a16:creationId xmlns:a16="http://schemas.microsoft.com/office/drawing/2014/main" id="{9A0F104F-1CAC-EE54-751C-52AA12B72BEB}"/>
-              </a:ext>
-            </a:extLst>
-          </p:cNvPr>
-          <p:cNvSpPr txBox="1"/>
-          <p:nvPr/>
-        </p:nvSpPr>
-        <p:spPr>
-          <a:xfrm>
-            <a:off x="617816" y="7183875"/>
-            <a:ext cx="6153091" cy="577081"/>
-          </a:xfrm>
-          <a:prstGeom prst="rect">
-            <a:avLst/>
-          </a:prstGeom>
-          <a:noFill/>
-          <a:ln w="19050">
-            <a:solidFill>
-              <a:srgbClr val="538234"/>
-            </a:solidFill>
-          </a:ln>
-        </p:spPr>
-        <p:txBody>
-          <a:bodyPr wrap="square" rtlCol="0">
-            <a:spAutoFit/>
-          </a:bodyPr>
-          <a:lstStyle/>
-          <a:p>
-            <a:pPr algn="ctr"/>
-            <a:r>
-              <a:rPr lang="en-GB" sz="1050" b="1" dirty="0">
-                <a:latin typeface="Times New Roman" panose="02020603050405020304" pitchFamily="18" charset="0"/>
-                <a:cs typeface="Times New Roman" panose="02020603050405020304" pitchFamily="18" charset="0"/>
-              </a:rPr>
-              <a:t>Candidate effector clustering</a:t>
-            </a:r>
-          </a:p>
-          <a:p>
-            <a:pPr algn="ctr"/>
-            <a:r>
-              <a:rPr lang="en-US" sz="1050" dirty="0">
-                <a:latin typeface="Times New Roman"/>
-                <a:cs typeface="Times New Roman"/>
-              </a:rPr>
-              <a:t>             Candidate effector sequences are from all assemblies are combined into one FASTA and clustered using CD-HIT (4.8.1) (80% identity (optional using command line input)).   </a:t>
-            </a:r>
-            <a:endParaRPr lang="en-US" sz="1050" dirty="0">
-              <a:latin typeface="Times New Roman" panose="02020603050405020304" pitchFamily="18" charset="0"/>
-              <a:cs typeface="Times New Roman" panose="02020603050405020304" pitchFamily="18" charset="0"/>
-            </a:endParaRPr>
-          </a:p>
-        </p:txBody>
-      </p:sp>
-      <p:sp>
-        <p:nvSpPr>
-          <p:cNvPr id="123" name="TextBox 122">
-            <a:extLst>
-              <a:ext uri="{FF2B5EF4-FFF2-40B4-BE49-F238E27FC236}">
-                <a16:creationId xmlns:a16="http://schemas.microsoft.com/office/drawing/2014/main" id="{8B79224C-C268-03A9-5F63-D89D027AB911}"/>
-              </a:ext>
-            </a:extLst>
-          </p:cNvPr>
-          <p:cNvSpPr txBox="1"/>
-          <p:nvPr/>
-        </p:nvSpPr>
-        <p:spPr>
-          <a:xfrm>
-            <a:off x="617816" y="7923826"/>
-            <a:ext cx="6153091" cy="675275"/>
-          </a:xfrm>
-          <a:prstGeom prst="rect">
-            <a:avLst/>
-          </a:prstGeom>
-          <a:noFill/>
-          <a:ln w="19050">
-            <a:solidFill>
-              <a:schemeClr val="accent6">
-                <a:lumMod val="75000"/>
-              </a:schemeClr>
-            </a:solidFill>
-          </a:ln>
-        </p:spPr>
-        <p:txBody>
-          <a:bodyPr wrap="square" lIns="28664" tIns="14332" rIns="28664" bIns="14332" rtlCol="0" anchor="t">
-            <a:spAutoFit/>
-          </a:bodyPr>
-          <a:lstStyle/>
-          <a:p>
-            <a:pPr algn="ctr"/>
-            <a:r>
-              <a:rPr lang="en-US" sz="1050" b="1" dirty="0">
-                <a:latin typeface="Times New Roman"/>
-                <a:cs typeface="Times New Roman"/>
-              </a:rPr>
-              <a:t>Cluster analysis</a:t>
-            </a:r>
-          </a:p>
-          <a:p>
-            <a:pPr algn="ctr"/>
-            <a:r>
-              <a:rPr lang="en-GB" sz="1050" dirty="0">
-                <a:latin typeface="Times New Roman"/>
-                <a:ea typeface="Times New Roman" panose="02020603050405020304" pitchFamily="18" charset="0"/>
-                <a:cs typeface="Times New Roman"/>
-              </a:rPr>
-              <a:t>A custom python script is used to generate a table of effector clusters, containing details on the sequences in each cluster, the assembly from which each sequence originated, and the percentage identity of each sequence within the cluster to the cluster reference.</a:t>
-            </a:r>
-            <a:endParaRPr lang="en-US" sz="1050" dirty="0">
-              <a:latin typeface="Times New Roman" panose="02020603050405020304" pitchFamily="18" charset="0"/>
-              <a:cs typeface="Times New Roman" panose="02020603050405020304" pitchFamily="18" charset="0"/>
-            </a:endParaRPr>
-          </a:p>
-        </p:txBody>
-      </p:sp>
-      <p:sp>
-        <p:nvSpPr>
-          <p:cNvPr id="124" name="TextBox 123">
-            <a:extLst>
-              <a:ext uri="{FF2B5EF4-FFF2-40B4-BE49-F238E27FC236}">
-                <a16:creationId xmlns:a16="http://schemas.microsoft.com/office/drawing/2014/main" id="{23EE0309-6164-6E38-7343-E53A02B5CBA0}"/>
-              </a:ext>
-            </a:extLst>
-          </p:cNvPr>
-          <p:cNvSpPr txBox="1"/>
-          <p:nvPr/>
-        </p:nvSpPr>
-        <p:spPr>
-          <a:xfrm>
-            <a:off x="617817" y="8751461"/>
-            <a:ext cx="6153091" cy="675275"/>
-          </a:xfrm>
-          <a:prstGeom prst="rect">
-            <a:avLst/>
-          </a:prstGeom>
-          <a:noFill/>
-          <a:ln w="19050">
-            <a:solidFill>
-              <a:schemeClr val="accent6">
-                <a:lumMod val="75000"/>
-              </a:schemeClr>
-            </a:solidFill>
-          </a:ln>
-        </p:spPr>
-        <p:txBody>
-          <a:bodyPr wrap="square" lIns="28664" tIns="14332" rIns="28664" bIns="14332" rtlCol="0" anchor="t">
-            <a:spAutoFit/>
-          </a:bodyPr>
-          <a:lstStyle/>
-          <a:p>
-            <a:pPr algn="ctr"/>
-            <a:r>
-              <a:rPr lang="en-US" sz="1050" b="1" dirty="0">
-                <a:latin typeface="Times New Roman" panose="02020603050405020304" pitchFamily="18" charset="0"/>
-                <a:cs typeface="Times New Roman" panose="02020603050405020304" pitchFamily="18" charset="0"/>
-              </a:rPr>
-              <a:t>Candidate effector profiling</a:t>
-            </a:r>
-          </a:p>
-          <a:p>
-            <a:pPr algn="ctr"/>
-            <a:r>
-              <a:rPr lang="en-US" sz="1050" dirty="0">
-                <a:latin typeface="Times New Roman"/>
-                <a:cs typeface="Times New Roman"/>
-              </a:rPr>
-              <a:t>An effector profile generated in R Studio (version 3.6.3), using the package Pheatmap  (version 1.0.12). Data can be converted to binary at this stage to only generate a presence/absence heatmap rather than hit frequency heatmap. </a:t>
-            </a:r>
-            <a:endParaRPr lang="en-US" sz="1050" dirty="0">
-              <a:latin typeface="Times New Roman" panose="02020603050405020304" pitchFamily="18" charset="0"/>
-              <a:cs typeface="Times New Roman" panose="02020603050405020304" pitchFamily="18" charset="0"/>
-            </a:endParaRPr>
-          </a:p>
-        </p:txBody>
-      </p:sp>
-      <p:cxnSp>
-        <p:nvCxnSpPr>
-          <p:cNvPr id="125" name="Straight Arrow Connector 124">
-            <a:extLst>
-              <a:ext uri="{FF2B5EF4-FFF2-40B4-BE49-F238E27FC236}">
-                <a16:creationId xmlns:a16="http://schemas.microsoft.com/office/drawing/2014/main" id="{99DDFF90-F44B-2245-0C90-936A3EDA5853}"/>
-              </a:ext>
-            </a:extLst>
-          </p:cNvPr>
-          <p:cNvCxnSpPr>
-            <a:cxnSpLocks/>
-            <a:stCxn id="123" idx="2"/>
-            <a:endCxn id="124" idx="0"/>
-          </p:cNvCxnSpPr>
-          <p:nvPr/>
-        </p:nvCxnSpPr>
-        <p:spPr>
-          <a:xfrm>
-            <a:off x="3694362" y="8599101"/>
-            <a:ext cx="1" cy="152360"/>
-          </a:xfrm>
-          <a:prstGeom prst="straightConnector1">
-            <a:avLst/>
-          </a:prstGeom>
-          <a:ln w="19050">
-            <a:solidFill>
-              <a:schemeClr val="tx1"/>
-            </a:solidFill>
-            <a:headEnd type="none" w="med" len="med"/>
-            <a:tailEnd type="arrow" w="med" len="med"/>
-          </a:ln>
-        </p:spPr>
-        <p:style>
-          <a:lnRef idx="1">
-            <a:schemeClr val="accent1"/>
-          </a:lnRef>
-          <a:fillRef idx="0">
-            <a:schemeClr val="accent1"/>
-          </a:fillRef>
-          <a:effectRef idx="0">
-            <a:schemeClr val="accent1"/>
-          </a:effectRef>
-          <a:fontRef idx="minor">
-            <a:schemeClr val="tx1"/>
-          </a:fontRef>
-        </p:style>
-      </p:cxnSp>
-      <p:cxnSp>
-        <p:nvCxnSpPr>
-          <p:cNvPr id="126" name="Straight Arrow Connector 125">
-            <a:extLst>
-              <a:ext uri="{FF2B5EF4-FFF2-40B4-BE49-F238E27FC236}">
-                <a16:creationId xmlns:a16="http://schemas.microsoft.com/office/drawing/2014/main" id="{200F51BD-A2D4-AD7C-1660-FFE4D27EC7BF}"/>
-              </a:ext>
-            </a:extLst>
-          </p:cNvPr>
-          <p:cNvCxnSpPr>
-            <a:cxnSpLocks/>
-            <a:stCxn id="122" idx="2"/>
-            <a:endCxn id="123" idx="0"/>
-          </p:cNvCxnSpPr>
-          <p:nvPr/>
-        </p:nvCxnSpPr>
-        <p:spPr>
-          <a:xfrm>
-            <a:off x="3694362" y="7760956"/>
-            <a:ext cx="0" cy="162870"/>
-          </a:xfrm>
-          <a:prstGeom prst="straightConnector1">
-            <a:avLst/>
-          </a:prstGeom>
-          <a:ln w="19050">
-            <a:solidFill>
-              <a:schemeClr val="tx1"/>
-            </a:solidFill>
-            <a:headEnd type="none" w="med" len="med"/>
-            <a:tailEnd type="arrow" w="med" len="med"/>
-          </a:ln>
-        </p:spPr>
-        <p:style>
-          <a:lnRef idx="1">
-            <a:schemeClr val="accent1"/>
-          </a:lnRef>
-          <a:fillRef idx="0">
-            <a:schemeClr val="accent1"/>
-          </a:fillRef>
-          <a:effectRef idx="0">
-            <a:schemeClr val="accent1"/>
-          </a:effectRef>
-          <a:fontRef idx="minor">
-            <a:schemeClr val="tx1"/>
-          </a:fontRef>
-        </p:style>
-      </p:cxnSp>
-      <p:sp>
-        <p:nvSpPr>
-          <p:cNvPr id="135" name="TextBox 134">
-            <a:extLst>
-              <a:ext uri="{FF2B5EF4-FFF2-40B4-BE49-F238E27FC236}">
-                <a16:creationId xmlns:a16="http://schemas.microsoft.com/office/drawing/2014/main" id="{172F94FD-261F-4DD4-A1A0-05DB6852F479}"/>
-              </a:ext>
-            </a:extLst>
-          </p:cNvPr>
-          <p:cNvSpPr txBox="1"/>
-          <p:nvPr/>
-        </p:nvSpPr>
-        <p:spPr>
-          <a:xfrm rot="16200000">
-            <a:off x="-395648" y="8536782"/>
-            <a:ext cx="1502912" cy="276999"/>
-          </a:xfrm>
-          <a:prstGeom prst="rect">
-            <a:avLst/>
-          </a:prstGeom>
-          <a:noFill/>
-          <a:ln w="19050">
-            <a:solidFill>
-              <a:schemeClr val="accent6">
-                <a:lumMod val="75000"/>
-              </a:schemeClr>
-            </a:solidFill>
-          </a:ln>
-        </p:spPr>
-        <p:txBody>
-          <a:bodyPr wrap="square" rtlCol="0">
-            <a:spAutoFit/>
-          </a:bodyPr>
-          <a:lstStyle/>
-          <a:p>
-            <a:pPr algn="ctr"/>
-            <a:r>
-              <a:rPr lang="en-US" sz="1200" b="1" dirty="0">
-                <a:latin typeface="Times New Roman" panose="02020603050405020304" pitchFamily="18" charset="0"/>
-                <a:cs typeface="Times New Roman" panose="02020603050405020304" pitchFamily="18" charset="0"/>
-              </a:rPr>
-              <a:t>Effector Profiling</a:t>
-            </a:r>
-            <a:r>
-              <a:rPr lang="en-US" sz="1200" dirty="0">
-                <a:latin typeface="Times New Roman" panose="02020603050405020304" pitchFamily="18" charset="0"/>
-                <a:cs typeface="Times New Roman" panose="02020603050405020304" pitchFamily="18" charset="0"/>
-              </a:rPr>
-              <a:t> </a:t>
-            </a:r>
-          </a:p>
-        </p:txBody>
-      </p:sp>
-      <p:sp>
-        <p:nvSpPr>
-          <p:cNvPr id="136" name="Oval 135">
-            <a:extLst>
-              <a:ext uri="{FF2B5EF4-FFF2-40B4-BE49-F238E27FC236}">
-                <a16:creationId xmlns:a16="http://schemas.microsoft.com/office/drawing/2014/main" id="{EC7CDFCA-5FC6-5160-BFAA-511EA270E59B}"/>
-              </a:ext>
-            </a:extLst>
-          </p:cNvPr>
-          <p:cNvSpPr/>
-          <p:nvPr/>
-        </p:nvSpPr>
-        <p:spPr>
-          <a:xfrm rot="20647326">
-            <a:off x="66924" y="7180140"/>
-            <a:ext cx="1200177" cy="537117"/>
-          </a:xfrm>
-          <a:prstGeom prst="ellipse">
-            <a:avLst/>
-          </a:prstGeom>
-          <a:solidFill>
-            <a:schemeClr val="accent2">
-              <a:lumMod val="20000"/>
-              <a:lumOff val="80000"/>
-            </a:schemeClr>
-          </a:solidFill>
-          <a:ln w="19050">
-            <a:solidFill>
-              <a:srgbClr val="FF0000"/>
-            </a:solidFill>
-          </a:ln>
-        </p:spPr>
-        <p:style>
-          <a:lnRef idx="2">
-            <a:schemeClr val="accent1">
-              <a:shade val="50000"/>
-            </a:schemeClr>
-          </a:lnRef>
-          <a:fillRef idx="1">
-            <a:schemeClr val="accent1"/>
-          </a:fillRef>
-          <a:effectRef idx="0">
-            <a:schemeClr val="accent1"/>
-          </a:effectRef>
-          <a:fontRef idx="minor">
-            <a:schemeClr val="lt1"/>
-          </a:fontRef>
-        </p:style>
-        <p:txBody>
-          <a:bodyPr rtlCol="0" anchor="ctr"/>
-          <a:lstStyle/>
-          <a:p>
-            <a:pPr algn="ctr"/>
-            <a:r>
-              <a:rPr lang="en-US" sz="1000" b="1" i="1" dirty="0">
-                <a:solidFill>
-                  <a:schemeClr val="tx1"/>
-                </a:solidFill>
-                <a:latin typeface="Times New Roman" panose="02020603050405020304" pitchFamily="18" charset="0"/>
-                <a:cs typeface="Times New Roman" panose="02020603050405020304" pitchFamily="18" charset="0"/>
-              </a:rPr>
-              <a:t>Fusarium</a:t>
-            </a:r>
-            <a:endParaRPr lang="en-US" sz="1000" b="1" dirty="0">
-              <a:solidFill>
-                <a:schemeClr val="tx1"/>
-              </a:solidFill>
-              <a:latin typeface="Times New Roman" panose="02020603050405020304" pitchFamily="18" charset="0"/>
-              <a:cs typeface="Times New Roman" panose="02020603050405020304" pitchFamily="18" charset="0"/>
-            </a:endParaRPr>
-          </a:p>
-          <a:p>
-            <a:pPr algn="ctr"/>
-            <a:r>
-              <a:rPr lang="en-US" sz="1000" b="1" dirty="0">
-                <a:solidFill>
-                  <a:schemeClr val="tx1"/>
-                </a:solidFill>
-                <a:latin typeface="Times New Roman" panose="02020603050405020304" pitchFamily="18" charset="0"/>
-                <a:cs typeface="Times New Roman" panose="02020603050405020304" pitchFamily="18" charset="0"/>
-              </a:rPr>
-              <a:t>pan-effectorome</a:t>
-            </a:r>
-          </a:p>
-        </p:txBody>
-      </p:sp>
-      <p:cxnSp>
-        <p:nvCxnSpPr>
-          <p:cNvPr id="163" name="Straight Arrow Connector 162">
-            <a:extLst>
-              <a:ext uri="{FF2B5EF4-FFF2-40B4-BE49-F238E27FC236}">
-                <a16:creationId xmlns:a16="http://schemas.microsoft.com/office/drawing/2014/main" id="{B5BEDAD8-B981-7F55-7E04-9EDD87DD9D71}"/>
-              </a:ext>
-            </a:extLst>
-          </p:cNvPr>
-          <p:cNvCxnSpPr>
-            <a:cxnSpLocks/>
-            <a:stCxn id="50" idx="2"/>
-            <a:endCxn id="122" idx="0"/>
-          </p:cNvCxnSpPr>
-          <p:nvPr/>
-        </p:nvCxnSpPr>
-        <p:spPr>
-          <a:xfrm>
-            <a:off x="3694362" y="7024310"/>
-            <a:ext cx="0" cy="159565"/>
-          </a:xfrm>
-          <a:prstGeom prst="straightConnector1">
-            <a:avLst/>
-          </a:prstGeom>
-          <a:ln w="19050">
-            <a:solidFill>
-              <a:schemeClr val="tx1"/>
-            </a:solidFill>
-            <a:headEnd type="none" w="med" len="med"/>
-            <a:tailEnd type="arrow" w="med" len="med"/>
-          </a:ln>
-        </p:spPr>
-        <p:style>
-          <a:lnRef idx="1">
-            <a:schemeClr val="accent1"/>
-          </a:lnRef>
-          <a:fillRef idx="0">
-            <a:schemeClr val="accent1"/>
-          </a:fillRef>
-          <a:effectRef idx="0">
-            <a:schemeClr val="accent1"/>
-          </a:effectRef>
-          <a:fontRef idx="minor">
-            <a:schemeClr val="tx1"/>
-          </a:fontRef>
-        </p:style>
-      </p:cxnSp>
+              </a:endParaRPr>
+            </a:p>
+            <a:p>
+              <a:pPr algn="ctr"/>
+              <a:r>
+                <a:rPr lang="en-US" sz="1000" b="1" dirty="0">
+                  <a:solidFill>
+                    <a:schemeClr val="tx1"/>
+                  </a:solidFill>
+                  <a:latin typeface="Times New Roman" panose="02020603050405020304" pitchFamily="18" charset="0"/>
+                  <a:cs typeface="Times New Roman" panose="02020603050405020304" pitchFamily="18" charset="0"/>
+                </a:rPr>
+                <a:t>pan-effectorome</a:t>
+              </a:r>
+            </a:p>
+          </p:txBody>
+        </p:sp>
+      </p:grpSp>
     </p:spTree>
     <p:extLst>
       <p:ext uri="{BB962C8B-B14F-4D97-AF65-F5344CB8AC3E}">

</xml_diff>

<commit_message>
adding final thesis draft files and scripts
</commit_message>
<xml_diff>
--- a/docs/Maie_v5_Figure.pptx
+++ b/docs/Maie_v5_Figure.pptx
@@ -205,7 +205,7 @@
           <a:p>
             <a:fld id="{69BCE753-FEAF-2346-94B7-4FCB79DBED48}" type="datetimeFigureOut">
               <a:rPr lang="en-US" smtClean="0"/>
-              <a:t>2/6/24</a:t>
+              <a:t>3/26/24</a:t>
             </a:fld>
             <a:endParaRPr lang="en-US"/>
           </a:p>
@@ -604,7 +604,7 @@
           <a:p>
             <a:fld id="{17D8D008-64F1-FB47-AAE7-E5AAE46159A6}" type="datetimeFigureOut">
               <a:rPr lang="en-US" smtClean="0"/>
-              <a:t>2/6/24</a:t>
+              <a:t>3/26/24</a:t>
             </a:fld>
             <a:endParaRPr lang="en-US"/>
           </a:p>
@@ -774,7 +774,7 @@
           <a:p>
             <a:fld id="{17D8D008-64F1-FB47-AAE7-E5AAE46159A6}" type="datetimeFigureOut">
               <a:rPr lang="en-US" smtClean="0"/>
-              <a:t>2/6/24</a:t>
+              <a:t>3/26/24</a:t>
             </a:fld>
             <a:endParaRPr lang="en-US"/>
           </a:p>
@@ -954,7 +954,7 @@
           <a:p>
             <a:fld id="{17D8D008-64F1-FB47-AAE7-E5AAE46159A6}" type="datetimeFigureOut">
               <a:rPr lang="en-US" smtClean="0"/>
-              <a:t>2/6/24</a:t>
+              <a:t>3/26/24</a:t>
             </a:fld>
             <a:endParaRPr lang="en-US"/>
           </a:p>
@@ -1124,7 +1124,7 @@
           <a:p>
             <a:fld id="{17D8D008-64F1-FB47-AAE7-E5AAE46159A6}" type="datetimeFigureOut">
               <a:rPr lang="en-US" smtClean="0"/>
-              <a:t>2/6/24</a:t>
+              <a:t>3/26/24</a:t>
             </a:fld>
             <a:endParaRPr lang="en-US"/>
           </a:p>
@@ -1368,7 +1368,7 @@
           <a:p>
             <a:fld id="{17D8D008-64F1-FB47-AAE7-E5AAE46159A6}" type="datetimeFigureOut">
               <a:rPr lang="en-US" smtClean="0"/>
-              <a:t>2/6/24</a:t>
+              <a:t>3/26/24</a:t>
             </a:fld>
             <a:endParaRPr lang="en-US"/>
           </a:p>
@@ -1600,7 +1600,7 @@
           <a:p>
             <a:fld id="{17D8D008-64F1-FB47-AAE7-E5AAE46159A6}" type="datetimeFigureOut">
               <a:rPr lang="en-US" smtClean="0"/>
-              <a:t>2/6/24</a:t>
+              <a:t>3/26/24</a:t>
             </a:fld>
             <a:endParaRPr lang="en-US"/>
           </a:p>
@@ -1967,7 +1967,7 @@
           <a:p>
             <a:fld id="{17D8D008-64F1-FB47-AAE7-E5AAE46159A6}" type="datetimeFigureOut">
               <a:rPr lang="en-US" smtClean="0"/>
-              <a:t>2/6/24</a:t>
+              <a:t>3/26/24</a:t>
             </a:fld>
             <a:endParaRPr lang="en-US"/>
           </a:p>
@@ -2085,7 +2085,7 @@
           <a:p>
             <a:fld id="{17D8D008-64F1-FB47-AAE7-E5AAE46159A6}" type="datetimeFigureOut">
               <a:rPr lang="en-US" smtClean="0"/>
-              <a:t>2/6/24</a:t>
+              <a:t>3/26/24</a:t>
             </a:fld>
             <a:endParaRPr lang="en-US"/>
           </a:p>
@@ -2180,7 +2180,7 @@
           <a:p>
             <a:fld id="{17D8D008-64F1-FB47-AAE7-E5AAE46159A6}" type="datetimeFigureOut">
               <a:rPr lang="en-US" smtClean="0"/>
-              <a:t>2/6/24</a:t>
+              <a:t>3/26/24</a:t>
             </a:fld>
             <a:endParaRPr lang="en-US"/>
           </a:p>
@@ -2457,7 +2457,7 @@
           <a:p>
             <a:fld id="{17D8D008-64F1-FB47-AAE7-E5AAE46159A6}" type="datetimeFigureOut">
               <a:rPr lang="en-US" smtClean="0"/>
-              <a:t>2/6/24</a:t>
+              <a:t>3/26/24</a:t>
             </a:fld>
             <a:endParaRPr lang="en-US"/>
           </a:p>
@@ -2714,7 +2714,7 @@
           <a:p>
             <a:fld id="{17D8D008-64F1-FB47-AAE7-E5AAE46159A6}" type="datetimeFigureOut">
               <a:rPr lang="en-US" smtClean="0"/>
-              <a:t>2/6/24</a:t>
+              <a:t>3/26/24</a:t>
             </a:fld>
             <a:endParaRPr lang="en-US"/>
           </a:p>
@@ -2927,7 +2927,7 @@
           <a:p>
             <a:fld id="{17D8D008-64F1-FB47-AAE7-E5AAE46159A6}" type="datetimeFigureOut">
               <a:rPr lang="en-US" smtClean="0"/>
-              <a:t>2/6/24</a:t>
+              <a:t>3/26/24</a:t>
             </a:fld>
             <a:endParaRPr lang="en-US"/>
           </a:p>
@@ -3332,1738 +3332,1631 @@
           <a:chExt cx="0" cy="0"/>
         </a:xfrm>
       </p:grpSpPr>
-      <p:grpSp>
-        <p:nvGrpSpPr>
-          <p:cNvPr id="3" name="Group 2">
+      <p:sp>
+        <p:nvSpPr>
+          <p:cNvPr id="47" name="TextBox 46">
             <a:extLst>
               <a:ext uri="{FF2B5EF4-FFF2-40B4-BE49-F238E27FC236}">
-                <a16:creationId xmlns:a16="http://schemas.microsoft.com/office/drawing/2014/main" id="{C719410D-E89B-23A7-A334-2123311D8DA1}"/>
+                <a16:creationId xmlns:a16="http://schemas.microsoft.com/office/drawing/2014/main" id="{823958CA-EFBD-77D5-74E8-096A9629CCD4}"/>
               </a:ext>
             </a:extLst>
           </p:cNvPr>
-          <p:cNvGrpSpPr/>
+          <p:cNvSpPr txBox="1"/>
           <p:nvPr/>
-        </p:nvGrpSpPr>
-        <p:grpSpPr>
+        </p:nvSpPr>
+        <p:spPr>
+          <a:xfrm rot="16200000">
+            <a:off x="-1719769" y="6826510"/>
+            <a:ext cx="4030094" cy="276993"/>
+          </a:xfrm>
+          <a:prstGeom prst="rect">
+            <a:avLst/>
+          </a:prstGeom>
+          <a:noFill/>
+          <a:ln w="19050">
+            <a:solidFill>
+              <a:srgbClr val="0070C0"/>
+            </a:solidFill>
+          </a:ln>
+        </p:spPr>
+        <p:txBody>
+          <a:bodyPr wrap="square" rtlCol="0">
+            <a:spAutoFit/>
+          </a:bodyPr>
+          <a:lstStyle/>
+          <a:p>
+            <a:pPr algn="ctr"/>
+            <a:r>
+              <a:rPr lang="en-US" sz="1200" b="1" dirty="0">
+                <a:latin typeface="Helvetica" pitchFamily="2" charset="0"/>
+                <a:cs typeface="Times New Roman" panose="02020603050405020304" pitchFamily="18" charset="0"/>
+              </a:rPr>
+              <a:t>Candidate Effector Prediction</a:t>
+            </a:r>
+            <a:r>
+              <a:rPr lang="en-US" sz="1200" dirty="0">
+                <a:latin typeface="Helvetica" pitchFamily="2" charset="0"/>
+                <a:cs typeface="Times New Roman" panose="02020603050405020304" pitchFamily="18" charset="0"/>
+              </a:rPr>
+              <a:t> </a:t>
+            </a:r>
+          </a:p>
+        </p:txBody>
+      </p:sp>
+      <p:sp>
+        <p:nvSpPr>
+          <p:cNvPr id="48" name="TextBox 47">
+            <a:extLst>
+              <a:ext uri="{FF2B5EF4-FFF2-40B4-BE49-F238E27FC236}">
+                <a16:creationId xmlns:a16="http://schemas.microsoft.com/office/drawing/2014/main" id="{42C306F1-5954-A452-B5CB-01FBC99AB1C9}"/>
+              </a:ext>
+            </a:extLst>
+          </p:cNvPr>
+          <p:cNvSpPr txBox="1"/>
+          <p:nvPr/>
+        </p:nvSpPr>
+        <p:spPr>
+          <a:xfrm rot="16200000">
+            <a:off x="-1261026" y="2975415"/>
+            <a:ext cx="3095079" cy="276901"/>
+          </a:xfrm>
+          <a:prstGeom prst="rect">
+            <a:avLst/>
+          </a:prstGeom>
+          <a:noFill/>
+          <a:ln w="19050">
+            <a:solidFill>
+              <a:srgbClr val="FFC000"/>
+            </a:solidFill>
+          </a:ln>
+        </p:spPr>
+        <p:txBody>
+          <a:bodyPr wrap="square" rtlCol="0">
+            <a:spAutoFit/>
+          </a:bodyPr>
+          <a:lstStyle/>
+          <a:p>
+            <a:pPr algn="ctr"/>
+            <a:r>
+              <a:rPr lang="en-US" sz="1200" b="1" dirty="0">
+                <a:latin typeface="Helvetica" pitchFamily="2" charset="0"/>
+                <a:cs typeface="Times New Roman" panose="02020603050405020304" pitchFamily="18" charset="0"/>
+              </a:rPr>
+              <a:t>Sequence identification</a:t>
+            </a:r>
+          </a:p>
+        </p:txBody>
+      </p:sp>
+      <p:sp>
+        <p:nvSpPr>
+          <p:cNvPr id="28" name="Rectangle 27">
+            <a:extLst>
+              <a:ext uri="{FF2B5EF4-FFF2-40B4-BE49-F238E27FC236}">
+                <a16:creationId xmlns:a16="http://schemas.microsoft.com/office/drawing/2014/main" id="{5AB97E63-0861-21AA-97A8-B27875069948}"/>
+              </a:ext>
+            </a:extLst>
+          </p:cNvPr>
+          <p:cNvSpPr/>
+          <p:nvPr/>
+        </p:nvSpPr>
+        <p:spPr>
           <a:xfrm>
-            <a:off x="0" y="141890"/>
-            <a:ext cx="6703995" cy="9355518"/>
-            <a:chOff x="66924" y="65971"/>
-            <a:chExt cx="6703995" cy="7651286"/>
+            <a:off x="556834" y="146541"/>
+            <a:ext cx="6153103" cy="1054136"/>
           </a:xfrm>
-        </p:grpSpPr>
-        <p:sp>
-          <p:nvSpPr>
-            <p:cNvPr id="47" name="TextBox 46">
-              <a:extLst>
-                <a:ext uri="{FF2B5EF4-FFF2-40B4-BE49-F238E27FC236}">
-                  <a16:creationId xmlns:a16="http://schemas.microsoft.com/office/drawing/2014/main" id="{823958CA-EFBD-77D5-74E8-096A9629CCD4}"/>
-                </a:ext>
-              </a:extLst>
-            </p:cNvPr>
-            <p:cNvSpPr txBox="1"/>
-            <p:nvPr/>
-          </p:nvSpPr>
-          <p:spPr>
-            <a:xfrm rot="16200000">
-              <a:off x="-1341834" y="5187720"/>
-              <a:ext cx="3396186" cy="276993"/>
-            </a:xfrm>
-            <a:prstGeom prst="rect">
-              <a:avLst/>
-            </a:prstGeom>
-            <a:noFill/>
-            <a:ln w="19050">
-              <a:solidFill>
-                <a:srgbClr val="0070C0"/>
-              </a:solidFill>
-            </a:ln>
-          </p:spPr>
-          <p:txBody>
-            <a:bodyPr wrap="square" rtlCol="0">
-              <a:spAutoFit/>
-            </a:bodyPr>
-            <a:lstStyle/>
-            <a:p>
-              <a:pPr algn="ctr"/>
-              <a:r>
-                <a:rPr lang="en-US" sz="1200" b="1" dirty="0">
-                  <a:latin typeface="Times New Roman" panose="02020603050405020304" pitchFamily="18" charset="0"/>
-                  <a:cs typeface="Times New Roman" panose="02020603050405020304" pitchFamily="18" charset="0"/>
-                </a:rPr>
-                <a:t>Candidate Effector Prediction</a:t>
-              </a:r>
-              <a:r>
-                <a:rPr lang="en-US" sz="1200" dirty="0">
-                  <a:latin typeface="Times New Roman" panose="02020603050405020304" pitchFamily="18" charset="0"/>
-                  <a:cs typeface="Times New Roman" panose="02020603050405020304" pitchFamily="18" charset="0"/>
-                </a:rPr>
-                <a:t> </a:t>
-              </a:r>
-            </a:p>
-          </p:txBody>
-        </p:sp>
-        <p:sp>
-          <p:nvSpPr>
-            <p:cNvPr id="48" name="TextBox 47">
-              <a:extLst>
-                <a:ext uri="{FF2B5EF4-FFF2-40B4-BE49-F238E27FC236}">
-                  <a16:creationId xmlns:a16="http://schemas.microsoft.com/office/drawing/2014/main" id="{42C306F1-5954-A452-B5CB-01FBC99AB1C9}"/>
-                </a:ext>
-              </a:extLst>
-            </p:cNvPr>
-            <p:cNvSpPr txBox="1"/>
-            <p:nvPr/>
-          </p:nvSpPr>
-          <p:spPr>
-            <a:xfrm rot="16200000">
-              <a:off x="-918139" y="2088276"/>
-              <a:ext cx="2531269" cy="276901"/>
-            </a:xfrm>
-            <a:prstGeom prst="rect">
-              <a:avLst/>
-            </a:prstGeom>
-            <a:noFill/>
-            <a:ln w="19050">
-              <a:solidFill>
-                <a:srgbClr val="FFC000"/>
-              </a:solidFill>
-            </a:ln>
-          </p:spPr>
-          <p:txBody>
-            <a:bodyPr wrap="square" rtlCol="0">
-              <a:spAutoFit/>
-            </a:bodyPr>
-            <a:lstStyle/>
-            <a:p>
-              <a:pPr algn="ctr"/>
-              <a:r>
-                <a:rPr lang="en-US" sz="1200" b="1" dirty="0">
-                  <a:latin typeface="Times New Roman" panose="02020603050405020304" pitchFamily="18" charset="0"/>
-                  <a:cs typeface="Times New Roman" panose="02020603050405020304" pitchFamily="18" charset="0"/>
-                </a:rPr>
-                <a:t>Sequence identification</a:t>
-              </a:r>
-            </a:p>
-          </p:txBody>
-        </p:sp>
-        <p:sp>
-          <p:nvSpPr>
-            <p:cNvPr id="28" name="Rectangle 27">
-              <a:extLst>
-                <a:ext uri="{FF2B5EF4-FFF2-40B4-BE49-F238E27FC236}">
-                  <a16:creationId xmlns:a16="http://schemas.microsoft.com/office/drawing/2014/main" id="{5AB97E63-0861-21AA-97A8-B27875069948}"/>
-                </a:ext>
-              </a:extLst>
-            </p:cNvPr>
-            <p:cNvSpPr/>
-            <p:nvPr/>
-          </p:nvSpPr>
-          <p:spPr>
-            <a:xfrm>
-              <a:off x="617816" y="65971"/>
-              <a:ext cx="6153103" cy="757983"/>
-            </a:xfrm>
-            <a:prstGeom prst="rect">
-              <a:avLst/>
-            </a:prstGeom>
-            <a:noFill/>
-            <a:ln w="19050">
+          <a:prstGeom prst="rect">
+            <a:avLst/>
+          </a:prstGeom>
+          <a:noFill/>
+          <a:ln w="19050">
+            <a:solidFill>
+              <a:schemeClr val="tx1"/>
+            </a:solidFill>
+            <a:prstDash val="lgDash"/>
+          </a:ln>
+        </p:spPr>
+        <p:style>
+          <a:lnRef idx="2">
+            <a:schemeClr val="accent1">
+              <a:shade val="50000"/>
+            </a:schemeClr>
+          </a:lnRef>
+          <a:fillRef idx="1">
+            <a:schemeClr val="accent1"/>
+          </a:fillRef>
+          <a:effectRef idx="0">
+            <a:schemeClr val="accent1"/>
+          </a:effectRef>
+          <a:fontRef idx="minor">
+            <a:schemeClr val="lt1"/>
+          </a:fontRef>
+        </p:style>
+        <p:txBody>
+          <a:bodyPr rtlCol="0" anchor="ctr"/>
+          <a:lstStyle/>
+          <a:p>
+            <a:pPr algn="ctr"/>
+            <a:r>
+              <a:rPr lang="en-US" sz="2000" b="1" i="1" dirty="0">
+                <a:solidFill>
+                  <a:schemeClr val="tx1"/>
+                </a:solidFill>
+                <a:latin typeface="Helvetica" pitchFamily="2" charset="0"/>
+                <a:cs typeface="Times New Roman" panose="02020603050405020304" pitchFamily="18" charset="0"/>
+              </a:rPr>
+              <a:t>Fusarium</a:t>
+            </a:r>
+            <a:r>
+              <a:rPr lang="en-US" sz="2000" b="1" dirty="0">
+                <a:solidFill>
+                  <a:schemeClr val="tx1"/>
+                </a:solidFill>
+                <a:latin typeface="Helvetica" pitchFamily="2" charset="0"/>
+                <a:cs typeface="Times New Roman" panose="02020603050405020304" pitchFamily="18" charset="0"/>
+              </a:rPr>
+              <a:t> Assemblies</a:t>
+            </a:r>
+          </a:p>
+          <a:p>
+            <a:pPr algn="ctr"/>
+            <a:endParaRPr lang="en-US" sz="1100" b="1" dirty="0">
               <a:solidFill>
                 <a:schemeClr val="tx1"/>
               </a:solidFill>
-              <a:prstDash val="lgDash"/>
-            </a:ln>
-          </p:spPr>
-          <p:style>
-            <a:lnRef idx="2">
-              <a:schemeClr val="accent1">
-                <a:shade val="50000"/>
-              </a:schemeClr>
-            </a:lnRef>
-            <a:fillRef idx="1">
-              <a:schemeClr val="accent1"/>
-            </a:fillRef>
-            <a:effectRef idx="0">
-              <a:schemeClr val="accent1"/>
-            </a:effectRef>
-            <a:fontRef idx="minor">
-              <a:schemeClr val="lt1"/>
-            </a:fontRef>
-          </p:style>
-          <p:txBody>
-            <a:bodyPr rtlCol="0" anchor="ctr"/>
-            <a:lstStyle/>
-            <a:p>
-              <a:pPr algn="ctr"/>
-              <a:r>
-                <a:rPr lang="en-US" sz="2000" b="1" i="1" dirty="0">
-                  <a:solidFill>
-                    <a:schemeClr val="tx1"/>
-                  </a:solidFill>
-                  <a:latin typeface="Times New Roman" panose="02020603050405020304" pitchFamily="18" charset="0"/>
-                  <a:cs typeface="Times New Roman" panose="02020603050405020304" pitchFamily="18" charset="0"/>
-                </a:rPr>
-                <a:t>Fusarium</a:t>
-              </a:r>
-              <a:r>
-                <a:rPr lang="en-US" sz="2000" b="1" dirty="0">
-                  <a:solidFill>
-                    <a:schemeClr val="tx1"/>
-                  </a:solidFill>
-                  <a:latin typeface="Times New Roman" panose="02020603050405020304" pitchFamily="18" charset="0"/>
-                  <a:cs typeface="Times New Roman" panose="02020603050405020304" pitchFamily="18" charset="0"/>
-                </a:rPr>
-                <a:t> Assemblies</a:t>
-              </a:r>
-            </a:p>
-            <a:p>
-              <a:pPr algn="ctr"/>
-              <a:r>
-                <a:rPr lang="en-US" sz="1000" i="1" dirty="0">
-                  <a:solidFill>
-                    <a:schemeClr val="tx1"/>
-                  </a:solidFill>
-                  <a:latin typeface="Times New Roman" panose="02020603050405020304" pitchFamily="18" charset="0"/>
-                  <a:cs typeface="Times New Roman" panose="02020603050405020304" pitchFamily="18" charset="0"/>
-                </a:rPr>
-                <a:t>Fusarium</a:t>
-              </a:r>
-              <a:r>
-                <a:rPr lang="en-US" sz="1000" dirty="0">
-                  <a:solidFill>
-                    <a:schemeClr val="tx1"/>
-                  </a:solidFill>
-                  <a:latin typeface="Times New Roman" panose="02020603050405020304" pitchFamily="18" charset="0"/>
-                  <a:cs typeface="Times New Roman" panose="02020603050405020304" pitchFamily="18" charset="0"/>
-                </a:rPr>
-                <a:t> species genome assemblies in FASTA format, as well as a list of the assemblies and a </a:t>
-              </a:r>
-              <a:r>
-                <a:rPr lang="en-US" sz="1000" i="1" dirty="0">
-                  <a:solidFill>
-                    <a:schemeClr val="tx1"/>
-                  </a:solidFill>
-                  <a:latin typeface="Times New Roman" panose="02020603050405020304" pitchFamily="18" charset="0"/>
-                  <a:cs typeface="Times New Roman" panose="02020603050405020304" pitchFamily="18" charset="0"/>
-                </a:rPr>
-                <a:t>mimp </a:t>
-              </a:r>
-              <a:r>
-                <a:rPr lang="en-US" sz="1000" dirty="0">
-                  <a:solidFill>
-                    <a:schemeClr val="tx1"/>
-                  </a:solidFill>
-                  <a:latin typeface="Times New Roman" panose="02020603050405020304" pitchFamily="18" charset="0"/>
-                  <a:cs typeface="Times New Roman" panose="02020603050405020304" pitchFamily="18" charset="0"/>
-                </a:rPr>
-                <a:t>profile HMM, are prepared as input. </a:t>
-              </a:r>
-            </a:p>
-          </p:txBody>
-        </p:sp>
-        <p:sp>
-          <p:nvSpPr>
-            <p:cNvPr id="29" name="TextBox 28">
-              <a:extLst>
-                <a:ext uri="{FF2B5EF4-FFF2-40B4-BE49-F238E27FC236}">
-                  <a16:creationId xmlns:a16="http://schemas.microsoft.com/office/drawing/2014/main" id="{7ACB2F06-EF52-CA7D-F30C-9FDD268FAE7D}"/>
-                </a:ext>
-              </a:extLst>
-            </p:cNvPr>
-            <p:cNvSpPr txBox="1"/>
-            <p:nvPr/>
-          </p:nvSpPr>
-          <p:spPr>
-            <a:xfrm>
-              <a:off x="617815" y="961093"/>
-              <a:ext cx="6153098" cy="471958"/>
-            </a:xfrm>
-            <a:prstGeom prst="rect">
-              <a:avLst/>
-            </a:prstGeom>
-            <a:noFill/>
-            <a:ln w="19050">
-              <a:solidFill>
-                <a:schemeClr val="accent4"/>
-              </a:solidFill>
-            </a:ln>
-          </p:spPr>
-          <p:txBody>
-            <a:bodyPr wrap="square" rtlCol="0">
-              <a:spAutoFit/>
-            </a:bodyPr>
-            <a:lstStyle/>
-            <a:p>
-              <a:pPr algn="ctr"/>
-              <a:r>
-                <a:rPr lang="en-US" sz="1050" b="1" i="1" dirty="0">
-                  <a:latin typeface="Times New Roman" panose="02020603050405020304" pitchFamily="18" charset="0"/>
-                  <a:cs typeface="Times New Roman" panose="02020603050405020304" pitchFamily="18" charset="0"/>
-                </a:rPr>
-                <a:t>Mimp </a:t>
-              </a:r>
-              <a:r>
-                <a:rPr lang="en-US" sz="1050" b="1" dirty="0">
-                  <a:latin typeface="Times New Roman" panose="02020603050405020304" pitchFamily="18" charset="0"/>
-                  <a:cs typeface="Times New Roman" panose="02020603050405020304" pitchFamily="18" charset="0"/>
-                </a:rPr>
-                <a:t>identification</a:t>
-              </a:r>
-            </a:p>
-            <a:p>
-              <a:pPr algn="ctr"/>
-              <a:r>
-                <a:rPr lang="en-US" sz="1050" dirty="0">
-                  <a:latin typeface="Times New Roman" panose="02020603050405020304" pitchFamily="18" charset="0"/>
-                  <a:cs typeface="Times New Roman" panose="02020603050405020304" pitchFamily="18" charset="0"/>
-                </a:rPr>
-                <a:t>Each </a:t>
-              </a:r>
-              <a:r>
-                <a:rPr lang="en-US" sz="1050" i="1" dirty="0">
-                  <a:latin typeface="Times New Roman" panose="02020603050405020304" pitchFamily="18" charset="0"/>
-                  <a:cs typeface="Times New Roman" panose="02020603050405020304" pitchFamily="18" charset="0"/>
-                </a:rPr>
-                <a:t>Fusarium</a:t>
-              </a:r>
-              <a:r>
-                <a:rPr lang="en-US" sz="1050" dirty="0">
-                  <a:latin typeface="Times New Roman" panose="02020603050405020304" pitchFamily="18" charset="0"/>
-                  <a:cs typeface="Times New Roman" panose="02020603050405020304" pitchFamily="18" charset="0"/>
-                </a:rPr>
-                <a:t> assembly is searched for </a:t>
-              </a:r>
-              <a:r>
-                <a:rPr lang="en-US" sz="1050" i="1" dirty="0">
-                  <a:latin typeface="Times New Roman" panose="02020603050405020304" pitchFamily="18" charset="0"/>
-                  <a:cs typeface="Times New Roman" panose="02020603050405020304" pitchFamily="18" charset="0"/>
-                </a:rPr>
-                <a:t>mimps </a:t>
-              </a:r>
-              <a:r>
-                <a:rPr lang="en-US" sz="1050" dirty="0">
-                  <a:latin typeface="Times New Roman" panose="02020603050405020304" pitchFamily="18" charset="0"/>
-                  <a:cs typeface="Times New Roman" panose="02020603050405020304" pitchFamily="18" charset="0"/>
-                </a:rPr>
-                <a:t>using a custom python script (using </a:t>
-              </a:r>
-              <a:r>
-                <a:rPr lang="en-US" sz="1050" i="1" dirty="0">
-                  <a:latin typeface="Times New Roman" panose="02020603050405020304" pitchFamily="18" charset="0"/>
-                  <a:cs typeface="Times New Roman" panose="02020603050405020304" pitchFamily="18" charset="0"/>
-                </a:rPr>
-                <a:t>mimp </a:t>
-              </a:r>
-              <a:r>
-                <a:rPr lang="en-US" sz="1050" dirty="0">
-                  <a:latin typeface="Times New Roman" panose="02020603050405020304" pitchFamily="18" charset="0"/>
-                  <a:cs typeface="Times New Roman" panose="02020603050405020304" pitchFamily="18" charset="0"/>
-                </a:rPr>
-                <a:t>TIRs) and NHMMER </a:t>
-              </a:r>
-              <a:r>
-                <a:rPr lang="en-GB" sz="1050" dirty="0">
-                  <a:latin typeface="Times New Roman" panose="02020603050405020304" pitchFamily="18" charset="0"/>
-                  <a:ea typeface="Times New Roman" panose="02020603050405020304" pitchFamily="18" charset="0"/>
-                </a:rPr>
-                <a:t>(v3.3.1) (</a:t>
-              </a:r>
-              <a:r>
-                <a:rPr lang="en-US" sz="1050" dirty="0">
-                  <a:latin typeface="Times New Roman" panose="02020603050405020304" pitchFamily="18" charset="0"/>
-                  <a:cs typeface="Times New Roman" panose="02020603050405020304" pitchFamily="18" charset="0"/>
-                </a:rPr>
-                <a:t>using a </a:t>
-              </a:r>
-              <a:r>
-                <a:rPr lang="en-US" sz="1050" i="1" dirty="0">
-                  <a:latin typeface="Times New Roman" panose="02020603050405020304" pitchFamily="18" charset="0"/>
-                  <a:cs typeface="Times New Roman" panose="02020603050405020304" pitchFamily="18" charset="0"/>
-                </a:rPr>
-                <a:t>mimp </a:t>
-              </a:r>
-              <a:r>
-                <a:rPr lang="en-US" sz="1050" dirty="0">
-                  <a:latin typeface="Times New Roman" panose="02020603050405020304" pitchFamily="18" charset="0"/>
-                  <a:cs typeface="Times New Roman" panose="02020603050405020304" pitchFamily="18" charset="0"/>
-                </a:rPr>
-                <a:t>profile-HMM).</a:t>
-              </a:r>
-            </a:p>
-          </p:txBody>
-        </p:sp>
-        <p:sp>
-          <p:nvSpPr>
-            <p:cNvPr id="30" name="TextBox 29">
-              <a:extLst>
-                <a:ext uri="{FF2B5EF4-FFF2-40B4-BE49-F238E27FC236}">
-                  <a16:creationId xmlns:a16="http://schemas.microsoft.com/office/drawing/2014/main" id="{691DA270-25BC-ECFF-7EED-18C8390263C9}"/>
-                </a:ext>
-              </a:extLst>
-            </p:cNvPr>
-            <p:cNvSpPr txBox="1"/>
-            <p:nvPr/>
-          </p:nvSpPr>
-          <p:spPr>
-            <a:xfrm>
-              <a:off x="617814" y="1680837"/>
-              <a:ext cx="6153099" cy="577081"/>
-            </a:xfrm>
-            <a:prstGeom prst="rect">
-              <a:avLst/>
-            </a:prstGeom>
-            <a:noFill/>
-            <a:ln w="19050">
-              <a:solidFill>
-                <a:schemeClr val="accent4"/>
-              </a:solidFill>
-            </a:ln>
-          </p:spPr>
-          <p:txBody>
-            <a:bodyPr wrap="square" rtlCol="0">
-              <a:spAutoFit/>
-            </a:bodyPr>
-            <a:lstStyle/>
-            <a:p>
-              <a:pPr algn="ctr"/>
-              <a:r>
-                <a:rPr lang="en-US" sz="1050" b="1" i="1" dirty="0">
-                  <a:latin typeface="Times New Roman" panose="02020603050405020304" pitchFamily="18" charset="0"/>
-                  <a:cs typeface="Times New Roman" panose="02020603050405020304" pitchFamily="18" charset="0"/>
-                </a:rPr>
-                <a:t>Mimp </a:t>
-              </a:r>
-              <a:r>
-                <a:rPr lang="en-US" sz="1050" b="1" dirty="0">
-                  <a:latin typeface="Times New Roman" panose="02020603050405020304" pitchFamily="18" charset="0"/>
-                  <a:cs typeface="Times New Roman" panose="02020603050405020304" pitchFamily="18" charset="0"/>
-                </a:rPr>
-                <a:t>region sequence identification</a:t>
-              </a:r>
-            </a:p>
-            <a:p>
-              <a:pPr algn="ctr"/>
-              <a:r>
-                <a:rPr lang="en-US" sz="1050" dirty="0">
-                  <a:latin typeface="Times New Roman" panose="02020603050405020304" pitchFamily="18" charset="0"/>
-                  <a:cs typeface="Times New Roman" panose="02020603050405020304" pitchFamily="18" charset="0"/>
-                </a:rPr>
-                <a:t>Identify regions 2.5kb either side of a </a:t>
-              </a:r>
-              <a:r>
-                <a:rPr lang="en-US" sz="1050" i="1" dirty="0">
-                  <a:latin typeface="Times New Roman" panose="02020603050405020304" pitchFamily="18" charset="0"/>
-                  <a:cs typeface="Times New Roman" panose="02020603050405020304" pitchFamily="18" charset="0"/>
-                </a:rPr>
-                <a:t>mimp </a:t>
-              </a:r>
-              <a:r>
-                <a:rPr lang="en-US" sz="1050" dirty="0">
-                  <a:latin typeface="Times New Roman" panose="02020603050405020304" pitchFamily="18" charset="0"/>
-                  <a:cs typeface="Times New Roman" panose="02020603050405020304" pitchFamily="18" charset="0"/>
-                </a:rPr>
-                <a:t>(</a:t>
-              </a:r>
-              <a:r>
-                <a:rPr lang="en-US" sz="1050" i="1" dirty="0">
-                  <a:latin typeface="Times New Roman" panose="02020603050405020304" pitchFamily="18" charset="0"/>
-                  <a:cs typeface="Times New Roman" panose="02020603050405020304" pitchFamily="18" charset="0"/>
-                </a:rPr>
-                <a:t>mimp</a:t>
-              </a:r>
-              <a:r>
-                <a:rPr lang="en-US" sz="1050" dirty="0">
-                  <a:latin typeface="Times New Roman" panose="02020603050405020304" pitchFamily="18" charset="0"/>
-                  <a:cs typeface="Times New Roman" panose="02020603050405020304" pitchFamily="18" charset="0"/>
-                </a:rPr>
-                <a:t> region), generating a </a:t>
-              </a:r>
-              <a:r>
-                <a:rPr lang="en-US" sz="1050" i="1" dirty="0">
-                  <a:latin typeface="Times New Roman" panose="02020603050405020304" pitchFamily="18" charset="0"/>
-                  <a:cs typeface="Times New Roman" panose="02020603050405020304" pitchFamily="18" charset="0"/>
-                </a:rPr>
-                <a:t>mimp </a:t>
-              </a:r>
-              <a:r>
-                <a:rPr lang="en-US" sz="1050" dirty="0">
-                  <a:latin typeface="Times New Roman" panose="02020603050405020304" pitchFamily="18" charset="0"/>
-                  <a:cs typeface="Times New Roman" panose="02020603050405020304" pitchFamily="18" charset="0"/>
-                </a:rPr>
-                <a:t>region GFF file for each genome assembly. </a:t>
-              </a:r>
-            </a:p>
-          </p:txBody>
-        </p:sp>
-        <p:sp>
-          <p:nvSpPr>
-            <p:cNvPr id="31" name="TextBox 30">
-              <a:extLst>
-                <a:ext uri="{FF2B5EF4-FFF2-40B4-BE49-F238E27FC236}">
-                  <a16:creationId xmlns:a16="http://schemas.microsoft.com/office/drawing/2014/main" id="{5540790C-75EC-AE43-DFFA-A968FC71989D}"/>
-                </a:ext>
-              </a:extLst>
-            </p:cNvPr>
-            <p:cNvSpPr txBox="1"/>
-            <p:nvPr/>
-          </p:nvSpPr>
-          <p:spPr>
-            <a:xfrm>
-              <a:off x="617817" y="2438227"/>
-              <a:ext cx="3035236" cy="1061829"/>
-            </a:xfrm>
-            <a:prstGeom prst="rect">
-              <a:avLst/>
-            </a:prstGeom>
-            <a:noFill/>
-            <a:ln w="19050">
-              <a:solidFill>
-                <a:schemeClr val="accent4"/>
-              </a:solidFill>
-            </a:ln>
-          </p:spPr>
-          <p:txBody>
-            <a:bodyPr wrap="square" rtlCol="0">
-              <a:spAutoFit/>
-            </a:bodyPr>
-            <a:lstStyle/>
-            <a:p>
-              <a:pPr algn="ctr"/>
-              <a:r>
-                <a:rPr lang="en-US" sz="1050" b="1" dirty="0">
-                  <a:latin typeface="Times New Roman" panose="02020603050405020304" pitchFamily="18" charset="0"/>
-                  <a:cs typeface="Times New Roman" panose="02020603050405020304" pitchFamily="18" charset="0"/>
-                </a:rPr>
-                <a:t>Augustus regions identification</a:t>
-              </a:r>
-            </a:p>
-            <a:p>
-              <a:pPr algn="ctr"/>
-              <a:r>
-                <a:rPr lang="en-US" sz="1050" dirty="0">
-                  <a:latin typeface="Times New Roman" panose="02020603050405020304" pitchFamily="18" charset="0"/>
-                  <a:cs typeface="Times New Roman" panose="02020603050405020304" pitchFamily="18" charset="0"/>
-                </a:rPr>
-                <a:t>Expand 20kb either side of the </a:t>
-              </a:r>
-              <a:r>
-                <a:rPr lang="en-US" sz="1050" i="1" dirty="0">
-                  <a:latin typeface="Times New Roman" panose="02020603050405020304" pitchFamily="18" charset="0"/>
-                  <a:cs typeface="Times New Roman" panose="02020603050405020304" pitchFamily="18" charset="0"/>
-                </a:rPr>
-                <a:t>mimp </a:t>
-              </a:r>
-              <a:r>
-                <a:rPr lang="en-US" sz="1050" dirty="0">
-                  <a:latin typeface="Times New Roman" panose="02020603050405020304" pitchFamily="18" charset="0"/>
-                  <a:cs typeface="Times New Roman" panose="02020603050405020304" pitchFamily="18" charset="0"/>
-                </a:rPr>
-                <a:t>regions to identify regions for AUGUSTUS (v3.3.3) annotation. Generate an Augustus (v3.3.3) region GFF, and FASTAs where all non-Augustus have been hard masked.   </a:t>
-              </a:r>
-            </a:p>
-          </p:txBody>
-        </p:sp>
-        <p:sp>
-          <p:nvSpPr>
-            <p:cNvPr id="32" name="TextBox 31">
-              <a:extLst>
-                <a:ext uri="{FF2B5EF4-FFF2-40B4-BE49-F238E27FC236}">
-                  <a16:creationId xmlns:a16="http://schemas.microsoft.com/office/drawing/2014/main" id="{6324A5E0-C5F2-41E9-B0B7-ED4197F885BA}"/>
-                </a:ext>
-              </a:extLst>
-            </p:cNvPr>
-            <p:cNvSpPr txBox="1"/>
-            <p:nvPr/>
-          </p:nvSpPr>
-          <p:spPr>
-            <a:xfrm>
-              <a:off x="3750979" y="2438227"/>
-              <a:ext cx="3019934" cy="1054135"/>
-            </a:xfrm>
-            <a:prstGeom prst="rect">
-              <a:avLst/>
-            </a:prstGeom>
-            <a:noFill/>
-            <a:ln w="19050">
-              <a:solidFill>
-                <a:schemeClr val="accent4"/>
-              </a:solidFill>
-            </a:ln>
-          </p:spPr>
-          <p:txBody>
-            <a:bodyPr wrap="square" rtlCol="0">
-              <a:spAutoFit/>
-            </a:bodyPr>
-            <a:lstStyle/>
-            <a:p>
-              <a:pPr algn="ctr"/>
-              <a:r>
-                <a:rPr lang="en-US" sz="1050" b="1" dirty="0">
-                  <a:latin typeface="Times New Roman" panose="02020603050405020304" pitchFamily="18" charset="0"/>
-                  <a:cs typeface="Times New Roman" panose="02020603050405020304" pitchFamily="18" charset="0"/>
-                </a:rPr>
-                <a:t>Mask non-</a:t>
-              </a:r>
-              <a:r>
-                <a:rPr lang="en-US" sz="1050" b="1" i="1" dirty="0">
-                  <a:latin typeface="Times New Roman" panose="02020603050405020304" pitchFamily="18" charset="0"/>
-                  <a:cs typeface="Times New Roman" panose="02020603050405020304" pitchFamily="18" charset="0"/>
-                </a:rPr>
-                <a:t>mimp</a:t>
-              </a:r>
-              <a:r>
-                <a:rPr lang="en-US" sz="1050" b="1" dirty="0">
-                  <a:latin typeface="Times New Roman" panose="02020603050405020304" pitchFamily="18" charset="0"/>
-                  <a:cs typeface="Times New Roman" panose="02020603050405020304" pitchFamily="18" charset="0"/>
-                </a:rPr>
-                <a:t> regions</a:t>
-              </a:r>
-            </a:p>
-            <a:p>
-              <a:pPr algn="ctr"/>
-              <a:r>
-                <a:rPr lang="en-US" sz="1050" dirty="0">
-                  <a:latin typeface="Times New Roman" panose="02020603050405020304" pitchFamily="18" charset="0"/>
-                  <a:cs typeface="Times New Roman" panose="02020603050405020304" pitchFamily="18" charset="0"/>
-                </a:rPr>
-                <a:t>Using the </a:t>
-              </a:r>
-              <a:r>
-                <a:rPr lang="en-US" sz="1050" i="1" dirty="0">
-                  <a:latin typeface="Times New Roman" panose="02020603050405020304" pitchFamily="18" charset="0"/>
-                  <a:cs typeface="Times New Roman" panose="02020603050405020304" pitchFamily="18" charset="0"/>
-                </a:rPr>
-                <a:t>mimp </a:t>
-              </a:r>
-              <a:r>
-                <a:rPr lang="en-US" sz="1050" dirty="0">
-                  <a:latin typeface="Times New Roman" panose="02020603050405020304" pitchFamily="18" charset="0"/>
-                  <a:cs typeface="Times New Roman" panose="02020603050405020304" pitchFamily="18" charset="0"/>
-                </a:rPr>
-                <a:t>region GFF, create a </a:t>
-              </a:r>
-              <a:r>
-                <a:rPr lang="en-US" sz="1050" i="1" dirty="0">
-                  <a:latin typeface="Times New Roman" panose="02020603050405020304" pitchFamily="18" charset="0"/>
-                  <a:cs typeface="Times New Roman" panose="02020603050405020304" pitchFamily="18" charset="0"/>
-                </a:rPr>
-                <a:t>mimp</a:t>
-              </a:r>
-              <a:r>
-                <a:rPr lang="en-US" sz="1050" dirty="0">
-                  <a:latin typeface="Times New Roman" panose="02020603050405020304" pitchFamily="18" charset="0"/>
-                  <a:cs typeface="Times New Roman" panose="02020603050405020304" pitchFamily="18" charset="0"/>
-                </a:rPr>
-                <a:t> region FASTAS, where all non-</a:t>
-              </a:r>
-              <a:r>
-                <a:rPr lang="en-US" sz="1050" i="1" dirty="0">
-                  <a:latin typeface="Times New Roman" panose="02020603050405020304" pitchFamily="18" charset="0"/>
-                  <a:cs typeface="Times New Roman" panose="02020603050405020304" pitchFamily="18" charset="0"/>
-                </a:rPr>
-                <a:t>mimp </a:t>
-              </a:r>
-              <a:r>
-                <a:rPr lang="en-US" sz="1050" dirty="0">
-                  <a:latin typeface="Times New Roman" panose="02020603050405020304" pitchFamily="18" charset="0"/>
-                  <a:cs typeface="Times New Roman" panose="02020603050405020304" pitchFamily="18" charset="0"/>
-                </a:rPr>
-                <a:t>regions have been hard masked.</a:t>
-              </a:r>
-            </a:p>
-            <a:p>
-              <a:pPr algn="ctr"/>
-              <a:endParaRPr lang="en-US" sz="1050" dirty="0">
-                <a:latin typeface="Times New Roman" panose="02020603050405020304" pitchFamily="18" charset="0"/>
-                <a:cs typeface="Times New Roman" panose="02020603050405020304" pitchFamily="18" charset="0"/>
-              </a:endParaRPr>
-            </a:p>
-            <a:p>
-              <a:pPr algn="ctr"/>
-              <a:r>
-                <a:rPr lang="en-US" sz="1000" dirty="0">
-                  <a:latin typeface="Times New Roman" panose="02020603050405020304" pitchFamily="18" charset="0"/>
-                  <a:cs typeface="Times New Roman" panose="02020603050405020304" pitchFamily="18" charset="0"/>
-                </a:rPr>
-                <a:t> </a:t>
-              </a:r>
-              <a:endParaRPr lang="en-US" sz="900" dirty="0">
-                <a:latin typeface="Times New Roman" panose="02020603050405020304" pitchFamily="18" charset="0"/>
-                <a:cs typeface="Times New Roman" panose="02020603050405020304" pitchFamily="18" charset="0"/>
-              </a:endParaRPr>
-            </a:p>
-          </p:txBody>
-        </p:sp>
-        <p:sp>
-          <p:nvSpPr>
-            <p:cNvPr id="33" name="TextBox 32">
-              <a:extLst>
-                <a:ext uri="{FF2B5EF4-FFF2-40B4-BE49-F238E27FC236}">
-                  <a16:creationId xmlns:a16="http://schemas.microsoft.com/office/drawing/2014/main" id="{B711EA04-8776-BB1F-533B-25F5827492B4}"/>
-                </a:ext>
-              </a:extLst>
-            </p:cNvPr>
-            <p:cNvSpPr txBox="1"/>
-            <p:nvPr/>
-          </p:nvSpPr>
-          <p:spPr>
-            <a:xfrm>
-              <a:off x="3750973" y="3628125"/>
-              <a:ext cx="3019934" cy="738664"/>
-            </a:xfrm>
-            <a:prstGeom prst="rect">
-              <a:avLst/>
-            </a:prstGeom>
-            <a:noFill/>
-            <a:ln w="19050">
-              <a:solidFill>
-                <a:srgbClr val="0070C0"/>
-              </a:solidFill>
-            </a:ln>
-          </p:spPr>
-          <p:txBody>
-            <a:bodyPr wrap="square" rtlCol="0">
-              <a:spAutoFit/>
-            </a:bodyPr>
-            <a:lstStyle/>
-            <a:p>
-              <a:pPr algn="ctr"/>
-              <a:r>
-                <a:rPr lang="en-US" sz="1050" b="1" dirty="0">
-                  <a:latin typeface="Times New Roman" panose="02020603050405020304" pitchFamily="18" charset="0"/>
-                  <a:cs typeface="Times New Roman" panose="02020603050405020304" pitchFamily="18" charset="0"/>
-                </a:rPr>
-                <a:t>ORF Prediction </a:t>
-              </a:r>
-            </a:p>
-            <a:p>
-              <a:pPr algn="ctr"/>
-              <a:r>
-                <a:rPr lang="en-US" sz="1050" dirty="0">
-                  <a:latin typeface="Times New Roman" panose="02020603050405020304" pitchFamily="18" charset="0"/>
-                  <a:cs typeface="Times New Roman" panose="02020603050405020304" pitchFamily="18" charset="0"/>
-                </a:rPr>
-                <a:t>Getorf from Emboss (v6.6.0.0) is used to find open reading frames (ORFs) in the 2.5kb region. </a:t>
-              </a:r>
-            </a:p>
-            <a:p>
-              <a:pPr algn="ctr"/>
-              <a:r>
-                <a:rPr lang="en-US" sz="900" dirty="0">
-                  <a:latin typeface="Times New Roman" panose="02020603050405020304" pitchFamily="18" charset="0"/>
-                  <a:cs typeface="Times New Roman" panose="02020603050405020304" pitchFamily="18" charset="0"/>
-                </a:rPr>
-                <a:t> </a:t>
-              </a:r>
-            </a:p>
-          </p:txBody>
-        </p:sp>
-        <p:sp>
-          <p:nvSpPr>
-            <p:cNvPr id="34" name="TextBox 33">
-              <a:extLst>
-                <a:ext uri="{FF2B5EF4-FFF2-40B4-BE49-F238E27FC236}">
-                  <a16:creationId xmlns:a16="http://schemas.microsoft.com/office/drawing/2014/main" id="{2CF06320-44C5-7F77-6DA0-DC4B361DFD27}"/>
-                </a:ext>
-              </a:extLst>
-            </p:cNvPr>
-            <p:cNvSpPr txBox="1"/>
-            <p:nvPr/>
-          </p:nvSpPr>
-          <p:spPr>
-            <a:xfrm>
-              <a:off x="617816" y="4529168"/>
-              <a:ext cx="6153093" cy="339810"/>
-            </a:xfrm>
-            <a:prstGeom prst="rect">
-              <a:avLst/>
-            </a:prstGeom>
-            <a:noFill/>
-            <a:ln w="19050">
-              <a:solidFill>
-                <a:srgbClr val="0070C0"/>
-              </a:solidFill>
-            </a:ln>
-          </p:spPr>
-          <p:txBody>
-            <a:bodyPr wrap="square" rtlCol="0">
-              <a:spAutoFit/>
-            </a:bodyPr>
-            <a:lstStyle/>
-            <a:p>
-              <a:pPr algn="ctr"/>
-              <a:r>
-                <a:rPr lang="en-US" sz="1050" b="1" dirty="0">
-                  <a:latin typeface="Times New Roman" panose="02020603050405020304" pitchFamily="18" charset="0"/>
-                  <a:cs typeface="Times New Roman" panose="02020603050405020304" pitchFamily="18" charset="0"/>
-                </a:rPr>
-                <a:t>Signal peptide filtering</a:t>
-              </a:r>
-            </a:p>
-            <a:p>
-              <a:pPr algn="ctr"/>
-              <a:r>
-                <a:rPr lang="en-US" sz="1050" dirty="0">
-                  <a:latin typeface="Times New Roman" panose="02020603050405020304" pitchFamily="18" charset="0"/>
-                  <a:cs typeface="Times New Roman" panose="02020603050405020304" pitchFamily="18" charset="0"/>
-                </a:rPr>
-                <a:t>SignalP (v4.1) is used search all AUGUSTUS gene models and ORFs for a signal peptide.</a:t>
-              </a:r>
-            </a:p>
-          </p:txBody>
-        </p:sp>
-        <p:sp>
-          <p:nvSpPr>
-            <p:cNvPr id="35" name="TextBox 34">
-              <a:extLst>
-                <a:ext uri="{FF2B5EF4-FFF2-40B4-BE49-F238E27FC236}">
-                  <a16:creationId xmlns:a16="http://schemas.microsoft.com/office/drawing/2014/main" id="{AE157376-0193-94C8-7444-E50B1DB6C7C4}"/>
-                </a:ext>
-              </a:extLst>
-            </p:cNvPr>
-            <p:cNvSpPr txBox="1"/>
-            <p:nvPr/>
-          </p:nvSpPr>
-          <p:spPr>
-            <a:xfrm>
-              <a:off x="617817" y="3630805"/>
-              <a:ext cx="3035235" cy="604107"/>
-            </a:xfrm>
-            <a:prstGeom prst="rect">
-              <a:avLst/>
-            </a:prstGeom>
-            <a:noFill/>
-            <a:ln w="19050">
-              <a:solidFill>
-                <a:srgbClr val="0070C0"/>
-              </a:solidFill>
-            </a:ln>
-          </p:spPr>
-          <p:txBody>
-            <a:bodyPr wrap="square" rtlCol="0">
-              <a:spAutoFit/>
-            </a:bodyPr>
-            <a:lstStyle/>
-            <a:p>
-              <a:pPr algn="ctr"/>
-              <a:r>
-                <a:rPr lang="en-US" sz="1050" b="1" dirty="0">
-                  <a:latin typeface="Times New Roman" panose="02020603050405020304" pitchFamily="18" charset="0"/>
-                  <a:cs typeface="Times New Roman" panose="02020603050405020304" pitchFamily="18" charset="0"/>
-                </a:rPr>
-                <a:t>AUGUSTUS gene prediction</a:t>
-              </a:r>
-            </a:p>
-            <a:p>
-              <a:pPr algn="ctr"/>
-              <a:r>
-                <a:rPr lang="en-US" sz="1050" dirty="0">
-                  <a:latin typeface="Times New Roman" panose="02020603050405020304" pitchFamily="18" charset="0"/>
-                  <a:cs typeface="Times New Roman" panose="02020603050405020304" pitchFamily="18" charset="0"/>
-                </a:rPr>
-                <a:t>The Augustus region FASTA is submitted to AUGUSTUS (v3.3.3) for gene prediction with the “fusarium” species parameter selected.</a:t>
-              </a:r>
-            </a:p>
-          </p:txBody>
-        </p:sp>
-        <p:sp>
-          <p:nvSpPr>
-            <p:cNvPr id="36" name="TextBox 35">
-              <a:extLst>
-                <a:ext uri="{FF2B5EF4-FFF2-40B4-BE49-F238E27FC236}">
-                  <a16:creationId xmlns:a16="http://schemas.microsoft.com/office/drawing/2014/main" id="{976CB707-1090-E6D0-E086-A23D5310FC7A}"/>
-                </a:ext>
-              </a:extLst>
-            </p:cNvPr>
-            <p:cNvSpPr txBox="1"/>
-            <p:nvPr/>
-          </p:nvSpPr>
-          <p:spPr>
-            <a:xfrm>
-              <a:off x="617817" y="5096516"/>
-              <a:ext cx="6153092" cy="513692"/>
-            </a:xfrm>
-            <a:prstGeom prst="rect">
-              <a:avLst/>
-            </a:prstGeom>
-            <a:noFill/>
-            <a:ln w="19050">
-              <a:solidFill>
-                <a:schemeClr val="accent5">
-                  <a:lumMod val="75000"/>
-                </a:schemeClr>
-              </a:solidFill>
-            </a:ln>
-          </p:spPr>
-          <p:txBody>
-            <a:bodyPr wrap="square" lIns="28664" tIns="14332" rIns="28664" bIns="14332" rtlCol="0" anchor="t">
-              <a:spAutoFit/>
-            </a:bodyPr>
-            <a:lstStyle/>
-            <a:p>
-              <a:pPr algn="ctr"/>
-              <a:r>
-                <a:rPr lang="en-US" sz="1050" b="1" dirty="0">
-                  <a:latin typeface="Times New Roman" panose="02020603050405020304" pitchFamily="18" charset="0"/>
-                  <a:cs typeface="Times New Roman" panose="02020603050405020304" pitchFamily="18" charset="0"/>
-                </a:rPr>
-                <a:t>Size filter</a:t>
-              </a:r>
-            </a:p>
-            <a:p>
-              <a:pPr algn="ctr"/>
-              <a:r>
-                <a:rPr lang="en-US" sz="1050" dirty="0">
-                  <a:latin typeface="Times New Roman"/>
-                  <a:cs typeface="Times New Roman"/>
-                </a:rPr>
-                <a:t>Protein sequences containing a signal peptide predicted by SignalP (v4.1) are filtered based on size, with sequences &lt;450aa and &gt;30aa kept for effector prediction.  </a:t>
-              </a:r>
-              <a:endParaRPr lang="en-US" sz="1050" dirty="0">
-                <a:latin typeface="Times New Roman" panose="02020603050405020304" pitchFamily="18" charset="0"/>
-                <a:cs typeface="Times New Roman" panose="02020603050405020304" pitchFamily="18" charset="0"/>
-              </a:endParaRPr>
-            </a:p>
-          </p:txBody>
-        </p:sp>
-        <p:sp>
-          <p:nvSpPr>
-            <p:cNvPr id="37" name="TextBox 36">
-              <a:extLst>
-                <a:ext uri="{FF2B5EF4-FFF2-40B4-BE49-F238E27FC236}">
-                  <a16:creationId xmlns:a16="http://schemas.microsoft.com/office/drawing/2014/main" id="{6DCA523E-F833-5F7E-A65A-30DAA2F76805}"/>
-                </a:ext>
-              </a:extLst>
-            </p:cNvPr>
-            <p:cNvSpPr txBox="1"/>
-            <p:nvPr/>
-          </p:nvSpPr>
-          <p:spPr>
-            <a:xfrm>
-              <a:off x="617816" y="5842985"/>
-              <a:ext cx="6153093" cy="415498"/>
-            </a:xfrm>
-            <a:prstGeom prst="rect">
-              <a:avLst/>
-            </a:prstGeom>
-            <a:noFill/>
-            <a:ln w="19050">
-              <a:solidFill>
-                <a:schemeClr val="accent5">
-                  <a:lumMod val="75000"/>
-                </a:schemeClr>
-              </a:solidFill>
-            </a:ln>
-          </p:spPr>
-          <p:txBody>
-            <a:bodyPr wrap="square" rtlCol="0">
-              <a:spAutoFit/>
-            </a:bodyPr>
-            <a:lstStyle/>
-            <a:p>
-              <a:pPr algn="ctr"/>
-              <a:r>
-                <a:rPr lang="en-US" sz="1050" b="1" dirty="0">
-                  <a:latin typeface="Times New Roman" panose="02020603050405020304" pitchFamily="18" charset="0"/>
-                  <a:cs typeface="Times New Roman" panose="02020603050405020304" pitchFamily="18" charset="0"/>
-                </a:rPr>
-                <a:t> EffectorP (v2.0.1) scan for likely effectors</a:t>
-              </a:r>
-            </a:p>
-            <a:p>
-              <a:pPr algn="ctr"/>
-              <a:r>
-                <a:rPr lang="en-US" sz="1050" dirty="0">
-                  <a:latin typeface="Times New Roman" panose="02020603050405020304" pitchFamily="18" charset="0"/>
-                  <a:cs typeface="Times New Roman" panose="02020603050405020304" pitchFamily="18" charset="0"/>
-                </a:rPr>
-                <a:t>Each signal peptide and size filtered sequences is submitted to EffectorP (v2.0.1) for fungal effector prediction. </a:t>
-              </a:r>
-            </a:p>
-          </p:txBody>
-        </p:sp>
-        <p:cxnSp>
-          <p:nvCxnSpPr>
-            <p:cNvPr id="38" name="Straight Arrow Connector 39">
-              <a:extLst>
-                <a:ext uri="{FF2B5EF4-FFF2-40B4-BE49-F238E27FC236}">
-                  <a16:creationId xmlns:a16="http://schemas.microsoft.com/office/drawing/2014/main" id="{AC2CB13E-9DD3-CD43-4C1B-156384BB78BC}"/>
-                </a:ext>
-              </a:extLst>
-            </p:cNvPr>
-            <p:cNvCxnSpPr>
-              <a:cxnSpLocks/>
-              <a:stCxn id="30" idx="2"/>
-              <a:endCxn id="31" idx="0"/>
-            </p:cNvCxnSpPr>
-            <p:nvPr/>
-          </p:nvCxnSpPr>
-          <p:spPr>
-            <a:xfrm rot="5400000">
-              <a:off x="2824746" y="1568608"/>
-              <a:ext cx="180309" cy="1558929"/>
-            </a:xfrm>
-            <a:prstGeom prst="bentConnector3">
-              <a:avLst>
-                <a:gd name="adj1" fmla="val 50000"/>
-              </a:avLst>
-            </a:prstGeom>
-            <a:ln w="19050">
-              <a:solidFill>
-                <a:schemeClr val="tx1"/>
-              </a:solidFill>
-              <a:headEnd type="none" w="med" len="med"/>
-              <a:tailEnd type="arrow" w="med" len="med"/>
-            </a:ln>
-          </p:spPr>
-          <p:style>
-            <a:lnRef idx="1">
-              <a:schemeClr val="accent1"/>
-            </a:lnRef>
-            <a:fillRef idx="0">
-              <a:schemeClr val="accent1"/>
-            </a:fillRef>
-            <a:effectRef idx="0">
-              <a:schemeClr val="accent1"/>
-            </a:effectRef>
-            <a:fontRef idx="minor">
-              <a:schemeClr val="tx1"/>
-            </a:fontRef>
-          </p:style>
-        </p:cxnSp>
-        <p:cxnSp>
-          <p:nvCxnSpPr>
-            <p:cNvPr id="39" name="Straight Arrow Connector 38">
-              <a:extLst>
-                <a:ext uri="{FF2B5EF4-FFF2-40B4-BE49-F238E27FC236}">
-                  <a16:creationId xmlns:a16="http://schemas.microsoft.com/office/drawing/2014/main" id="{80B17E49-3031-9706-BDF3-6031A9A28FFA}"/>
-                </a:ext>
-              </a:extLst>
-            </p:cNvPr>
-            <p:cNvCxnSpPr>
-              <a:cxnSpLocks/>
-              <a:stCxn id="31" idx="2"/>
-              <a:endCxn id="35" idx="0"/>
-            </p:cNvCxnSpPr>
-            <p:nvPr/>
-          </p:nvCxnSpPr>
-          <p:spPr>
-            <a:xfrm>
-              <a:off x="2135435" y="3500056"/>
-              <a:ext cx="0" cy="130749"/>
-            </a:xfrm>
-            <a:prstGeom prst="straightConnector1">
-              <a:avLst/>
-            </a:prstGeom>
-            <a:ln w="19050">
-              <a:solidFill>
-                <a:schemeClr val="tx1"/>
-              </a:solidFill>
-              <a:headEnd type="none" w="med" len="med"/>
-              <a:tailEnd type="arrow" w="med" len="med"/>
-            </a:ln>
-          </p:spPr>
-          <p:style>
-            <a:lnRef idx="1">
-              <a:schemeClr val="accent1"/>
-            </a:lnRef>
-            <a:fillRef idx="0">
-              <a:schemeClr val="accent1"/>
-            </a:fillRef>
-            <a:effectRef idx="0">
-              <a:schemeClr val="accent1"/>
-            </a:effectRef>
-            <a:fontRef idx="minor">
-              <a:schemeClr val="tx1"/>
-            </a:fontRef>
-          </p:style>
-        </p:cxnSp>
-        <p:cxnSp>
-          <p:nvCxnSpPr>
-            <p:cNvPr id="40" name="Straight Arrow Connector 39">
-              <a:extLst>
-                <a:ext uri="{FF2B5EF4-FFF2-40B4-BE49-F238E27FC236}">
-                  <a16:creationId xmlns:a16="http://schemas.microsoft.com/office/drawing/2014/main" id="{37AD526A-51C8-22C7-ED75-940380912E7C}"/>
-                </a:ext>
-              </a:extLst>
-            </p:cNvPr>
-            <p:cNvCxnSpPr>
-              <a:cxnSpLocks/>
-              <a:stCxn id="33" idx="2"/>
-            </p:cNvCxnSpPr>
-            <p:nvPr/>
-          </p:nvCxnSpPr>
-          <p:spPr>
-            <a:xfrm>
-              <a:off x="5260940" y="4366789"/>
-              <a:ext cx="0" cy="162379"/>
-            </a:xfrm>
-            <a:prstGeom prst="straightConnector1">
-              <a:avLst/>
-            </a:prstGeom>
-            <a:ln w="19050">
-              <a:solidFill>
-                <a:schemeClr val="tx1"/>
-              </a:solidFill>
-              <a:headEnd type="none" w="med" len="med"/>
-              <a:tailEnd type="arrow" w="med" len="med"/>
-            </a:ln>
-          </p:spPr>
-          <p:style>
-            <a:lnRef idx="1">
-              <a:schemeClr val="accent1"/>
-            </a:lnRef>
-            <a:fillRef idx="0">
-              <a:schemeClr val="accent1"/>
-            </a:fillRef>
-            <a:effectRef idx="0">
-              <a:schemeClr val="accent1"/>
-            </a:effectRef>
-            <a:fontRef idx="minor">
-              <a:schemeClr val="tx1"/>
-            </a:fontRef>
-          </p:style>
-        </p:cxnSp>
-        <p:cxnSp>
-          <p:nvCxnSpPr>
-            <p:cNvPr id="41" name="Straight Arrow Connector 40">
-              <a:extLst>
-                <a:ext uri="{FF2B5EF4-FFF2-40B4-BE49-F238E27FC236}">
-                  <a16:creationId xmlns:a16="http://schemas.microsoft.com/office/drawing/2014/main" id="{E4D9565D-4082-948F-58CB-8BF463E36C28}"/>
-                </a:ext>
-              </a:extLst>
-            </p:cNvPr>
-            <p:cNvCxnSpPr>
-              <a:cxnSpLocks/>
-              <a:stCxn id="32" idx="2"/>
-              <a:endCxn id="33" idx="0"/>
-            </p:cNvCxnSpPr>
-            <p:nvPr/>
-          </p:nvCxnSpPr>
-          <p:spPr>
-            <a:xfrm flipH="1">
-              <a:off x="5260940" y="3492362"/>
-              <a:ext cx="6" cy="135763"/>
-            </a:xfrm>
-            <a:prstGeom prst="straightConnector1">
-              <a:avLst/>
-            </a:prstGeom>
-            <a:ln w="19050">
-              <a:solidFill>
-                <a:schemeClr val="tx1"/>
-              </a:solidFill>
-              <a:headEnd type="none" w="med" len="med"/>
-              <a:tailEnd type="arrow" w="med" len="med"/>
-            </a:ln>
-          </p:spPr>
-          <p:style>
-            <a:lnRef idx="1">
-              <a:schemeClr val="accent1"/>
-            </a:lnRef>
-            <a:fillRef idx="0">
-              <a:schemeClr val="accent1"/>
-            </a:fillRef>
-            <a:effectRef idx="0">
-              <a:schemeClr val="accent1"/>
-            </a:effectRef>
-            <a:fontRef idx="minor">
-              <a:schemeClr val="tx1"/>
-            </a:fontRef>
-          </p:style>
-        </p:cxnSp>
-        <p:cxnSp>
-          <p:nvCxnSpPr>
-            <p:cNvPr id="42" name="Straight Arrow Connector 41">
-              <a:extLst>
-                <a:ext uri="{FF2B5EF4-FFF2-40B4-BE49-F238E27FC236}">
-                  <a16:creationId xmlns:a16="http://schemas.microsoft.com/office/drawing/2014/main" id="{5327B655-1121-397A-9CA1-F589B30DD736}"/>
-                </a:ext>
-              </a:extLst>
-            </p:cNvPr>
-            <p:cNvCxnSpPr>
-              <a:cxnSpLocks/>
-              <a:stCxn id="36" idx="2"/>
-              <a:endCxn id="37" idx="0"/>
-            </p:cNvCxnSpPr>
-            <p:nvPr/>
-          </p:nvCxnSpPr>
-          <p:spPr>
-            <a:xfrm>
-              <a:off x="3694363" y="5610208"/>
-              <a:ext cx="0" cy="232777"/>
-            </a:xfrm>
-            <a:prstGeom prst="straightConnector1">
-              <a:avLst/>
-            </a:prstGeom>
-            <a:ln w="19050">
-              <a:solidFill>
-                <a:schemeClr val="tx1"/>
-              </a:solidFill>
-              <a:headEnd type="none" w="med" len="med"/>
-              <a:tailEnd type="arrow" w="med" len="med"/>
-            </a:ln>
-          </p:spPr>
-          <p:style>
-            <a:lnRef idx="1">
-              <a:schemeClr val="accent1"/>
-            </a:lnRef>
-            <a:fillRef idx="0">
-              <a:schemeClr val="accent1"/>
-            </a:fillRef>
-            <a:effectRef idx="0">
-              <a:schemeClr val="accent1"/>
-            </a:effectRef>
-            <a:fontRef idx="minor">
-              <a:schemeClr val="tx1"/>
-            </a:fontRef>
-          </p:style>
-        </p:cxnSp>
-        <p:cxnSp>
-          <p:nvCxnSpPr>
-            <p:cNvPr id="43" name="Straight Arrow Connector 42">
-              <a:extLst>
-                <a:ext uri="{FF2B5EF4-FFF2-40B4-BE49-F238E27FC236}">
-                  <a16:creationId xmlns:a16="http://schemas.microsoft.com/office/drawing/2014/main" id="{B954DB71-9171-6F9A-D14C-86A713998648}"/>
-                </a:ext>
-              </a:extLst>
-            </p:cNvPr>
-            <p:cNvCxnSpPr>
-              <a:cxnSpLocks/>
-              <a:stCxn id="29" idx="2"/>
-              <a:endCxn id="30" idx="0"/>
-            </p:cNvCxnSpPr>
-            <p:nvPr/>
-          </p:nvCxnSpPr>
-          <p:spPr>
-            <a:xfrm>
-              <a:off x="3694364" y="1433051"/>
-              <a:ext cx="0" cy="247786"/>
-            </a:xfrm>
-            <a:prstGeom prst="straightConnector1">
-              <a:avLst/>
-            </a:prstGeom>
-            <a:ln w="19050">
-              <a:solidFill>
-                <a:schemeClr val="tx1"/>
-              </a:solidFill>
-              <a:headEnd type="none" w="med" len="med"/>
-              <a:tailEnd type="arrow" w="med" len="med"/>
-            </a:ln>
-          </p:spPr>
-          <p:style>
-            <a:lnRef idx="1">
-              <a:schemeClr val="accent1"/>
-            </a:lnRef>
-            <a:fillRef idx="0">
-              <a:schemeClr val="accent1"/>
-            </a:fillRef>
-            <a:effectRef idx="0">
-              <a:schemeClr val="accent1"/>
-            </a:effectRef>
-            <a:fontRef idx="minor">
-              <a:schemeClr val="tx1"/>
-            </a:fontRef>
-          </p:style>
-        </p:cxnSp>
-        <p:cxnSp>
-          <p:nvCxnSpPr>
-            <p:cNvPr id="44" name="Straight Arrow Connector 39">
-              <a:extLst>
-                <a:ext uri="{FF2B5EF4-FFF2-40B4-BE49-F238E27FC236}">
-                  <a16:creationId xmlns:a16="http://schemas.microsoft.com/office/drawing/2014/main" id="{28D829CA-2B20-EC7B-5887-5CCFA31D626F}"/>
-                </a:ext>
-              </a:extLst>
-            </p:cNvPr>
-            <p:cNvCxnSpPr>
-              <a:cxnSpLocks/>
-              <a:stCxn id="30" idx="2"/>
-              <a:endCxn id="32" idx="0"/>
-            </p:cNvCxnSpPr>
-            <p:nvPr/>
-          </p:nvCxnSpPr>
-          <p:spPr>
-            <a:xfrm rot="16200000" flipH="1">
-              <a:off x="4387501" y="1564781"/>
-              <a:ext cx="180309" cy="1566582"/>
-            </a:xfrm>
-            <a:prstGeom prst="bentConnector3">
-              <a:avLst>
-                <a:gd name="adj1" fmla="val 50000"/>
-              </a:avLst>
-            </a:prstGeom>
-            <a:ln w="19050">
-              <a:solidFill>
-                <a:schemeClr val="tx1"/>
-              </a:solidFill>
-              <a:headEnd type="none" w="med" len="med"/>
-              <a:tailEnd type="arrow" w="med" len="med"/>
-            </a:ln>
-          </p:spPr>
-          <p:style>
-            <a:lnRef idx="1">
-              <a:schemeClr val="accent1"/>
-            </a:lnRef>
-            <a:fillRef idx="0">
-              <a:schemeClr val="accent1"/>
-            </a:fillRef>
-            <a:effectRef idx="0">
-              <a:schemeClr val="accent1"/>
-            </a:effectRef>
-            <a:fontRef idx="minor">
-              <a:schemeClr val="tx1"/>
-            </a:fontRef>
-          </p:style>
-        </p:cxnSp>
-        <p:cxnSp>
-          <p:nvCxnSpPr>
-            <p:cNvPr id="45" name="Straight Arrow Connector 44">
-              <a:extLst>
-                <a:ext uri="{FF2B5EF4-FFF2-40B4-BE49-F238E27FC236}">
-                  <a16:creationId xmlns:a16="http://schemas.microsoft.com/office/drawing/2014/main" id="{B4BAA9E8-2B6B-77BD-293D-288F8B1D232C}"/>
-                </a:ext>
-              </a:extLst>
-            </p:cNvPr>
-            <p:cNvCxnSpPr>
-              <a:cxnSpLocks/>
-              <a:stCxn id="34" idx="2"/>
-              <a:endCxn id="36" idx="0"/>
-            </p:cNvCxnSpPr>
-            <p:nvPr/>
-          </p:nvCxnSpPr>
-          <p:spPr>
-            <a:xfrm>
-              <a:off x="3694363" y="4868978"/>
-              <a:ext cx="0" cy="227538"/>
-            </a:xfrm>
-            <a:prstGeom prst="straightConnector1">
-              <a:avLst/>
-            </a:prstGeom>
-            <a:ln w="19050">
-              <a:solidFill>
-                <a:schemeClr val="tx1"/>
-              </a:solidFill>
-              <a:headEnd type="none" w="med" len="med"/>
-              <a:tailEnd type="arrow" w="med" len="med"/>
-            </a:ln>
-          </p:spPr>
-          <p:style>
-            <a:lnRef idx="1">
-              <a:schemeClr val="accent1"/>
-            </a:lnRef>
-            <a:fillRef idx="0">
-              <a:schemeClr val="accent1"/>
-            </a:fillRef>
-            <a:effectRef idx="0">
-              <a:schemeClr val="accent1"/>
-            </a:effectRef>
-            <a:fontRef idx="minor">
-              <a:schemeClr val="tx1"/>
-            </a:fontRef>
-          </p:style>
-        </p:cxnSp>
-        <p:cxnSp>
-          <p:nvCxnSpPr>
-            <p:cNvPr id="46" name="Straight Arrow Connector 45">
-              <a:extLst>
-                <a:ext uri="{FF2B5EF4-FFF2-40B4-BE49-F238E27FC236}">
-                  <a16:creationId xmlns:a16="http://schemas.microsoft.com/office/drawing/2014/main" id="{E2423F59-D43F-A99B-0BDF-4A053EAD8D7A}"/>
-                </a:ext>
-              </a:extLst>
-            </p:cNvPr>
-            <p:cNvCxnSpPr>
-              <a:cxnSpLocks/>
-              <a:stCxn id="28" idx="2"/>
-              <a:endCxn id="29" idx="0"/>
-            </p:cNvCxnSpPr>
-            <p:nvPr/>
-          </p:nvCxnSpPr>
-          <p:spPr>
-            <a:xfrm flipH="1">
-              <a:off x="3694364" y="823954"/>
-              <a:ext cx="4" cy="137139"/>
-            </a:xfrm>
-            <a:prstGeom prst="straightConnector1">
-              <a:avLst/>
-            </a:prstGeom>
-            <a:ln w="19050">
-              <a:solidFill>
-                <a:schemeClr val="tx1"/>
-              </a:solidFill>
-              <a:headEnd type="none" w="med" len="med"/>
-              <a:tailEnd type="arrow" w="med" len="med"/>
-            </a:ln>
-          </p:spPr>
-          <p:style>
-            <a:lnRef idx="1">
-              <a:schemeClr val="accent1"/>
-            </a:lnRef>
-            <a:fillRef idx="0">
-              <a:schemeClr val="accent1"/>
-            </a:fillRef>
-            <a:effectRef idx="0">
-              <a:schemeClr val="accent1"/>
-            </a:effectRef>
-            <a:fontRef idx="minor">
-              <a:schemeClr val="tx1"/>
-            </a:fontRef>
-          </p:style>
-        </p:cxnSp>
-        <p:cxnSp>
-          <p:nvCxnSpPr>
-            <p:cNvPr id="49" name="Straight Arrow Connector 48">
-              <a:extLst>
-                <a:ext uri="{FF2B5EF4-FFF2-40B4-BE49-F238E27FC236}">
-                  <a16:creationId xmlns:a16="http://schemas.microsoft.com/office/drawing/2014/main" id="{EA244CC3-F17E-102E-BF10-FC3BA680C682}"/>
-                </a:ext>
-              </a:extLst>
-            </p:cNvPr>
-            <p:cNvCxnSpPr>
-              <a:cxnSpLocks/>
-              <a:stCxn id="35" idx="2"/>
-            </p:cNvCxnSpPr>
-            <p:nvPr/>
-          </p:nvCxnSpPr>
-          <p:spPr>
-            <a:xfrm>
-              <a:off x="2135435" y="4234913"/>
-              <a:ext cx="0" cy="294255"/>
-            </a:xfrm>
-            <a:prstGeom prst="straightConnector1">
-              <a:avLst/>
-            </a:prstGeom>
-            <a:ln w="19050">
-              <a:solidFill>
-                <a:schemeClr val="tx1"/>
-              </a:solidFill>
-              <a:headEnd type="none" w="med" len="med"/>
-              <a:tailEnd type="arrow" w="med" len="med"/>
-            </a:ln>
-          </p:spPr>
-          <p:style>
-            <a:lnRef idx="1">
-              <a:schemeClr val="accent1"/>
-            </a:lnRef>
-            <a:fillRef idx="0">
-              <a:schemeClr val="accent1"/>
-            </a:fillRef>
-            <a:effectRef idx="0">
-              <a:schemeClr val="accent1"/>
-            </a:effectRef>
-            <a:fontRef idx="minor">
-              <a:schemeClr val="tx1"/>
-            </a:fontRef>
-          </p:style>
-        </p:cxnSp>
-        <p:sp>
-          <p:nvSpPr>
-            <p:cNvPr id="50" name="TextBox 49">
-              <a:extLst>
-                <a:ext uri="{FF2B5EF4-FFF2-40B4-BE49-F238E27FC236}">
-                  <a16:creationId xmlns:a16="http://schemas.microsoft.com/office/drawing/2014/main" id="{C8F812A7-7034-446A-39B3-B8D6A9E94B08}"/>
-                </a:ext>
-              </a:extLst>
-            </p:cNvPr>
-            <p:cNvSpPr txBox="1"/>
-            <p:nvPr/>
-          </p:nvSpPr>
-          <p:spPr>
-            <a:xfrm>
-              <a:off x="617816" y="6447229"/>
-              <a:ext cx="6153091" cy="471958"/>
-            </a:xfrm>
-            <a:prstGeom prst="rect">
-              <a:avLst/>
-            </a:prstGeom>
-            <a:noFill/>
-            <a:ln w="19050">
-              <a:solidFill>
-                <a:schemeClr val="accent5">
-                  <a:lumMod val="75000"/>
-                </a:schemeClr>
-              </a:solidFill>
-            </a:ln>
-          </p:spPr>
-          <p:txBody>
-            <a:bodyPr wrap="square" rtlCol="0">
-              <a:spAutoFit/>
-            </a:bodyPr>
-            <a:lstStyle/>
-            <a:p>
-              <a:pPr algn="ctr"/>
-              <a:r>
-                <a:rPr lang="en-US" sz="1050" b="1" dirty="0">
-                  <a:latin typeface="Times New Roman" panose="02020603050405020304" pitchFamily="18" charset="0"/>
-                  <a:cs typeface="Times New Roman" panose="02020603050405020304" pitchFamily="18" charset="0"/>
-                </a:rPr>
-                <a:t>FASTA and GFF generated</a:t>
-              </a:r>
-            </a:p>
-            <a:p>
-              <a:pPr algn="ctr"/>
-              <a:r>
-                <a:rPr lang="en-US" sz="1050" dirty="0">
-                  <a:latin typeface="Times New Roman" panose="02020603050405020304" pitchFamily="18" charset="0"/>
-                  <a:cs typeface="Times New Roman" panose="02020603050405020304" pitchFamily="18" charset="0"/>
-                </a:rPr>
-                <a:t>For each </a:t>
-              </a:r>
-              <a:r>
-                <a:rPr lang="en-US" sz="1050" i="1" dirty="0">
-                  <a:latin typeface="Times New Roman" panose="02020603050405020304" pitchFamily="18" charset="0"/>
-                  <a:cs typeface="Times New Roman" panose="02020603050405020304" pitchFamily="18" charset="0"/>
-                </a:rPr>
-                <a:t>Fusarium </a:t>
-              </a:r>
-              <a:r>
-                <a:rPr lang="en-US" sz="1050" dirty="0">
-                  <a:latin typeface="Times New Roman" panose="02020603050405020304" pitchFamily="18" charset="0"/>
-                  <a:cs typeface="Times New Roman" panose="02020603050405020304" pitchFamily="18" charset="0"/>
-                </a:rPr>
-                <a:t>assembly included, a candidate effector FASTA and GFF file is generated using various custom python scripts. </a:t>
-              </a:r>
-            </a:p>
-          </p:txBody>
-        </p:sp>
-        <p:cxnSp>
-          <p:nvCxnSpPr>
-            <p:cNvPr id="51" name="Straight Arrow Connector 50">
-              <a:extLst>
-                <a:ext uri="{FF2B5EF4-FFF2-40B4-BE49-F238E27FC236}">
-                  <a16:creationId xmlns:a16="http://schemas.microsoft.com/office/drawing/2014/main" id="{085083E8-AE12-9C4E-9838-224450859E01}"/>
-                </a:ext>
-              </a:extLst>
-            </p:cNvPr>
-            <p:cNvCxnSpPr>
-              <a:cxnSpLocks/>
-              <a:stCxn id="37" idx="2"/>
-              <a:endCxn id="50" idx="0"/>
-            </p:cNvCxnSpPr>
-            <p:nvPr/>
-          </p:nvCxnSpPr>
-          <p:spPr>
-            <a:xfrm flipH="1">
-              <a:off x="3694362" y="6258483"/>
-              <a:ext cx="1" cy="188746"/>
-            </a:xfrm>
-            <a:prstGeom prst="straightConnector1">
-              <a:avLst/>
-            </a:prstGeom>
-            <a:ln w="19050">
-              <a:solidFill>
-                <a:schemeClr val="tx1"/>
-              </a:solidFill>
-              <a:headEnd type="none" w="med" len="med"/>
-              <a:tailEnd type="arrow" w="med" len="med"/>
-            </a:ln>
-          </p:spPr>
-          <p:style>
-            <a:lnRef idx="1">
-              <a:schemeClr val="accent1"/>
-            </a:lnRef>
-            <a:fillRef idx="0">
-              <a:schemeClr val="accent1"/>
-            </a:fillRef>
-            <a:effectRef idx="0">
-              <a:schemeClr val="accent1"/>
-            </a:effectRef>
-            <a:fontRef idx="minor">
-              <a:schemeClr val="tx1"/>
-            </a:fontRef>
-          </p:style>
-        </p:cxnSp>
-        <p:sp>
-          <p:nvSpPr>
-            <p:cNvPr id="122" name="TextBox 121">
-              <a:extLst>
-                <a:ext uri="{FF2B5EF4-FFF2-40B4-BE49-F238E27FC236}">
-                  <a16:creationId xmlns:a16="http://schemas.microsoft.com/office/drawing/2014/main" id="{9A0F104F-1CAC-EE54-751C-52AA12B72BEB}"/>
-                </a:ext>
-              </a:extLst>
-            </p:cNvPr>
-            <p:cNvSpPr txBox="1"/>
-            <p:nvPr/>
-          </p:nvSpPr>
-          <p:spPr>
-            <a:xfrm>
-              <a:off x="617816" y="7183875"/>
-              <a:ext cx="6153091" cy="471958"/>
-            </a:xfrm>
-            <a:prstGeom prst="rect">
-              <a:avLst/>
-            </a:prstGeom>
-            <a:noFill/>
-            <a:ln w="19050">
-              <a:solidFill>
-                <a:srgbClr val="538234"/>
-              </a:solidFill>
-            </a:ln>
-          </p:spPr>
-          <p:txBody>
-            <a:bodyPr wrap="square" rtlCol="0">
-              <a:spAutoFit/>
-            </a:bodyPr>
-            <a:lstStyle/>
-            <a:p>
-              <a:pPr algn="ctr"/>
-              <a:r>
-                <a:rPr lang="en-GB" sz="1050" b="1" dirty="0">
-                  <a:latin typeface="Times New Roman" panose="02020603050405020304" pitchFamily="18" charset="0"/>
-                  <a:cs typeface="Times New Roman" panose="02020603050405020304" pitchFamily="18" charset="0"/>
-                </a:rPr>
-                <a:t>Candidate effector clustering</a:t>
-              </a:r>
-            </a:p>
-            <a:p>
-              <a:pPr algn="ctr"/>
-              <a:r>
-                <a:rPr lang="en-US" sz="1050" dirty="0">
-                  <a:latin typeface="Times New Roman"/>
-                  <a:cs typeface="Times New Roman"/>
-                </a:rPr>
-                <a:t>             Candidate effector sequences are from all assemblies are combined into one FASTA and clustered using CD-HIT (v4.8.1) (80% identity).  </a:t>
-              </a:r>
-              <a:endParaRPr lang="en-US" sz="1050" dirty="0">
-                <a:latin typeface="Times New Roman" panose="02020603050405020304" pitchFamily="18" charset="0"/>
-                <a:cs typeface="Times New Roman" panose="02020603050405020304" pitchFamily="18" charset="0"/>
-              </a:endParaRPr>
-            </a:p>
-          </p:txBody>
-        </p:sp>
-        <p:cxnSp>
-          <p:nvCxnSpPr>
-            <p:cNvPr id="163" name="Straight Arrow Connector 162">
-              <a:extLst>
-                <a:ext uri="{FF2B5EF4-FFF2-40B4-BE49-F238E27FC236}">
-                  <a16:creationId xmlns:a16="http://schemas.microsoft.com/office/drawing/2014/main" id="{B5BEDAD8-B981-7F55-7E04-9EDD87DD9D71}"/>
-                </a:ext>
-              </a:extLst>
-            </p:cNvPr>
-            <p:cNvCxnSpPr>
-              <a:cxnSpLocks/>
-              <a:stCxn id="50" idx="2"/>
-              <a:endCxn id="122" idx="0"/>
-            </p:cNvCxnSpPr>
-            <p:nvPr/>
-          </p:nvCxnSpPr>
-          <p:spPr>
-            <a:xfrm>
-              <a:off x="3694362" y="6919187"/>
-              <a:ext cx="0" cy="264688"/>
-            </a:xfrm>
-            <a:prstGeom prst="straightConnector1">
-              <a:avLst/>
-            </a:prstGeom>
-            <a:ln w="19050">
-              <a:solidFill>
-                <a:schemeClr val="tx1"/>
-              </a:solidFill>
-              <a:headEnd type="none" w="med" len="med"/>
-              <a:tailEnd type="arrow" w="med" len="med"/>
-            </a:ln>
-          </p:spPr>
-          <p:style>
-            <a:lnRef idx="1">
-              <a:schemeClr val="accent1"/>
-            </a:lnRef>
-            <a:fillRef idx="0">
-              <a:schemeClr val="accent1"/>
-            </a:fillRef>
-            <a:effectRef idx="0">
-              <a:schemeClr val="accent1"/>
-            </a:effectRef>
-            <a:fontRef idx="minor">
-              <a:schemeClr val="tx1"/>
-            </a:fontRef>
-          </p:style>
-        </p:cxnSp>
-        <p:sp>
-          <p:nvSpPr>
-            <p:cNvPr id="136" name="Oval 135">
-              <a:extLst>
-                <a:ext uri="{FF2B5EF4-FFF2-40B4-BE49-F238E27FC236}">
-                  <a16:creationId xmlns:a16="http://schemas.microsoft.com/office/drawing/2014/main" id="{EC7CDFCA-5FC6-5160-BFAA-511EA270E59B}"/>
-                </a:ext>
-              </a:extLst>
-            </p:cNvPr>
-            <p:cNvSpPr/>
-            <p:nvPr/>
-          </p:nvSpPr>
-          <p:spPr>
-            <a:xfrm rot="20647326">
-              <a:off x="66924" y="7180140"/>
-              <a:ext cx="1200177" cy="537117"/>
-            </a:xfrm>
-            <a:prstGeom prst="ellipse">
-              <a:avLst/>
-            </a:prstGeom>
-            <a:solidFill>
-              <a:schemeClr val="accent2">
-                <a:lumMod val="20000"/>
-                <a:lumOff val="80000"/>
-              </a:schemeClr>
-            </a:solidFill>
-            <a:ln w="19050">
-              <a:solidFill>
-                <a:srgbClr val="FF0000"/>
-              </a:solidFill>
-            </a:ln>
-          </p:spPr>
-          <p:style>
-            <a:lnRef idx="2">
-              <a:schemeClr val="accent1">
-                <a:shade val="50000"/>
-              </a:schemeClr>
-            </a:lnRef>
-            <a:fillRef idx="1">
-              <a:schemeClr val="accent1"/>
-            </a:fillRef>
-            <a:effectRef idx="0">
-              <a:schemeClr val="accent1"/>
-            </a:effectRef>
-            <a:fontRef idx="minor">
-              <a:schemeClr val="lt1"/>
-            </a:fontRef>
-          </p:style>
-          <p:txBody>
-            <a:bodyPr rtlCol="0" anchor="ctr"/>
-            <a:lstStyle/>
-            <a:p>
-              <a:pPr algn="ctr"/>
-              <a:r>
-                <a:rPr lang="en-US" sz="1000" b="1" i="1" dirty="0">
-                  <a:solidFill>
-                    <a:schemeClr val="tx1"/>
-                  </a:solidFill>
-                  <a:latin typeface="Times New Roman" panose="02020603050405020304" pitchFamily="18" charset="0"/>
-                  <a:cs typeface="Times New Roman" panose="02020603050405020304" pitchFamily="18" charset="0"/>
-                </a:rPr>
-                <a:t>Fusarium</a:t>
-              </a:r>
-              <a:endParaRPr lang="en-US" sz="1000" b="1" dirty="0">
+              <a:latin typeface="Helvetica" pitchFamily="2" charset="0"/>
+              <a:cs typeface="Times New Roman" panose="02020603050405020304" pitchFamily="18" charset="0"/>
+            </a:endParaRPr>
+          </a:p>
+          <a:p>
+            <a:pPr algn="ctr"/>
+            <a:r>
+              <a:rPr lang="en-US" sz="1000" i="1" dirty="0">
                 <a:solidFill>
                   <a:schemeClr val="tx1"/>
                 </a:solidFill>
-                <a:latin typeface="Times New Roman" panose="02020603050405020304" pitchFamily="18" charset="0"/>
-                <a:cs typeface="Times New Roman" panose="02020603050405020304" pitchFamily="18" charset="0"/>
-              </a:endParaRPr>
-            </a:p>
-            <a:p>
-              <a:pPr algn="ctr"/>
-              <a:r>
-                <a:rPr lang="en-US" sz="1000" b="1" dirty="0">
-                  <a:solidFill>
-                    <a:schemeClr val="tx1"/>
-                  </a:solidFill>
-                  <a:latin typeface="Times New Roman" panose="02020603050405020304" pitchFamily="18" charset="0"/>
-                  <a:cs typeface="Times New Roman" panose="02020603050405020304" pitchFamily="18" charset="0"/>
-                </a:rPr>
-                <a:t>pan-effectorome</a:t>
-              </a:r>
-            </a:p>
-          </p:txBody>
-        </p:sp>
-      </p:grpSp>
+                <a:latin typeface="Helvetica" pitchFamily="2" charset="0"/>
+                <a:cs typeface="Times New Roman" panose="02020603050405020304" pitchFamily="18" charset="0"/>
+              </a:rPr>
+              <a:t>Fusarium</a:t>
+            </a:r>
+            <a:r>
+              <a:rPr lang="en-US" sz="1000" dirty="0">
+                <a:solidFill>
+                  <a:schemeClr val="tx1"/>
+                </a:solidFill>
+                <a:latin typeface="Helvetica" pitchFamily="2" charset="0"/>
+                <a:cs typeface="Times New Roman" panose="02020603050405020304" pitchFamily="18" charset="0"/>
+              </a:rPr>
+              <a:t> species genome assemblies in FASTA format, as well as a list of the assemblies and a </a:t>
+            </a:r>
+            <a:r>
+              <a:rPr lang="en-US" sz="1000" i="1" dirty="0">
+                <a:solidFill>
+                  <a:schemeClr val="tx1"/>
+                </a:solidFill>
+                <a:latin typeface="Helvetica" pitchFamily="2" charset="0"/>
+                <a:cs typeface="Times New Roman" panose="02020603050405020304" pitchFamily="18" charset="0"/>
+              </a:rPr>
+              <a:t>mimp </a:t>
+            </a:r>
+            <a:r>
+              <a:rPr lang="en-US" sz="1000" dirty="0">
+                <a:solidFill>
+                  <a:schemeClr val="tx1"/>
+                </a:solidFill>
+                <a:latin typeface="Helvetica" pitchFamily="2" charset="0"/>
+                <a:cs typeface="Times New Roman" panose="02020603050405020304" pitchFamily="18" charset="0"/>
+              </a:rPr>
+              <a:t>profile HMM, are prepared as input. </a:t>
+            </a:r>
+          </a:p>
+        </p:txBody>
+      </p:sp>
+      <p:sp>
+        <p:nvSpPr>
+          <p:cNvPr id="29" name="TextBox 28">
+            <a:extLst>
+              <a:ext uri="{FF2B5EF4-FFF2-40B4-BE49-F238E27FC236}">
+                <a16:creationId xmlns:a16="http://schemas.microsoft.com/office/drawing/2014/main" id="{7ACB2F06-EF52-CA7D-F30C-9FDD268FAE7D}"/>
+              </a:ext>
+            </a:extLst>
+          </p:cNvPr>
+          <p:cNvSpPr txBox="1"/>
+          <p:nvPr/>
+        </p:nvSpPr>
+        <p:spPr>
+          <a:xfrm>
+            <a:off x="556833" y="1566328"/>
+            <a:ext cx="6153098" cy="577081"/>
+          </a:xfrm>
+          <a:prstGeom prst="rect">
+            <a:avLst/>
+          </a:prstGeom>
+          <a:noFill/>
+          <a:ln w="19050">
+            <a:solidFill>
+              <a:schemeClr val="accent4"/>
+            </a:solidFill>
+          </a:ln>
+        </p:spPr>
+        <p:txBody>
+          <a:bodyPr wrap="square" rtlCol="0">
+            <a:spAutoFit/>
+          </a:bodyPr>
+          <a:lstStyle/>
+          <a:p>
+            <a:pPr algn="ctr"/>
+            <a:r>
+              <a:rPr lang="en-US" sz="1050" b="1" i="1" dirty="0">
+                <a:latin typeface="Helvetica" pitchFamily="2" charset="0"/>
+                <a:cs typeface="Times New Roman" panose="02020603050405020304" pitchFamily="18" charset="0"/>
+              </a:rPr>
+              <a:t>Mimp </a:t>
+            </a:r>
+            <a:r>
+              <a:rPr lang="en-US" sz="1050" b="1" dirty="0">
+                <a:latin typeface="Helvetica" pitchFamily="2" charset="0"/>
+                <a:cs typeface="Times New Roman" panose="02020603050405020304" pitchFamily="18" charset="0"/>
+              </a:rPr>
+              <a:t>identification</a:t>
+            </a:r>
+          </a:p>
+          <a:p>
+            <a:pPr algn="ctr"/>
+            <a:r>
+              <a:rPr lang="en-US" sz="1050" dirty="0">
+                <a:latin typeface="Helvetica" pitchFamily="2" charset="0"/>
+                <a:cs typeface="Times New Roman" panose="02020603050405020304" pitchFamily="18" charset="0"/>
+              </a:rPr>
+              <a:t>Each </a:t>
+            </a:r>
+            <a:r>
+              <a:rPr lang="en-US" sz="1050" i="1" dirty="0">
+                <a:latin typeface="Helvetica" pitchFamily="2" charset="0"/>
+                <a:cs typeface="Times New Roman" panose="02020603050405020304" pitchFamily="18" charset="0"/>
+              </a:rPr>
+              <a:t>Fusarium</a:t>
+            </a:r>
+            <a:r>
+              <a:rPr lang="en-US" sz="1050" dirty="0">
+                <a:latin typeface="Helvetica" pitchFamily="2" charset="0"/>
+                <a:cs typeface="Times New Roman" panose="02020603050405020304" pitchFamily="18" charset="0"/>
+              </a:rPr>
+              <a:t> assembly is searched for </a:t>
+            </a:r>
+            <a:r>
+              <a:rPr lang="en-US" sz="1050" i="1" dirty="0">
+                <a:latin typeface="Helvetica" pitchFamily="2" charset="0"/>
+                <a:cs typeface="Times New Roman" panose="02020603050405020304" pitchFamily="18" charset="0"/>
+              </a:rPr>
+              <a:t>mimps </a:t>
+            </a:r>
+            <a:r>
+              <a:rPr lang="en-US" sz="1050" dirty="0">
+                <a:latin typeface="Helvetica" pitchFamily="2" charset="0"/>
+                <a:cs typeface="Times New Roman" panose="02020603050405020304" pitchFamily="18" charset="0"/>
+              </a:rPr>
+              <a:t>using a custom python script (using </a:t>
+            </a:r>
+            <a:r>
+              <a:rPr lang="en-US" sz="1050" i="1" dirty="0">
+                <a:latin typeface="Helvetica" pitchFamily="2" charset="0"/>
+                <a:cs typeface="Times New Roman" panose="02020603050405020304" pitchFamily="18" charset="0"/>
+              </a:rPr>
+              <a:t>mimp </a:t>
+            </a:r>
+            <a:r>
+              <a:rPr lang="en-US" sz="1050" dirty="0">
+                <a:latin typeface="Helvetica" pitchFamily="2" charset="0"/>
+                <a:cs typeface="Times New Roman" panose="02020603050405020304" pitchFamily="18" charset="0"/>
+              </a:rPr>
+              <a:t>TIRs) and NHMMER </a:t>
+            </a:r>
+            <a:r>
+              <a:rPr lang="en-GB" sz="1050" dirty="0">
+                <a:latin typeface="Helvetica" pitchFamily="2" charset="0"/>
+                <a:ea typeface="Times New Roman" panose="02020603050405020304" pitchFamily="18" charset="0"/>
+              </a:rPr>
+              <a:t>(v3.3.1) (</a:t>
+            </a:r>
+            <a:r>
+              <a:rPr lang="en-US" sz="1050" dirty="0">
+                <a:latin typeface="Helvetica" pitchFamily="2" charset="0"/>
+                <a:cs typeface="Times New Roman" panose="02020603050405020304" pitchFamily="18" charset="0"/>
+              </a:rPr>
+              <a:t>using a </a:t>
+            </a:r>
+            <a:r>
+              <a:rPr lang="en-US" sz="1050" i="1" dirty="0">
+                <a:latin typeface="Helvetica" pitchFamily="2" charset="0"/>
+                <a:cs typeface="Times New Roman" panose="02020603050405020304" pitchFamily="18" charset="0"/>
+              </a:rPr>
+              <a:t>mimp </a:t>
+            </a:r>
+            <a:r>
+              <a:rPr lang="en-US" sz="1050" dirty="0">
+                <a:latin typeface="Helvetica" pitchFamily="2" charset="0"/>
+                <a:cs typeface="Times New Roman" panose="02020603050405020304" pitchFamily="18" charset="0"/>
+              </a:rPr>
+              <a:t>profile-HMM).</a:t>
+            </a:r>
+          </a:p>
+        </p:txBody>
+      </p:sp>
+      <p:sp>
+        <p:nvSpPr>
+          <p:cNvPr id="30" name="TextBox 29">
+            <a:extLst>
+              <a:ext uri="{FF2B5EF4-FFF2-40B4-BE49-F238E27FC236}">
+                <a16:creationId xmlns:a16="http://schemas.microsoft.com/office/drawing/2014/main" id="{691DA270-25BC-ECFF-7EED-18C8390263C9}"/>
+              </a:ext>
+            </a:extLst>
+          </p:cNvPr>
+          <p:cNvSpPr txBox="1"/>
+          <p:nvPr/>
+        </p:nvSpPr>
+        <p:spPr>
+          <a:xfrm>
+            <a:off x="556832" y="2531229"/>
+            <a:ext cx="6153099" cy="577081"/>
+          </a:xfrm>
+          <a:prstGeom prst="rect">
+            <a:avLst/>
+          </a:prstGeom>
+          <a:noFill/>
+          <a:ln w="19050">
+            <a:solidFill>
+              <a:schemeClr val="accent4"/>
+            </a:solidFill>
+          </a:ln>
+        </p:spPr>
+        <p:txBody>
+          <a:bodyPr wrap="square" rtlCol="0">
+            <a:spAutoFit/>
+          </a:bodyPr>
+          <a:lstStyle/>
+          <a:p>
+            <a:pPr algn="ctr"/>
+            <a:r>
+              <a:rPr lang="en-US" sz="1050" b="1" i="1" dirty="0">
+                <a:latin typeface="Helvetica" pitchFamily="2" charset="0"/>
+                <a:cs typeface="Times New Roman" panose="02020603050405020304" pitchFamily="18" charset="0"/>
+              </a:rPr>
+              <a:t>Mimp </a:t>
+            </a:r>
+            <a:r>
+              <a:rPr lang="en-US" sz="1050" b="1" dirty="0">
+                <a:latin typeface="Helvetica" pitchFamily="2" charset="0"/>
+                <a:cs typeface="Times New Roman" panose="02020603050405020304" pitchFamily="18" charset="0"/>
+              </a:rPr>
+              <a:t>region sequence identification</a:t>
+            </a:r>
+          </a:p>
+          <a:p>
+            <a:pPr algn="ctr"/>
+            <a:r>
+              <a:rPr lang="en-US" sz="1050" dirty="0">
+                <a:latin typeface="Helvetica" pitchFamily="2" charset="0"/>
+                <a:cs typeface="Times New Roman" panose="02020603050405020304" pitchFamily="18" charset="0"/>
+              </a:rPr>
+              <a:t>Identify regions 2.5kb either side of a </a:t>
+            </a:r>
+            <a:r>
+              <a:rPr lang="en-US" sz="1050" i="1" dirty="0">
+                <a:latin typeface="Helvetica" pitchFamily="2" charset="0"/>
+                <a:cs typeface="Times New Roman" panose="02020603050405020304" pitchFamily="18" charset="0"/>
+              </a:rPr>
+              <a:t>mimp </a:t>
+            </a:r>
+            <a:r>
+              <a:rPr lang="en-US" sz="1050" dirty="0">
+                <a:latin typeface="Helvetica" pitchFamily="2" charset="0"/>
+                <a:cs typeface="Times New Roman" panose="02020603050405020304" pitchFamily="18" charset="0"/>
+              </a:rPr>
+              <a:t>(</a:t>
+            </a:r>
+            <a:r>
+              <a:rPr lang="en-US" sz="1050" i="1" dirty="0">
+                <a:latin typeface="Helvetica" pitchFamily="2" charset="0"/>
+                <a:cs typeface="Times New Roman" panose="02020603050405020304" pitchFamily="18" charset="0"/>
+              </a:rPr>
+              <a:t>mimp</a:t>
+            </a:r>
+            <a:r>
+              <a:rPr lang="en-US" sz="1050" dirty="0">
+                <a:latin typeface="Helvetica" pitchFamily="2" charset="0"/>
+                <a:cs typeface="Times New Roman" panose="02020603050405020304" pitchFamily="18" charset="0"/>
+              </a:rPr>
+              <a:t> region), generating a </a:t>
+            </a:r>
+            <a:r>
+              <a:rPr lang="en-US" sz="1050" i="1" dirty="0">
+                <a:latin typeface="Helvetica" pitchFamily="2" charset="0"/>
+                <a:cs typeface="Times New Roman" panose="02020603050405020304" pitchFamily="18" charset="0"/>
+              </a:rPr>
+              <a:t>mimp </a:t>
+            </a:r>
+            <a:r>
+              <a:rPr lang="en-US" sz="1050" dirty="0">
+                <a:latin typeface="Helvetica" pitchFamily="2" charset="0"/>
+                <a:cs typeface="Times New Roman" panose="02020603050405020304" pitchFamily="18" charset="0"/>
+              </a:rPr>
+              <a:t>region GFF file for each genome assembly. </a:t>
+            </a:r>
+          </a:p>
+        </p:txBody>
+      </p:sp>
+      <p:sp>
+        <p:nvSpPr>
+          <p:cNvPr id="31" name="TextBox 30">
+            <a:extLst>
+              <a:ext uri="{FF2B5EF4-FFF2-40B4-BE49-F238E27FC236}">
+                <a16:creationId xmlns:a16="http://schemas.microsoft.com/office/drawing/2014/main" id="{5540790C-75EC-AE43-DFFA-A968FC71989D}"/>
+              </a:ext>
+            </a:extLst>
+          </p:cNvPr>
+          <p:cNvSpPr txBox="1"/>
+          <p:nvPr/>
+        </p:nvSpPr>
+        <p:spPr>
+          <a:xfrm>
+            <a:off x="556835" y="3589293"/>
+            <a:ext cx="3035236" cy="1061829"/>
+          </a:xfrm>
+          <a:prstGeom prst="rect">
+            <a:avLst/>
+          </a:prstGeom>
+          <a:noFill/>
+          <a:ln w="19050">
+            <a:solidFill>
+              <a:schemeClr val="accent4"/>
+            </a:solidFill>
+          </a:ln>
+        </p:spPr>
+        <p:txBody>
+          <a:bodyPr wrap="square" rtlCol="0">
+            <a:spAutoFit/>
+          </a:bodyPr>
+          <a:lstStyle/>
+          <a:p>
+            <a:pPr algn="ctr"/>
+            <a:r>
+              <a:rPr lang="en-US" sz="1050" b="1" dirty="0">
+                <a:latin typeface="Helvetica" pitchFamily="2" charset="0"/>
+                <a:cs typeface="Times New Roman" panose="02020603050405020304" pitchFamily="18" charset="0"/>
+              </a:rPr>
+              <a:t>Augustus regions identification</a:t>
+            </a:r>
+          </a:p>
+          <a:p>
+            <a:pPr algn="ctr"/>
+            <a:r>
+              <a:rPr lang="en-US" sz="1050" dirty="0">
+                <a:latin typeface="Helvetica" pitchFamily="2" charset="0"/>
+                <a:cs typeface="Times New Roman" panose="02020603050405020304" pitchFamily="18" charset="0"/>
+              </a:rPr>
+              <a:t>Expand 20kb either side of the </a:t>
+            </a:r>
+            <a:r>
+              <a:rPr lang="en-US" sz="1050" i="1" dirty="0">
+                <a:latin typeface="Helvetica" pitchFamily="2" charset="0"/>
+                <a:cs typeface="Times New Roman" panose="02020603050405020304" pitchFamily="18" charset="0"/>
+              </a:rPr>
+              <a:t>mimp </a:t>
+            </a:r>
+            <a:r>
+              <a:rPr lang="en-US" sz="1050" dirty="0">
+                <a:latin typeface="Helvetica" pitchFamily="2" charset="0"/>
+                <a:cs typeface="Times New Roman" panose="02020603050405020304" pitchFamily="18" charset="0"/>
+              </a:rPr>
+              <a:t>regions to identify regions for AUGUSTUS (v3.3.3) annotation. Generate an Augustus (v3.3.3) region GFF, and FASTAs where all non-Augustus have been hard masked.   </a:t>
+            </a:r>
+          </a:p>
+        </p:txBody>
+      </p:sp>
+      <p:sp>
+        <p:nvSpPr>
+          <p:cNvPr id="32" name="TextBox 31">
+            <a:extLst>
+              <a:ext uri="{FF2B5EF4-FFF2-40B4-BE49-F238E27FC236}">
+                <a16:creationId xmlns:a16="http://schemas.microsoft.com/office/drawing/2014/main" id="{6324A5E0-C5F2-41E9-B0B7-ED4197F885BA}"/>
+              </a:ext>
+            </a:extLst>
+          </p:cNvPr>
+          <p:cNvSpPr txBox="1"/>
+          <p:nvPr/>
+        </p:nvSpPr>
+        <p:spPr>
+          <a:xfrm>
+            <a:off x="3689997" y="3589293"/>
+            <a:ext cx="3019934" cy="1054135"/>
+          </a:xfrm>
+          <a:prstGeom prst="rect">
+            <a:avLst/>
+          </a:prstGeom>
+          <a:noFill/>
+          <a:ln w="19050">
+            <a:solidFill>
+              <a:schemeClr val="accent4"/>
+            </a:solidFill>
+          </a:ln>
+        </p:spPr>
+        <p:txBody>
+          <a:bodyPr wrap="square" rtlCol="0">
+            <a:spAutoFit/>
+          </a:bodyPr>
+          <a:lstStyle/>
+          <a:p>
+            <a:pPr algn="ctr"/>
+            <a:r>
+              <a:rPr lang="en-US" sz="1050" b="1" dirty="0">
+                <a:latin typeface="Helvetica" pitchFamily="2" charset="0"/>
+                <a:cs typeface="Times New Roman" panose="02020603050405020304" pitchFamily="18" charset="0"/>
+              </a:rPr>
+              <a:t>Mask non-</a:t>
+            </a:r>
+            <a:r>
+              <a:rPr lang="en-US" sz="1050" b="1" i="1" dirty="0">
+                <a:latin typeface="Helvetica" pitchFamily="2" charset="0"/>
+                <a:cs typeface="Times New Roman" panose="02020603050405020304" pitchFamily="18" charset="0"/>
+              </a:rPr>
+              <a:t>mimp</a:t>
+            </a:r>
+            <a:r>
+              <a:rPr lang="en-US" sz="1050" b="1" dirty="0">
+                <a:latin typeface="Helvetica" pitchFamily="2" charset="0"/>
+                <a:cs typeface="Times New Roman" panose="02020603050405020304" pitchFamily="18" charset="0"/>
+              </a:rPr>
+              <a:t> regions</a:t>
+            </a:r>
+          </a:p>
+          <a:p>
+            <a:pPr algn="ctr"/>
+            <a:r>
+              <a:rPr lang="en-US" sz="1050" dirty="0">
+                <a:latin typeface="Helvetica" pitchFamily="2" charset="0"/>
+                <a:cs typeface="Times New Roman" panose="02020603050405020304" pitchFamily="18" charset="0"/>
+              </a:rPr>
+              <a:t>Using the </a:t>
+            </a:r>
+            <a:r>
+              <a:rPr lang="en-US" sz="1050" i="1" dirty="0">
+                <a:latin typeface="Helvetica" pitchFamily="2" charset="0"/>
+                <a:cs typeface="Times New Roman" panose="02020603050405020304" pitchFamily="18" charset="0"/>
+              </a:rPr>
+              <a:t>mimp </a:t>
+            </a:r>
+            <a:r>
+              <a:rPr lang="en-US" sz="1050" dirty="0">
+                <a:latin typeface="Helvetica" pitchFamily="2" charset="0"/>
+                <a:cs typeface="Times New Roman" panose="02020603050405020304" pitchFamily="18" charset="0"/>
+              </a:rPr>
+              <a:t>region GFF, create a </a:t>
+            </a:r>
+            <a:r>
+              <a:rPr lang="en-US" sz="1050" i="1" dirty="0">
+                <a:latin typeface="Helvetica" pitchFamily="2" charset="0"/>
+                <a:cs typeface="Times New Roman" panose="02020603050405020304" pitchFamily="18" charset="0"/>
+              </a:rPr>
+              <a:t>mimp</a:t>
+            </a:r>
+            <a:r>
+              <a:rPr lang="en-US" sz="1050" dirty="0">
+                <a:latin typeface="Helvetica" pitchFamily="2" charset="0"/>
+                <a:cs typeface="Times New Roman" panose="02020603050405020304" pitchFamily="18" charset="0"/>
+              </a:rPr>
+              <a:t> region FASTAS, where all non-</a:t>
+            </a:r>
+            <a:r>
+              <a:rPr lang="en-US" sz="1050" i="1" dirty="0">
+                <a:latin typeface="Helvetica" pitchFamily="2" charset="0"/>
+                <a:cs typeface="Times New Roman" panose="02020603050405020304" pitchFamily="18" charset="0"/>
+              </a:rPr>
+              <a:t>mimp </a:t>
+            </a:r>
+            <a:r>
+              <a:rPr lang="en-US" sz="1050" dirty="0">
+                <a:latin typeface="Helvetica" pitchFamily="2" charset="0"/>
+                <a:cs typeface="Times New Roman" panose="02020603050405020304" pitchFamily="18" charset="0"/>
+              </a:rPr>
+              <a:t>regions have been hard masked.</a:t>
+            </a:r>
+          </a:p>
+          <a:p>
+            <a:pPr algn="ctr"/>
+            <a:endParaRPr lang="en-US" sz="1050" dirty="0">
+              <a:latin typeface="Helvetica" pitchFamily="2" charset="0"/>
+              <a:cs typeface="Times New Roman" panose="02020603050405020304" pitchFamily="18" charset="0"/>
+            </a:endParaRPr>
+          </a:p>
+          <a:p>
+            <a:pPr algn="ctr"/>
+            <a:r>
+              <a:rPr lang="en-US" sz="1000" dirty="0">
+                <a:latin typeface="Helvetica" pitchFamily="2" charset="0"/>
+                <a:cs typeface="Times New Roman" panose="02020603050405020304" pitchFamily="18" charset="0"/>
+              </a:rPr>
+              <a:t> </a:t>
+            </a:r>
+            <a:endParaRPr lang="en-US" sz="900" dirty="0">
+              <a:latin typeface="Helvetica" pitchFamily="2" charset="0"/>
+              <a:cs typeface="Times New Roman" panose="02020603050405020304" pitchFamily="18" charset="0"/>
+            </a:endParaRPr>
+          </a:p>
+        </p:txBody>
+      </p:sp>
+      <p:sp>
+        <p:nvSpPr>
+          <p:cNvPr id="33" name="TextBox 32">
+            <a:extLst>
+              <a:ext uri="{FF2B5EF4-FFF2-40B4-BE49-F238E27FC236}">
+                <a16:creationId xmlns:a16="http://schemas.microsoft.com/office/drawing/2014/main" id="{B711EA04-8776-BB1F-533B-25F5827492B4}"/>
+              </a:ext>
+            </a:extLst>
+          </p:cNvPr>
+          <p:cNvSpPr txBox="1"/>
+          <p:nvPr/>
+        </p:nvSpPr>
+        <p:spPr>
+          <a:xfrm>
+            <a:off x="3689991" y="4949960"/>
+            <a:ext cx="3019934" cy="738665"/>
+          </a:xfrm>
+          <a:prstGeom prst="rect">
+            <a:avLst/>
+          </a:prstGeom>
+          <a:noFill/>
+          <a:ln w="19050">
+            <a:solidFill>
+              <a:srgbClr val="0070C0"/>
+            </a:solidFill>
+          </a:ln>
+        </p:spPr>
+        <p:txBody>
+          <a:bodyPr wrap="square" rtlCol="0">
+            <a:spAutoFit/>
+          </a:bodyPr>
+          <a:lstStyle/>
+          <a:p>
+            <a:pPr algn="ctr"/>
+            <a:r>
+              <a:rPr lang="en-US" sz="1050" b="1" dirty="0">
+                <a:latin typeface="Helvetica" pitchFamily="2" charset="0"/>
+                <a:cs typeface="Times New Roman" panose="02020603050405020304" pitchFamily="18" charset="0"/>
+              </a:rPr>
+              <a:t>ORF Prediction </a:t>
+            </a:r>
+          </a:p>
+          <a:p>
+            <a:pPr algn="ctr"/>
+            <a:r>
+              <a:rPr lang="en-US" sz="1050" dirty="0">
+                <a:latin typeface="Helvetica" pitchFamily="2" charset="0"/>
+                <a:cs typeface="Times New Roman" panose="02020603050405020304" pitchFamily="18" charset="0"/>
+              </a:rPr>
+              <a:t>Getorf from Emboss (v6.6.0.0) is used to find open reading frames (ORFs) in the 2.5kb region.</a:t>
+            </a:r>
+          </a:p>
+        </p:txBody>
+      </p:sp>
+      <p:sp>
+        <p:nvSpPr>
+          <p:cNvPr id="34" name="TextBox 33">
+            <a:extLst>
+              <a:ext uri="{FF2B5EF4-FFF2-40B4-BE49-F238E27FC236}">
+                <a16:creationId xmlns:a16="http://schemas.microsoft.com/office/drawing/2014/main" id="{2CF06320-44C5-7F77-6DA0-DC4B361DFD27}"/>
+              </a:ext>
+            </a:extLst>
+          </p:cNvPr>
+          <p:cNvSpPr txBox="1"/>
+          <p:nvPr/>
+        </p:nvSpPr>
+        <p:spPr>
+          <a:xfrm>
+            <a:off x="556834" y="6051700"/>
+            <a:ext cx="6153093" cy="415499"/>
+          </a:xfrm>
+          <a:prstGeom prst="rect">
+            <a:avLst/>
+          </a:prstGeom>
+          <a:noFill/>
+          <a:ln w="19050">
+            <a:solidFill>
+              <a:srgbClr val="0070C0"/>
+            </a:solidFill>
+          </a:ln>
+        </p:spPr>
+        <p:txBody>
+          <a:bodyPr wrap="square" rtlCol="0">
+            <a:spAutoFit/>
+          </a:bodyPr>
+          <a:lstStyle/>
+          <a:p>
+            <a:pPr algn="ctr"/>
+            <a:r>
+              <a:rPr lang="en-US" sz="1050" b="1" dirty="0">
+                <a:latin typeface="Helvetica" pitchFamily="2" charset="0"/>
+                <a:cs typeface="Times New Roman" panose="02020603050405020304" pitchFamily="18" charset="0"/>
+              </a:rPr>
+              <a:t>Signal peptide filtering</a:t>
+            </a:r>
+          </a:p>
+          <a:p>
+            <a:pPr algn="ctr"/>
+            <a:r>
+              <a:rPr lang="en-US" sz="1050" dirty="0">
+                <a:latin typeface="Helvetica" pitchFamily="2" charset="0"/>
+                <a:cs typeface="Times New Roman" panose="02020603050405020304" pitchFamily="18" charset="0"/>
+              </a:rPr>
+              <a:t>SignalP (v4.1) is used search all AUGUSTUS gene models and ORFs for a signal peptide.</a:t>
+            </a:r>
+          </a:p>
+        </p:txBody>
+      </p:sp>
+      <p:sp>
+        <p:nvSpPr>
+          <p:cNvPr id="35" name="TextBox 34">
+            <a:extLst>
+              <a:ext uri="{FF2B5EF4-FFF2-40B4-BE49-F238E27FC236}">
+                <a16:creationId xmlns:a16="http://schemas.microsoft.com/office/drawing/2014/main" id="{AE157376-0193-94C8-7444-E50B1DB6C7C4}"/>
+              </a:ext>
+            </a:extLst>
+          </p:cNvPr>
+          <p:cNvSpPr txBox="1"/>
+          <p:nvPr/>
+        </p:nvSpPr>
+        <p:spPr>
+          <a:xfrm>
+            <a:off x="556835" y="4953237"/>
+            <a:ext cx="3035235" cy="738665"/>
+          </a:xfrm>
+          <a:prstGeom prst="rect">
+            <a:avLst/>
+          </a:prstGeom>
+          <a:noFill/>
+          <a:ln w="19050">
+            <a:solidFill>
+              <a:srgbClr val="0070C0"/>
+            </a:solidFill>
+          </a:ln>
+        </p:spPr>
+        <p:txBody>
+          <a:bodyPr wrap="square" rtlCol="0">
+            <a:spAutoFit/>
+          </a:bodyPr>
+          <a:lstStyle/>
+          <a:p>
+            <a:pPr algn="ctr"/>
+            <a:r>
+              <a:rPr lang="en-US" sz="1050" b="1" dirty="0">
+                <a:latin typeface="Helvetica" pitchFamily="2" charset="0"/>
+                <a:cs typeface="Times New Roman" panose="02020603050405020304" pitchFamily="18" charset="0"/>
+              </a:rPr>
+              <a:t>AUGUSTUS gene prediction</a:t>
+            </a:r>
+          </a:p>
+          <a:p>
+            <a:pPr algn="ctr"/>
+            <a:r>
+              <a:rPr lang="en-US" sz="1050" dirty="0">
+                <a:latin typeface="Helvetica" pitchFamily="2" charset="0"/>
+                <a:cs typeface="Times New Roman" panose="02020603050405020304" pitchFamily="18" charset="0"/>
+              </a:rPr>
+              <a:t>The Augustus region FASTA is submitted to AUGUSTUS (v3.3.3) for gene prediction with the “fusarium” species parameter selected.</a:t>
+            </a:r>
+          </a:p>
+        </p:txBody>
+      </p:sp>
+      <p:sp>
+        <p:nvSpPr>
+          <p:cNvPr id="36" name="TextBox 35">
+            <a:extLst>
+              <a:ext uri="{FF2B5EF4-FFF2-40B4-BE49-F238E27FC236}">
+                <a16:creationId xmlns:a16="http://schemas.microsoft.com/office/drawing/2014/main" id="{976CB707-1090-E6D0-E086-A23D5310FC7A}"/>
+              </a:ext>
+            </a:extLst>
+          </p:cNvPr>
+          <p:cNvSpPr txBox="1"/>
+          <p:nvPr/>
+        </p:nvSpPr>
+        <p:spPr>
+          <a:xfrm>
+            <a:off x="556835" y="6745418"/>
+            <a:ext cx="6153092" cy="513692"/>
+          </a:xfrm>
+          <a:prstGeom prst="rect">
+            <a:avLst/>
+          </a:prstGeom>
+          <a:noFill/>
+          <a:ln w="19050">
+            <a:solidFill>
+              <a:schemeClr val="accent5">
+                <a:lumMod val="75000"/>
+              </a:schemeClr>
+            </a:solidFill>
+          </a:ln>
+        </p:spPr>
+        <p:txBody>
+          <a:bodyPr wrap="square" lIns="28664" tIns="14332" rIns="28664" bIns="14332" rtlCol="0" anchor="t">
+            <a:spAutoFit/>
+          </a:bodyPr>
+          <a:lstStyle/>
+          <a:p>
+            <a:pPr algn="ctr"/>
+            <a:r>
+              <a:rPr lang="en-US" sz="1050" b="1" dirty="0">
+                <a:latin typeface="Helvetica" pitchFamily="2" charset="0"/>
+                <a:cs typeface="Times New Roman" panose="02020603050405020304" pitchFamily="18" charset="0"/>
+              </a:rPr>
+              <a:t>Size filter</a:t>
+            </a:r>
+          </a:p>
+          <a:p>
+            <a:pPr algn="ctr"/>
+            <a:r>
+              <a:rPr lang="en-US" sz="1050" dirty="0">
+                <a:latin typeface="Helvetica" pitchFamily="2" charset="0"/>
+                <a:cs typeface="Times New Roman"/>
+              </a:rPr>
+              <a:t>Protein sequences containing a signal peptide predicted by SignalP (v4.1) are filtered based on size, with sequences &lt;450aa and &gt;30aa kept for effector prediction.  </a:t>
+            </a:r>
+            <a:endParaRPr lang="en-US" sz="1050" dirty="0">
+              <a:latin typeface="Helvetica" pitchFamily="2" charset="0"/>
+              <a:cs typeface="Times New Roman" panose="02020603050405020304" pitchFamily="18" charset="0"/>
+            </a:endParaRPr>
+          </a:p>
+        </p:txBody>
+      </p:sp>
+      <p:sp>
+        <p:nvSpPr>
+          <p:cNvPr id="37" name="TextBox 36">
+            <a:extLst>
+              <a:ext uri="{FF2B5EF4-FFF2-40B4-BE49-F238E27FC236}">
+                <a16:creationId xmlns:a16="http://schemas.microsoft.com/office/drawing/2014/main" id="{6DCA523E-F833-5F7E-A65A-30DAA2F76805}"/>
+              </a:ext>
+            </a:extLst>
+          </p:cNvPr>
+          <p:cNvSpPr txBox="1"/>
+          <p:nvPr/>
+        </p:nvSpPr>
+        <p:spPr>
+          <a:xfrm>
+            <a:off x="556834" y="7535603"/>
+            <a:ext cx="6153093" cy="577081"/>
+          </a:xfrm>
+          <a:prstGeom prst="rect">
+            <a:avLst/>
+          </a:prstGeom>
+          <a:noFill/>
+          <a:ln w="19050">
+            <a:solidFill>
+              <a:schemeClr val="accent5">
+                <a:lumMod val="75000"/>
+              </a:schemeClr>
+            </a:solidFill>
+          </a:ln>
+        </p:spPr>
+        <p:txBody>
+          <a:bodyPr wrap="square" rtlCol="0">
+            <a:spAutoFit/>
+          </a:bodyPr>
+          <a:lstStyle/>
+          <a:p>
+            <a:pPr algn="ctr"/>
+            <a:r>
+              <a:rPr lang="en-US" sz="1050" b="1" dirty="0">
+                <a:latin typeface="Helvetica" pitchFamily="2" charset="0"/>
+                <a:cs typeface="Times New Roman" panose="02020603050405020304" pitchFamily="18" charset="0"/>
+              </a:rPr>
+              <a:t> EffectorP (v2.0.1) scan for likely effectors</a:t>
+            </a:r>
+          </a:p>
+          <a:p>
+            <a:pPr algn="ctr"/>
+            <a:r>
+              <a:rPr lang="en-US" sz="1050" dirty="0">
+                <a:latin typeface="Helvetica" pitchFamily="2" charset="0"/>
+                <a:cs typeface="Times New Roman" panose="02020603050405020304" pitchFamily="18" charset="0"/>
+              </a:rPr>
+              <a:t>Each signal peptide and size filtered sequences is submitted to EffectorP (v2.0.1) for fungal effector prediction. </a:t>
+            </a:r>
+          </a:p>
+        </p:txBody>
+      </p:sp>
+      <p:cxnSp>
+        <p:nvCxnSpPr>
+          <p:cNvPr id="38" name="Straight Arrow Connector 39">
+            <a:extLst>
+              <a:ext uri="{FF2B5EF4-FFF2-40B4-BE49-F238E27FC236}">
+                <a16:creationId xmlns:a16="http://schemas.microsoft.com/office/drawing/2014/main" id="{AC2CB13E-9DD3-CD43-4C1B-156384BB78BC}"/>
+              </a:ext>
+            </a:extLst>
+          </p:cNvPr>
+          <p:cNvCxnSpPr>
+            <a:cxnSpLocks/>
+            <a:stCxn id="30" idx="2"/>
+            <a:endCxn id="31" idx="0"/>
+          </p:cNvCxnSpPr>
+          <p:nvPr/>
+        </p:nvCxnSpPr>
+        <p:spPr>
+          <a:xfrm rot="5400000">
+            <a:off x="2613427" y="2569337"/>
+            <a:ext cx="480983" cy="1558929"/>
+          </a:xfrm>
+          <a:prstGeom prst="bentConnector3">
+            <a:avLst>
+              <a:gd name="adj1" fmla="val 50000"/>
+            </a:avLst>
+          </a:prstGeom>
+          <a:ln w="19050">
+            <a:solidFill>
+              <a:schemeClr val="tx1"/>
+            </a:solidFill>
+            <a:headEnd type="none" w="med" len="med"/>
+            <a:tailEnd type="arrow" w="med" len="med"/>
+          </a:ln>
+        </p:spPr>
+        <p:style>
+          <a:lnRef idx="1">
+            <a:schemeClr val="accent1"/>
+          </a:lnRef>
+          <a:fillRef idx="0">
+            <a:schemeClr val="accent1"/>
+          </a:fillRef>
+          <a:effectRef idx="0">
+            <a:schemeClr val="accent1"/>
+          </a:effectRef>
+          <a:fontRef idx="minor">
+            <a:schemeClr val="tx1"/>
+          </a:fontRef>
+        </p:style>
+      </p:cxnSp>
+      <p:cxnSp>
+        <p:nvCxnSpPr>
+          <p:cNvPr id="39" name="Straight Arrow Connector 38">
+            <a:extLst>
+              <a:ext uri="{FF2B5EF4-FFF2-40B4-BE49-F238E27FC236}">
+                <a16:creationId xmlns:a16="http://schemas.microsoft.com/office/drawing/2014/main" id="{80B17E49-3031-9706-BDF3-6031A9A28FFA}"/>
+              </a:ext>
+            </a:extLst>
+          </p:cNvPr>
+          <p:cNvCxnSpPr>
+            <a:cxnSpLocks/>
+            <a:stCxn id="31" idx="2"/>
+            <a:endCxn id="35" idx="0"/>
+          </p:cNvCxnSpPr>
+          <p:nvPr/>
+        </p:nvCxnSpPr>
+        <p:spPr>
+          <a:xfrm>
+            <a:off x="2074453" y="4651122"/>
+            <a:ext cx="0" cy="302115"/>
+          </a:xfrm>
+          <a:prstGeom prst="straightConnector1">
+            <a:avLst/>
+          </a:prstGeom>
+          <a:ln w="19050">
+            <a:solidFill>
+              <a:schemeClr val="tx1"/>
+            </a:solidFill>
+            <a:headEnd type="none" w="med" len="med"/>
+            <a:tailEnd type="arrow" w="med" len="med"/>
+          </a:ln>
+        </p:spPr>
+        <p:style>
+          <a:lnRef idx="1">
+            <a:schemeClr val="accent1"/>
+          </a:lnRef>
+          <a:fillRef idx="0">
+            <a:schemeClr val="accent1"/>
+          </a:fillRef>
+          <a:effectRef idx="0">
+            <a:schemeClr val="accent1"/>
+          </a:effectRef>
+          <a:fontRef idx="minor">
+            <a:schemeClr val="tx1"/>
+          </a:fontRef>
+        </p:style>
+      </p:cxnSp>
+      <p:cxnSp>
+        <p:nvCxnSpPr>
+          <p:cNvPr id="40" name="Straight Arrow Connector 39">
+            <a:extLst>
+              <a:ext uri="{FF2B5EF4-FFF2-40B4-BE49-F238E27FC236}">
+                <a16:creationId xmlns:a16="http://schemas.microsoft.com/office/drawing/2014/main" id="{37AD526A-51C8-22C7-ED75-940380912E7C}"/>
+              </a:ext>
+            </a:extLst>
+          </p:cNvPr>
+          <p:cNvCxnSpPr>
+            <a:cxnSpLocks/>
+            <a:stCxn id="33" idx="2"/>
+          </p:cNvCxnSpPr>
+          <p:nvPr/>
+        </p:nvCxnSpPr>
+        <p:spPr>
+          <a:xfrm>
+            <a:off x="5199958" y="5688625"/>
+            <a:ext cx="0" cy="363075"/>
+          </a:xfrm>
+          <a:prstGeom prst="straightConnector1">
+            <a:avLst/>
+          </a:prstGeom>
+          <a:ln w="19050">
+            <a:solidFill>
+              <a:schemeClr val="tx1"/>
+            </a:solidFill>
+            <a:headEnd type="none" w="med" len="med"/>
+            <a:tailEnd type="arrow" w="med" len="med"/>
+          </a:ln>
+        </p:spPr>
+        <p:style>
+          <a:lnRef idx="1">
+            <a:schemeClr val="accent1"/>
+          </a:lnRef>
+          <a:fillRef idx="0">
+            <a:schemeClr val="accent1"/>
+          </a:fillRef>
+          <a:effectRef idx="0">
+            <a:schemeClr val="accent1"/>
+          </a:effectRef>
+          <a:fontRef idx="minor">
+            <a:schemeClr val="tx1"/>
+          </a:fontRef>
+        </p:style>
+      </p:cxnSp>
+      <p:cxnSp>
+        <p:nvCxnSpPr>
+          <p:cNvPr id="41" name="Straight Arrow Connector 40">
+            <a:extLst>
+              <a:ext uri="{FF2B5EF4-FFF2-40B4-BE49-F238E27FC236}">
+                <a16:creationId xmlns:a16="http://schemas.microsoft.com/office/drawing/2014/main" id="{E4D9565D-4082-948F-58CB-8BF463E36C28}"/>
+              </a:ext>
+            </a:extLst>
+          </p:cNvPr>
+          <p:cNvCxnSpPr>
+            <a:cxnSpLocks/>
+            <a:stCxn id="32" idx="2"/>
+            <a:endCxn id="33" idx="0"/>
+          </p:cNvCxnSpPr>
+          <p:nvPr/>
+        </p:nvCxnSpPr>
+        <p:spPr>
+          <a:xfrm flipH="1">
+            <a:off x="5199958" y="4643428"/>
+            <a:ext cx="6" cy="306532"/>
+          </a:xfrm>
+          <a:prstGeom prst="straightConnector1">
+            <a:avLst/>
+          </a:prstGeom>
+          <a:ln w="19050">
+            <a:solidFill>
+              <a:schemeClr val="tx1"/>
+            </a:solidFill>
+            <a:headEnd type="none" w="med" len="med"/>
+            <a:tailEnd type="arrow" w="med" len="med"/>
+          </a:ln>
+        </p:spPr>
+        <p:style>
+          <a:lnRef idx="1">
+            <a:schemeClr val="accent1"/>
+          </a:lnRef>
+          <a:fillRef idx="0">
+            <a:schemeClr val="accent1"/>
+          </a:fillRef>
+          <a:effectRef idx="0">
+            <a:schemeClr val="accent1"/>
+          </a:effectRef>
+          <a:fontRef idx="minor">
+            <a:schemeClr val="tx1"/>
+          </a:fontRef>
+        </p:style>
+      </p:cxnSp>
+      <p:cxnSp>
+        <p:nvCxnSpPr>
+          <p:cNvPr id="42" name="Straight Arrow Connector 41">
+            <a:extLst>
+              <a:ext uri="{FF2B5EF4-FFF2-40B4-BE49-F238E27FC236}">
+                <a16:creationId xmlns:a16="http://schemas.microsoft.com/office/drawing/2014/main" id="{5327B655-1121-397A-9CA1-F589B30DD736}"/>
+              </a:ext>
+            </a:extLst>
+          </p:cNvPr>
+          <p:cNvCxnSpPr>
+            <a:cxnSpLocks/>
+            <a:stCxn id="36" idx="2"/>
+            <a:endCxn id="37" idx="0"/>
+          </p:cNvCxnSpPr>
+          <p:nvPr/>
+        </p:nvCxnSpPr>
+        <p:spPr>
+          <a:xfrm>
+            <a:off x="3633381" y="7259110"/>
+            <a:ext cx="0" cy="276493"/>
+          </a:xfrm>
+          <a:prstGeom prst="straightConnector1">
+            <a:avLst/>
+          </a:prstGeom>
+          <a:ln w="19050">
+            <a:solidFill>
+              <a:schemeClr val="tx1"/>
+            </a:solidFill>
+            <a:headEnd type="none" w="med" len="med"/>
+            <a:tailEnd type="arrow" w="med" len="med"/>
+          </a:ln>
+        </p:spPr>
+        <p:style>
+          <a:lnRef idx="1">
+            <a:schemeClr val="accent1"/>
+          </a:lnRef>
+          <a:fillRef idx="0">
+            <a:schemeClr val="accent1"/>
+          </a:fillRef>
+          <a:effectRef idx="0">
+            <a:schemeClr val="accent1"/>
+          </a:effectRef>
+          <a:fontRef idx="minor">
+            <a:schemeClr val="tx1"/>
+          </a:fontRef>
+        </p:style>
+      </p:cxnSp>
+      <p:cxnSp>
+        <p:nvCxnSpPr>
+          <p:cNvPr id="43" name="Straight Arrow Connector 42">
+            <a:extLst>
+              <a:ext uri="{FF2B5EF4-FFF2-40B4-BE49-F238E27FC236}">
+                <a16:creationId xmlns:a16="http://schemas.microsoft.com/office/drawing/2014/main" id="{B954DB71-9171-6F9A-D14C-86A713998648}"/>
+              </a:ext>
+            </a:extLst>
+          </p:cNvPr>
+          <p:cNvCxnSpPr>
+            <a:cxnSpLocks/>
+            <a:stCxn id="29" idx="2"/>
+            <a:endCxn id="30" idx="0"/>
+          </p:cNvCxnSpPr>
+          <p:nvPr/>
+        </p:nvCxnSpPr>
+        <p:spPr>
+          <a:xfrm>
+            <a:off x="3633382" y="2143409"/>
+            <a:ext cx="0" cy="387820"/>
+          </a:xfrm>
+          <a:prstGeom prst="straightConnector1">
+            <a:avLst/>
+          </a:prstGeom>
+          <a:ln w="19050">
+            <a:solidFill>
+              <a:schemeClr val="tx1"/>
+            </a:solidFill>
+            <a:headEnd type="none" w="med" len="med"/>
+            <a:tailEnd type="arrow" w="med" len="med"/>
+          </a:ln>
+        </p:spPr>
+        <p:style>
+          <a:lnRef idx="1">
+            <a:schemeClr val="accent1"/>
+          </a:lnRef>
+          <a:fillRef idx="0">
+            <a:schemeClr val="accent1"/>
+          </a:fillRef>
+          <a:effectRef idx="0">
+            <a:schemeClr val="accent1"/>
+          </a:effectRef>
+          <a:fontRef idx="minor">
+            <a:schemeClr val="tx1"/>
+          </a:fontRef>
+        </p:style>
+      </p:cxnSp>
+      <p:cxnSp>
+        <p:nvCxnSpPr>
+          <p:cNvPr id="44" name="Straight Arrow Connector 39">
+            <a:extLst>
+              <a:ext uri="{FF2B5EF4-FFF2-40B4-BE49-F238E27FC236}">
+                <a16:creationId xmlns:a16="http://schemas.microsoft.com/office/drawing/2014/main" id="{28D829CA-2B20-EC7B-5887-5CCFA31D626F}"/>
+              </a:ext>
+            </a:extLst>
+          </p:cNvPr>
+          <p:cNvCxnSpPr>
+            <a:cxnSpLocks/>
+            <a:stCxn id="30" idx="2"/>
+            <a:endCxn id="32" idx="0"/>
+          </p:cNvCxnSpPr>
+          <p:nvPr/>
+        </p:nvCxnSpPr>
+        <p:spPr>
+          <a:xfrm rot="16200000" flipH="1">
+            <a:off x="4176182" y="2565510"/>
+            <a:ext cx="480983" cy="1566582"/>
+          </a:xfrm>
+          <a:prstGeom prst="bentConnector3">
+            <a:avLst>
+              <a:gd name="adj1" fmla="val 50000"/>
+            </a:avLst>
+          </a:prstGeom>
+          <a:ln w="19050">
+            <a:solidFill>
+              <a:schemeClr val="tx1"/>
+            </a:solidFill>
+            <a:headEnd type="none" w="med" len="med"/>
+            <a:tailEnd type="arrow" w="med" len="med"/>
+          </a:ln>
+        </p:spPr>
+        <p:style>
+          <a:lnRef idx="1">
+            <a:schemeClr val="accent1"/>
+          </a:lnRef>
+          <a:fillRef idx="0">
+            <a:schemeClr val="accent1"/>
+          </a:fillRef>
+          <a:effectRef idx="0">
+            <a:schemeClr val="accent1"/>
+          </a:effectRef>
+          <a:fontRef idx="minor">
+            <a:schemeClr val="tx1"/>
+          </a:fontRef>
+        </p:style>
+      </p:cxnSp>
+      <p:cxnSp>
+        <p:nvCxnSpPr>
+          <p:cNvPr id="45" name="Straight Arrow Connector 44">
+            <a:extLst>
+              <a:ext uri="{FF2B5EF4-FFF2-40B4-BE49-F238E27FC236}">
+                <a16:creationId xmlns:a16="http://schemas.microsoft.com/office/drawing/2014/main" id="{B4BAA9E8-2B6B-77BD-293D-288F8B1D232C}"/>
+              </a:ext>
+            </a:extLst>
+          </p:cNvPr>
+          <p:cNvCxnSpPr>
+            <a:cxnSpLocks/>
+            <a:stCxn id="34" idx="2"/>
+            <a:endCxn id="36" idx="0"/>
+          </p:cNvCxnSpPr>
+          <p:nvPr/>
+        </p:nvCxnSpPr>
+        <p:spPr>
+          <a:xfrm>
+            <a:off x="3633381" y="6467198"/>
+            <a:ext cx="0" cy="278219"/>
+          </a:xfrm>
+          <a:prstGeom prst="straightConnector1">
+            <a:avLst/>
+          </a:prstGeom>
+          <a:ln w="19050">
+            <a:solidFill>
+              <a:schemeClr val="tx1"/>
+            </a:solidFill>
+            <a:headEnd type="none" w="med" len="med"/>
+            <a:tailEnd type="arrow" w="med" len="med"/>
+          </a:ln>
+        </p:spPr>
+        <p:style>
+          <a:lnRef idx="1">
+            <a:schemeClr val="accent1"/>
+          </a:lnRef>
+          <a:fillRef idx="0">
+            <a:schemeClr val="accent1"/>
+          </a:fillRef>
+          <a:effectRef idx="0">
+            <a:schemeClr val="accent1"/>
+          </a:effectRef>
+          <a:fontRef idx="minor">
+            <a:schemeClr val="tx1"/>
+          </a:fontRef>
+        </p:style>
+      </p:cxnSp>
+      <p:cxnSp>
+        <p:nvCxnSpPr>
+          <p:cNvPr id="46" name="Straight Arrow Connector 45">
+            <a:extLst>
+              <a:ext uri="{FF2B5EF4-FFF2-40B4-BE49-F238E27FC236}">
+                <a16:creationId xmlns:a16="http://schemas.microsoft.com/office/drawing/2014/main" id="{E2423F59-D43F-A99B-0BDF-4A053EAD8D7A}"/>
+              </a:ext>
+            </a:extLst>
+          </p:cNvPr>
+          <p:cNvCxnSpPr>
+            <a:cxnSpLocks/>
+            <a:stCxn id="28" idx="2"/>
+            <a:endCxn id="29" idx="0"/>
+          </p:cNvCxnSpPr>
+          <p:nvPr/>
+        </p:nvCxnSpPr>
+        <p:spPr>
+          <a:xfrm flipH="1">
+            <a:off x="3633382" y="1200677"/>
+            <a:ext cx="4" cy="365651"/>
+          </a:xfrm>
+          <a:prstGeom prst="straightConnector1">
+            <a:avLst/>
+          </a:prstGeom>
+          <a:ln w="19050">
+            <a:solidFill>
+              <a:schemeClr val="tx1"/>
+            </a:solidFill>
+            <a:headEnd type="none" w="med" len="med"/>
+            <a:tailEnd type="arrow" w="med" len="med"/>
+          </a:ln>
+        </p:spPr>
+        <p:style>
+          <a:lnRef idx="1">
+            <a:schemeClr val="accent1"/>
+          </a:lnRef>
+          <a:fillRef idx="0">
+            <a:schemeClr val="accent1"/>
+          </a:fillRef>
+          <a:effectRef idx="0">
+            <a:schemeClr val="accent1"/>
+          </a:effectRef>
+          <a:fontRef idx="minor">
+            <a:schemeClr val="tx1"/>
+          </a:fontRef>
+        </p:style>
+      </p:cxnSp>
+      <p:cxnSp>
+        <p:nvCxnSpPr>
+          <p:cNvPr id="49" name="Straight Arrow Connector 48">
+            <a:extLst>
+              <a:ext uri="{FF2B5EF4-FFF2-40B4-BE49-F238E27FC236}">
+                <a16:creationId xmlns:a16="http://schemas.microsoft.com/office/drawing/2014/main" id="{EA244CC3-F17E-102E-BF10-FC3BA680C682}"/>
+              </a:ext>
+            </a:extLst>
+          </p:cNvPr>
+          <p:cNvCxnSpPr>
+            <a:cxnSpLocks/>
+            <a:stCxn id="35" idx="2"/>
+          </p:cNvCxnSpPr>
+          <p:nvPr/>
+        </p:nvCxnSpPr>
+        <p:spPr>
+          <a:xfrm>
+            <a:off x="2074453" y="5691903"/>
+            <a:ext cx="0" cy="359797"/>
+          </a:xfrm>
+          <a:prstGeom prst="straightConnector1">
+            <a:avLst/>
+          </a:prstGeom>
+          <a:ln w="19050">
+            <a:solidFill>
+              <a:schemeClr val="tx1"/>
+            </a:solidFill>
+            <a:headEnd type="none" w="med" len="med"/>
+            <a:tailEnd type="arrow" w="med" len="med"/>
+          </a:ln>
+        </p:spPr>
+        <p:style>
+          <a:lnRef idx="1">
+            <a:schemeClr val="accent1"/>
+          </a:lnRef>
+          <a:fillRef idx="0">
+            <a:schemeClr val="accent1"/>
+          </a:fillRef>
+          <a:effectRef idx="0">
+            <a:schemeClr val="accent1"/>
+          </a:effectRef>
+          <a:fontRef idx="minor">
+            <a:schemeClr val="tx1"/>
+          </a:fontRef>
+        </p:style>
+      </p:cxnSp>
+      <p:sp>
+        <p:nvSpPr>
+          <p:cNvPr id="50" name="TextBox 49">
+            <a:extLst>
+              <a:ext uri="{FF2B5EF4-FFF2-40B4-BE49-F238E27FC236}">
+                <a16:creationId xmlns:a16="http://schemas.microsoft.com/office/drawing/2014/main" id="{C8F812A7-7034-446A-39B3-B8D6A9E94B08}"/>
+              </a:ext>
+            </a:extLst>
+          </p:cNvPr>
+          <p:cNvSpPr txBox="1"/>
+          <p:nvPr/>
+        </p:nvSpPr>
+        <p:spPr>
+          <a:xfrm>
+            <a:off x="556834" y="8387560"/>
+            <a:ext cx="6153091" cy="577081"/>
+          </a:xfrm>
+          <a:prstGeom prst="rect">
+            <a:avLst/>
+          </a:prstGeom>
+          <a:noFill/>
+          <a:ln w="19050">
+            <a:solidFill>
+              <a:schemeClr val="accent5">
+                <a:lumMod val="75000"/>
+              </a:schemeClr>
+            </a:solidFill>
+          </a:ln>
+        </p:spPr>
+        <p:txBody>
+          <a:bodyPr wrap="square" rtlCol="0">
+            <a:spAutoFit/>
+          </a:bodyPr>
+          <a:lstStyle/>
+          <a:p>
+            <a:pPr algn="ctr"/>
+            <a:r>
+              <a:rPr lang="en-US" sz="1050" b="1" dirty="0">
+                <a:latin typeface="Helvetica" pitchFamily="2" charset="0"/>
+                <a:cs typeface="Times New Roman" panose="02020603050405020304" pitchFamily="18" charset="0"/>
+              </a:rPr>
+              <a:t>FASTA and GFF generated</a:t>
+            </a:r>
+          </a:p>
+          <a:p>
+            <a:pPr algn="ctr"/>
+            <a:r>
+              <a:rPr lang="en-US" sz="1050" dirty="0">
+                <a:latin typeface="Helvetica" pitchFamily="2" charset="0"/>
+                <a:cs typeface="Times New Roman" panose="02020603050405020304" pitchFamily="18" charset="0"/>
+              </a:rPr>
+              <a:t>For each </a:t>
+            </a:r>
+            <a:r>
+              <a:rPr lang="en-US" sz="1050" i="1" dirty="0">
+                <a:latin typeface="Helvetica" pitchFamily="2" charset="0"/>
+                <a:cs typeface="Times New Roman" panose="02020603050405020304" pitchFamily="18" charset="0"/>
+              </a:rPr>
+              <a:t>Fusarium </a:t>
+            </a:r>
+            <a:r>
+              <a:rPr lang="en-US" sz="1050" dirty="0">
+                <a:latin typeface="Helvetica" pitchFamily="2" charset="0"/>
+                <a:cs typeface="Times New Roman" panose="02020603050405020304" pitchFamily="18" charset="0"/>
+              </a:rPr>
+              <a:t>assembly included, a candidate effector FASTA and GFF file is generated using various custom python scripts. </a:t>
+            </a:r>
+          </a:p>
+        </p:txBody>
+      </p:sp>
+      <p:cxnSp>
+        <p:nvCxnSpPr>
+          <p:cNvPr id="51" name="Straight Arrow Connector 50">
+            <a:extLst>
+              <a:ext uri="{FF2B5EF4-FFF2-40B4-BE49-F238E27FC236}">
+                <a16:creationId xmlns:a16="http://schemas.microsoft.com/office/drawing/2014/main" id="{085083E8-AE12-9C4E-9838-224450859E01}"/>
+              </a:ext>
+            </a:extLst>
+          </p:cNvPr>
+          <p:cNvCxnSpPr>
+            <a:cxnSpLocks/>
+            <a:stCxn id="37" idx="2"/>
+            <a:endCxn id="50" idx="0"/>
+          </p:cNvCxnSpPr>
+          <p:nvPr/>
+        </p:nvCxnSpPr>
+        <p:spPr>
+          <a:xfrm flipH="1">
+            <a:off x="3633380" y="8112684"/>
+            <a:ext cx="1" cy="274876"/>
+          </a:xfrm>
+          <a:prstGeom prst="straightConnector1">
+            <a:avLst/>
+          </a:prstGeom>
+          <a:ln w="19050">
+            <a:solidFill>
+              <a:schemeClr val="tx1"/>
+            </a:solidFill>
+            <a:headEnd type="none" w="med" len="med"/>
+            <a:tailEnd type="arrow" w="med" len="med"/>
+          </a:ln>
+        </p:spPr>
+        <p:style>
+          <a:lnRef idx="1">
+            <a:schemeClr val="accent1"/>
+          </a:lnRef>
+          <a:fillRef idx="0">
+            <a:schemeClr val="accent1"/>
+          </a:fillRef>
+          <a:effectRef idx="0">
+            <a:schemeClr val="accent1"/>
+          </a:effectRef>
+          <a:fontRef idx="minor">
+            <a:schemeClr val="tx1"/>
+          </a:fontRef>
+        </p:style>
+      </p:cxnSp>
+      <p:sp>
+        <p:nvSpPr>
+          <p:cNvPr id="122" name="TextBox 121">
+            <a:extLst>
+              <a:ext uri="{FF2B5EF4-FFF2-40B4-BE49-F238E27FC236}">
+                <a16:creationId xmlns:a16="http://schemas.microsoft.com/office/drawing/2014/main" id="{9A0F104F-1CAC-EE54-751C-52AA12B72BEB}"/>
+              </a:ext>
+            </a:extLst>
+          </p:cNvPr>
+          <p:cNvSpPr txBox="1"/>
+          <p:nvPr/>
+        </p:nvSpPr>
+        <p:spPr>
+          <a:xfrm>
+            <a:off x="556834" y="9175160"/>
+            <a:ext cx="6153091" cy="577081"/>
+          </a:xfrm>
+          <a:prstGeom prst="rect">
+            <a:avLst/>
+          </a:prstGeom>
+          <a:noFill/>
+          <a:ln w="19050">
+            <a:solidFill>
+              <a:srgbClr val="538234"/>
+            </a:solidFill>
+          </a:ln>
+        </p:spPr>
+        <p:txBody>
+          <a:bodyPr wrap="square" rtlCol="0">
+            <a:spAutoFit/>
+          </a:bodyPr>
+          <a:lstStyle/>
+          <a:p>
+            <a:pPr algn="ctr"/>
+            <a:r>
+              <a:rPr lang="en-GB" sz="1050" b="1" dirty="0">
+                <a:latin typeface="Helvetica" pitchFamily="2" charset="0"/>
+                <a:cs typeface="Times New Roman" panose="02020603050405020304" pitchFamily="18" charset="0"/>
+              </a:rPr>
+              <a:t>Candidate effector clustering</a:t>
+            </a:r>
+          </a:p>
+          <a:p>
+            <a:pPr algn="ctr"/>
+            <a:r>
+              <a:rPr lang="en-US" sz="1050" dirty="0">
+                <a:latin typeface="Helvetica" pitchFamily="2" charset="0"/>
+                <a:cs typeface="Times New Roman"/>
+              </a:rPr>
+              <a:t>             Candidate effector sequences are from all assemblies are combined into one FASTA and clustered using CD-HIT (v4.8.1) (80% identity).  </a:t>
+            </a:r>
+            <a:endParaRPr lang="en-US" sz="1050" dirty="0">
+              <a:latin typeface="Helvetica" pitchFamily="2" charset="0"/>
+              <a:cs typeface="Times New Roman" panose="02020603050405020304" pitchFamily="18" charset="0"/>
+            </a:endParaRPr>
+          </a:p>
+        </p:txBody>
+      </p:sp>
+      <p:cxnSp>
+        <p:nvCxnSpPr>
+          <p:cNvPr id="163" name="Straight Arrow Connector 162">
+            <a:extLst>
+              <a:ext uri="{FF2B5EF4-FFF2-40B4-BE49-F238E27FC236}">
+                <a16:creationId xmlns:a16="http://schemas.microsoft.com/office/drawing/2014/main" id="{B5BEDAD8-B981-7F55-7E04-9EDD87DD9D71}"/>
+              </a:ext>
+            </a:extLst>
+          </p:cNvPr>
+          <p:cNvCxnSpPr>
+            <a:cxnSpLocks/>
+            <a:stCxn id="50" idx="2"/>
+            <a:endCxn id="122" idx="0"/>
+          </p:cNvCxnSpPr>
+          <p:nvPr/>
+        </p:nvCxnSpPr>
+        <p:spPr>
+          <a:xfrm>
+            <a:off x="3633380" y="8964641"/>
+            <a:ext cx="0" cy="210519"/>
+          </a:xfrm>
+          <a:prstGeom prst="straightConnector1">
+            <a:avLst/>
+          </a:prstGeom>
+          <a:ln w="19050">
+            <a:solidFill>
+              <a:schemeClr val="tx1"/>
+            </a:solidFill>
+            <a:headEnd type="none" w="med" len="med"/>
+            <a:tailEnd type="arrow" w="med" len="med"/>
+          </a:ln>
+        </p:spPr>
+        <p:style>
+          <a:lnRef idx="1">
+            <a:schemeClr val="accent1"/>
+          </a:lnRef>
+          <a:fillRef idx="0">
+            <a:schemeClr val="accent1"/>
+          </a:fillRef>
+          <a:effectRef idx="0">
+            <a:schemeClr val="accent1"/>
+          </a:effectRef>
+          <a:fontRef idx="minor">
+            <a:schemeClr val="tx1"/>
+          </a:fontRef>
+        </p:style>
+      </p:cxnSp>
     </p:spTree>
     <p:extLst>
       <p:ext uri="{BB962C8B-B14F-4D97-AF65-F5344CB8AC3E}">

</xml_diff>